<commit_message>
Updates to Capstone Presentation
</commit_message>
<xml_diff>
--- a/Thesis/CapstonePresentaion/Classifying Chaotic Synthesizers with a Multimodal Neural Network.pptx
+++ b/Thesis/CapstonePresentaion/Classifying Chaotic Synthesizers with a Multimodal Neural Network.pptx
@@ -5,10 +5,10 @@
     <p:sldMasterId id="2147483648" r:id="rId1"/>
   </p:sldMasterIdLst>
   <p:notesMasterIdLst>
-    <p:notesMasterId r:id="rId18"/>
+    <p:notesMasterId r:id="rId22"/>
   </p:notesMasterIdLst>
   <p:handoutMasterIdLst>
-    <p:handoutMasterId r:id="rId19"/>
+    <p:handoutMasterId r:id="rId23"/>
   </p:handoutMasterIdLst>
   <p:sldIdLst>
     <p:sldId id="256" r:id="rId2"/>
@@ -21,12 +21,16 @@
     <p:sldId id="269" r:id="rId9"/>
     <p:sldId id="270" r:id="rId10"/>
     <p:sldId id="272" r:id="rId11"/>
-    <p:sldId id="271" r:id="rId12"/>
-    <p:sldId id="264" r:id="rId13"/>
-    <p:sldId id="266" r:id="rId14"/>
+    <p:sldId id="264" r:id="rId12"/>
+    <p:sldId id="266" r:id="rId13"/>
+    <p:sldId id="273" r:id="rId14"/>
     <p:sldId id="267" r:id="rId15"/>
-    <p:sldId id="265" r:id="rId16"/>
-    <p:sldId id="268" r:id="rId17"/>
+    <p:sldId id="274" r:id="rId16"/>
+    <p:sldId id="265" r:id="rId17"/>
+    <p:sldId id="268" r:id="rId18"/>
+    <p:sldId id="275" r:id="rId19"/>
+    <p:sldId id="276" r:id="rId20"/>
+    <p:sldId id="277" r:id="rId21"/>
   </p:sldIdLst>
   <p:sldSz cx="12192000" cy="6858000"/>
   <p:notesSz cx="6858000" cy="9144000"/>
@@ -2077,7 +2081,7 @@
                 <a:schemeClr val="bg1"/>
               </a:solidFill>
             </a:rPr>
-            <a:t>We update the Parameters in each layer </a:t>
+            <a:t>Choose parameters to minimize the objective function</a:t>
           </a:r>
         </a:p>
       </dgm:t>
@@ -3042,7 +3046,7 @@
                 <a:schemeClr val="bg1"/>
               </a:solidFill>
             </a:rPr>
-            <a:t>We update the Parameters in each layer </a:t>
+            <a:t>Choose parameters to minimize the objective function</a:t>
           </a:r>
         </a:p>
       </dsp:txBody>
@@ -9733,6 +9737,24 @@
           <a:p>
             <a:r>
               <a:rPr lang="en-US" dirty="0"/>
+              <a:t>Adjust each </a:t>
+            </a:r>
+            <a:r>
+              <a:rPr lang="en-US" dirty="0" err="1"/>
+              <a:t>each</a:t>
+            </a:r>
+            <a:r>
+              <a:rPr lang="en-US" dirty="0"/>
+              <a:t> parameter to minimize cost function</a:t>
+            </a:r>
+          </a:p>
+          <a:p>
+            <a:pPr lvl="1"/>
+            <a:endParaRPr lang="en-US" dirty="0"/>
+          </a:p>
+          <a:p>
+            <a:r>
+              <a:rPr lang="en-US" dirty="0"/>
               <a:t>Based on Gradient Descent</a:t>
             </a:r>
           </a:p>
@@ -9740,7 +9762,7 @@
             <a:pPr lvl="1"/>
             <a:r>
               <a:rPr lang="en-US" dirty="0"/>
-              <a:t>Computer gradient w.r.t cost function</a:t>
+              <a:t>Compute gradient w.r.t cost function</a:t>
             </a:r>
           </a:p>
           <a:p>
@@ -9819,111 +9841,6 @@
           <p:cNvPr id="2" name="Title 1">
             <a:extLst>
               <a:ext uri="{FF2B5EF4-FFF2-40B4-BE49-F238E27FC236}">
-                <a16:creationId xmlns:a16="http://schemas.microsoft.com/office/drawing/2014/main" id="{2CA552BD-5189-45FF-BDBD-E4F4FAD9B732}"/>
-              </a:ext>
-            </a:extLst>
-          </p:cNvPr>
-          <p:cNvSpPr>
-            <a:spLocks noGrp="1"/>
-          </p:cNvSpPr>
-          <p:nvPr>
-            <p:ph type="title"/>
-          </p:nvPr>
-        </p:nvSpPr>
-        <p:spPr/>
-        <p:txBody>
-          <a:bodyPr/>
-          <a:lstStyle/>
-          <a:p>
-            <a:endParaRPr lang="en-US"/>
-          </a:p>
-        </p:txBody>
-      </p:sp>
-      <p:sp>
-        <p:nvSpPr>
-          <p:cNvPr id="3" name="Content Placeholder 2">
-            <a:extLst>
-              <a:ext uri="{FF2B5EF4-FFF2-40B4-BE49-F238E27FC236}">
-                <a16:creationId xmlns:a16="http://schemas.microsoft.com/office/drawing/2014/main" id="{FA0C0548-9FEB-4ABB-867D-6A1E0EF7EA8A}"/>
-              </a:ext>
-            </a:extLst>
-          </p:cNvPr>
-          <p:cNvSpPr>
-            <a:spLocks noGrp="1"/>
-          </p:cNvSpPr>
-          <p:nvPr>
-            <p:ph idx="1"/>
-          </p:nvPr>
-        </p:nvSpPr>
-        <p:spPr/>
-        <p:txBody>
-          <a:bodyPr/>
-          <a:lstStyle/>
-          <a:p>
-            <a:endParaRPr lang="en-US"/>
-          </a:p>
-        </p:txBody>
-      </p:sp>
-      <p:sp>
-        <p:nvSpPr>
-          <p:cNvPr id="4" name="Text Placeholder 3">
-            <a:extLst>
-              <a:ext uri="{FF2B5EF4-FFF2-40B4-BE49-F238E27FC236}">
-                <a16:creationId xmlns:a16="http://schemas.microsoft.com/office/drawing/2014/main" id="{1661950F-0E90-4E21-A94D-47C2BEF099BF}"/>
-              </a:ext>
-            </a:extLst>
-          </p:cNvPr>
-          <p:cNvSpPr>
-            <a:spLocks noGrp="1"/>
-          </p:cNvSpPr>
-          <p:nvPr>
-            <p:ph type="body" sz="half" idx="2"/>
-          </p:nvPr>
-        </p:nvSpPr>
-        <p:spPr/>
-        <p:txBody>
-          <a:bodyPr/>
-          <a:lstStyle/>
-          <a:p>
-            <a:endParaRPr lang="en-US"/>
-          </a:p>
-        </p:txBody>
-      </p:sp>
-    </p:spTree>
-    <p:extLst>
-      <p:ext uri="{BB962C8B-B14F-4D97-AF65-F5344CB8AC3E}">
-        <p14:creationId xmlns:p14="http://schemas.microsoft.com/office/powerpoint/2010/main" val="1183860635"/>
-      </p:ext>
-    </p:extLst>
-  </p:cSld>
-  <p:clrMapOvr>
-    <a:masterClrMapping/>
-  </p:clrMapOvr>
-</p:sld>
-</file>
-
-<file path=ppt/slides/slide12.xml><?xml version="1.0" encoding="utf-8"?>
-<p:sld xmlns:a="http://schemas.openxmlformats.org/drawingml/2006/main" xmlns:r="http://schemas.openxmlformats.org/officeDocument/2006/relationships" xmlns:p="http://schemas.openxmlformats.org/presentationml/2006/main">
-  <p:cSld>
-    <p:spTree>
-      <p:nvGrpSpPr>
-        <p:cNvPr id="1" name=""/>
-        <p:cNvGrpSpPr/>
-        <p:nvPr/>
-      </p:nvGrpSpPr>
-      <p:grpSpPr>
-        <a:xfrm>
-          <a:off x="0" y="0"/>
-          <a:ext cx="0" cy="0"/>
-          <a:chOff x="0" y="0"/>
-          <a:chExt cx="0" cy="0"/>
-        </a:xfrm>
-      </p:grpSpPr>
-      <p:sp>
-        <p:nvSpPr>
-          <p:cNvPr id="2" name="Title 1">
-            <a:extLst>
-              <a:ext uri="{FF2B5EF4-FFF2-40B4-BE49-F238E27FC236}">
                 <a16:creationId xmlns:a16="http://schemas.microsoft.com/office/drawing/2014/main" id="{6E245FA5-1622-40FD-9D94-81D541C99921}"/>
               </a:ext>
             </a:extLst>
@@ -9988,7 +9905,7 @@
 </p:sld>
 </file>
 
-<file path=ppt/slides/slide13.xml><?xml version="1.0" encoding="utf-8"?>
+<file path=ppt/slides/slide12.xml><?xml version="1.0" encoding="utf-8"?>
 <p:sld xmlns:a="http://schemas.openxmlformats.org/drawingml/2006/main" xmlns:r="http://schemas.openxmlformats.org/officeDocument/2006/relationships" xmlns:p="http://schemas.openxmlformats.org/presentationml/2006/main">
   <p:cSld>
     <p:spTree>
@@ -10115,6 +10032,20 @@
             <a:endParaRPr lang="en-US" dirty="0"/>
           </a:p>
           <a:p>
+            <a:r>
+              <a:rPr lang="en-US" dirty="0"/>
+              <a:t>Features are </a:t>
+            </a:r>
+            <a:r>
+              <a:rPr lang="en-US" i="1" dirty="0"/>
+              <a:t>inputs</a:t>
+            </a:r>
+            <a:r>
+              <a:rPr lang="en-US" dirty="0"/>
+              <a:t> that we provide to the neural network</a:t>
+            </a:r>
+          </a:p>
+          <a:p>
             <a:endParaRPr lang="en-US" dirty="0"/>
           </a:p>
           <a:p>
@@ -10129,6 +10060,169 @@
     <p:extLst>
       <p:ext uri="{BB962C8B-B14F-4D97-AF65-F5344CB8AC3E}">
         <p14:creationId xmlns:p14="http://schemas.microsoft.com/office/powerpoint/2010/main" val="3503023060"/>
+      </p:ext>
+    </p:extLst>
+  </p:cSld>
+  <p:clrMapOvr>
+    <a:masterClrMapping/>
+  </p:clrMapOvr>
+</p:sld>
+</file>
+
+<file path=ppt/slides/slide13.xml><?xml version="1.0" encoding="utf-8"?>
+<p:sld xmlns:a="http://schemas.openxmlformats.org/drawingml/2006/main" xmlns:r="http://schemas.openxmlformats.org/officeDocument/2006/relationships" xmlns:p="http://schemas.openxmlformats.org/presentationml/2006/main">
+  <p:cSld>
+    <p:spTree>
+      <p:nvGrpSpPr>
+        <p:cNvPr id="1" name=""/>
+        <p:cNvGrpSpPr/>
+        <p:nvPr/>
+      </p:nvGrpSpPr>
+      <p:grpSpPr>
+        <a:xfrm>
+          <a:off x="0" y="0"/>
+          <a:ext cx="0" cy="0"/>
+          <a:chOff x="0" y="0"/>
+          <a:chExt cx="0" cy="0"/>
+        </a:xfrm>
+      </p:grpSpPr>
+      <p:sp>
+        <p:nvSpPr>
+          <p:cNvPr id="2" name="Title 1">
+            <a:extLst>
+              <a:ext uri="{FF2B5EF4-FFF2-40B4-BE49-F238E27FC236}">
+                <a16:creationId xmlns:a16="http://schemas.microsoft.com/office/drawing/2014/main" id="{6F4B16F3-AE1E-44C6-A8CD-E20D86BE9985}"/>
+              </a:ext>
+            </a:extLst>
+          </p:cNvPr>
+          <p:cNvSpPr>
+            <a:spLocks noGrp="1"/>
+          </p:cNvSpPr>
+          <p:nvPr>
+            <p:ph type="title"/>
+          </p:nvPr>
+        </p:nvSpPr>
+        <p:spPr/>
+        <p:txBody>
+          <a:bodyPr/>
+          <a:lstStyle/>
+          <a:p>
+            <a:r>
+              <a:rPr lang="en-US" dirty="0"/>
+              <a:t>Consider The Task</a:t>
+            </a:r>
+          </a:p>
+        </p:txBody>
+      </p:sp>
+      <p:sp>
+        <p:nvSpPr>
+          <p:cNvPr id="3" name="Content Placeholder 2">
+            <a:extLst>
+              <a:ext uri="{FF2B5EF4-FFF2-40B4-BE49-F238E27FC236}">
+                <a16:creationId xmlns:a16="http://schemas.microsoft.com/office/drawing/2014/main" id="{444C7747-633B-4747-BBC9-2FF12797CC78}"/>
+              </a:ext>
+            </a:extLst>
+          </p:cNvPr>
+          <p:cNvSpPr>
+            <a:spLocks noGrp="1"/>
+          </p:cNvSpPr>
+          <p:nvPr>
+            <p:ph idx="1"/>
+          </p:nvPr>
+        </p:nvSpPr>
+        <p:spPr/>
+        <p:txBody>
+          <a:bodyPr/>
+          <a:lstStyle/>
+          <a:p>
+            <a:r>
+              <a:rPr lang="en-US" dirty="0"/>
+              <a:t>Consider Making a binary classifier model</a:t>
+            </a:r>
+          </a:p>
+          <a:p>
+            <a:pPr lvl="1"/>
+            <a:r>
+              <a:rPr lang="en-US" dirty="0"/>
+              <a:t>Been to space vs. have not been to space</a:t>
+            </a:r>
+          </a:p>
+          <a:p>
+            <a:pPr lvl="1"/>
+            <a:endParaRPr lang="en-US" dirty="0"/>
+          </a:p>
+          <a:p>
+            <a:r>
+              <a:rPr lang="en-US" dirty="0"/>
+              <a:t>Consider the features</a:t>
+            </a:r>
+          </a:p>
+          <a:p>
+            <a:pPr lvl="1"/>
+            <a:r>
+              <a:rPr lang="en-US" dirty="0"/>
+              <a:t>Date of Birth</a:t>
+            </a:r>
+          </a:p>
+          <a:p>
+            <a:pPr lvl="1"/>
+            <a:r>
+              <a:rPr lang="en-US" dirty="0"/>
+              <a:t>Eye Color</a:t>
+            </a:r>
+          </a:p>
+          <a:p>
+            <a:pPr lvl="1"/>
+            <a:r>
+              <a:rPr lang="en-US" dirty="0"/>
+              <a:t>Country of Birth</a:t>
+            </a:r>
+          </a:p>
+          <a:p>
+            <a:pPr lvl="1"/>
+            <a:endParaRPr lang="en-US" dirty="0"/>
+          </a:p>
+          <a:p>
+            <a:pPr lvl="1"/>
+            <a:endParaRPr lang="en-US" dirty="0"/>
+          </a:p>
+        </p:txBody>
+      </p:sp>
+      <p:sp>
+        <p:nvSpPr>
+          <p:cNvPr id="4" name="Text Placeholder 3">
+            <a:extLst>
+              <a:ext uri="{FF2B5EF4-FFF2-40B4-BE49-F238E27FC236}">
+                <a16:creationId xmlns:a16="http://schemas.microsoft.com/office/drawing/2014/main" id="{E3D6B6A0-E7F1-48AE-8E7E-C7B1A3EF434C}"/>
+              </a:ext>
+            </a:extLst>
+          </p:cNvPr>
+          <p:cNvSpPr>
+            <a:spLocks noGrp="1"/>
+          </p:cNvSpPr>
+          <p:nvPr>
+            <p:ph type="body" sz="half" idx="2"/>
+          </p:nvPr>
+        </p:nvSpPr>
+        <p:spPr/>
+        <p:txBody>
+          <a:bodyPr/>
+          <a:lstStyle/>
+          <a:p>
+            <a:endParaRPr lang="en-US" dirty="0"/>
+          </a:p>
+          <a:p>
+            <a:r>
+              <a:rPr lang="en-US" dirty="0"/>
+              <a:t>Which are useful? Which are not?</a:t>
+            </a:r>
+          </a:p>
+        </p:txBody>
+      </p:sp>
+    </p:spTree>
+    <p:extLst>
+      <p:ext uri="{BB962C8B-B14F-4D97-AF65-F5344CB8AC3E}">
+        <p14:creationId xmlns:p14="http://schemas.microsoft.com/office/powerpoint/2010/main" val="3730803208"/>
       </p:ext>
     </p:extLst>
   </p:cSld>
@@ -10309,6 +10403,195 @@
           <p:cNvPr id="2" name="Title 1">
             <a:extLst>
               <a:ext uri="{FF2B5EF4-FFF2-40B4-BE49-F238E27FC236}">
+                <a16:creationId xmlns:a16="http://schemas.microsoft.com/office/drawing/2014/main" id="{746F704E-FF07-4E4F-9C69-ABE19B4CB770}"/>
+              </a:ext>
+            </a:extLst>
+          </p:cNvPr>
+          <p:cNvSpPr>
+            <a:spLocks noGrp="1"/>
+          </p:cNvSpPr>
+          <p:nvPr>
+            <p:ph type="title"/>
+          </p:nvPr>
+        </p:nvSpPr>
+        <p:spPr/>
+        <p:txBody>
+          <a:bodyPr/>
+          <a:lstStyle/>
+          <a:p>
+            <a:r>
+              <a:rPr lang="en-US" dirty="0"/>
+              <a:t>Decision Boundaries</a:t>
+            </a:r>
+          </a:p>
+        </p:txBody>
+      </p:sp>
+      <p:sp>
+        <p:nvSpPr>
+          <p:cNvPr id="3" name="Text Placeholder 2">
+            <a:extLst>
+              <a:ext uri="{FF2B5EF4-FFF2-40B4-BE49-F238E27FC236}">
+                <a16:creationId xmlns:a16="http://schemas.microsoft.com/office/drawing/2014/main" id="{1997D637-D4EB-4CC9-A5D7-E124AD51AA3F}"/>
+              </a:ext>
+            </a:extLst>
+          </p:cNvPr>
+          <p:cNvSpPr>
+            <a:spLocks noGrp="1"/>
+          </p:cNvSpPr>
+          <p:nvPr>
+            <p:ph type="body" idx="1"/>
+          </p:nvPr>
+        </p:nvSpPr>
+        <p:spPr>
+          <a:xfrm>
+            <a:off x="457199" y="1828800"/>
+            <a:ext cx="5413249" cy="685800"/>
+          </a:xfrm>
+        </p:spPr>
+        <p:txBody>
+          <a:bodyPr/>
+          <a:lstStyle/>
+          <a:p>
+            <a:r>
+              <a:rPr lang="en-US" dirty="0"/>
+              <a:t>Separable</a:t>
+            </a:r>
+          </a:p>
+        </p:txBody>
+      </p:sp>
+      <p:pic>
+        <p:nvPicPr>
+          <p:cNvPr id="8" name="Content Placeholder 7" descr="Chart, scatter chart&#10;&#10;Description automatically generated">
+            <a:extLst>
+              <a:ext uri="{FF2B5EF4-FFF2-40B4-BE49-F238E27FC236}">
+                <a16:creationId xmlns:a16="http://schemas.microsoft.com/office/drawing/2014/main" id="{0BC6FAB9-F7A1-437E-AD90-E16C26279939}"/>
+              </a:ext>
+            </a:extLst>
+          </p:cNvPr>
+          <p:cNvPicPr>
+            <a:picLocks noGrp="1" noChangeAspect="1"/>
+          </p:cNvPicPr>
+          <p:nvPr>
+            <p:ph sz="half" idx="2"/>
+          </p:nvPr>
+        </p:nvPicPr>
+        <p:blipFill>
+          <a:blip r:embed="rId2" cstate="print">
+            <a:extLst>
+              <a:ext uri="{28A0092B-C50C-407E-A947-70E740481C1C}">
+                <a14:useLocalDpi xmlns:a14="http://schemas.microsoft.com/office/drawing/2010/main" val="0"/>
+              </a:ext>
+            </a:extLst>
+          </a:blip>
+          <a:stretch>
+            <a:fillRect/>
+          </a:stretch>
+        </p:blipFill>
+        <p:spPr>
+          <a:xfrm>
+            <a:off x="457199" y="2514600"/>
+            <a:ext cx="4971201" cy="2590800"/>
+          </a:xfrm>
+        </p:spPr>
+      </p:pic>
+      <p:sp>
+        <p:nvSpPr>
+          <p:cNvPr id="5" name="Text Placeholder 4">
+            <a:extLst>
+              <a:ext uri="{FF2B5EF4-FFF2-40B4-BE49-F238E27FC236}">
+                <a16:creationId xmlns:a16="http://schemas.microsoft.com/office/drawing/2014/main" id="{DDFC2A11-D414-4BA0-956E-614C36193B66}"/>
+              </a:ext>
+            </a:extLst>
+          </p:cNvPr>
+          <p:cNvSpPr>
+            <a:spLocks noGrp="1"/>
+          </p:cNvSpPr>
+          <p:nvPr>
+            <p:ph type="body" sz="quarter" idx="3"/>
+          </p:nvPr>
+        </p:nvSpPr>
+        <p:spPr/>
+        <p:txBody>
+          <a:bodyPr/>
+          <a:lstStyle/>
+          <a:p>
+            <a:r>
+              <a:rPr lang="en-US" dirty="0"/>
+              <a:t>Non-Separable</a:t>
+            </a:r>
+          </a:p>
+        </p:txBody>
+      </p:sp>
+      <p:pic>
+        <p:nvPicPr>
+          <p:cNvPr id="10" name="Content Placeholder 9" descr="Chart, scatter chart&#10;&#10;Description automatically generated">
+            <a:extLst>
+              <a:ext uri="{FF2B5EF4-FFF2-40B4-BE49-F238E27FC236}">
+                <a16:creationId xmlns:a16="http://schemas.microsoft.com/office/drawing/2014/main" id="{507E246A-EA50-4A7D-870C-CFDEDC1F52D6}"/>
+              </a:ext>
+            </a:extLst>
+          </p:cNvPr>
+          <p:cNvPicPr>
+            <a:picLocks noGrp="1" noChangeAspect="1"/>
+          </p:cNvPicPr>
+          <p:nvPr>
+            <p:ph sz="quarter" idx="4"/>
+          </p:nvPr>
+        </p:nvPicPr>
+        <p:blipFill>
+          <a:blip r:embed="rId3" cstate="print">
+            <a:extLst>
+              <a:ext uri="{28A0092B-C50C-407E-A947-70E740481C1C}">
+                <a14:useLocalDpi xmlns:a14="http://schemas.microsoft.com/office/drawing/2010/main" val="0"/>
+              </a:ext>
+            </a:extLst>
+          </a:blip>
+          <a:stretch>
+            <a:fillRect/>
+          </a:stretch>
+        </p:blipFill>
+        <p:spPr>
+          <a:xfrm>
+            <a:off x="6466223" y="2438400"/>
+            <a:ext cx="5029200" cy="2620150"/>
+          </a:xfrm>
+        </p:spPr>
+      </p:pic>
+    </p:spTree>
+    <p:extLst>
+      <p:ext uri="{BB962C8B-B14F-4D97-AF65-F5344CB8AC3E}">
+        <p14:creationId xmlns:p14="http://schemas.microsoft.com/office/powerpoint/2010/main" val="1875312511"/>
+      </p:ext>
+    </p:extLst>
+  </p:cSld>
+  <p:clrMapOvr>
+    <a:masterClrMapping/>
+  </p:clrMapOvr>
+</p:sld>
+</file>
+
+<file path=ppt/slides/slide16.xml><?xml version="1.0" encoding="utf-8"?>
+<p:sld xmlns:a="http://schemas.openxmlformats.org/drawingml/2006/main" xmlns:r="http://schemas.openxmlformats.org/officeDocument/2006/relationships" xmlns:p="http://schemas.openxmlformats.org/presentationml/2006/main">
+  <p:cSld>
+    <p:spTree>
+      <p:nvGrpSpPr>
+        <p:cNvPr id="1" name=""/>
+        <p:cNvGrpSpPr/>
+        <p:nvPr/>
+      </p:nvGrpSpPr>
+      <p:grpSpPr>
+        <a:xfrm>
+          <a:off x="0" y="0"/>
+          <a:ext cx="0" cy="0"/>
+          <a:chOff x="0" y="0"/>
+          <a:chExt cx="0" cy="0"/>
+        </a:xfrm>
+      </p:grpSpPr>
+      <p:sp>
+        <p:nvSpPr>
+          <p:cNvPr id="2" name="Title 1">
+            <a:extLst>
+              <a:ext uri="{FF2B5EF4-FFF2-40B4-BE49-F238E27FC236}">
                 <a16:creationId xmlns:a16="http://schemas.microsoft.com/office/drawing/2014/main" id="{C60E6861-121A-406E-AB06-061356006C06}"/>
               </a:ext>
             </a:extLst>
@@ -10427,7 +10710,7 @@
 </p:sld>
 </file>
 
-<file path=ppt/slides/slide16.xml><?xml version="1.0" encoding="utf-8"?>
+<file path=ppt/slides/slide17.xml><?xml version="1.0" encoding="utf-8"?>
 <p:sld xmlns:a="http://schemas.openxmlformats.org/drawingml/2006/main" xmlns:r="http://schemas.openxmlformats.org/officeDocument/2006/relationships" xmlns:p="http://schemas.openxmlformats.org/presentationml/2006/main">
   <p:cSld>
     <p:spTree>
@@ -10526,6 +10809,268 @@
     <p:extLst>
       <p:ext uri="{BB962C8B-B14F-4D97-AF65-F5344CB8AC3E}">
         <p14:creationId xmlns:p14="http://schemas.microsoft.com/office/powerpoint/2010/main" val="1580390925"/>
+      </p:ext>
+    </p:extLst>
+  </p:cSld>
+  <p:clrMapOvr>
+    <a:masterClrMapping/>
+  </p:clrMapOvr>
+</p:sld>
+</file>
+
+<file path=ppt/slides/slide18.xml><?xml version="1.0" encoding="utf-8"?>
+<p:sld xmlns:a="http://schemas.openxmlformats.org/drawingml/2006/main" xmlns:r="http://schemas.openxmlformats.org/officeDocument/2006/relationships" xmlns:p="http://schemas.openxmlformats.org/presentationml/2006/main">
+  <p:cSld>
+    <p:spTree>
+      <p:nvGrpSpPr>
+        <p:cNvPr id="1" name=""/>
+        <p:cNvGrpSpPr/>
+        <p:nvPr/>
+      </p:nvGrpSpPr>
+      <p:grpSpPr>
+        <a:xfrm>
+          <a:off x="0" y="0"/>
+          <a:ext cx="0" cy="0"/>
+          <a:chOff x="0" y="0"/>
+          <a:chExt cx="0" cy="0"/>
+        </a:xfrm>
+      </p:grpSpPr>
+      <p:sp>
+        <p:nvSpPr>
+          <p:cNvPr id="2" name="Title 1">
+            <a:extLst>
+              <a:ext uri="{FF2B5EF4-FFF2-40B4-BE49-F238E27FC236}">
+                <a16:creationId xmlns:a16="http://schemas.microsoft.com/office/drawing/2014/main" id="{3E4DF63E-2452-4314-9786-67AC9F6598CB}"/>
+              </a:ext>
+            </a:extLst>
+          </p:cNvPr>
+          <p:cNvSpPr>
+            <a:spLocks noGrp="1"/>
+          </p:cNvSpPr>
+          <p:nvPr>
+            <p:ph type="title"/>
+          </p:nvPr>
+        </p:nvSpPr>
+        <p:spPr/>
+        <p:txBody>
+          <a:bodyPr/>
+          <a:lstStyle/>
+          <a:p>
+            <a:pPr algn="r"/>
+            <a:r>
+              <a:rPr lang="en-US" dirty="0"/>
+              <a:t>Time Domain Envelope</a:t>
+            </a:r>
+          </a:p>
+        </p:txBody>
+      </p:sp>
+      <p:sp>
+        <p:nvSpPr>
+          <p:cNvPr id="3" name="Content Placeholder 2">
+            <a:extLst>
+              <a:ext uri="{FF2B5EF4-FFF2-40B4-BE49-F238E27FC236}">
+                <a16:creationId xmlns:a16="http://schemas.microsoft.com/office/drawing/2014/main" id="{165A7B68-9917-444C-922B-6A91AEFA2528}"/>
+              </a:ext>
+            </a:extLst>
+          </p:cNvPr>
+          <p:cNvSpPr>
+            <a:spLocks noGrp="1"/>
+          </p:cNvSpPr>
+          <p:nvPr>
+            <p:ph sz="half" idx="1"/>
+          </p:nvPr>
+        </p:nvSpPr>
+        <p:spPr/>
+        <p:txBody>
+          <a:bodyPr/>
+          <a:lstStyle/>
+          <a:p>
+            <a:r>
+              <a:rPr lang="en-US" dirty="0"/>
+              <a:t>Estimate Energy in Time-Domain </a:t>
+            </a:r>
+          </a:p>
+          <a:p>
+            <a:endParaRPr lang="en-US" dirty="0"/>
+          </a:p>
+          <a:p>
+            <a:r>
+              <a:rPr lang="en-US" dirty="0"/>
+              <a:t>Divide waveform into 5 sections</a:t>
+            </a:r>
+          </a:p>
+          <a:p>
+            <a:endParaRPr lang="en-US" dirty="0"/>
+          </a:p>
+          <a:p>
+            <a:r>
+              <a:rPr lang="en-US" dirty="0"/>
+              <a:t>Compute TDE for each, use as features</a:t>
+            </a:r>
+          </a:p>
+        </p:txBody>
+      </p:sp>
+      <p:sp>
+        <p:nvSpPr>
+          <p:cNvPr id="4" name="Content Placeholder 3">
+            <a:extLst>
+              <a:ext uri="{FF2B5EF4-FFF2-40B4-BE49-F238E27FC236}">
+                <a16:creationId xmlns:a16="http://schemas.microsoft.com/office/drawing/2014/main" id="{23A9EEDE-4CE0-4D97-8AA6-C88AF41C1ED0}"/>
+              </a:ext>
+            </a:extLst>
+          </p:cNvPr>
+          <p:cNvSpPr>
+            <a:spLocks noGrp="1"/>
+          </p:cNvSpPr>
+          <p:nvPr>
+            <p:ph sz="half" idx="2"/>
+          </p:nvPr>
+        </p:nvSpPr>
+        <p:spPr/>
+        <p:txBody>
+          <a:bodyPr/>
+          <a:lstStyle/>
+          <a:p>
+            <a:endParaRPr lang="en-US"/>
+          </a:p>
+        </p:txBody>
+      </p:sp>
+    </p:spTree>
+    <p:extLst>
+      <p:ext uri="{BB962C8B-B14F-4D97-AF65-F5344CB8AC3E}">
+        <p14:creationId xmlns:p14="http://schemas.microsoft.com/office/powerpoint/2010/main" val="3839079855"/>
+      </p:ext>
+    </p:extLst>
+  </p:cSld>
+  <p:clrMapOvr>
+    <a:masterClrMapping/>
+  </p:clrMapOvr>
+</p:sld>
+</file>
+
+<file path=ppt/slides/slide19.xml><?xml version="1.0" encoding="utf-8"?>
+<p:sld xmlns:a="http://schemas.openxmlformats.org/drawingml/2006/main" xmlns:r="http://schemas.openxmlformats.org/officeDocument/2006/relationships" xmlns:p="http://schemas.openxmlformats.org/presentationml/2006/main">
+  <p:cSld>
+    <p:spTree>
+      <p:nvGrpSpPr>
+        <p:cNvPr id="1" name=""/>
+        <p:cNvGrpSpPr/>
+        <p:nvPr/>
+      </p:nvGrpSpPr>
+      <p:grpSpPr>
+        <a:xfrm>
+          <a:off x="0" y="0"/>
+          <a:ext cx="0" cy="0"/>
+          <a:chOff x="0" y="0"/>
+          <a:chExt cx="0" cy="0"/>
+        </a:xfrm>
+      </p:grpSpPr>
+      <p:sp>
+        <p:nvSpPr>
+          <p:cNvPr id="2" name="Title 1">
+            <a:extLst>
+              <a:ext uri="{FF2B5EF4-FFF2-40B4-BE49-F238E27FC236}">
+                <a16:creationId xmlns:a16="http://schemas.microsoft.com/office/drawing/2014/main" id="{FA3EBA3B-60F5-4647-9490-D6B38FF15E40}"/>
+              </a:ext>
+            </a:extLst>
+          </p:cNvPr>
+          <p:cNvSpPr>
+            <a:spLocks noGrp="1"/>
+          </p:cNvSpPr>
+          <p:nvPr>
+            <p:ph type="title"/>
+          </p:nvPr>
+        </p:nvSpPr>
+        <p:spPr/>
+        <p:txBody>
+          <a:bodyPr/>
+          <a:lstStyle/>
+          <a:p>
+            <a:r>
+              <a:rPr lang="en-US" dirty="0"/>
+              <a:t>Zero Crossing Rate</a:t>
+            </a:r>
+          </a:p>
+        </p:txBody>
+      </p:sp>
+      <p:sp>
+        <p:nvSpPr>
+          <p:cNvPr id="3" name="Content Placeholder 2">
+            <a:extLst>
+              <a:ext uri="{FF2B5EF4-FFF2-40B4-BE49-F238E27FC236}">
+                <a16:creationId xmlns:a16="http://schemas.microsoft.com/office/drawing/2014/main" id="{E56D1340-B884-4C7B-849B-E339EC3E72A3}"/>
+              </a:ext>
+            </a:extLst>
+          </p:cNvPr>
+          <p:cNvSpPr>
+            <a:spLocks noGrp="1"/>
+          </p:cNvSpPr>
+          <p:nvPr>
+            <p:ph sz="half" idx="1"/>
+          </p:nvPr>
+        </p:nvSpPr>
+        <p:spPr/>
+        <p:txBody>
+          <a:bodyPr/>
+          <a:lstStyle/>
+          <a:p>
+            <a:endParaRPr lang="en-US" dirty="0"/>
+          </a:p>
+        </p:txBody>
+      </p:sp>
+      <p:sp>
+        <p:nvSpPr>
+          <p:cNvPr id="4" name="Content Placeholder 3">
+            <a:extLst>
+              <a:ext uri="{FF2B5EF4-FFF2-40B4-BE49-F238E27FC236}">
+                <a16:creationId xmlns:a16="http://schemas.microsoft.com/office/drawing/2014/main" id="{B0AD92B4-A82E-4F8B-8A20-68542868E33D}"/>
+              </a:ext>
+            </a:extLst>
+          </p:cNvPr>
+          <p:cNvSpPr>
+            <a:spLocks noGrp="1"/>
+          </p:cNvSpPr>
+          <p:nvPr>
+            <p:ph sz="half" idx="2"/>
+          </p:nvPr>
+        </p:nvSpPr>
+        <p:spPr/>
+        <p:txBody>
+          <a:bodyPr/>
+          <a:lstStyle/>
+          <a:p>
+            <a:endParaRPr lang="en-US" dirty="0"/>
+          </a:p>
+          <a:p>
+            <a:r>
+              <a:rPr lang="en-US" dirty="0"/>
+              <a:t>Number of times a waveform crosses equilibrium</a:t>
+            </a:r>
+          </a:p>
+          <a:p>
+            <a:endParaRPr lang="en-US" dirty="0"/>
+          </a:p>
+          <a:p>
+            <a:r>
+              <a:rPr lang="en-US" dirty="0"/>
+              <a:t>Often used in Speech vs. Music Detection</a:t>
+            </a:r>
+          </a:p>
+          <a:p>
+            <a:endParaRPr lang="en-US" dirty="0"/>
+          </a:p>
+          <a:p>
+            <a:r>
+              <a:rPr lang="en-US" dirty="0"/>
+              <a:t>Identifies Jagged vs. periodic waveforms</a:t>
+            </a:r>
+          </a:p>
+        </p:txBody>
+      </p:sp>
+    </p:spTree>
+    <p:extLst>
+      <p:ext uri="{BB962C8B-B14F-4D97-AF65-F5344CB8AC3E}">
+        <p14:creationId xmlns:p14="http://schemas.microsoft.com/office/powerpoint/2010/main" val="244597935"/>
       </p:ext>
     </p:extLst>
   </p:cSld>
@@ -10612,6 +11157,111 @@
     <p:extLst>
       <p:ext uri="{BB962C8B-B14F-4D97-AF65-F5344CB8AC3E}">
         <p14:creationId xmlns:p14="http://schemas.microsoft.com/office/powerpoint/2010/main" val="3060856925"/>
+      </p:ext>
+    </p:extLst>
+  </p:cSld>
+  <p:clrMapOvr>
+    <a:masterClrMapping/>
+  </p:clrMapOvr>
+</p:sld>
+</file>
+
+<file path=ppt/slides/slide20.xml><?xml version="1.0" encoding="utf-8"?>
+<p:sld xmlns:a="http://schemas.openxmlformats.org/drawingml/2006/main" xmlns:r="http://schemas.openxmlformats.org/officeDocument/2006/relationships" xmlns:p="http://schemas.openxmlformats.org/presentationml/2006/main">
+  <p:cSld>
+    <p:spTree>
+      <p:nvGrpSpPr>
+        <p:cNvPr id="1" name=""/>
+        <p:cNvGrpSpPr/>
+        <p:nvPr/>
+      </p:nvGrpSpPr>
+      <p:grpSpPr>
+        <a:xfrm>
+          <a:off x="0" y="0"/>
+          <a:ext cx="0" cy="0"/>
+          <a:chOff x="0" y="0"/>
+          <a:chExt cx="0" cy="0"/>
+        </a:xfrm>
+      </p:grpSpPr>
+      <p:sp>
+        <p:nvSpPr>
+          <p:cNvPr id="2" name="Title 1">
+            <a:extLst>
+              <a:ext uri="{FF2B5EF4-FFF2-40B4-BE49-F238E27FC236}">
+                <a16:creationId xmlns:a16="http://schemas.microsoft.com/office/drawing/2014/main" id="{AAE792CC-092D-49B7-A4D3-EE50716DEEFF}"/>
+              </a:ext>
+            </a:extLst>
+          </p:cNvPr>
+          <p:cNvSpPr>
+            <a:spLocks noGrp="1"/>
+          </p:cNvSpPr>
+          <p:nvPr>
+            <p:ph type="title"/>
+          </p:nvPr>
+        </p:nvSpPr>
+        <p:spPr/>
+        <p:txBody>
+          <a:bodyPr/>
+          <a:lstStyle/>
+          <a:p>
+            <a:endParaRPr lang="en-US" dirty="0"/>
+          </a:p>
+        </p:txBody>
+      </p:sp>
+      <p:sp>
+        <p:nvSpPr>
+          <p:cNvPr id="3" name="Content Placeholder 2">
+            <a:extLst>
+              <a:ext uri="{FF2B5EF4-FFF2-40B4-BE49-F238E27FC236}">
+                <a16:creationId xmlns:a16="http://schemas.microsoft.com/office/drawing/2014/main" id="{899D4A64-7182-47E4-BF57-ACBDEB0DB2AF}"/>
+              </a:ext>
+            </a:extLst>
+          </p:cNvPr>
+          <p:cNvSpPr>
+            <a:spLocks noGrp="1"/>
+          </p:cNvSpPr>
+          <p:nvPr>
+            <p:ph sz="half" idx="1"/>
+          </p:nvPr>
+        </p:nvSpPr>
+        <p:spPr/>
+        <p:txBody>
+          <a:bodyPr/>
+          <a:lstStyle/>
+          <a:p>
+            <a:endParaRPr lang="en-US"/>
+          </a:p>
+        </p:txBody>
+      </p:sp>
+      <p:sp>
+        <p:nvSpPr>
+          <p:cNvPr id="4" name="Content Placeholder 3">
+            <a:extLst>
+              <a:ext uri="{FF2B5EF4-FFF2-40B4-BE49-F238E27FC236}">
+                <a16:creationId xmlns:a16="http://schemas.microsoft.com/office/drawing/2014/main" id="{AF94EA20-BC79-4DCF-ABA2-EFC5ECD55D95}"/>
+              </a:ext>
+            </a:extLst>
+          </p:cNvPr>
+          <p:cNvSpPr>
+            <a:spLocks noGrp="1"/>
+          </p:cNvSpPr>
+          <p:nvPr>
+            <p:ph sz="half" idx="2"/>
+          </p:nvPr>
+        </p:nvSpPr>
+        <p:spPr/>
+        <p:txBody>
+          <a:bodyPr/>
+          <a:lstStyle/>
+          <a:p>
+            <a:endParaRPr lang="en-US"/>
+          </a:p>
+        </p:txBody>
+      </p:sp>
+    </p:spTree>
+    <p:extLst>
+      <p:ext uri="{BB962C8B-B14F-4D97-AF65-F5344CB8AC3E}">
+        <p14:creationId xmlns:p14="http://schemas.microsoft.com/office/powerpoint/2010/main" val="3920899464"/>
       </p:ext>
     </p:extLst>
   </p:cSld>
@@ -11180,13 +11830,8 @@
           <a:p>
             <a:r>
               <a:rPr lang="en-US" dirty="0"/>
-              <a:t>Encode output as a probability distribution over the </a:t>
-            </a:r>
-            <a:r>
-              <a:rPr lang="en-US" dirty="0" err="1"/>
-              <a:t>clases</a:t>
-            </a:r>
-            <a:endParaRPr lang="en-US" dirty="0"/>
+              <a:t>Encode output as a probability distribution over the classes</a:t>
+            </a:r>
           </a:p>
         </p:txBody>
       </p:sp>
@@ -11379,8 +12024,8 @@
           </a:p>
         </p:txBody>
       </p:sp>
-      <mc:AlternateContent xmlns:mc="http://schemas.openxmlformats.org/markup-compatibility/2006">
-        <mc:Choice xmlns:a14="http://schemas.microsoft.com/office/drawing/2010/main" Requires="a14">
+      <mc:AlternateContent xmlns:mc="http://schemas.openxmlformats.org/markup-compatibility/2006" xmlns:a14="http://schemas.microsoft.com/office/drawing/2010/main">
+        <mc:Choice Requires="a14">
           <p:sp>
             <p:nvSpPr>
               <p:cNvPr id="9" name="TextBox 8">
@@ -11409,6 +12054,7 @@
               </a:bodyPr>
               <a:lstStyle/>
               <a:p>
+                <a:pPr/>
                 <a14:m>
                   <m:oMathPara xmlns:m="http://schemas.openxmlformats.org/officeDocument/2006/math">
                     <m:oMathParaPr>
@@ -11438,7 +12084,7 @@
                           <m:begChr m:val="["/>
                           <m:endChr m:val="]"/>
                           <m:ctrlPr>
-                            <a:rPr lang="en-US" sz="2400" b="0" i="0" smtClean="0">
+                            <a:rPr lang="en-US" sz="2400" b="0" i="1" smtClean="0">
                               <a:latin typeface="Cambria Math" panose="02040503050406030204" pitchFamily="18" charset="0"/>
                             </a:rPr>
                           </m:ctrlPr>
@@ -11462,7 +12108,7 @@
                           <m:sSup>
                             <m:sSupPr>
                               <m:ctrlPr>
-                                <a:rPr lang="en-US" sz="2400" b="0" i="0" smtClean="0">
+                                <a:rPr lang="en-US" sz="2400" b="0" i="1" smtClean="0">
                                   <a:latin typeface="Cambria Math" panose="02040503050406030204" pitchFamily="18" charset="0"/>
                                 </a:rPr>
                               </m:ctrlPr>
@@ -11625,7 +12271,7 @@
             </p:txBody>
           </p:sp>
         </mc:Choice>
-        <mc:Fallback>
+        <mc:Fallback xmlns="">
           <p:sp>
             <p:nvSpPr>
               <p:cNvPr id="9" name="TextBox 8">
@@ -11862,7 +12508,7 @@
             <p:ph idx="1"/>
             <p:extLst>
               <p:ext uri="{D42A27DB-BD31-4B8C-83A1-F6EECF244321}">
-                <p14:modId xmlns:p14="http://schemas.microsoft.com/office/powerpoint/2010/main" val="3788044437"/>
+                <p14:modId xmlns:p14="http://schemas.microsoft.com/office/powerpoint/2010/main" val="3855695356"/>
               </p:ext>
             </p:extLst>
           </p:nvPr>

</xml_diff>

<commit_message>
Update Classifying Chaotic Synthesizers with a Multimodal Neural Network.pptx
</commit_message>
<xml_diff>
--- a/Thesis/CapstonePresentaion/Classifying Chaotic Synthesizers with a Multimodal Neural Network.pptx
+++ b/Thesis/CapstonePresentaion/Classifying Chaotic Synthesizers with a Multimodal Neural Network.pptx
@@ -5,10 +5,10 @@
     <p:sldMasterId id="2147483648" r:id="rId1"/>
   </p:sldMasterIdLst>
   <p:notesMasterIdLst>
-    <p:notesMasterId r:id="rId32"/>
+    <p:notesMasterId r:id="rId29"/>
   </p:notesMasterIdLst>
   <p:handoutMasterIdLst>
-    <p:handoutMasterId r:id="rId33"/>
+    <p:handoutMasterId r:id="rId30"/>
   </p:handoutMasterIdLst>
   <p:sldIdLst>
     <p:sldId id="256" r:id="rId2"/>
@@ -24,23 +24,20 @@
     <p:sldId id="272" r:id="rId12"/>
     <p:sldId id="264" r:id="rId13"/>
     <p:sldId id="267" r:id="rId14"/>
-    <p:sldId id="274" r:id="rId15"/>
-    <p:sldId id="265" r:id="rId16"/>
-    <p:sldId id="281" r:id="rId17"/>
-    <p:sldId id="282" r:id="rId18"/>
-    <p:sldId id="279" r:id="rId19"/>
-    <p:sldId id="283" r:id="rId20"/>
-    <p:sldId id="284" r:id="rId21"/>
-    <p:sldId id="285" r:id="rId22"/>
-    <p:sldId id="286" r:id="rId23"/>
-    <p:sldId id="287" r:id="rId24"/>
-    <p:sldId id="289" r:id="rId25"/>
-    <p:sldId id="288" r:id="rId26"/>
-    <p:sldId id="290" r:id="rId27"/>
-    <p:sldId id="291" r:id="rId28"/>
-    <p:sldId id="292" r:id="rId29"/>
-    <p:sldId id="294" r:id="rId30"/>
-    <p:sldId id="295" r:id="rId31"/>
+    <p:sldId id="265" r:id="rId15"/>
+    <p:sldId id="281" r:id="rId16"/>
+    <p:sldId id="282" r:id="rId17"/>
+    <p:sldId id="279" r:id="rId18"/>
+    <p:sldId id="283" r:id="rId19"/>
+    <p:sldId id="284" r:id="rId20"/>
+    <p:sldId id="285" r:id="rId21"/>
+    <p:sldId id="286" r:id="rId22"/>
+    <p:sldId id="289" r:id="rId23"/>
+    <p:sldId id="288" r:id="rId24"/>
+    <p:sldId id="290" r:id="rId25"/>
+    <p:sldId id="291" r:id="rId26"/>
+    <p:sldId id="292" r:id="rId27"/>
+    <p:sldId id="295" r:id="rId28"/>
   </p:sldIdLst>
   <p:sldSz cx="12192000" cy="6858000"/>
   <p:notesSz cx="6858000" cy="9144000"/>
@@ -3866,753 +3863,6 @@
   <dgm:styleLbl name="fgShp">
     <dgm:fillClrLst meth="repeat">
       <a:schemeClr val="accent1">
-        <a:tint val="60000"/>
-      </a:schemeClr>
-    </dgm:fillClrLst>
-    <dgm:linClrLst meth="repeat">
-      <a:schemeClr val="lt1"/>
-    </dgm:linClrLst>
-    <dgm:effectClrLst/>
-    <dgm:txLinClrLst/>
-    <dgm:txFillClrLst meth="repeat">
-      <a:schemeClr val="dk1"/>
-    </dgm:txFillClrLst>
-    <dgm:txEffectClrLst/>
-  </dgm:styleLbl>
-  <dgm:styleLbl name="revTx">
-    <dgm:fillClrLst meth="repeat">
-      <a:schemeClr val="lt1">
-        <a:alpha val="0"/>
-      </a:schemeClr>
-    </dgm:fillClrLst>
-    <dgm:linClrLst meth="repeat">
-      <a:schemeClr val="dk1">
-        <a:alpha val="0"/>
-      </a:schemeClr>
-    </dgm:linClrLst>
-    <dgm:effectClrLst/>
-    <dgm:txLinClrLst/>
-    <dgm:txFillClrLst meth="repeat">
-      <a:schemeClr val="tx1"/>
-    </dgm:txFillClrLst>
-    <dgm:txEffectClrLst/>
-  </dgm:styleLbl>
-</dgm:colorsDef>
-</file>
-
-<file path=ppt/diagrams/colors6.xml><?xml version="1.0" encoding="utf-8"?>
-<dgm:colorsDef xmlns:dgm="http://schemas.openxmlformats.org/drawingml/2006/diagram" xmlns:a="http://schemas.openxmlformats.org/drawingml/2006/main" uniqueId="urn:microsoft.com/office/officeart/2005/8/colors/accent2_2">
-  <dgm:title val=""/>
-  <dgm:desc val=""/>
-  <dgm:catLst>
-    <dgm:cat type="accent2" pri="11200"/>
-  </dgm:catLst>
-  <dgm:styleLbl name="node0">
-    <dgm:fillClrLst meth="repeat">
-      <a:schemeClr val="accent2"/>
-    </dgm:fillClrLst>
-    <dgm:linClrLst meth="repeat">
-      <a:schemeClr val="lt1"/>
-    </dgm:linClrLst>
-    <dgm:effectClrLst/>
-    <dgm:txLinClrLst/>
-    <dgm:txFillClrLst/>
-    <dgm:txEffectClrLst/>
-  </dgm:styleLbl>
-  <dgm:styleLbl name="node1">
-    <dgm:fillClrLst meth="repeat">
-      <a:schemeClr val="accent2"/>
-    </dgm:fillClrLst>
-    <dgm:linClrLst meth="repeat">
-      <a:schemeClr val="lt1"/>
-    </dgm:linClrLst>
-    <dgm:effectClrLst/>
-    <dgm:txLinClrLst/>
-    <dgm:txFillClrLst/>
-    <dgm:txEffectClrLst/>
-  </dgm:styleLbl>
-  <dgm:styleLbl name="alignNode1">
-    <dgm:fillClrLst meth="repeat">
-      <a:schemeClr val="accent2"/>
-    </dgm:fillClrLst>
-    <dgm:linClrLst meth="repeat">
-      <a:schemeClr val="accent2"/>
-    </dgm:linClrLst>
-    <dgm:effectClrLst/>
-    <dgm:txLinClrLst/>
-    <dgm:txFillClrLst/>
-    <dgm:txEffectClrLst/>
-  </dgm:styleLbl>
-  <dgm:styleLbl name="lnNode1">
-    <dgm:fillClrLst meth="repeat">
-      <a:schemeClr val="accent2"/>
-    </dgm:fillClrLst>
-    <dgm:linClrLst meth="repeat">
-      <a:schemeClr val="lt1"/>
-    </dgm:linClrLst>
-    <dgm:effectClrLst/>
-    <dgm:txLinClrLst/>
-    <dgm:txFillClrLst/>
-    <dgm:txEffectClrLst/>
-  </dgm:styleLbl>
-  <dgm:styleLbl name="vennNode1">
-    <dgm:fillClrLst meth="repeat">
-      <a:schemeClr val="accent2">
-        <a:alpha val="50000"/>
-      </a:schemeClr>
-    </dgm:fillClrLst>
-    <dgm:linClrLst meth="repeat">
-      <a:schemeClr val="lt1"/>
-    </dgm:linClrLst>
-    <dgm:effectClrLst/>
-    <dgm:txLinClrLst/>
-    <dgm:txFillClrLst/>
-    <dgm:txEffectClrLst/>
-  </dgm:styleLbl>
-  <dgm:styleLbl name="node2">
-    <dgm:fillClrLst meth="repeat">
-      <a:schemeClr val="accent2"/>
-    </dgm:fillClrLst>
-    <dgm:linClrLst meth="repeat">
-      <a:schemeClr val="lt1"/>
-    </dgm:linClrLst>
-    <dgm:effectClrLst/>
-    <dgm:txLinClrLst/>
-    <dgm:txFillClrLst/>
-    <dgm:txEffectClrLst/>
-  </dgm:styleLbl>
-  <dgm:styleLbl name="node3">
-    <dgm:fillClrLst meth="repeat">
-      <a:schemeClr val="accent2"/>
-    </dgm:fillClrLst>
-    <dgm:linClrLst meth="repeat">
-      <a:schemeClr val="lt1"/>
-    </dgm:linClrLst>
-    <dgm:effectClrLst/>
-    <dgm:txLinClrLst/>
-    <dgm:txFillClrLst/>
-    <dgm:txEffectClrLst/>
-  </dgm:styleLbl>
-  <dgm:styleLbl name="node4">
-    <dgm:fillClrLst meth="repeat">
-      <a:schemeClr val="accent2"/>
-    </dgm:fillClrLst>
-    <dgm:linClrLst meth="repeat">
-      <a:schemeClr val="lt1"/>
-    </dgm:linClrLst>
-    <dgm:effectClrLst/>
-    <dgm:txLinClrLst/>
-    <dgm:txFillClrLst/>
-    <dgm:txEffectClrLst/>
-  </dgm:styleLbl>
-  <dgm:styleLbl name="fgImgPlace1">
-    <dgm:fillClrLst meth="repeat">
-      <a:schemeClr val="accent2">
-        <a:tint val="50000"/>
-      </a:schemeClr>
-    </dgm:fillClrLst>
-    <dgm:linClrLst meth="repeat">
-      <a:schemeClr val="lt1"/>
-    </dgm:linClrLst>
-    <dgm:effectClrLst/>
-    <dgm:txLinClrLst/>
-    <dgm:txFillClrLst meth="repeat">
-      <a:schemeClr val="lt1"/>
-    </dgm:txFillClrLst>
-    <dgm:txEffectClrLst/>
-  </dgm:styleLbl>
-  <dgm:styleLbl name="alignImgPlace1">
-    <dgm:fillClrLst meth="repeat">
-      <a:schemeClr val="accent2">
-        <a:tint val="50000"/>
-      </a:schemeClr>
-    </dgm:fillClrLst>
-    <dgm:linClrLst meth="repeat">
-      <a:schemeClr val="lt1"/>
-    </dgm:linClrLst>
-    <dgm:effectClrLst/>
-    <dgm:txLinClrLst/>
-    <dgm:txFillClrLst meth="repeat">
-      <a:schemeClr val="lt1"/>
-    </dgm:txFillClrLst>
-    <dgm:txEffectClrLst/>
-  </dgm:styleLbl>
-  <dgm:styleLbl name="bgImgPlace1">
-    <dgm:fillClrLst meth="repeat">
-      <a:schemeClr val="accent2">
-        <a:tint val="50000"/>
-      </a:schemeClr>
-    </dgm:fillClrLst>
-    <dgm:linClrLst meth="repeat">
-      <a:schemeClr val="lt1"/>
-    </dgm:linClrLst>
-    <dgm:effectClrLst/>
-    <dgm:txLinClrLst/>
-    <dgm:txFillClrLst meth="repeat">
-      <a:schemeClr val="lt1"/>
-    </dgm:txFillClrLst>
-    <dgm:txEffectClrLst/>
-  </dgm:styleLbl>
-  <dgm:styleLbl name="sibTrans2D1">
-    <dgm:fillClrLst meth="repeat">
-      <a:schemeClr val="accent2">
-        <a:tint val="60000"/>
-      </a:schemeClr>
-    </dgm:fillClrLst>
-    <dgm:linClrLst meth="repeat">
-      <a:schemeClr val="accent2">
-        <a:tint val="60000"/>
-      </a:schemeClr>
-    </dgm:linClrLst>
-    <dgm:effectClrLst/>
-    <dgm:txLinClrLst/>
-    <dgm:txFillClrLst/>
-    <dgm:txEffectClrLst/>
-  </dgm:styleLbl>
-  <dgm:styleLbl name="fgSibTrans2D1">
-    <dgm:fillClrLst meth="repeat">
-      <a:schemeClr val="accent2">
-        <a:tint val="60000"/>
-      </a:schemeClr>
-    </dgm:fillClrLst>
-    <dgm:linClrLst meth="repeat">
-      <a:schemeClr val="accent2">
-        <a:tint val="60000"/>
-      </a:schemeClr>
-    </dgm:linClrLst>
-    <dgm:effectClrLst/>
-    <dgm:txLinClrLst/>
-    <dgm:txFillClrLst/>
-    <dgm:txEffectClrLst/>
-  </dgm:styleLbl>
-  <dgm:styleLbl name="bgSibTrans2D1">
-    <dgm:fillClrLst meth="repeat">
-      <a:schemeClr val="accent2">
-        <a:tint val="60000"/>
-      </a:schemeClr>
-    </dgm:fillClrLst>
-    <dgm:linClrLst meth="repeat">
-      <a:schemeClr val="accent2">
-        <a:tint val="60000"/>
-      </a:schemeClr>
-    </dgm:linClrLst>
-    <dgm:effectClrLst/>
-    <dgm:txLinClrLst/>
-    <dgm:txFillClrLst/>
-    <dgm:txEffectClrLst/>
-  </dgm:styleLbl>
-  <dgm:styleLbl name="sibTrans1D1">
-    <dgm:fillClrLst meth="repeat">
-      <a:schemeClr val="accent2"/>
-    </dgm:fillClrLst>
-    <dgm:linClrLst meth="repeat">
-      <a:schemeClr val="accent2"/>
-    </dgm:linClrLst>
-    <dgm:effectClrLst/>
-    <dgm:txLinClrLst/>
-    <dgm:txFillClrLst meth="repeat">
-      <a:schemeClr val="tx1"/>
-    </dgm:txFillClrLst>
-    <dgm:txEffectClrLst/>
-  </dgm:styleLbl>
-  <dgm:styleLbl name="callout">
-    <dgm:fillClrLst meth="repeat">
-      <a:schemeClr val="accent2"/>
-    </dgm:fillClrLst>
-    <dgm:linClrLst meth="repeat">
-      <a:schemeClr val="accent2">
-        <a:tint val="50000"/>
-      </a:schemeClr>
-    </dgm:linClrLst>
-    <dgm:effectClrLst/>
-    <dgm:txLinClrLst/>
-    <dgm:txFillClrLst meth="repeat">
-      <a:schemeClr val="tx1"/>
-    </dgm:txFillClrLst>
-    <dgm:txEffectClrLst/>
-  </dgm:styleLbl>
-  <dgm:styleLbl name="asst0">
-    <dgm:fillClrLst meth="repeat">
-      <a:schemeClr val="accent2"/>
-    </dgm:fillClrLst>
-    <dgm:linClrLst meth="repeat">
-      <a:schemeClr val="lt1"/>
-    </dgm:linClrLst>
-    <dgm:effectClrLst/>
-    <dgm:txLinClrLst/>
-    <dgm:txFillClrLst/>
-    <dgm:txEffectClrLst/>
-  </dgm:styleLbl>
-  <dgm:styleLbl name="asst1">
-    <dgm:fillClrLst meth="repeat">
-      <a:schemeClr val="accent2"/>
-    </dgm:fillClrLst>
-    <dgm:linClrLst meth="repeat">
-      <a:schemeClr val="lt1"/>
-    </dgm:linClrLst>
-    <dgm:effectClrLst/>
-    <dgm:txLinClrLst/>
-    <dgm:txFillClrLst/>
-    <dgm:txEffectClrLst/>
-  </dgm:styleLbl>
-  <dgm:styleLbl name="asst2">
-    <dgm:fillClrLst meth="repeat">
-      <a:schemeClr val="accent2"/>
-    </dgm:fillClrLst>
-    <dgm:linClrLst meth="repeat">
-      <a:schemeClr val="lt1"/>
-    </dgm:linClrLst>
-    <dgm:effectClrLst/>
-    <dgm:txLinClrLst/>
-    <dgm:txFillClrLst/>
-    <dgm:txEffectClrLst/>
-  </dgm:styleLbl>
-  <dgm:styleLbl name="asst3">
-    <dgm:fillClrLst meth="repeat">
-      <a:schemeClr val="accent2"/>
-    </dgm:fillClrLst>
-    <dgm:linClrLst meth="repeat">
-      <a:schemeClr val="lt1"/>
-    </dgm:linClrLst>
-    <dgm:effectClrLst/>
-    <dgm:txLinClrLst/>
-    <dgm:txFillClrLst/>
-    <dgm:txEffectClrLst/>
-  </dgm:styleLbl>
-  <dgm:styleLbl name="asst4">
-    <dgm:fillClrLst meth="repeat">
-      <a:schemeClr val="accent2"/>
-    </dgm:fillClrLst>
-    <dgm:linClrLst meth="repeat">
-      <a:schemeClr val="lt1"/>
-    </dgm:linClrLst>
-    <dgm:effectClrLst/>
-    <dgm:txLinClrLst/>
-    <dgm:txFillClrLst/>
-    <dgm:txEffectClrLst/>
-  </dgm:styleLbl>
-  <dgm:styleLbl name="parChTrans2D1">
-    <dgm:fillClrLst meth="repeat">
-      <a:schemeClr val="accent2">
-        <a:tint val="60000"/>
-      </a:schemeClr>
-    </dgm:fillClrLst>
-    <dgm:linClrLst meth="repeat">
-      <a:schemeClr val="accent2">
-        <a:tint val="60000"/>
-      </a:schemeClr>
-    </dgm:linClrLst>
-    <dgm:effectClrLst/>
-    <dgm:txLinClrLst/>
-    <dgm:txFillClrLst meth="repeat">
-      <a:schemeClr val="lt1"/>
-    </dgm:txFillClrLst>
-    <dgm:txEffectClrLst/>
-  </dgm:styleLbl>
-  <dgm:styleLbl name="parChTrans2D2">
-    <dgm:fillClrLst meth="repeat">
-      <a:schemeClr val="accent2"/>
-    </dgm:fillClrLst>
-    <dgm:linClrLst meth="repeat">
-      <a:schemeClr val="accent2"/>
-    </dgm:linClrLst>
-    <dgm:effectClrLst/>
-    <dgm:txLinClrLst/>
-    <dgm:txFillClrLst meth="repeat">
-      <a:schemeClr val="lt1"/>
-    </dgm:txFillClrLst>
-    <dgm:txEffectClrLst/>
-  </dgm:styleLbl>
-  <dgm:styleLbl name="parChTrans2D3">
-    <dgm:fillClrLst meth="repeat">
-      <a:schemeClr val="accent2"/>
-    </dgm:fillClrLst>
-    <dgm:linClrLst meth="repeat">
-      <a:schemeClr val="accent2"/>
-    </dgm:linClrLst>
-    <dgm:effectClrLst/>
-    <dgm:txLinClrLst/>
-    <dgm:txFillClrLst meth="repeat">
-      <a:schemeClr val="lt1"/>
-    </dgm:txFillClrLst>
-    <dgm:txEffectClrLst/>
-  </dgm:styleLbl>
-  <dgm:styleLbl name="parChTrans2D4">
-    <dgm:fillClrLst meth="repeat">
-      <a:schemeClr val="accent2"/>
-    </dgm:fillClrLst>
-    <dgm:linClrLst meth="repeat">
-      <a:schemeClr val="accent2"/>
-    </dgm:linClrLst>
-    <dgm:effectClrLst/>
-    <dgm:txLinClrLst/>
-    <dgm:txFillClrLst meth="repeat">
-      <a:schemeClr val="lt1"/>
-    </dgm:txFillClrLst>
-    <dgm:txEffectClrLst/>
-  </dgm:styleLbl>
-  <dgm:styleLbl name="parChTrans1D1">
-    <dgm:fillClrLst meth="repeat">
-      <a:schemeClr val="accent2"/>
-    </dgm:fillClrLst>
-    <dgm:linClrLst meth="repeat">
-      <a:schemeClr val="accent2">
-        <a:shade val="60000"/>
-      </a:schemeClr>
-    </dgm:linClrLst>
-    <dgm:effectClrLst/>
-    <dgm:txLinClrLst/>
-    <dgm:txFillClrLst meth="repeat">
-      <a:schemeClr val="tx1"/>
-    </dgm:txFillClrLst>
-    <dgm:txEffectClrLst/>
-  </dgm:styleLbl>
-  <dgm:styleLbl name="parChTrans1D2">
-    <dgm:fillClrLst meth="repeat">
-      <a:schemeClr val="accent2"/>
-    </dgm:fillClrLst>
-    <dgm:linClrLst meth="repeat">
-      <a:schemeClr val="accent2">
-        <a:shade val="60000"/>
-      </a:schemeClr>
-    </dgm:linClrLst>
-    <dgm:effectClrLst/>
-    <dgm:txLinClrLst/>
-    <dgm:txFillClrLst meth="repeat">
-      <a:schemeClr val="tx1"/>
-    </dgm:txFillClrLst>
-    <dgm:txEffectClrLst/>
-  </dgm:styleLbl>
-  <dgm:styleLbl name="parChTrans1D3">
-    <dgm:fillClrLst meth="repeat">
-      <a:schemeClr val="accent2"/>
-    </dgm:fillClrLst>
-    <dgm:linClrLst meth="repeat">
-      <a:schemeClr val="accent2">
-        <a:shade val="80000"/>
-      </a:schemeClr>
-    </dgm:linClrLst>
-    <dgm:effectClrLst/>
-    <dgm:txLinClrLst/>
-    <dgm:txFillClrLst meth="repeat">
-      <a:schemeClr val="tx1"/>
-    </dgm:txFillClrLst>
-    <dgm:txEffectClrLst/>
-  </dgm:styleLbl>
-  <dgm:styleLbl name="parChTrans1D4">
-    <dgm:fillClrLst meth="repeat">
-      <a:schemeClr val="accent2"/>
-    </dgm:fillClrLst>
-    <dgm:linClrLst meth="repeat">
-      <a:schemeClr val="accent2">
-        <a:shade val="80000"/>
-      </a:schemeClr>
-    </dgm:linClrLst>
-    <dgm:effectClrLst/>
-    <dgm:txLinClrLst/>
-    <dgm:txFillClrLst meth="repeat">
-      <a:schemeClr val="tx1"/>
-    </dgm:txFillClrLst>
-    <dgm:txEffectClrLst/>
-  </dgm:styleLbl>
-  <dgm:styleLbl name="fgAcc1">
-    <dgm:fillClrLst meth="repeat">
-      <a:schemeClr val="lt1">
-        <a:alpha val="90000"/>
-      </a:schemeClr>
-    </dgm:fillClrLst>
-    <dgm:linClrLst meth="repeat">
-      <a:schemeClr val="accent2"/>
-    </dgm:linClrLst>
-    <dgm:effectClrLst/>
-    <dgm:txLinClrLst/>
-    <dgm:txFillClrLst meth="repeat">
-      <a:schemeClr val="dk1"/>
-    </dgm:txFillClrLst>
-    <dgm:txEffectClrLst/>
-  </dgm:styleLbl>
-  <dgm:styleLbl name="conFgAcc1">
-    <dgm:fillClrLst meth="repeat">
-      <a:schemeClr val="lt1">
-        <a:alpha val="90000"/>
-      </a:schemeClr>
-    </dgm:fillClrLst>
-    <dgm:linClrLst meth="repeat">
-      <a:schemeClr val="accent2"/>
-    </dgm:linClrLst>
-    <dgm:effectClrLst/>
-    <dgm:txLinClrLst/>
-    <dgm:txFillClrLst meth="repeat">
-      <a:schemeClr val="dk1"/>
-    </dgm:txFillClrLst>
-    <dgm:txEffectClrLst/>
-  </dgm:styleLbl>
-  <dgm:styleLbl name="alignAcc1">
-    <dgm:fillClrLst meth="repeat">
-      <a:schemeClr val="lt1">
-        <a:alpha val="90000"/>
-      </a:schemeClr>
-    </dgm:fillClrLst>
-    <dgm:linClrLst meth="repeat">
-      <a:schemeClr val="accent2"/>
-    </dgm:linClrLst>
-    <dgm:effectClrLst/>
-    <dgm:txLinClrLst/>
-    <dgm:txFillClrLst meth="repeat">
-      <a:schemeClr val="dk1"/>
-    </dgm:txFillClrLst>
-    <dgm:txEffectClrLst/>
-  </dgm:styleLbl>
-  <dgm:styleLbl name="trAlignAcc1">
-    <dgm:fillClrLst meth="repeat">
-      <a:schemeClr val="lt1">
-        <a:alpha val="40000"/>
-      </a:schemeClr>
-    </dgm:fillClrLst>
-    <dgm:linClrLst meth="repeat">
-      <a:schemeClr val="accent2"/>
-    </dgm:linClrLst>
-    <dgm:effectClrLst/>
-    <dgm:txLinClrLst/>
-    <dgm:txFillClrLst meth="repeat">
-      <a:schemeClr val="dk1"/>
-    </dgm:txFillClrLst>
-    <dgm:txEffectClrLst/>
-  </dgm:styleLbl>
-  <dgm:styleLbl name="bgAcc1">
-    <dgm:fillClrLst meth="repeat">
-      <a:schemeClr val="lt1">
-        <a:alpha val="90000"/>
-      </a:schemeClr>
-    </dgm:fillClrLst>
-    <dgm:linClrLst meth="repeat">
-      <a:schemeClr val="accent2"/>
-    </dgm:linClrLst>
-    <dgm:effectClrLst/>
-    <dgm:txLinClrLst/>
-    <dgm:txFillClrLst meth="repeat">
-      <a:schemeClr val="dk1"/>
-    </dgm:txFillClrLst>
-    <dgm:txEffectClrLst/>
-  </dgm:styleLbl>
-  <dgm:styleLbl name="solidFgAcc1">
-    <dgm:fillClrLst meth="repeat">
-      <a:schemeClr val="lt1"/>
-    </dgm:fillClrLst>
-    <dgm:linClrLst meth="repeat">
-      <a:schemeClr val="accent2"/>
-    </dgm:linClrLst>
-    <dgm:effectClrLst/>
-    <dgm:txLinClrLst/>
-    <dgm:txFillClrLst meth="repeat">
-      <a:schemeClr val="dk1"/>
-    </dgm:txFillClrLst>
-    <dgm:txEffectClrLst/>
-  </dgm:styleLbl>
-  <dgm:styleLbl name="solidAlignAcc1">
-    <dgm:fillClrLst meth="repeat">
-      <a:schemeClr val="lt1"/>
-    </dgm:fillClrLst>
-    <dgm:linClrLst meth="repeat">
-      <a:schemeClr val="accent2"/>
-    </dgm:linClrLst>
-    <dgm:effectClrLst/>
-    <dgm:txLinClrLst/>
-    <dgm:txFillClrLst meth="repeat">
-      <a:schemeClr val="dk1"/>
-    </dgm:txFillClrLst>
-    <dgm:txEffectClrLst/>
-  </dgm:styleLbl>
-  <dgm:styleLbl name="solidBgAcc1">
-    <dgm:fillClrLst meth="repeat">
-      <a:schemeClr val="lt1"/>
-    </dgm:fillClrLst>
-    <dgm:linClrLst meth="repeat">
-      <a:schemeClr val="accent2"/>
-    </dgm:linClrLst>
-    <dgm:effectClrLst/>
-    <dgm:txLinClrLst/>
-    <dgm:txFillClrLst meth="repeat">
-      <a:schemeClr val="dk1"/>
-    </dgm:txFillClrLst>
-    <dgm:txEffectClrLst/>
-  </dgm:styleLbl>
-  <dgm:styleLbl name="fgAccFollowNode1">
-    <dgm:fillClrLst meth="repeat">
-      <a:schemeClr val="accent2">
-        <a:alpha val="90000"/>
-        <a:tint val="40000"/>
-      </a:schemeClr>
-    </dgm:fillClrLst>
-    <dgm:linClrLst meth="repeat">
-      <a:schemeClr val="accent2">
-        <a:alpha val="90000"/>
-        <a:tint val="40000"/>
-      </a:schemeClr>
-    </dgm:linClrLst>
-    <dgm:effectClrLst/>
-    <dgm:txLinClrLst/>
-    <dgm:txFillClrLst meth="repeat">
-      <a:schemeClr val="dk1"/>
-    </dgm:txFillClrLst>
-    <dgm:txEffectClrLst/>
-  </dgm:styleLbl>
-  <dgm:styleLbl name="alignAccFollowNode1">
-    <dgm:fillClrLst meth="repeat">
-      <a:schemeClr val="accent2">
-        <a:alpha val="90000"/>
-        <a:tint val="40000"/>
-      </a:schemeClr>
-    </dgm:fillClrLst>
-    <dgm:linClrLst meth="repeat">
-      <a:schemeClr val="accent2">
-        <a:alpha val="90000"/>
-        <a:tint val="40000"/>
-      </a:schemeClr>
-    </dgm:linClrLst>
-    <dgm:effectClrLst/>
-    <dgm:txLinClrLst/>
-    <dgm:txFillClrLst meth="repeat">
-      <a:schemeClr val="dk1"/>
-    </dgm:txFillClrLst>
-    <dgm:txEffectClrLst/>
-  </dgm:styleLbl>
-  <dgm:styleLbl name="bgAccFollowNode1">
-    <dgm:fillClrLst meth="repeat">
-      <a:schemeClr val="accent2">
-        <a:alpha val="90000"/>
-        <a:tint val="40000"/>
-      </a:schemeClr>
-    </dgm:fillClrLst>
-    <dgm:linClrLst meth="repeat">
-      <a:schemeClr val="accent2">
-        <a:alpha val="90000"/>
-        <a:tint val="40000"/>
-      </a:schemeClr>
-    </dgm:linClrLst>
-    <dgm:effectClrLst/>
-    <dgm:txLinClrLst/>
-    <dgm:txFillClrLst meth="repeat">
-      <a:schemeClr val="dk1"/>
-    </dgm:txFillClrLst>
-    <dgm:txEffectClrLst/>
-  </dgm:styleLbl>
-  <dgm:styleLbl name="fgAcc0">
-    <dgm:fillClrLst meth="repeat">
-      <a:schemeClr val="lt1">
-        <a:alpha val="90000"/>
-      </a:schemeClr>
-    </dgm:fillClrLst>
-    <dgm:linClrLst meth="repeat">
-      <a:schemeClr val="accent2"/>
-    </dgm:linClrLst>
-    <dgm:effectClrLst/>
-    <dgm:txLinClrLst/>
-    <dgm:txFillClrLst meth="repeat">
-      <a:schemeClr val="dk1"/>
-    </dgm:txFillClrLst>
-    <dgm:txEffectClrLst/>
-  </dgm:styleLbl>
-  <dgm:styleLbl name="fgAcc2">
-    <dgm:fillClrLst meth="repeat">
-      <a:schemeClr val="lt1">
-        <a:alpha val="90000"/>
-      </a:schemeClr>
-    </dgm:fillClrLst>
-    <dgm:linClrLst meth="repeat">
-      <a:schemeClr val="accent2"/>
-    </dgm:linClrLst>
-    <dgm:effectClrLst/>
-    <dgm:txLinClrLst/>
-    <dgm:txFillClrLst meth="repeat">
-      <a:schemeClr val="dk1"/>
-    </dgm:txFillClrLst>
-    <dgm:txEffectClrLst/>
-  </dgm:styleLbl>
-  <dgm:styleLbl name="fgAcc3">
-    <dgm:fillClrLst meth="repeat">
-      <a:schemeClr val="lt1">
-        <a:alpha val="90000"/>
-      </a:schemeClr>
-    </dgm:fillClrLst>
-    <dgm:linClrLst meth="repeat">
-      <a:schemeClr val="accent2"/>
-    </dgm:linClrLst>
-    <dgm:effectClrLst/>
-    <dgm:txLinClrLst/>
-    <dgm:txFillClrLst meth="repeat">
-      <a:schemeClr val="dk1"/>
-    </dgm:txFillClrLst>
-    <dgm:txEffectClrLst/>
-  </dgm:styleLbl>
-  <dgm:styleLbl name="fgAcc4">
-    <dgm:fillClrLst meth="repeat">
-      <a:schemeClr val="lt1">
-        <a:alpha val="90000"/>
-      </a:schemeClr>
-    </dgm:fillClrLst>
-    <dgm:linClrLst meth="repeat">
-      <a:schemeClr val="accent2"/>
-    </dgm:linClrLst>
-    <dgm:effectClrLst/>
-    <dgm:txLinClrLst/>
-    <dgm:txFillClrLst meth="repeat">
-      <a:schemeClr val="dk1"/>
-    </dgm:txFillClrLst>
-    <dgm:txEffectClrLst/>
-  </dgm:styleLbl>
-  <dgm:styleLbl name="bgShp">
-    <dgm:fillClrLst meth="repeat">
-      <a:schemeClr val="accent2">
-        <a:tint val="40000"/>
-      </a:schemeClr>
-    </dgm:fillClrLst>
-    <dgm:linClrLst meth="repeat">
-      <a:schemeClr val="accent2"/>
-    </dgm:linClrLst>
-    <dgm:effectClrLst/>
-    <dgm:txLinClrLst/>
-    <dgm:txFillClrLst meth="repeat">
-      <a:schemeClr val="dk1"/>
-    </dgm:txFillClrLst>
-    <dgm:txEffectClrLst/>
-  </dgm:styleLbl>
-  <dgm:styleLbl name="dkBgShp">
-    <dgm:fillClrLst meth="repeat">
-      <a:schemeClr val="accent2">
-        <a:shade val="80000"/>
-      </a:schemeClr>
-    </dgm:fillClrLst>
-    <dgm:linClrLst meth="repeat">
-      <a:schemeClr val="accent2"/>
-    </dgm:linClrLst>
-    <dgm:effectClrLst/>
-    <dgm:txLinClrLst/>
-    <dgm:txFillClrLst meth="repeat">
-      <a:schemeClr val="lt1"/>
-    </dgm:txFillClrLst>
-    <dgm:txEffectClrLst/>
-  </dgm:styleLbl>
-  <dgm:styleLbl name="trBgShp">
-    <dgm:fillClrLst meth="repeat">
-      <a:schemeClr val="accent2">
-        <a:tint val="50000"/>
-        <a:alpha val="40000"/>
-      </a:schemeClr>
-    </dgm:fillClrLst>
-    <dgm:linClrLst meth="repeat">
-      <a:schemeClr val="accent2"/>
-    </dgm:linClrLst>
-    <dgm:effectClrLst/>
-    <dgm:txLinClrLst/>
-    <dgm:txFillClrLst meth="repeat">
-      <a:schemeClr val="lt1"/>
-    </dgm:txFillClrLst>
-    <dgm:txEffectClrLst/>
-  </dgm:styleLbl>
-  <dgm:styleLbl name="fgShp">
-    <dgm:fillClrLst meth="repeat">
-      <a:schemeClr val="accent2">
         <a:tint val="60000"/>
       </a:schemeClr>
     </dgm:fillClrLst>
@@ -6222,358 +5472,6 @@
     <dgm:cxn modelId="{74853269-4712-45F2-80E3-EDFE470B7B2E}" type="presParOf" srcId="{DB71755D-1577-43E4-8CB6-7FB59E870687}" destId="{F3C0BAD4-097C-411D-98D4-09E4B721B98F}" srcOrd="6" destOrd="0" presId="urn:microsoft.com/office/officeart/2005/8/layout/vProcess5"/>
     <dgm:cxn modelId="{7CF74354-7777-459E-9065-FC3D8FD4B026}" type="presParOf" srcId="{DB71755D-1577-43E4-8CB6-7FB59E870687}" destId="{59BC3FA2-6B4C-4055-8F33-5877DCAD23C1}" srcOrd="7" destOrd="0" presId="urn:microsoft.com/office/officeart/2005/8/layout/vProcess5"/>
     <dgm:cxn modelId="{0448F0B3-BBFF-405D-B0AB-59919469A044}" type="presParOf" srcId="{DB71755D-1577-43E4-8CB6-7FB59E870687}" destId="{601A2D8C-612D-43FD-9E80-43B82ADDEF50}" srcOrd="8" destOrd="0" presId="urn:microsoft.com/office/officeart/2005/8/layout/vProcess5"/>
-  </dgm:cxnLst>
-  <dgm:bg/>
-  <dgm:whole/>
-  <dgm:extLst>
-    <a:ext uri="http://schemas.microsoft.com/office/drawing/2008/diagram">
-      <dsp:dataModelExt xmlns:dsp="http://schemas.microsoft.com/office/drawing/2008/diagram" relId="rId6" minVer="http://schemas.openxmlformats.org/drawingml/2006/diagram"/>
-    </a:ext>
-  </dgm:extLst>
-</dgm:dataModel>
-</file>
-
-<file path=ppt/diagrams/data6.xml><?xml version="1.0" encoding="utf-8"?>
-<dgm:dataModel xmlns:dgm="http://schemas.openxmlformats.org/drawingml/2006/diagram" xmlns:a="http://schemas.openxmlformats.org/drawingml/2006/main">
-  <dgm:ptLst>
-    <dgm:pt modelId="{D01A76EA-025D-4861-8B43-B8EE84A6FD1A}" type="doc">
-      <dgm:prSet loTypeId="urn:microsoft.com/office/officeart/2018/5/layout/IconCircleLabelList" loCatId="icon" qsTypeId="urn:microsoft.com/office/officeart/2005/8/quickstyle/simple1" qsCatId="simple" csTypeId="urn:microsoft.com/office/officeart/2005/8/colors/accent2_2" csCatId="accent2" phldr="1"/>
-      <dgm:spPr/>
-      <dgm:t>
-        <a:bodyPr/>
-        <a:lstStyle/>
-        <a:p>
-          <a:endParaRPr lang="en-US"/>
-        </a:p>
-      </dgm:t>
-    </dgm:pt>
-    <dgm:pt modelId="{61542324-136E-4962-B124-A2E13562DCA5}">
-      <dgm:prSet/>
-      <dgm:spPr/>
-      <dgm:t>
-        <a:bodyPr/>
-        <a:lstStyle/>
-        <a:p>
-          <a:pPr>
-            <a:defRPr cap="all"/>
-          </a:pPr>
-          <a:r>
-            <a:rPr lang="en-US"/>
-            <a:t>K – Folds Cross Validation</a:t>
-          </a:r>
-        </a:p>
-      </dgm:t>
-    </dgm:pt>
-    <dgm:pt modelId="{FA43E2B0-3D5B-42AE-BC31-38B9953D6F18}" type="parTrans" cxnId="{B1C935D7-6FAF-4BF6-9CBD-3A8C2654CCEA}">
-      <dgm:prSet/>
-      <dgm:spPr/>
-      <dgm:t>
-        <a:bodyPr/>
-        <a:lstStyle/>
-        <a:p>
-          <a:endParaRPr lang="en-US"/>
-        </a:p>
-      </dgm:t>
-    </dgm:pt>
-    <dgm:pt modelId="{0CACFC4A-8BA6-47BA-ABE1-1F6B185CAF8B}" type="sibTrans" cxnId="{B1C935D7-6FAF-4BF6-9CBD-3A8C2654CCEA}">
-      <dgm:prSet/>
-      <dgm:spPr/>
-      <dgm:t>
-        <a:bodyPr/>
-        <a:lstStyle/>
-        <a:p>
-          <a:endParaRPr lang="en-US"/>
-        </a:p>
-      </dgm:t>
-    </dgm:pt>
-    <dgm:pt modelId="{65D83A1D-8F7D-4E02-90AE-1FE661A8F2EB}">
-      <dgm:prSet/>
-      <dgm:spPr/>
-      <dgm:t>
-        <a:bodyPr/>
-        <a:lstStyle/>
-        <a:p>
-          <a:pPr>
-            <a:defRPr cap="all"/>
-          </a:pPr>
-          <a:r>
-            <a:rPr lang="en-US"/>
-            <a:t>Train &amp; Test ‘K’ models trained on overlapping subsets of data</a:t>
-          </a:r>
-        </a:p>
-      </dgm:t>
-    </dgm:pt>
-    <dgm:pt modelId="{9DD797AE-6D91-450D-AFCF-6854BACEC0D1}" type="parTrans" cxnId="{8DB78AC6-B538-4762-BF90-18FF0460A2A4}">
-      <dgm:prSet/>
-      <dgm:spPr/>
-      <dgm:t>
-        <a:bodyPr/>
-        <a:lstStyle/>
-        <a:p>
-          <a:endParaRPr lang="en-US"/>
-        </a:p>
-      </dgm:t>
-    </dgm:pt>
-    <dgm:pt modelId="{0C3465A3-BADF-4BA7-8DC0-1C8304F8C36B}" type="sibTrans" cxnId="{8DB78AC6-B538-4762-BF90-18FF0460A2A4}">
-      <dgm:prSet/>
-      <dgm:spPr/>
-      <dgm:t>
-        <a:bodyPr/>
-        <a:lstStyle/>
-        <a:p>
-          <a:endParaRPr lang="en-US"/>
-        </a:p>
-      </dgm:t>
-    </dgm:pt>
-    <dgm:pt modelId="{08A18010-8BE2-4796-9E43-B2971BCD1778}">
-      <dgm:prSet/>
-      <dgm:spPr/>
-      <dgm:t>
-        <a:bodyPr/>
-        <a:lstStyle/>
-        <a:p>
-          <a:pPr>
-            <a:defRPr cap="all"/>
-          </a:pPr>
-          <a:r>
-            <a:rPr lang="en-US"/>
-            <a:t>Ensures no “anomaly cases”</a:t>
-          </a:r>
-        </a:p>
-      </dgm:t>
-    </dgm:pt>
-    <dgm:pt modelId="{E70F81A3-4707-4713-B72B-D0F3C79A343D}" type="parTrans" cxnId="{DC3A32E3-8915-49B4-8D24-E080AE37AB4B}">
-      <dgm:prSet/>
-      <dgm:spPr/>
-      <dgm:t>
-        <a:bodyPr/>
-        <a:lstStyle/>
-        <a:p>
-          <a:endParaRPr lang="en-US"/>
-        </a:p>
-      </dgm:t>
-    </dgm:pt>
-    <dgm:pt modelId="{89C2F69C-CCF7-4BB4-BDFA-30EE8E0AE359}" type="sibTrans" cxnId="{DC3A32E3-8915-49B4-8D24-E080AE37AB4B}">
-      <dgm:prSet/>
-      <dgm:spPr/>
-      <dgm:t>
-        <a:bodyPr/>
-        <a:lstStyle/>
-        <a:p>
-          <a:endParaRPr lang="en-US"/>
-        </a:p>
-      </dgm:t>
-    </dgm:pt>
-    <dgm:pt modelId="{746D5E88-FB0A-4903-9853-E1CF8CC1FC49}" type="pres">
-      <dgm:prSet presAssocID="{D01A76EA-025D-4861-8B43-B8EE84A6FD1A}" presName="root" presStyleCnt="0">
-        <dgm:presLayoutVars>
-          <dgm:dir/>
-          <dgm:resizeHandles val="exact"/>
-        </dgm:presLayoutVars>
-      </dgm:prSet>
-      <dgm:spPr/>
-    </dgm:pt>
-    <dgm:pt modelId="{4318EC47-A9EA-45DA-8031-04C5BFB07967}" type="pres">
-      <dgm:prSet presAssocID="{61542324-136E-4962-B124-A2E13562DCA5}" presName="compNode" presStyleCnt="0"/>
-      <dgm:spPr/>
-    </dgm:pt>
-    <dgm:pt modelId="{0B2B27FF-6836-4FAA-AEEF-979656B3DEC1}" type="pres">
-      <dgm:prSet presAssocID="{61542324-136E-4962-B124-A2E13562DCA5}" presName="iconBgRect" presStyleLbl="bgShp" presStyleIdx="0" presStyleCnt="3"/>
-      <dgm:spPr>
-        <a:solidFill>
-          <a:schemeClr val="bg1">
-            <a:lumMod val="65000"/>
-            <a:lumOff val="35000"/>
-          </a:schemeClr>
-        </a:solidFill>
-      </dgm:spPr>
-    </dgm:pt>
-    <dgm:pt modelId="{8D029246-069B-4DB9-96C3-FA2873511B9A}" type="pres">
-      <dgm:prSet presAssocID="{61542324-136E-4962-B124-A2E13562DCA5}" presName="iconRect" presStyleLbl="node1" presStyleIdx="0" presStyleCnt="3"/>
-      <dgm:spPr>
-        <a:blipFill>
-          <a:blip xmlns:r="http://schemas.openxmlformats.org/officeDocument/2006/relationships" r:embed="rId1">
-            <a:extLst>
-              <a:ext uri="{28A0092B-C50C-407E-A947-70E740481C1C}">
-                <a14:useLocalDpi xmlns:a14="http://schemas.microsoft.com/office/drawing/2010/main" val="0"/>
-              </a:ext>
-              <a:ext uri="{96DAC541-7B7A-43D3-8B79-37D633B846F1}">
-                <asvg:svgBlip xmlns:asvg="http://schemas.microsoft.com/office/drawing/2016/SVG/main" r:embed="rId2"/>
-              </a:ext>
-            </a:extLst>
-          </a:blip>
-          <a:srcRect/>
-          <a:stretch>
-            <a:fillRect/>
-          </a:stretch>
-        </a:blipFill>
-        <a:ln>
-          <a:noFill/>
-        </a:ln>
-      </dgm:spPr>
-      <dgm:extLst>
-        <a:ext uri="{E40237B7-FDA0-4F09-8148-C483321AD2D9}">
-          <dgm14:cNvPr xmlns:dgm14="http://schemas.microsoft.com/office/drawing/2010/diagram" id="0" name="" descr="Abacus"/>
-        </a:ext>
-      </dgm:extLst>
-    </dgm:pt>
-    <dgm:pt modelId="{2A572874-DD32-42E7-A742-39BA264F2222}" type="pres">
-      <dgm:prSet presAssocID="{61542324-136E-4962-B124-A2E13562DCA5}" presName="spaceRect" presStyleCnt="0"/>
-      <dgm:spPr/>
-    </dgm:pt>
-    <dgm:pt modelId="{CB43206C-856B-47F1-BBC2-6E3CA6057D92}" type="pres">
-      <dgm:prSet presAssocID="{61542324-136E-4962-B124-A2E13562DCA5}" presName="textRect" presStyleLbl="revTx" presStyleIdx="0" presStyleCnt="3">
-        <dgm:presLayoutVars>
-          <dgm:chMax val="1"/>
-          <dgm:chPref val="1"/>
-        </dgm:presLayoutVars>
-      </dgm:prSet>
-      <dgm:spPr/>
-    </dgm:pt>
-    <dgm:pt modelId="{0650DF44-969C-46D8-A368-66CD95F7BCE7}" type="pres">
-      <dgm:prSet presAssocID="{0CACFC4A-8BA6-47BA-ABE1-1F6B185CAF8B}" presName="sibTrans" presStyleCnt="0"/>
-      <dgm:spPr/>
-    </dgm:pt>
-    <dgm:pt modelId="{1BCE10A6-2DC8-4FA6-969C-9272ACB56683}" type="pres">
-      <dgm:prSet presAssocID="{65D83A1D-8F7D-4E02-90AE-1FE661A8F2EB}" presName="compNode" presStyleCnt="0"/>
-      <dgm:spPr/>
-    </dgm:pt>
-    <dgm:pt modelId="{5B882669-33D1-4CCD-A8B6-5FFB158B1724}" type="pres">
-      <dgm:prSet presAssocID="{65D83A1D-8F7D-4E02-90AE-1FE661A8F2EB}" presName="iconBgRect" presStyleLbl="bgShp" presStyleIdx="1" presStyleCnt="3"/>
-      <dgm:spPr>
-        <a:solidFill>
-          <a:schemeClr val="bg1">
-            <a:lumMod val="65000"/>
-            <a:lumOff val="35000"/>
-          </a:schemeClr>
-        </a:solidFill>
-      </dgm:spPr>
-    </dgm:pt>
-    <dgm:pt modelId="{5758AE65-DB0F-4CC3-A313-86D7FA89ABAD}" type="pres">
-      <dgm:prSet presAssocID="{65D83A1D-8F7D-4E02-90AE-1FE661A8F2EB}" presName="iconRect" presStyleLbl="node1" presStyleIdx="1" presStyleCnt="3"/>
-      <dgm:spPr>
-        <a:blipFill>
-          <a:blip xmlns:r="http://schemas.openxmlformats.org/officeDocument/2006/relationships" r:embed="rId3">
-            <a:extLst>
-              <a:ext uri="{28A0092B-C50C-407E-A947-70E740481C1C}">
-                <a14:useLocalDpi xmlns:a14="http://schemas.microsoft.com/office/drawing/2010/main" val="0"/>
-              </a:ext>
-              <a:ext uri="{96DAC541-7B7A-43D3-8B79-37D633B846F1}">
-                <asvg:svgBlip xmlns:asvg="http://schemas.microsoft.com/office/drawing/2016/SVG/main" r:embed="rId4"/>
-              </a:ext>
-            </a:extLst>
-          </a:blip>
-          <a:stretch>
-            <a:fillRect/>
-          </a:stretch>
-        </a:blipFill>
-        <a:ln>
-          <a:noFill/>
-        </a:ln>
-      </dgm:spPr>
-      <dgm:extLst>
-        <a:ext uri="{E40237B7-FDA0-4F09-8148-C483321AD2D9}">
-          <dgm14:cNvPr xmlns:dgm14="http://schemas.microsoft.com/office/drawing/2010/diagram" id="0" name="" descr="Teacher"/>
-        </a:ext>
-      </dgm:extLst>
-    </dgm:pt>
-    <dgm:pt modelId="{0ABD0C18-6A62-4D96-B1F2-DC18CBC07C31}" type="pres">
-      <dgm:prSet presAssocID="{65D83A1D-8F7D-4E02-90AE-1FE661A8F2EB}" presName="spaceRect" presStyleCnt="0"/>
-      <dgm:spPr/>
-    </dgm:pt>
-    <dgm:pt modelId="{7A582C1F-F627-4840-9610-3C79B1289D11}" type="pres">
-      <dgm:prSet presAssocID="{65D83A1D-8F7D-4E02-90AE-1FE661A8F2EB}" presName="textRect" presStyleLbl="revTx" presStyleIdx="1" presStyleCnt="3">
-        <dgm:presLayoutVars>
-          <dgm:chMax val="1"/>
-          <dgm:chPref val="1"/>
-        </dgm:presLayoutVars>
-      </dgm:prSet>
-      <dgm:spPr/>
-    </dgm:pt>
-    <dgm:pt modelId="{9969B971-B75A-45AA-8C7D-51710534509A}" type="pres">
-      <dgm:prSet presAssocID="{0C3465A3-BADF-4BA7-8DC0-1C8304F8C36B}" presName="sibTrans" presStyleCnt="0"/>
-      <dgm:spPr/>
-    </dgm:pt>
-    <dgm:pt modelId="{063478D3-5E52-4668-A95A-49DC080C32DC}" type="pres">
-      <dgm:prSet presAssocID="{08A18010-8BE2-4796-9E43-B2971BCD1778}" presName="compNode" presStyleCnt="0"/>
-      <dgm:spPr/>
-    </dgm:pt>
-    <dgm:pt modelId="{A076D8E6-457C-4F54-9B61-19CB9796740D}" type="pres">
-      <dgm:prSet presAssocID="{08A18010-8BE2-4796-9E43-B2971BCD1778}" presName="iconBgRect" presStyleLbl="bgShp" presStyleIdx="2" presStyleCnt="3"/>
-      <dgm:spPr>
-        <a:solidFill>
-          <a:schemeClr val="bg1">
-            <a:lumMod val="65000"/>
-            <a:lumOff val="35000"/>
-          </a:schemeClr>
-        </a:solidFill>
-      </dgm:spPr>
-    </dgm:pt>
-    <dgm:pt modelId="{C6B89EC3-9DE3-4EDD-A2FF-A82A98FF755F}" type="pres">
-      <dgm:prSet presAssocID="{08A18010-8BE2-4796-9E43-B2971BCD1778}" presName="iconRect" presStyleLbl="node1" presStyleIdx="2" presStyleCnt="3"/>
-      <dgm:spPr>
-        <a:blipFill>
-          <a:blip xmlns:r="http://schemas.openxmlformats.org/officeDocument/2006/relationships" r:embed="rId5">
-            <a:extLst>
-              <a:ext uri="{96DAC541-7B7A-43D3-8B79-37D633B846F1}">
-                <asvg:svgBlip xmlns:asvg="http://schemas.microsoft.com/office/drawing/2016/SVG/main" r:embed="rId6"/>
-              </a:ext>
-            </a:extLst>
-          </a:blip>
-          <a:srcRect/>
-          <a:stretch>
-            <a:fillRect/>
-          </a:stretch>
-        </a:blipFill>
-        <a:ln>
-          <a:noFill/>
-        </a:ln>
-      </dgm:spPr>
-      <dgm:extLst>
-        <a:ext uri="{E40237B7-FDA0-4F09-8148-C483321AD2D9}">
-          <dgm14:cNvPr xmlns:dgm14="http://schemas.microsoft.com/office/drawing/2010/diagram" id="0" name="" descr="Exclamation mark"/>
-        </a:ext>
-      </dgm:extLst>
-    </dgm:pt>
-    <dgm:pt modelId="{EC03F2A4-9B12-4F1F-AD53-C9728E5C53D3}" type="pres">
-      <dgm:prSet presAssocID="{08A18010-8BE2-4796-9E43-B2971BCD1778}" presName="spaceRect" presStyleCnt="0"/>
-      <dgm:spPr/>
-    </dgm:pt>
-    <dgm:pt modelId="{92FF035B-F289-41D4-ABBC-482C0A7B8221}" type="pres">
-      <dgm:prSet presAssocID="{08A18010-8BE2-4796-9E43-B2971BCD1778}" presName="textRect" presStyleLbl="revTx" presStyleIdx="2" presStyleCnt="3">
-        <dgm:presLayoutVars>
-          <dgm:chMax val="1"/>
-          <dgm:chPref val="1"/>
-        </dgm:presLayoutVars>
-      </dgm:prSet>
-      <dgm:spPr/>
-    </dgm:pt>
-  </dgm:ptLst>
-  <dgm:cxnLst>
-    <dgm:cxn modelId="{797BB81A-DDA5-489C-882D-4CDA166DB121}" type="presOf" srcId="{65D83A1D-8F7D-4E02-90AE-1FE661A8F2EB}" destId="{7A582C1F-F627-4840-9610-3C79B1289D11}" srcOrd="0" destOrd="0" presId="urn:microsoft.com/office/officeart/2018/5/layout/IconCircleLabelList"/>
-    <dgm:cxn modelId="{8C6DA226-042E-49CF-9F08-7DECE5A53761}" type="presOf" srcId="{08A18010-8BE2-4796-9E43-B2971BCD1778}" destId="{92FF035B-F289-41D4-ABBC-482C0A7B8221}" srcOrd="0" destOrd="0" presId="urn:microsoft.com/office/officeart/2018/5/layout/IconCircleLabelList"/>
-    <dgm:cxn modelId="{ECE7E559-CEF7-4E3F-BA70-6EB2807AAD93}" type="presOf" srcId="{61542324-136E-4962-B124-A2E13562DCA5}" destId="{CB43206C-856B-47F1-BBC2-6E3CA6057D92}" srcOrd="0" destOrd="0" presId="urn:microsoft.com/office/officeart/2018/5/layout/IconCircleLabelList"/>
-    <dgm:cxn modelId="{8DB78AC6-B538-4762-BF90-18FF0460A2A4}" srcId="{D01A76EA-025D-4861-8B43-B8EE84A6FD1A}" destId="{65D83A1D-8F7D-4E02-90AE-1FE661A8F2EB}" srcOrd="1" destOrd="0" parTransId="{9DD797AE-6D91-450D-AFCF-6854BACEC0D1}" sibTransId="{0C3465A3-BADF-4BA7-8DC0-1C8304F8C36B}"/>
-    <dgm:cxn modelId="{B1C935D7-6FAF-4BF6-9CBD-3A8C2654CCEA}" srcId="{D01A76EA-025D-4861-8B43-B8EE84A6FD1A}" destId="{61542324-136E-4962-B124-A2E13562DCA5}" srcOrd="0" destOrd="0" parTransId="{FA43E2B0-3D5B-42AE-BC31-38B9953D6F18}" sibTransId="{0CACFC4A-8BA6-47BA-ABE1-1F6B185CAF8B}"/>
-    <dgm:cxn modelId="{DC3A32E3-8915-49B4-8D24-E080AE37AB4B}" srcId="{D01A76EA-025D-4861-8B43-B8EE84A6FD1A}" destId="{08A18010-8BE2-4796-9E43-B2971BCD1778}" srcOrd="2" destOrd="0" parTransId="{E70F81A3-4707-4713-B72B-D0F3C79A343D}" sibTransId="{89C2F69C-CCF7-4BB4-BDFA-30EE8E0AE359}"/>
-    <dgm:cxn modelId="{B48EA8E6-EAFB-47BC-A449-17605C3C5279}" type="presOf" srcId="{D01A76EA-025D-4861-8B43-B8EE84A6FD1A}" destId="{746D5E88-FB0A-4903-9853-E1CF8CC1FC49}" srcOrd="0" destOrd="0" presId="urn:microsoft.com/office/officeart/2018/5/layout/IconCircleLabelList"/>
-    <dgm:cxn modelId="{CD7A2616-20E2-44E4-BFE0-534C5ACF5EFB}" type="presParOf" srcId="{746D5E88-FB0A-4903-9853-E1CF8CC1FC49}" destId="{4318EC47-A9EA-45DA-8031-04C5BFB07967}" srcOrd="0" destOrd="0" presId="urn:microsoft.com/office/officeart/2018/5/layout/IconCircleLabelList"/>
-    <dgm:cxn modelId="{12F1930F-4E72-4A32-AFEE-4C7B7C4C6889}" type="presParOf" srcId="{4318EC47-A9EA-45DA-8031-04C5BFB07967}" destId="{0B2B27FF-6836-4FAA-AEEF-979656B3DEC1}" srcOrd="0" destOrd="0" presId="urn:microsoft.com/office/officeart/2018/5/layout/IconCircleLabelList"/>
-    <dgm:cxn modelId="{0324AFEF-BD44-4882-B2E9-EE137950172E}" type="presParOf" srcId="{4318EC47-A9EA-45DA-8031-04C5BFB07967}" destId="{8D029246-069B-4DB9-96C3-FA2873511B9A}" srcOrd="1" destOrd="0" presId="urn:microsoft.com/office/officeart/2018/5/layout/IconCircleLabelList"/>
-    <dgm:cxn modelId="{689280AD-183B-4C23-919C-3CE85F0DA756}" type="presParOf" srcId="{4318EC47-A9EA-45DA-8031-04C5BFB07967}" destId="{2A572874-DD32-42E7-A742-39BA264F2222}" srcOrd="2" destOrd="0" presId="urn:microsoft.com/office/officeart/2018/5/layout/IconCircleLabelList"/>
-    <dgm:cxn modelId="{AE020E2F-52D5-4223-8601-056E4D2BA397}" type="presParOf" srcId="{4318EC47-A9EA-45DA-8031-04C5BFB07967}" destId="{CB43206C-856B-47F1-BBC2-6E3CA6057D92}" srcOrd="3" destOrd="0" presId="urn:microsoft.com/office/officeart/2018/5/layout/IconCircleLabelList"/>
-    <dgm:cxn modelId="{622F4567-AA50-4450-B348-0760CA3A3769}" type="presParOf" srcId="{746D5E88-FB0A-4903-9853-E1CF8CC1FC49}" destId="{0650DF44-969C-46D8-A368-66CD95F7BCE7}" srcOrd="1" destOrd="0" presId="urn:microsoft.com/office/officeart/2018/5/layout/IconCircleLabelList"/>
-    <dgm:cxn modelId="{8532D9DF-86E7-4868-9C50-99F40D3D571A}" type="presParOf" srcId="{746D5E88-FB0A-4903-9853-E1CF8CC1FC49}" destId="{1BCE10A6-2DC8-4FA6-969C-9272ACB56683}" srcOrd="2" destOrd="0" presId="urn:microsoft.com/office/officeart/2018/5/layout/IconCircleLabelList"/>
-    <dgm:cxn modelId="{0E9191D5-B202-42DD-976C-7FDF9D0FAFFE}" type="presParOf" srcId="{1BCE10A6-2DC8-4FA6-969C-9272ACB56683}" destId="{5B882669-33D1-4CCD-A8B6-5FFB158B1724}" srcOrd="0" destOrd="0" presId="urn:microsoft.com/office/officeart/2018/5/layout/IconCircleLabelList"/>
-    <dgm:cxn modelId="{5D1AF640-064C-4B79-9E24-04DA2867B655}" type="presParOf" srcId="{1BCE10A6-2DC8-4FA6-969C-9272ACB56683}" destId="{5758AE65-DB0F-4CC3-A313-86D7FA89ABAD}" srcOrd="1" destOrd="0" presId="urn:microsoft.com/office/officeart/2018/5/layout/IconCircleLabelList"/>
-    <dgm:cxn modelId="{A11976B6-1634-40F6-85F2-8DB7F05B8FF1}" type="presParOf" srcId="{1BCE10A6-2DC8-4FA6-969C-9272ACB56683}" destId="{0ABD0C18-6A62-4D96-B1F2-DC18CBC07C31}" srcOrd="2" destOrd="0" presId="urn:microsoft.com/office/officeart/2018/5/layout/IconCircleLabelList"/>
-    <dgm:cxn modelId="{C0D4F485-4E22-40C1-B05F-583B19807869}" type="presParOf" srcId="{1BCE10A6-2DC8-4FA6-969C-9272ACB56683}" destId="{7A582C1F-F627-4840-9610-3C79B1289D11}" srcOrd="3" destOrd="0" presId="urn:microsoft.com/office/officeart/2018/5/layout/IconCircleLabelList"/>
-    <dgm:cxn modelId="{3E6DC7A6-A63A-47D5-9FB3-3883D78075BA}" type="presParOf" srcId="{746D5E88-FB0A-4903-9853-E1CF8CC1FC49}" destId="{9969B971-B75A-45AA-8C7D-51710534509A}" srcOrd="3" destOrd="0" presId="urn:microsoft.com/office/officeart/2018/5/layout/IconCircleLabelList"/>
-    <dgm:cxn modelId="{D016316F-917F-457A-9844-24EE56B6AFEB}" type="presParOf" srcId="{746D5E88-FB0A-4903-9853-E1CF8CC1FC49}" destId="{063478D3-5E52-4668-A95A-49DC080C32DC}" srcOrd="4" destOrd="0" presId="urn:microsoft.com/office/officeart/2018/5/layout/IconCircleLabelList"/>
-    <dgm:cxn modelId="{B6DE2C90-F3B0-40F0-8FAA-61DDFCDE1C5B}" type="presParOf" srcId="{063478D3-5E52-4668-A95A-49DC080C32DC}" destId="{A076D8E6-457C-4F54-9B61-19CB9796740D}" srcOrd="0" destOrd="0" presId="urn:microsoft.com/office/officeart/2018/5/layout/IconCircleLabelList"/>
-    <dgm:cxn modelId="{FD580628-6765-4627-A713-1D06277733B4}" type="presParOf" srcId="{063478D3-5E52-4668-A95A-49DC080C32DC}" destId="{C6B89EC3-9DE3-4EDD-A2FF-A82A98FF755F}" srcOrd="1" destOrd="0" presId="urn:microsoft.com/office/officeart/2018/5/layout/IconCircleLabelList"/>
-    <dgm:cxn modelId="{46DD4EC3-8FBC-4C1B-AFAA-9F7C03D62BC0}" type="presParOf" srcId="{063478D3-5E52-4668-A95A-49DC080C32DC}" destId="{EC03F2A4-9B12-4F1F-AD53-C9728E5C53D3}" srcOrd="2" destOrd="0" presId="urn:microsoft.com/office/officeart/2018/5/layout/IconCircleLabelList"/>
-    <dgm:cxn modelId="{79B8FA1D-8ED9-463F-AFA6-D1F6D675340F}" type="presParOf" srcId="{063478D3-5E52-4668-A95A-49DC080C32DC}" destId="{92FF035B-F289-41D4-ABBC-482C0A7B8221}" srcOrd="3" destOrd="0" presId="urn:microsoft.com/office/officeart/2018/5/layout/IconCircleLabelList"/>
   </dgm:cxnLst>
   <dgm:bg/>
   <dgm:whole/>
@@ -8876,461 +7774,6 @@
       <dsp:txXfrm>
         <a:off x="5114639" y="3069717"/>
         <a:ext cx="572072" cy="782698"/>
-      </dsp:txXfrm>
-    </dsp:sp>
-  </dsp:spTree>
-</dsp:drawing>
-</file>
-
-<file path=ppt/diagrams/drawing6.xml><?xml version="1.0" encoding="utf-8"?>
-<dsp:drawing xmlns:dgm="http://schemas.openxmlformats.org/drawingml/2006/diagram" xmlns:dsp="http://schemas.microsoft.com/office/drawing/2008/diagram" xmlns:a="http://schemas.openxmlformats.org/drawingml/2006/main">
-  <dsp:spTree>
-    <dsp:nvGrpSpPr>
-      <dsp:cNvPr id="0" name=""/>
-      <dsp:cNvGrpSpPr/>
-    </dsp:nvGrpSpPr>
-    <dsp:grpSpPr/>
-    <dsp:sp modelId="{0B2B27FF-6836-4FAA-AEEF-979656B3DEC1}">
-      <dsp:nvSpPr>
-        <dsp:cNvPr id="0" name=""/>
-        <dsp:cNvSpPr/>
-      </dsp:nvSpPr>
-      <dsp:spPr>
-        <a:xfrm>
-          <a:off x="575999" y="693600"/>
-          <a:ext cx="1647000" cy="1647000"/>
-        </a:xfrm>
-        <a:prstGeom prst="ellipse">
-          <a:avLst/>
-        </a:prstGeom>
-        <a:solidFill>
-          <a:schemeClr val="bg1">
-            <a:lumMod val="65000"/>
-            <a:lumOff val="35000"/>
-          </a:schemeClr>
-        </a:solidFill>
-        <a:ln>
-          <a:noFill/>
-        </a:ln>
-        <a:effectLst/>
-      </dsp:spPr>
-      <dsp:style>
-        <a:lnRef idx="0">
-          <a:scrgbClr r="0" g="0" b="0"/>
-        </a:lnRef>
-        <a:fillRef idx="1">
-          <a:scrgbClr r="0" g="0" b="0"/>
-        </a:fillRef>
-        <a:effectRef idx="0">
-          <a:scrgbClr r="0" g="0" b="0"/>
-        </a:effectRef>
-        <a:fontRef idx="minor"/>
-      </dsp:style>
-    </dsp:sp>
-    <dsp:sp modelId="{8D029246-069B-4DB9-96C3-FA2873511B9A}">
-      <dsp:nvSpPr>
-        <dsp:cNvPr id="0" name=""/>
-        <dsp:cNvSpPr/>
-      </dsp:nvSpPr>
-      <dsp:spPr>
-        <a:xfrm>
-          <a:off x="927000" y="1044600"/>
-          <a:ext cx="945000" cy="945000"/>
-        </a:xfrm>
-        <a:prstGeom prst="rect">
-          <a:avLst/>
-        </a:prstGeom>
-        <a:blipFill>
-          <a:blip xmlns:r="http://schemas.openxmlformats.org/officeDocument/2006/relationships" r:embed="rId1">
-            <a:extLst>
-              <a:ext uri="{28A0092B-C50C-407E-A947-70E740481C1C}">
-                <a14:useLocalDpi xmlns:a14="http://schemas.microsoft.com/office/drawing/2010/main" val="0"/>
-              </a:ext>
-              <a:ext uri="{96DAC541-7B7A-43D3-8B79-37D633B846F1}">
-                <asvg:svgBlip xmlns:asvg="http://schemas.microsoft.com/office/drawing/2016/SVG/main" r:embed="rId2"/>
-              </a:ext>
-            </a:extLst>
-          </a:blip>
-          <a:srcRect/>
-          <a:stretch>
-            <a:fillRect/>
-          </a:stretch>
-        </a:blipFill>
-        <a:ln w="12700" cap="flat" cmpd="sng" algn="ctr">
-          <a:noFill/>
-          <a:prstDash val="solid"/>
-          <a:miter lim="800000"/>
-        </a:ln>
-        <a:effectLst/>
-      </dsp:spPr>
-      <dsp:style>
-        <a:lnRef idx="2">
-          <a:scrgbClr r="0" g="0" b="0"/>
-        </a:lnRef>
-        <a:fillRef idx="1">
-          <a:scrgbClr r="0" g="0" b="0"/>
-        </a:fillRef>
-        <a:effectRef idx="0">
-          <a:scrgbClr r="0" g="0" b="0"/>
-        </a:effectRef>
-        <a:fontRef idx="minor">
-          <a:schemeClr val="lt1"/>
-        </a:fontRef>
-      </dsp:style>
-    </dsp:sp>
-    <dsp:sp modelId="{CB43206C-856B-47F1-BBC2-6E3CA6057D92}">
-      <dsp:nvSpPr>
-        <dsp:cNvPr id="0" name=""/>
-        <dsp:cNvSpPr/>
-      </dsp:nvSpPr>
-      <dsp:spPr>
-        <a:xfrm>
-          <a:off x="49500" y="2853600"/>
-          <a:ext cx="2700000" cy="720000"/>
-        </a:xfrm>
-        <a:prstGeom prst="rect">
-          <a:avLst/>
-        </a:prstGeom>
-        <a:noFill/>
-        <a:ln>
-          <a:noFill/>
-        </a:ln>
-        <a:effectLst/>
-      </dsp:spPr>
-      <dsp:style>
-        <a:lnRef idx="0">
-          <a:scrgbClr r="0" g="0" b="0"/>
-        </a:lnRef>
-        <a:fillRef idx="0">
-          <a:scrgbClr r="0" g="0" b="0"/>
-        </a:fillRef>
-        <a:effectRef idx="0">
-          <a:scrgbClr r="0" g="0" b="0"/>
-        </a:effectRef>
-        <a:fontRef idx="minor"/>
-      </dsp:style>
-      <dsp:txBody>
-        <a:bodyPr spcFirstLastPara="0" vert="horz" wrap="square" lIns="0" tIns="0" rIns="0" bIns="0" numCol="1" spcCol="1270" anchor="t" anchorCtr="0">
-          <a:noAutofit/>
-        </a:bodyPr>
-        <a:lstStyle/>
-        <a:p>
-          <a:pPr marL="0" lvl="0" indent="0" algn="ctr" defTabSz="755650">
-            <a:lnSpc>
-              <a:spcPct val="90000"/>
-            </a:lnSpc>
-            <a:spcBef>
-              <a:spcPct val="0"/>
-            </a:spcBef>
-            <a:spcAft>
-              <a:spcPct val="35000"/>
-            </a:spcAft>
-            <a:buNone/>
-            <a:defRPr cap="all"/>
-          </a:pPr>
-          <a:r>
-            <a:rPr lang="en-US" sz="1700" kern="1200"/>
-            <a:t>K – Folds Cross Validation</a:t>
-          </a:r>
-        </a:p>
-      </dsp:txBody>
-      <dsp:txXfrm>
-        <a:off x="49500" y="2853600"/>
-        <a:ext cx="2700000" cy="720000"/>
-      </dsp:txXfrm>
-    </dsp:sp>
-    <dsp:sp modelId="{5B882669-33D1-4CCD-A8B6-5FFB158B1724}">
-      <dsp:nvSpPr>
-        <dsp:cNvPr id="0" name=""/>
-        <dsp:cNvSpPr/>
-      </dsp:nvSpPr>
-      <dsp:spPr>
-        <a:xfrm>
-          <a:off x="3748500" y="693600"/>
-          <a:ext cx="1647000" cy="1647000"/>
-        </a:xfrm>
-        <a:prstGeom prst="ellipse">
-          <a:avLst/>
-        </a:prstGeom>
-        <a:solidFill>
-          <a:schemeClr val="bg1">
-            <a:lumMod val="65000"/>
-            <a:lumOff val="35000"/>
-          </a:schemeClr>
-        </a:solidFill>
-        <a:ln>
-          <a:noFill/>
-        </a:ln>
-        <a:effectLst/>
-      </dsp:spPr>
-      <dsp:style>
-        <a:lnRef idx="0">
-          <a:scrgbClr r="0" g="0" b="0"/>
-        </a:lnRef>
-        <a:fillRef idx="1">
-          <a:scrgbClr r="0" g="0" b="0"/>
-        </a:fillRef>
-        <a:effectRef idx="0">
-          <a:scrgbClr r="0" g="0" b="0"/>
-        </a:effectRef>
-        <a:fontRef idx="minor"/>
-      </dsp:style>
-    </dsp:sp>
-    <dsp:sp modelId="{5758AE65-DB0F-4CC3-A313-86D7FA89ABAD}">
-      <dsp:nvSpPr>
-        <dsp:cNvPr id="0" name=""/>
-        <dsp:cNvSpPr/>
-      </dsp:nvSpPr>
-      <dsp:spPr>
-        <a:xfrm>
-          <a:off x="4099500" y="1044600"/>
-          <a:ext cx="945000" cy="945000"/>
-        </a:xfrm>
-        <a:prstGeom prst="rect">
-          <a:avLst/>
-        </a:prstGeom>
-        <a:blipFill>
-          <a:blip xmlns:r="http://schemas.openxmlformats.org/officeDocument/2006/relationships" r:embed="rId3">
-            <a:extLst>
-              <a:ext uri="{28A0092B-C50C-407E-A947-70E740481C1C}">
-                <a14:useLocalDpi xmlns:a14="http://schemas.microsoft.com/office/drawing/2010/main" val="0"/>
-              </a:ext>
-              <a:ext uri="{96DAC541-7B7A-43D3-8B79-37D633B846F1}">
-                <asvg:svgBlip xmlns:asvg="http://schemas.microsoft.com/office/drawing/2016/SVG/main" r:embed="rId4"/>
-              </a:ext>
-            </a:extLst>
-          </a:blip>
-          <a:stretch>
-            <a:fillRect/>
-          </a:stretch>
-        </a:blipFill>
-        <a:ln w="12700" cap="flat" cmpd="sng" algn="ctr">
-          <a:noFill/>
-          <a:prstDash val="solid"/>
-          <a:miter lim="800000"/>
-        </a:ln>
-        <a:effectLst/>
-      </dsp:spPr>
-      <dsp:style>
-        <a:lnRef idx="2">
-          <a:scrgbClr r="0" g="0" b="0"/>
-        </a:lnRef>
-        <a:fillRef idx="1">
-          <a:scrgbClr r="0" g="0" b="0"/>
-        </a:fillRef>
-        <a:effectRef idx="0">
-          <a:scrgbClr r="0" g="0" b="0"/>
-        </a:effectRef>
-        <a:fontRef idx="minor">
-          <a:schemeClr val="lt1"/>
-        </a:fontRef>
-      </dsp:style>
-    </dsp:sp>
-    <dsp:sp modelId="{7A582C1F-F627-4840-9610-3C79B1289D11}">
-      <dsp:nvSpPr>
-        <dsp:cNvPr id="0" name=""/>
-        <dsp:cNvSpPr/>
-      </dsp:nvSpPr>
-      <dsp:spPr>
-        <a:xfrm>
-          <a:off x="3222000" y="2853600"/>
-          <a:ext cx="2700000" cy="720000"/>
-        </a:xfrm>
-        <a:prstGeom prst="rect">
-          <a:avLst/>
-        </a:prstGeom>
-        <a:noFill/>
-        <a:ln>
-          <a:noFill/>
-        </a:ln>
-        <a:effectLst/>
-      </dsp:spPr>
-      <dsp:style>
-        <a:lnRef idx="0">
-          <a:scrgbClr r="0" g="0" b="0"/>
-        </a:lnRef>
-        <a:fillRef idx="0">
-          <a:scrgbClr r="0" g="0" b="0"/>
-        </a:fillRef>
-        <a:effectRef idx="0">
-          <a:scrgbClr r="0" g="0" b="0"/>
-        </a:effectRef>
-        <a:fontRef idx="minor"/>
-      </dsp:style>
-      <dsp:txBody>
-        <a:bodyPr spcFirstLastPara="0" vert="horz" wrap="square" lIns="0" tIns="0" rIns="0" bIns="0" numCol="1" spcCol="1270" anchor="t" anchorCtr="0">
-          <a:noAutofit/>
-        </a:bodyPr>
-        <a:lstStyle/>
-        <a:p>
-          <a:pPr marL="0" lvl="0" indent="0" algn="ctr" defTabSz="755650">
-            <a:lnSpc>
-              <a:spcPct val="90000"/>
-            </a:lnSpc>
-            <a:spcBef>
-              <a:spcPct val="0"/>
-            </a:spcBef>
-            <a:spcAft>
-              <a:spcPct val="35000"/>
-            </a:spcAft>
-            <a:buNone/>
-            <a:defRPr cap="all"/>
-          </a:pPr>
-          <a:r>
-            <a:rPr lang="en-US" sz="1700" kern="1200"/>
-            <a:t>Train &amp; Test ‘K’ models trained on overlapping subsets of data</a:t>
-          </a:r>
-        </a:p>
-      </dsp:txBody>
-      <dsp:txXfrm>
-        <a:off x="3222000" y="2853600"/>
-        <a:ext cx="2700000" cy="720000"/>
-      </dsp:txXfrm>
-    </dsp:sp>
-    <dsp:sp modelId="{A076D8E6-457C-4F54-9B61-19CB9796740D}">
-      <dsp:nvSpPr>
-        <dsp:cNvPr id="0" name=""/>
-        <dsp:cNvSpPr/>
-      </dsp:nvSpPr>
-      <dsp:spPr>
-        <a:xfrm>
-          <a:off x="6921000" y="693600"/>
-          <a:ext cx="1647000" cy="1647000"/>
-        </a:xfrm>
-        <a:prstGeom prst="ellipse">
-          <a:avLst/>
-        </a:prstGeom>
-        <a:solidFill>
-          <a:schemeClr val="bg1">
-            <a:lumMod val="65000"/>
-            <a:lumOff val="35000"/>
-          </a:schemeClr>
-        </a:solidFill>
-        <a:ln>
-          <a:noFill/>
-        </a:ln>
-        <a:effectLst/>
-      </dsp:spPr>
-      <dsp:style>
-        <a:lnRef idx="0">
-          <a:scrgbClr r="0" g="0" b="0"/>
-        </a:lnRef>
-        <a:fillRef idx="1">
-          <a:scrgbClr r="0" g="0" b="0"/>
-        </a:fillRef>
-        <a:effectRef idx="0">
-          <a:scrgbClr r="0" g="0" b="0"/>
-        </a:effectRef>
-        <a:fontRef idx="minor"/>
-      </dsp:style>
-    </dsp:sp>
-    <dsp:sp modelId="{C6B89EC3-9DE3-4EDD-A2FF-A82A98FF755F}">
-      <dsp:nvSpPr>
-        <dsp:cNvPr id="0" name=""/>
-        <dsp:cNvSpPr/>
-      </dsp:nvSpPr>
-      <dsp:spPr>
-        <a:xfrm>
-          <a:off x="7272000" y="1044600"/>
-          <a:ext cx="945000" cy="945000"/>
-        </a:xfrm>
-        <a:prstGeom prst="rect">
-          <a:avLst/>
-        </a:prstGeom>
-        <a:blipFill>
-          <a:blip xmlns:r="http://schemas.openxmlformats.org/officeDocument/2006/relationships" r:embed="rId5">
-            <a:extLst>
-              <a:ext uri="{96DAC541-7B7A-43D3-8B79-37D633B846F1}">
-                <asvg:svgBlip xmlns:asvg="http://schemas.microsoft.com/office/drawing/2016/SVG/main" r:embed="rId6"/>
-              </a:ext>
-            </a:extLst>
-          </a:blip>
-          <a:srcRect/>
-          <a:stretch>
-            <a:fillRect/>
-          </a:stretch>
-        </a:blipFill>
-        <a:ln w="12700" cap="flat" cmpd="sng" algn="ctr">
-          <a:noFill/>
-          <a:prstDash val="solid"/>
-          <a:miter lim="800000"/>
-        </a:ln>
-        <a:effectLst/>
-      </dsp:spPr>
-      <dsp:style>
-        <a:lnRef idx="2">
-          <a:scrgbClr r="0" g="0" b="0"/>
-        </a:lnRef>
-        <a:fillRef idx="1">
-          <a:scrgbClr r="0" g="0" b="0"/>
-        </a:fillRef>
-        <a:effectRef idx="0">
-          <a:scrgbClr r="0" g="0" b="0"/>
-        </a:effectRef>
-        <a:fontRef idx="minor">
-          <a:schemeClr val="lt1"/>
-        </a:fontRef>
-      </dsp:style>
-    </dsp:sp>
-    <dsp:sp modelId="{92FF035B-F289-41D4-ABBC-482C0A7B8221}">
-      <dsp:nvSpPr>
-        <dsp:cNvPr id="0" name=""/>
-        <dsp:cNvSpPr/>
-      </dsp:nvSpPr>
-      <dsp:spPr>
-        <a:xfrm>
-          <a:off x="6394500" y="2853600"/>
-          <a:ext cx="2700000" cy="720000"/>
-        </a:xfrm>
-        <a:prstGeom prst="rect">
-          <a:avLst/>
-        </a:prstGeom>
-        <a:noFill/>
-        <a:ln>
-          <a:noFill/>
-        </a:ln>
-        <a:effectLst/>
-      </dsp:spPr>
-      <dsp:style>
-        <a:lnRef idx="0">
-          <a:scrgbClr r="0" g="0" b="0"/>
-        </a:lnRef>
-        <a:fillRef idx="0">
-          <a:scrgbClr r="0" g="0" b="0"/>
-        </a:fillRef>
-        <a:effectRef idx="0">
-          <a:scrgbClr r="0" g="0" b="0"/>
-        </a:effectRef>
-        <a:fontRef idx="minor"/>
-      </dsp:style>
-      <dsp:txBody>
-        <a:bodyPr spcFirstLastPara="0" vert="horz" wrap="square" lIns="0" tIns="0" rIns="0" bIns="0" numCol="1" spcCol="1270" anchor="t" anchorCtr="0">
-          <a:noAutofit/>
-        </a:bodyPr>
-        <a:lstStyle/>
-        <a:p>
-          <a:pPr marL="0" lvl="0" indent="0" algn="ctr" defTabSz="755650">
-            <a:lnSpc>
-              <a:spcPct val="90000"/>
-            </a:lnSpc>
-            <a:spcBef>
-              <a:spcPct val="0"/>
-            </a:spcBef>
-            <a:spcAft>
-              <a:spcPct val="35000"/>
-            </a:spcAft>
-            <a:buNone/>
-            <a:defRPr cap="all"/>
-          </a:pPr>
-          <a:r>
-            <a:rPr lang="en-US" sz="1700" kern="1200"/>
-            <a:t>Ensures no “anomaly cases”</a:t>
-          </a:r>
-        </a:p>
-      </dsp:txBody>
-      <dsp:txXfrm>
-        <a:off x="6394500" y="2853600"/>
-        <a:ext cx="2700000" cy="720000"/>
       </dsp:txXfrm>
     </dsp:sp>
   </dsp:spTree>
@@ -11844,221 +10287,6 @@
 </dgm:layoutDef>
 </file>
 
-<file path=ppt/diagrams/layout6.xml><?xml version="1.0" encoding="utf-8"?>
-<dgm:layoutDef xmlns:dgm="http://schemas.openxmlformats.org/drawingml/2006/diagram" xmlns:a="http://schemas.openxmlformats.org/drawingml/2006/main" uniqueId="urn:microsoft.com/office/officeart/2018/5/layout/IconCircleLabelList">
-  <dgm:title val="Icon Circle Label List"/>
-  <dgm:desc val="Use to show non-sequential or grouped chunks of information accompanied by a related visuals. Works best with icons or small pictures with short text captions."/>
-  <dgm:catLst>
-    <dgm:cat type="icon" pri="500"/>
-  </dgm:catLst>
-  <dgm:sampData useDef="1">
-    <dgm:dataModel>
-      <dgm:ptLst/>
-      <dgm:bg/>
-      <dgm:whole/>
-    </dgm:dataModel>
-  </dgm:sampData>
-  <dgm:styleData useDef="1">
-    <dgm:dataModel>
-      <dgm:ptLst/>
-      <dgm:bg/>
-      <dgm:whole/>
-    </dgm:dataModel>
-  </dgm:styleData>
-  <dgm:clrData useDef="1">
-    <dgm:dataModel>
-      <dgm:ptLst/>
-      <dgm:bg/>
-      <dgm:whole/>
-    </dgm:dataModel>
-  </dgm:clrData>
-  <dgm:layoutNode name="root">
-    <dgm:varLst>
-      <dgm:dir/>
-      <dgm:resizeHandles val="exact"/>
-    </dgm:varLst>
-    <dgm:choose name="Name0">
-      <dgm:if name="Name1" axis="self" func="var" arg="dir" op="equ" val="norm">
-        <dgm:alg type="snake">
-          <dgm:param type="grDir" val="tL"/>
-          <dgm:param type="flowDir" val="row"/>
-          <dgm:param type="contDir" val="sameDir"/>
-          <dgm:param type="off" val="ctr"/>
-          <dgm:param type="vertAlign" val="mid"/>
-          <dgm:param type="horzAlign" val="ctr"/>
-        </dgm:alg>
-      </dgm:if>
-      <dgm:else name="Name2">
-        <dgm:alg type="snake">
-          <dgm:param type="grDir" val="tR"/>
-          <dgm:param type="flowDir" val="row"/>
-          <dgm:param type="contDir" val="sameDir"/>
-          <dgm:param type="off" val="ctr"/>
-          <dgm:param type="vertAlign" val="mid"/>
-          <dgm:param type="horzAlign" val="ctr"/>
-        </dgm:alg>
-      </dgm:else>
-    </dgm:choose>
-    <dgm:shape xmlns:r="http://schemas.openxmlformats.org/officeDocument/2006/relationships" r:blip="">
-      <dgm:adjLst/>
-    </dgm:shape>
-    <dgm:presOf/>
-    <dgm:choose name="Name3">
-      <dgm:if name="Name4" axis="ch" ptType="node" func="cnt" op="lte" val="2">
-        <dgm:constrLst>
-          <dgm:constr type="h" for="ch" forName="compNode" refType="h" fact="0.4"/>
-          <dgm:constr type="w" for="ch" forName="compNode" val="100"/>
-          <dgm:constr type="w" for="ch" forName="sibTrans" refType="w" refFor="ch" refForName="compNode" fact="0.175"/>
-          <dgm:constr type="sp" refType="w" refFor="ch" refForName="compNode" op="equ" fact="0.25"/>
-          <dgm:constr type="primFontSz" for="des" ptType="node" op="equ" val="44"/>
-          <dgm:constr type="h" for="des" forName="compNode" op="equ"/>
-          <dgm:constr type="h" for="des" forName="textRect" op="equ"/>
-        </dgm:constrLst>
-      </dgm:if>
-      <dgm:if name="Name5" axis="ch" ptType="node" func="cnt" op="lte" val="3">
-        <dgm:constrLst>
-          <dgm:constr type="h" for="ch" forName="compNode" refType="h" fact="0.4"/>
-          <dgm:constr type="w" for="ch" forName="compNode" val="100"/>
-          <dgm:constr type="w" for="ch" forName="sibTrans" refType="w" refFor="ch" refForName="compNode" fact="0.175"/>
-          <dgm:constr type="sp" refType="w" refFor="ch" refForName="compNode" op="equ" fact="0.25"/>
-          <dgm:constr type="primFontSz" for="des" ptType="node" op="equ" val="40"/>
-          <dgm:constr type="h" for="des" forName="compNode" op="equ"/>
-          <dgm:constr type="h" for="des" forName="textRect" op="equ"/>
-        </dgm:constrLst>
-      </dgm:if>
-      <dgm:if name="Name6" axis="ch" ptType="node" func="cnt" op="lte" val="4">
-        <dgm:constrLst>
-          <dgm:constr type="h" for="ch" forName="compNode" refType="h" fact="0.4"/>
-          <dgm:constr type="w" for="ch" forName="compNode" refType="w"/>
-          <dgm:constr type="w" for="ch" forName="sibTrans" refType="w" refFor="ch" refForName="compNode" fact="0.175"/>
-          <dgm:constr type="sp" refType="w" refFor="ch" refForName="compNode" op="equ" fact="0.25"/>
-          <dgm:constr type="primFontSz" for="des" ptType="node" op="equ" val="32"/>
-          <dgm:constr type="h" for="des" forName="compNode" op="equ"/>
-          <dgm:constr type="h" for="des" forName="textRect" op="equ"/>
-        </dgm:constrLst>
-      </dgm:if>
-      <dgm:else name="Name7">
-        <dgm:constrLst>
-          <dgm:constr type="h" for="ch" forName="compNode" refType="h" fact="0.4"/>
-          <dgm:constr type="w" for="ch" forName="compNode" refType="w"/>
-          <dgm:constr type="w" for="ch" forName="sibTrans" refType="w" refFor="ch" refForName="compNode" fact="0.175"/>
-          <dgm:constr type="sp" refType="w" refFor="ch" refForName="compNode" op="equ" fact="0.25"/>
-          <dgm:constr type="primFontSz" for="des" ptType="node" op="equ" val="24"/>
-          <dgm:constr type="h" for="des" forName="compNode" op="equ"/>
-          <dgm:constr type="h" for="des" forName="textRect" op="equ"/>
-        </dgm:constrLst>
-      </dgm:else>
-    </dgm:choose>
-    <dgm:ruleLst>
-      <dgm:rule type="w" for="ch" forName="compNode" val="50" fact="NaN" max="NaN"/>
-    </dgm:ruleLst>
-    <dgm:forEach name="Name8" axis="ch" ptType="node">
-      <dgm:layoutNode name="compNode">
-        <dgm:alg type="composite"/>
-        <dgm:shape xmlns:r="http://schemas.openxmlformats.org/officeDocument/2006/relationships" r:blip="">
-          <dgm:adjLst/>
-        </dgm:shape>
-        <dgm:presOf axis="self"/>
-        <dgm:constrLst>
-          <dgm:constr type="w" for="ch" forName="iconBgRect" refType="w" fact="0.61"/>
-          <dgm:constr type="h" for="ch" forName="iconBgRect" refType="w" refFor="ch" refForName="iconBgRect"/>
-          <dgm:constr type="t" for="ch" forName="iconBgRect"/>
-          <dgm:constr type="ctrX" for="ch" forName="iconBgRect" refType="w" fact="0.5"/>
-          <dgm:constr type="w" for="ch" forName="iconRect" refType="w" fact="0.35"/>
-          <dgm:constr type="h" for="ch" forName="iconRect" refType="w" refFor="ch" refForName="iconRect"/>
-          <dgm:constr type="ctrX" for="ch" forName="iconRect" refType="ctrX" refFor="ch" refForName="iconBgRect"/>
-          <dgm:constr type="ctrY" for="ch" forName="iconRect" refType="ctrY" refFor="ch" refForName="iconBgRect"/>
-          <dgm:constr type="h" for="ch" forName="spaceRect" refType="w" fact="0.19"/>
-          <dgm:constr type="w" for="ch" forName="spaceRect" refType="w"/>
-          <dgm:constr type="l" for="ch" forName="spaceRect"/>
-          <dgm:constr type="t" for="ch" forName="spaceRect" refType="b" refFor="ch" refForName="iconBgRect"/>
-          <dgm:constr type="h" for="ch" forName="textRect" val="20"/>
-          <dgm:constr type="w" for="ch" forName="textRect" refType="w"/>
-          <dgm:constr type="l" for="ch" forName="textRect"/>
-          <dgm:constr type="t" for="ch" forName="textRect" refType="b" refFor="ch" refForName="spaceRect"/>
-        </dgm:constrLst>
-        <dgm:ruleLst>
-          <dgm:rule type="h" val="INF" fact="NaN" max="NaN"/>
-        </dgm:ruleLst>
-        <dgm:layoutNode name="iconBgRect" styleLbl="bgShp">
-          <dgm:alg type="sp"/>
-          <dgm:shape xmlns:r="http://schemas.openxmlformats.org/officeDocument/2006/relationships" type="ellipse" r:blip="">
-            <dgm:adjLst/>
-          </dgm:shape>
-          <dgm:presOf/>
-          <dgm:constrLst/>
-          <dgm:ruleLst/>
-        </dgm:layoutNode>
-        <dgm:layoutNode name="iconRect" styleLbl="node1">
-          <dgm:alg type="sp"/>
-          <dgm:shape xmlns:r="http://schemas.openxmlformats.org/officeDocument/2006/relationships" type="rect" r:blip="" blipPhldr="1">
-            <dgm:adjLst/>
-          </dgm:shape>
-          <dgm:presOf/>
-          <dgm:constrLst/>
-          <dgm:ruleLst/>
-        </dgm:layoutNode>
-        <dgm:layoutNode name="spaceRect">
-          <dgm:alg type="sp"/>
-          <dgm:shape xmlns:r="http://schemas.openxmlformats.org/officeDocument/2006/relationships" r:blip="">
-            <dgm:adjLst/>
-          </dgm:shape>
-          <dgm:presOf/>
-          <dgm:constrLst/>
-          <dgm:ruleLst/>
-        </dgm:layoutNode>
-        <dgm:layoutNode name="textRect" styleLbl="revTx">
-          <dgm:varLst>
-            <dgm:chMax val="1"/>
-            <dgm:chPref val="1"/>
-          </dgm:varLst>
-          <dgm:alg type="tx">
-            <dgm:param type="txAnchorVert" val="t"/>
-          </dgm:alg>
-          <dgm:shape xmlns:r="http://schemas.openxmlformats.org/officeDocument/2006/relationships" type="rect" r:blip="">
-            <dgm:adjLst/>
-          </dgm:shape>
-          <dgm:presOf axis="self" ptType="node"/>
-          <dgm:constrLst>
-            <dgm:constr type="lMarg"/>
-            <dgm:constr type="rMarg"/>
-            <dgm:constr type="tMarg"/>
-            <dgm:constr type="bMarg"/>
-          </dgm:constrLst>
-          <dgm:ruleLst>
-            <dgm:rule type="primFontSz" val="11" fact="NaN" max="NaN"/>
-            <dgm:rule type="h" val="INF" fact="NaN" max="NaN"/>
-          </dgm:ruleLst>
-        </dgm:layoutNode>
-      </dgm:layoutNode>
-      <dgm:forEach name="Name9" axis="followSib" ptType="sibTrans" cnt="1">
-        <dgm:layoutNode name="sibTrans">
-          <dgm:alg type="sp"/>
-          <dgm:shape xmlns:r="http://schemas.openxmlformats.org/officeDocument/2006/relationships" r:blip="">
-            <dgm:adjLst/>
-          </dgm:shape>
-          <dgm:presOf axis="self"/>
-          <dgm:constrLst/>
-          <dgm:ruleLst/>
-        </dgm:layoutNode>
-      </dgm:forEach>
-    </dgm:forEach>
-  </dgm:layoutNode>
-  <dgm:extLst>
-    <a:ext uri="{68A01E43-0DF5-4B5B-8FA6-DAF915123BFB}">
-      <dgm1612:lstStyle xmlns:dgm1612="http://schemas.microsoft.com/office/drawing/2016/12/diagram">
-        <a:lvl1pPr>
-          <a:lnSpc>
-            <a:spcPct val="100000"/>
-          </a:lnSpc>
-          <a:defRPr cap="all"/>
-        </a:lvl1pPr>
-      </dgm1612:lstStyle>
-    </a:ext>
-  </dgm:extLst>
-</dgm:layoutDef>
-</file>
-
 <file path=ppt/diagrams/quickStyle1.xml><?xml version="1.0" encoding="utf-8"?>
 <dgm:styleDef xmlns:dgm="http://schemas.openxmlformats.org/drawingml/2006/diagram" xmlns:a="http://schemas.openxmlformats.org/drawingml/2006/main" uniqueId="urn:microsoft.com/office/officeart/2005/8/quickstyle/simple2">
   <dgm:title val=""/>
@@ -17201,1040 +15429,6 @@
         <a:scrgbClr r="0" g="0" b="0"/>
       </a:fillRef>
       <a:effectRef idx="1">
-        <a:scrgbClr r="0" g="0" b="0"/>
-      </a:effectRef>
-      <a:fontRef idx="minor"/>
-    </dgm:style>
-  </dgm:styleLbl>
-  <dgm:styleLbl name="revTx">
-    <dgm:scene3d>
-      <a:camera prst="orthographicFront"/>
-      <a:lightRig rig="threePt" dir="t"/>
-    </dgm:scene3d>
-    <dgm:sp3d/>
-    <dgm:txPr/>
-    <dgm:style>
-      <a:lnRef idx="0">
-        <a:scrgbClr r="0" g="0" b="0"/>
-      </a:lnRef>
-      <a:fillRef idx="0">
-        <a:scrgbClr r="0" g="0" b="0"/>
-      </a:fillRef>
-      <a:effectRef idx="0">
-        <a:scrgbClr r="0" g="0" b="0"/>
-      </a:effectRef>
-      <a:fontRef idx="minor"/>
-    </dgm:style>
-  </dgm:styleLbl>
-</dgm:styleDef>
-</file>
-
-<file path=ppt/diagrams/quickStyle6.xml><?xml version="1.0" encoding="utf-8"?>
-<dgm:styleDef xmlns:dgm="http://schemas.openxmlformats.org/drawingml/2006/diagram" xmlns:a="http://schemas.openxmlformats.org/drawingml/2006/main" uniqueId="urn:microsoft.com/office/officeart/2005/8/quickstyle/simple1">
-  <dgm:title val=""/>
-  <dgm:desc val=""/>
-  <dgm:catLst>
-    <dgm:cat type="simple" pri="10100"/>
-  </dgm:catLst>
-  <dgm:scene3d>
-    <a:camera prst="orthographicFront"/>
-    <a:lightRig rig="threePt" dir="t"/>
-  </dgm:scene3d>
-  <dgm:styleLbl name="node0">
-    <dgm:scene3d>
-      <a:camera prst="orthographicFront"/>
-      <a:lightRig rig="threePt" dir="t"/>
-    </dgm:scene3d>
-    <dgm:sp3d/>
-    <dgm:txPr/>
-    <dgm:style>
-      <a:lnRef idx="2">
-        <a:scrgbClr r="0" g="0" b="0"/>
-      </a:lnRef>
-      <a:fillRef idx="1">
-        <a:scrgbClr r="0" g="0" b="0"/>
-      </a:fillRef>
-      <a:effectRef idx="0">
-        <a:scrgbClr r="0" g="0" b="0"/>
-      </a:effectRef>
-      <a:fontRef idx="minor">
-        <a:schemeClr val="lt1"/>
-      </a:fontRef>
-    </dgm:style>
-  </dgm:styleLbl>
-  <dgm:styleLbl name="lnNode1">
-    <dgm:scene3d>
-      <a:camera prst="orthographicFront"/>
-      <a:lightRig rig="threePt" dir="t"/>
-    </dgm:scene3d>
-    <dgm:sp3d/>
-    <dgm:txPr/>
-    <dgm:style>
-      <a:lnRef idx="2">
-        <a:scrgbClr r="0" g="0" b="0"/>
-      </a:lnRef>
-      <a:fillRef idx="1">
-        <a:scrgbClr r="0" g="0" b="0"/>
-      </a:fillRef>
-      <a:effectRef idx="0">
-        <a:scrgbClr r="0" g="0" b="0"/>
-      </a:effectRef>
-      <a:fontRef idx="minor">
-        <a:schemeClr val="lt1"/>
-      </a:fontRef>
-    </dgm:style>
-  </dgm:styleLbl>
-  <dgm:styleLbl name="vennNode1">
-    <dgm:scene3d>
-      <a:camera prst="orthographicFront"/>
-      <a:lightRig rig="threePt" dir="t"/>
-    </dgm:scene3d>
-    <dgm:sp3d/>
-    <dgm:txPr/>
-    <dgm:style>
-      <a:lnRef idx="2">
-        <a:scrgbClr r="0" g="0" b="0"/>
-      </a:lnRef>
-      <a:fillRef idx="1">
-        <a:scrgbClr r="0" g="0" b="0"/>
-      </a:fillRef>
-      <a:effectRef idx="0">
-        <a:scrgbClr r="0" g="0" b="0"/>
-      </a:effectRef>
-      <a:fontRef idx="minor">
-        <a:schemeClr val="tx1"/>
-      </a:fontRef>
-    </dgm:style>
-  </dgm:styleLbl>
-  <dgm:styleLbl name="alignNode1">
-    <dgm:scene3d>
-      <a:camera prst="orthographicFront"/>
-      <a:lightRig rig="threePt" dir="t"/>
-    </dgm:scene3d>
-    <dgm:sp3d/>
-    <dgm:txPr/>
-    <dgm:style>
-      <a:lnRef idx="2">
-        <a:scrgbClr r="0" g="0" b="0"/>
-      </a:lnRef>
-      <a:fillRef idx="1">
-        <a:scrgbClr r="0" g="0" b="0"/>
-      </a:fillRef>
-      <a:effectRef idx="0">
-        <a:scrgbClr r="0" g="0" b="0"/>
-      </a:effectRef>
-      <a:fontRef idx="minor">
-        <a:schemeClr val="lt1"/>
-      </a:fontRef>
-    </dgm:style>
-  </dgm:styleLbl>
-  <dgm:styleLbl name="node1">
-    <dgm:scene3d>
-      <a:camera prst="orthographicFront"/>
-      <a:lightRig rig="threePt" dir="t"/>
-    </dgm:scene3d>
-    <dgm:sp3d/>
-    <dgm:txPr/>
-    <dgm:style>
-      <a:lnRef idx="2">
-        <a:scrgbClr r="0" g="0" b="0"/>
-      </a:lnRef>
-      <a:fillRef idx="1">
-        <a:scrgbClr r="0" g="0" b="0"/>
-      </a:fillRef>
-      <a:effectRef idx="0">
-        <a:scrgbClr r="0" g="0" b="0"/>
-      </a:effectRef>
-      <a:fontRef idx="minor">
-        <a:schemeClr val="lt1"/>
-      </a:fontRef>
-    </dgm:style>
-  </dgm:styleLbl>
-  <dgm:styleLbl name="node2">
-    <dgm:scene3d>
-      <a:camera prst="orthographicFront"/>
-      <a:lightRig rig="threePt" dir="t"/>
-    </dgm:scene3d>
-    <dgm:sp3d/>
-    <dgm:txPr/>
-    <dgm:style>
-      <a:lnRef idx="2">
-        <a:scrgbClr r="0" g="0" b="0"/>
-      </a:lnRef>
-      <a:fillRef idx="1">
-        <a:scrgbClr r="0" g="0" b="0"/>
-      </a:fillRef>
-      <a:effectRef idx="0">
-        <a:scrgbClr r="0" g="0" b="0"/>
-      </a:effectRef>
-      <a:fontRef idx="minor">
-        <a:schemeClr val="lt1"/>
-      </a:fontRef>
-    </dgm:style>
-  </dgm:styleLbl>
-  <dgm:styleLbl name="node3">
-    <dgm:scene3d>
-      <a:camera prst="orthographicFront"/>
-      <a:lightRig rig="threePt" dir="t"/>
-    </dgm:scene3d>
-    <dgm:sp3d/>
-    <dgm:txPr/>
-    <dgm:style>
-      <a:lnRef idx="2">
-        <a:scrgbClr r="0" g="0" b="0"/>
-      </a:lnRef>
-      <a:fillRef idx="1">
-        <a:scrgbClr r="0" g="0" b="0"/>
-      </a:fillRef>
-      <a:effectRef idx="0">
-        <a:scrgbClr r="0" g="0" b="0"/>
-      </a:effectRef>
-      <a:fontRef idx="minor">
-        <a:schemeClr val="lt1"/>
-      </a:fontRef>
-    </dgm:style>
-  </dgm:styleLbl>
-  <dgm:styleLbl name="node4">
-    <dgm:scene3d>
-      <a:camera prst="orthographicFront"/>
-      <a:lightRig rig="threePt" dir="t"/>
-    </dgm:scene3d>
-    <dgm:sp3d/>
-    <dgm:txPr/>
-    <dgm:style>
-      <a:lnRef idx="2">
-        <a:scrgbClr r="0" g="0" b="0"/>
-      </a:lnRef>
-      <a:fillRef idx="1">
-        <a:scrgbClr r="0" g="0" b="0"/>
-      </a:fillRef>
-      <a:effectRef idx="0">
-        <a:scrgbClr r="0" g="0" b="0"/>
-      </a:effectRef>
-      <a:fontRef idx="minor">
-        <a:schemeClr val="lt1"/>
-      </a:fontRef>
-    </dgm:style>
-  </dgm:styleLbl>
-  <dgm:styleLbl name="fgImgPlace1">
-    <dgm:scene3d>
-      <a:camera prst="orthographicFront"/>
-      <a:lightRig rig="threePt" dir="t"/>
-    </dgm:scene3d>
-    <dgm:sp3d/>
-    <dgm:txPr/>
-    <dgm:style>
-      <a:lnRef idx="2">
-        <a:scrgbClr r="0" g="0" b="0"/>
-      </a:lnRef>
-      <a:fillRef idx="1">
-        <a:scrgbClr r="0" g="0" b="0"/>
-      </a:fillRef>
-      <a:effectRef idx="0">
-        <a:scrgbClr r="0" g="0" b="0"/>
-      </a:effectRef>
-      <a:fontRef idx="minor"/>
-    </dgm:style>
-  </dgm:styleLbl>
-  <dgm:styleLbl name="alignImgPlace1">
-    <dgm:scene3d>
-      <a:camera prst="orthographicFront"/>
-      <a:lightRig rig="threePt" dir="t"/>
-    </dgm:scene3d>
-    <dgm:sp3d/>
-    <dgm:txPr/>
-    <dgm:style>
-      <a:lnRef idx="2">
-        <a:scrgbClr r="0" g="0" b="0"/>
-      </a:lnRef>
-      <a:fillRef idx="1">
-        <a:scrgbClr r="0" g="0" b="0"/>
-      </a:fillRef>
-      <a:effectRef idx="0">
-        <a:scrgbClr r="0" g="0" b="0"/>
-      </a:effectRef>
-      <a:fontRef idx="minor"/>
-    </dgm:style>
-  </dgm:styleLbl>
-  <dgm:styleLbl name="bgImgPlace1">
-    <dgm:scene3d>
-      <a:camera prst="orthographicFront"/>
-      <a:lightRig rig="threePt" dir="t"/>
-    </dgm:scene3d>
-    <dgm:sp3d/>
-    <dgm:txPr/>
-    <dgm:style>
-      <a:lnRef idx="2">
-        <a:scrgbClr r="0" g="0" b="0"/>
-      </a:lnRef>
-      <a:fillRef idx="1">
-        <a:scrgbClr r="0" g="0" b="0"/>
-      </a:fillRef>
-      <a:effectRef idx="0">
-        <a:scrgbClr r="0" g="0" b="0"/>
-      </a:effectRef>
-      <a:fontRef idx="minor"/>
-    </dgm:style>
-  </dgm:styleLbl>
-  <dgm:styleLbl name="sibTrans2D1">
-    <dgm:scene3d>
-      <a:camera prst="orthographicFront"/>
-      <a:lightRig rig="threePt" dir="t"/>
-    </dgm:scene3d>
-    <dgm:sp3d/>
-    <dgm:txPr/>
-    <dgm:style>
-      <a:lnRef idx="0">
-        <a:scrgbClr r="0" g="0" b="0"/>
-      </a:lnRef>
-      <a:fillRef idx="1">
-        <a:scrgbClr r="0" g="0" b="0"/>
-      </a:fillRef>
-      <a:effectRef idx="0">
-        <a:scrgbClr r="0" g="0" b="0"/>
-      </a:effectRef>
-      <a:fontRef idx="minor">
-        <a:schemeClr val="lt1"/>
-      </a:fontRef>
-    </dgm:style>
-  </dgm:styleLbl>
-  <dgm:styleLbl name="fgSibTrans2D1">
-    <dgm:scene3d>
-      <a:camera prst="orthographicFront"/>
-      <a:lightRig rig="threePt" dir="t"/>
-    </dgm:scene3d>
-    <dgm:sp3d/>
-    <dgm:txPr/>
-    <dgm:style>
-      <a:lnRef idx="0">
-        <a:scrgbClr r="0" g="0" b="0"/>
-      </a:lnRef>
-      <a:fillRef idx="1">
-        <a:scrgbClr r="0" g="0" b="0"/>
-      </a:fillRef>
-      <a:effectRef idx="0">
-        <a:scrgbClr r="0" g="0" b="0"/>
-      </a:effectRef>
-      <a:fontRef idx="minor">
-        <a:schemeClr val="lt1"/>
-      </a:fontRef>
-    </dgm:style>
-  </dgm:styleLbl>
-  <dgm:styleLbl name="bgSibTrans2D1">
-    <dgm:scene3d>
-      <a:camera prst="orthographicFront"/>
-      <a:lightRig rig="threePt" dir="t"/>
-    </dgm:scene3d>
-    <dgm:sp3d/>
-    <dgm:txPr/>
-    <dgm:style>
-      <a:lnRef idx="0">
-        <a:scrgbClr r="0" g="0" b="0"/>
-      </a:lnRef>
-      <a:fillRef idx="1">
-        <a:scrgbClr r="0" g="0" b="0"/>
-      </a:fillRef>
-      <a:effectRef idx="0">
-        <a:scrgbClr r="0" g="0" b="0"/>
-      </a:effectRef>
-      <a:fontRef idx="minor">
-        <a:schemeClr val="lt1"/>
-      </a:fontRef>
-    </dgm:style>
-  </dgm:styleLbl>
-  <dgm:styleLbl name="sibTrans1D1">
-    <dgm:scene3d>
-      <a:camera prst="orthographicFront"/>
-      <a:lightRig rig="threePt" dir="t"/>
-    </dgm:scene3d>
-    <dgm:sp3d/>
-    <dgm:txPr/>
-    <dgm:style>
-      <a:lnRef idx="1">
-        <a:scrgbClr r="0" g="0" b="0"/>
-      </a:lnRef>
-      <a:fillRef idx="0">
-        <a:scrgbClr r="0" g="0" b="0"/>
-      </a:fillRef>
-      <a:effectRef idx="0">
-        <a:scrgbClr r="0" g="0" b="0"/>
-      </a:effectRef>
-      <a:fontRef idx="minor"/>
-    </dgm:style>
-  </dgm:styleLbl>
-  <dgm:styleLbl name="callout">
-    <dgm:scene3d>
-      <a:camera prst="orthographicFront"/>
-      <a:lightRig rig="threePt" dir="t"/>
-    </dgm:scene3d>
-    <dgm:sp3d/>
-    <dgm:txPr/>
-    <dgm:style>
-      <a:lnRef idx="2">
-        <a:scrgbClr r="0" g="0" b="0"/>
-      </a:lnRef>
-      <a:fillRef idx="1">
-        <a:scrgbClr r="0" g="0" b="0"/>
-      </a:fillRef>
-      <a:effectRef idx="0">
-        <a:scrgbClr r="0" g="0" b="0"/>
-      </a:effectRef>
-      <a:fontRef idx="minor"/>
-    </dgm:style>
-  </dgm:styleLbl>
-  <dgm:styleLbl name="asst0">
-    <dgm:scene3d>
-      <a:camera prst="orthographicFront"/>
-      <a:lightRig rig="threePt" dir="t"/>
-    </dgm:scene3d>
-    <dgm:sp3d/>
-    <dgm:txPr/>
-    <dgm:style>
-      <a:lnRef idx="2">
-        <a:scrgbClr r="0" g="0" b="0"/>
-      </a:lnRef>
-      <a:fillRef idx="1">
-        <a:scrgbClr r="0" g="0" b="0"/>
-      </a:fillRef>
-      <a:effectRef idx="0">
-        <a:scrgbClr r="0" g="0" b="0"/>
-      </a:effectRef>
-      <a:fontRef idx="minor">
-        <a:schemeClr val="lt1"/>
-      </a:fontRef>
-    </dgm:style>
-  </dgm:styleLbl>
-  <dgm:styleLbl name="asst1">
-    <dgm:scene3d>
-      <a:camera prst="orthographicFront"/>
-      <a:lightRig rig="threePt" dir="t"/>
-    </dgm:scene3d>
-    <dgm:sp3d/>
-    <dgm:txPr/>
-    <dgm:style>
-      <a:lnRef idx="2">
-        <a:scrgbClr r="0" g="0" b="0"/>
-      </a:lnRef>
-      <a:fillRef idx="1">
-        <a:scrgbClr r="0" g="0" b="0"/>
-      </a:fillRef>
-      <a:effectRef idx="0">
-        <a:scrgbClr r="0" g="0" b="0"/>
-      </a:effectRef>
-      <a:fontRef idx="minor">
-        <a:schemeClr val="lt1"/>
-      </a:fontRef>
-    </dgm:style>
-  </dgm:styleLbl>
-  <dgm:styleLbl name="asst2">
-    <dgm:scene3d>
-      <a:camera prst="orthographicFront"/>
-      <a:lightRig rig="threePt" dir="t"/>
-    </dgm:scene3d>
-    <dgm:sp3d/>
-    <dgm:txPr/>
-    <dgm:style>
-      <a:lnRef idx="2">
-        <a:scrgbClr r="0" g="0" b="0"/>
-      </a:lnRef>
-      <a:fillRef idx="1">
-        <a:scrgbClr r="0" g="0" b="0"/>
-      </a:fillRef>
-      <a:effectRef idx="0">
-        <a:scrgbClr r="0" g="0" b="0"/>
-      </a:effectRef>
-      <a:fontRef idx="minor">
-        <a:schemeClr val="lt1"/>
-      </a:fontRef>
-    </dgm:style>
-  </dgm:styleLbl>
-  <dgm:styleLbl name="asst3">
-    <dgm:scene3d>
-      <a:camera prst="orthographicFront"/>
-      <a:lightRig rig="threePt" dir="t"/>
-    </dgm:scene3d>
-    <dgm:sp3d/>
-    <dgm:txPr/>
-    <dgm:style>
-      <a:lnRef idx="2">
-        <a:scrgbClr r="0" g="0" b="0"/>
-      </a:lnRef>
-      <a:fillRef idx="1">
-        <a:scrgbClr r="0" g="0" b="0"/>
-      </a:fillRef>
-      <a:effectRef idx="0">
-        <a:scrgbClr r="0" g="0" b="0"/>
-      </a:effectRef>
-      <a:fontRef idx="minor">
-        <a:schemeClr val="lt1"/>
-      </a:fontRef>
-    </dgm:style>
-  </dgm:styleLbl>
-  <dgm:styleLbl name="asst4">
-    <dgm:scene3d>
-      <a:camera prst="orthographicFront"/>
-      <a:lightRig rig="threePt" dir="t"/>
-    </dgm:scene3d>
-    <dgm:sp3d/>
-    <dgm:txPr/>
-    <dgm:style>
-      <a:lnRef idx="2">
-        <a:scrgbClr r="0" g="0" b="0"/>
-      </a:lnRef>
-      <a:fillRef idx="1">
-        <a:scrgbClr r="0" g="0" b="0"/>
-      </a:fillRef>
-      <a:effectRef idx="0">
-        <a:scrgbClr r="0" g="0" b="0"/>
-      </a:effectRef>
-      <a:fontRef idx="minor">
-        <a:schemeClr val="lt1"/>
-      </a:fontRef>
-    </dgm:style>
-  </dgm:styleLbl>
-  <dgm:styleLbl name="parChTrans2D1">
-    <dgm:scene3d>
-      <a:camera prst="orthographicFront"/>
-      <a:lightRig rig="threePt" dir="t"/>
-    </dgm:scene3d>
-    <dgm:sp3d/>
-    <dgm:txPr/>
-    <dgm:style>
-      <a:lnRef idx="2">
-        <a:scrgbClr r="0" g="0" b="0"/>
-      </a:lnRef>
-      <a:fillRef idx="1">
-        <a:scrgbClr r="0" g="0" b="0"/>
-      </a:fillRef>
-      <a:effectRef idx="0">
-        <a:scrgbClr r="0" g="0" b="0"/>
-      </a:effectRef>
-      <a:fontRef idx="minor">
-        <a:schemeClr val="lt1"/>
-      </a:fontRef>
-    </dgm:style>
-  </dgm:styleLbl>
-  <dgm:styleLbl name="parChTrans2D2">
-    <dgm:scene3d>
-      <a:camera prst="orthographicFront"/>
-      <a:lightRig rig="threePt" dir="t"/>
-    </dgm:scene3d>
-    <dgm:sp3d/>
-    <dgm:txPr/>
-    <dgm:style>
-      <a:lnRef idx="2">
-        <a:scrgbClr r="0" g="0" b="0"/>
-      </a:lnRef>
-      <a:fillRef idx="1">
-        <a:scrgbClr r="0" g="0" b="0"/>
-      </a:fillRef>
-      <a:effectRef idx="0">
-        <a:scrgbClr r="0" g="0" b="0"/>
-      </a:effectRef>
-      <a:fontRef idx="minor">
-        <a:schemeClr val="lt1"/>
-      </a:fontRef>
-    </dgm:style>
-  </dgm:styleLbl>
-  <dgm:styleLbl name="parChTrans2D3">
-    <dgm:scene3d>
-      <a:camera prst="orthographicFront"/>
-      <a:lightRig rig="threePt" dir="t"/>
-    </dgm:scene3d>
-    <dgm:sp3d/>
-    <dgm:txPr/>
-    <dgm:style>
-      <a:lnRef idx="2">
-        <a:scrgbClr r="0" g="0" b="0"/>
-      </a:lnRef>
-      <a:fillRef idx="1">
-        <a:scrgbClr r="0" g="0" b="0"/>
-      </a:fillRef>
-      <a:effectRef idx="0">
-        <a:scrgbClr r="0" g="0" b="0"/>
-      </a:effectRef>
-      <a:fontRef idx="minor">
-        <a:schemeClr val="lt1"/>
-      </a:fontRef>
-    </dgm:style>
-  </dgm:styleLbl>
-  <dgm:styleLbl name="parChTrans2D4">
-    <dgm:scene3d>
-      <a:camera prst="orthographicFront"/>
-      <a:lightRig rig="threePt" dir="t"/>
-    </dgm:scene3d>
-    <dgm:sp3d/>
-    <dgm:txPr/>
-    <dgm:style>
-      <a:lnRef idx="2">
-        <a:scrgbClr r="0" g="0" b="0"/>
-      </a:lnRef>
-      <a:fillRef idx="1">
-        <a:scrgbClr r="0" g="0" b="0"/>
-      </a:fillRef>
-      <a:effectRef idx="0">
-        <a:scrgbClr r="0" g="0" b="0"/>
-      </a:effectRef>
-      <a:fontRef idx="minor">
-        <a:schemeClr val="lt1"/>
-      </a:fontRef>
-    </dgm:style>
-  </dgm:styleLbl>
-  <dgm:styleLbl name="parChTrans1D1">
-    <dgm:scene3d>
-      <a:camera prst="orthographicFront"/>
-      <a:lightRig rig="threePt" dir="t"/>
-    </dgm:scene3d>
-    <dgm:sp3d/>
-    <dgm:txPr/>
-    <dgm:style>
-      <a:lnRef idx="2">
-        <a:scrgbClr r="0" g="0" b="0"/>
-      </a:lnRef>
-      <a:fillRef idx="0">
-        <a:scrgbClr r="0" g="0" b="0"/>
-      </a:fillRef>
-      <a:effectRef idx="0">
-        <a:scrgbClr r="0" g="0" b="0"/>
-      </a:effectRef>
-      <a:fontRef idx="minor"/>
-    </dgm:style>
-  </dgm:styleLbl>
-  <dgm:styleLbl name="parChTrans1D2">
-    <dgm:scene3d>
-      <a:camera prst="orthographicFront"/>
-      <a:lightRig rig="threePt" dir="t"/>
-    </dgm:scene3d>
-    <dgm:sp3d/>
-    <dgm:txPr/>
-    <dgm:style>
-      <a:lnRef idx="2">
-        <a:scrgbClr r="0" g="0" b="0"/>
-      </a:lnRef>
-      <a:fillRef idx="0">
-        <a:scrgbClr r="0" g="0" b="0"/>
-      </a:fillRef>
-      <a:effectRef idx="0">
-        <a:scrgbClr r="0" g="0" b="0"/>
-      </a:effectRef>
-      <a:fontRef idx="minor"/>
-    </dgm:style>
-  </dgm:styleLbl>
-  <dgm:styleLbl name="parChTrans1D3">
-    <dgm:scene3d>
-      <a:camera prst="orthographicFront"/>
-      <a:lightRig rig="threePt" dir="t"/>
-    </dgm:scene3d>
-    <dgm:sp3d/>
-    <dgm:txPr/>
-    <dgm:style>
-      <a:lnRef idx="2">
-        <a:scrgbClr r="0" g="0" b="0"/>
-      </a:lnRef>
-      <a:fillRef idx="0">
-        <a:scrgbClr r="0" g="0" b="0"/>
-      </a:fillRef>
-      <a:effectRef idx="0">
-        <a:scrgbClr r="0" g="0" b="0"/>
-      </a:effectRef>
-      <a:fontRef idx="minor"/>
-    </dgm:style>
-  </dgm:styleLbl>
-  <dgm:styleLbl name="parChTrans1D4">
-    <dgm:scene3d>
-      <a:camera prst="orthographicFront"/>
-      <a:lightRig rig="threePt" dir="t"/>
-    </dgm:scene3d>
-    <dgm:sp3d/>
-    <dgm:txPr/>
-    <dgm:style>
-      <a:lnRef idx="2">
-        <a:scrgbClr r="0" g="0" b="0"/>
-      </a:lnRef>
-      <a:fillRef idx="0">
-        <a:scrgbClr r="0" g="0" b="0"/>
-      </a:fillRef>
-      <a:effectRef idx="0">
-        <a:scrgbClr r="0" g="0" b="0"/>
-      </a:effectRef>
-      <a:fontRef idx="minor"/>
-    </dgm:style>
-  </dgm:styleLbl>
-  <dgm:styleLbl name="fgAcc1">
-    <dgm:scene3d>
-      <a:camera prst="orthographicFront"/>
-      <a:lightRig rig="threePt" dir="t"/>
-    </dgm:scene3d>
-    <dgm:sp3d/>
-    <dgm:txPr/>
-    <dgm:style>
-      <a:lnRef idx="2">
-        <a:scrgbClr r="0" g="0" b="0"/>
-      </a:lnRef>
-      <a:fillRef idx="1">
-        <a:scrgbClr r="0" g="0" b="0"/>
-      </a:fillRef>
-      <a:effectRef idx="0">
-        <a:scrgbClr r="0" g="0" b="0"/>
-      </a:effectRef>
-      <a:fontRef idx="minor"/>
-    </dgm:style>
-  </dgm:styleLbl>
-  <dgm:styleLbl name="conFgAcc1">
-    <dgm:scene3d>
-      <a:camera prst="orthographicFront"/>
-      <a:lightRig rig="threePt" dir="t"/>
-    </dgm:scene3d>
-    <dgm:sp3d/>
-    <dgm:txPr/>
-    <dgm:style>
-      <a:lnRef idx="2">
-        <a:scrgbClr r="0" g="0" b="0"/>
-      </a:lnRef>
-      <a:fillRef idx="1">
-        <a:scrgbClr r="0" g="0" b="0"/>
-      </a:fillRef>
-      <a:effectRef idx="0">
-        <a:scrgbClr r="0" g="0" b="0"/>
-      </a:effectRef>
-      <a:fontRef idx="minor"/>
-    </dgm:style>
-  </dgm:styleLbl>
-  <dgm:styleLbl name="alignAcc1">
-    <dgm:scene3d>
-      <a:camera prst="orthographicFront"/>
-      <a:lightRig rig="threePt" dir="t"/>
-    </dgm:scene3d>
-    <dgm:sp3d/>
-    <dgm:txPr/>
-    <dgm:style>
-      <a:lnRef idx="2">
-        <a:scrgbClr r="0" g="0" b="0"/>
-      </a:lnRef>
-      <a:fillRef idx="1">
-        <a:scrgbClr r="0" g="0" b="0"/>
-      </a:fillRef>
-      <a:effectRef idx="0">
-        <a:scrgbClr r="0" g="0" b="0"/>
-      </a:effectRef>
-      <a:fontRef idx="minor"/>
-    </dgm:style>
-  </dgm:styleLbl>
-  <dgm:styleLbl name="trAlignAcc1">
-    <dgm:scene3d>
-      <a:camera prst="orthographicFront"/>
-      <a:lightRig rig="threePt" dir="t"/>
-    </dgm:scene3d>
-    <dgm:sp3d/>
-    <dgm:txPr/>
-    <dgm:style>
-      <a:lnRef idx="1">
-        <a:scrgbClr r="0" g="0" b="0"/>
-      </a:lnRef>
-      <a:fillRef idx="1">
-        <a:scrgbClr r="0" g="0" b="0"/>
-      </a:fillRef>
-      <a:effectRef idx="0">
-        <a:scrgbClr r="0" g="0" b="0"/>
-      </a:effectRef>
-      <a:fontRef idx="minor"/>
-    </dgm:style>
-  </dgm:styleLbl>
-  <dgm:styleLbl name="bgAcc1">
-    <dgm:scene3d>
-      <a:camera prst="orthographicFront"/>
-      <a:lightRig rig="threePt" dir="t"/>
-    </dgm:scene3d>
-    <dgm:sp3d/>
-    <dgm:txPr/>
-    <dgm:style>
-      <a:lnRef idx="2">
-        <a:scrgbClr r="0" g="0" b="0"/>
-      </a:lnRef>
-      <a:fillRef idx="1">
-        <a:scrgbClr r="0" g="0" b="0"/>
-      </a:fillRef>
-      <a:effectRef idx="0">
-        <a:scrgbClr r="0" g="0" b="0"/>
-      </a:effectRef>
-      <a:fontRef idx="minor"/>
-    </dgm:style>
-  </dgm:styleLbl>
-  <dgm:styleLbl name="solidFgAcc1">
-    <dgm:scene3d>
-      <a:camera prst="orthographicFront"/>
-      <a:lightRig rig="threePt" dir="t"/>
-    </dgm:scene3d>
-    <dgm:sp3d/>
-    <dgm:txPr/>
-    <dgm:style>
-      <a:lnRef idx="2">
-        <a:scrgbClr r="0" g="0" b="0"/>
-      </a:lnRef>
-      <a:fillRef idx="1">
-        <a:scrgbClr r="0" g="0" b="0"/>
-      </a:fillRef>
-      <a:effectRef idx="0">
-        <a:scrgbClr r="0" g="0" b="0"/>
-      </a:effectRef>
-      <a:fontRef idx="minor"/>
-    </dgm:style>
-  </dgm:styleLbl>
-  <dgm:styleLbl name="solidAlignAcc1">
-    <dgm:scene3d>
-      <a:camera prst="orthographicFront"/>
-      <a:lightRig rig="threePt" dir="t"/>
-    </dgm:scene3d>
-    <dgm:sp3d/>
-    <dgm:txPr/>
-    <dgm:style>
-      <a:lnRef idx="2">
-        <a:scrgbClr r="0" g="0" b="0"/>
-      </a:lnRef>
-      <a:fillRef idx="1">
-        <a:scrgbClr r="0" g="0" b="0"/>
-      </a:fillRef>
-      <a:effectRef idx="0">
-        <a:scrgbClr r="0" g="0" b="0"/>
-      </a:effectRef>
-      <a:fontRef idx="minor"/>
-    </dgm:style>
-  </dgm:styleLbl>
-  <dgm:styleLbl name="solidBgAcc1">
-    <dgm:scene3d>
-      <a:camera prst="orthographicFront"/>
-      <a:lightRig rig="threePt" dir="t"/>
-    </dgm:scene3d>
-    <dgm:sp3d/>
-    <dgm:txPr/>
-    <dgm:style>
-      <a:lnRef idx="2">
-        <a:scrgbClr r="0" g="0" b="0"/>
-      </a:lnRef>
-      <a:fillRef idx="1">
-        <a:scrgbClr r="0" g="0" b="0"/>
-      </a:fillRef>
-      <a:effectRef idx="0">
-        <a:scrgbClr r="0" g="0" b="0"/>
-      </a:effectRef>
-      <a:fontRef idx="minor"/>
-    </dgm:style>
-  </dgm:styleLbl>
-  <dgm:styleLbl name="fgAccFollowNode1">
-    <dgm:scene3d>
-      <a:camera prst="orthographicFront"/>
-      <a:lightRig rig="threePt" dir="t"/>
-    </dgm:scene3d>
-    <dgm:sp3d/>
-    <dgm:txPr/>
-    <dgm:style>
-      <a:lnRef idx="2">
-        <a:scrgbClr r="0" g="0" b="0"/>
-      </a:lnRef>
-      <a:fillRef idx="1">
-        <a:scrgbClr r="0" g="0" b="0"/>
-      </a:fillRef>
-      <a:effectRef idx="0">
-        <a:scrgbClr r="0" g="0" b="0"/>
-      </a:effectRef>
-      <a:fontRef idx="minor"/>
-    </dgm:style>
-  </dgm:styleLbl>
-  <dgm:styleLbl name="alignAccFollowNode1">
-    <dgm:scene3d>
-      <a:camera prst="orthographicFront"/>
-      <a:lightRig rig="threePt" dir="t"/>
-    </dgm:scene3d>
-    <dgm:sp3d/>
-    <dgm:txPr/>
-    <dgm:style>
-      <a:lnRef idx="2">
-        <a:scrgbClr r="0" g="0" b="0"/>
-      </a:lnRef>
-      <a:fillRef idx="1">
-        <a:scrgbClr r="0" g="0" b="0"/>
-      </a:fillRef>
-      <a:effectRef idx="0">
-        <a:scrgbClr r="0" g="0" b="0"/>
-      </a:effectRef>
-      <a:fontRef idx="minor"/>
-    </dgm:style>
-  </dgm:styleLbl>
-  <dgm:styleLbl name="bgAccFollowNode1">
-    <dgm:scene3d>
-      <a:camera prst="orthographicFront"/>
-      <a:lightRig rig="threePt" dir="t"/>
-    </dgm:scene3d>
-    <dgm:sp3d/>
-    <dgm:txPr/>
-    <dgm:style>
-      <a:lnRef idx="2">
-        <a:scrgbClr r="0" g="0" b="0"/>
-      </a:lnRef>
-      <a:fillRef idx="1">
-        <a:scrgbClr r="0" g="0" b="0"/>
-      </a:fillRef>
-      <a:effectRef idx="0">
-        <a:scrgbClr r="0" g="0" b="0"/>
-      </a:effectRef>
-      <a:fontRef idx="minor"/>
-    </dgm:style>
-  </dgm:styleLbl>
-  <dgm:styleLbl name="fgAcc0">
-    <dgm:scene3d>
-      <a:camera prst="orthographicFront"/>
-      <a:lightRig rig="threePt" dir="t"/>
-    </dgm:scene3d>
-    <dgm:sp3d/>
-    <dgm:txPr/>
-    <dgm:style>
-      <a:lnRef idx="2">
-        <a:scrgbClr r="0" g="0" b="0"/>
-      </a:lnRef>
-      <a:fillRef idx="1">
-        <a:scrgbClr r="0" g="0" b="0"/>
-      </a:fillRef>
-      <a:effectRef idx="0">
-        <a:scrgbClr r="0" g="0" b="0"/>
-      </a:effectRef>
-      <a:fontRef idx="minor"/>
-    </dgm:style>
-  </dgm:styleLbl>
-  <dgm:styleLbl name="fgAcc2">
-    <dgm:scene3d>
-      <a:camera prst="orthographicFront"/>
-      <a:lightRig rig="threePt" dir="t"/>
-    </dgm:scene3d>
-    <dgm:sp3d/>
-    <dgm:txPr/>
-    <dgm:style>
-      <a:lnRef idx="2">
-        <a:scrgbClr r="0" g="0" b="0"/>
-      </a:lnRef>
-      <a:fillRef idx="1">
-        <a:scrgbClr r="0" g="0" b="0"/>
-      </a:fillRef>
-      <a:effectRef idx="0">
-        <a:scrgbClr r="0" g="0" b="0"/>
-      </a:effectRef>
-      <a:fontRef idx="minor"/>
-    </dgm:style>
-  </dgm:styleLbl>
-  <dgm:styleLbl name="fgAcc3">
-    <dgm:scene3d>
-      <a:camera prst="orthographicFront"/>
-      <a:lightRig rig="threePt" dir="t"/>
-    </dgm:scene3d>
-    <dgm:sp3d/>
-    <dgm:txPr/>
-    <dgm:style>
-      <a:lnRef idx="2">
-        <a:scrgbClr r="0" g="0" b="0"/>
-      </a:lnRef>
-      <a:fillRef idx="1">
-        <a:scrgbClr r="0" g="0" b="0"/>
-      </a:fillRef>
-      <a:effectRef idx="0">
-        <a:scrgbClr r="0" g="0" b="0"/>
-      </a:effectRef>
-      <a:fontRef idx="minor"/>
-    </dgm:style>
-  </dgm:styleLbl>
-  <dgm:styleLbl name="fgAcc4">
-    <dgm:scene3d>
-      <a:camera prst="orthographicFront"/>
-      <a:lightRig rig="threePt" dir="t"/>
-    </dgm:scene3d>
-    <dgm:sp3d/>
-    <dgm:txPr/>
-    <dgm:style>
-      <a:lnRef idx="2">
-        <a:scrgbClr r="0" g="0" b="0"/>
-      </a:lnRef>
-      <a:fillRef idx="1">
-        <a:scrgbClr r="0" g="0" b="0"/>
-      </a:fillRef>
-      <a:effectRef idx="0">
-        <a:scrgbClr r="0" g="0" b="0"/>
-      </a:effectRef>
-      <a:fontRef idx="minor"/>
-    </dgm:style>
-  </dgm:styleLbl>
-  <dgm:styleLbl name="bgShp">
-    <dgm:scene3d>
-      <a:camera prst="orthographicFront"/>
-      <a:lightRig rig="threePt" dir="t"/>
-    </dgm:scene3d>
-    <dgm:sp3d/>
-    <dgm:txPr/>
-    <dgm:style>
-      <a:lnRef idx="0">
-        <a:scrgbClr r="0" g="0" b="0"/>
-      </a:lnRef>
-      <a:fillRef idx="1">
-        <a:scrgbClr r="0" g="0" b="0"/>
-      </a:fillRef>
-      <a:effectRef idx="0">
-        <a:scrgbClr r="0" g="0" b="0"/>
-      </a:effectRef>
-      <a:fontRef idx="minor"/>
-    </dgm:style>
-  </dgm:styleLbl>
-  <dgm:styleLbl name="dkBgShp">
-    <dgm:scene3d>
-      <a:camera prst="orthographicFront"/>
-      <a:lightRig rig="threePt" dir="t"/>
-    </dgm:scene3d>
-    <dgm:sp3d/>
-    <dgm:txPr/>
-    <dgm:style>
-      <a:lnRef idx="0">
-        <a:scrgbClr r="0" g="0" b="0"/>
-      </a:lnRef>
-      <a:fillRef idx="1">
-        <a:scrgbClr r="0" g="0" b="0"/>
-      </a:fillRef>
-      <a:effectRef idx="0">
-        <a:scrgbClr r="0" g="0" b="0"/>
-      </a:effectRef>
-      <a:fontRef idx="minor"/>
-    </dgm:style>
-  </dgm:styleLbl>
-  <dgm:styleLbl name="trBgShp">
-    <dgm:scene3d>
-      <a:camera prst="orthographicFront"/>
-      <a:lightRig rig="threePt" dir="t"/>
-    </dgm:scene3d>
-    <dgm:sp3d/>
-    <dgm:txPr/>
-    <dgm:style>
-      <a:lnRef idx="0">
-        <a:scrgbClr r="0" g="0" b="0"/>
-      </a:lnRef>
-      <a:fillRef idx="1">
-        <a:scrgbClr r="0" g="0" b="0"/>
-      </a:fillRef>
-      <a:effectRef idx="0">
-        <a:scrgbClr r="0" g="0" b="0"/>
-      </a:effectRef>
-      <a:fontRef idx="minor"/>
-    </dgm:style>
-  </dgm:styleLbl>
-  <dgm:styleLbl name="fgShp">
-    <dgm:scene3d>
-      <a:camera prst="orthographicFront"/>
-      <a:lightRig rig="threePt" dir="t"/>
-    </dgm:scene3d>
-    <dgm:sp3d/>
-    <dgm:txPr/>
-    <dgm:style>
-      <a:lnRef idx="2">
-        <a:scrgbClr r="0" g="0" b="0"/>
-      </a:lnRef>
-      <a:fillRef idx="1">
-        <a:scrgbClr r="0" g="0" b="0"/>
-      </a:fillRef>
-      <a:effectRef idx="0">
         <a:scrgbClr r="0" g="0" b="0"/>
       </a:effectRef>
       <a:fontRef idx="minor"/>
@@ -18345,7 +15539,7 @@
           <a:p>
             <a:fld id="{762B48F5-BACC-47D6-A0F7-82FBF9C6BC85}" type="datetimeFigureOut">
               <a:rPr lang="en-US"/>
-              <a:t>12/1/2020</a:t>
+              <a:t>12/2/2020</a:t>
             </a:fld>
             <a:endParaRPr/>
           </a:p>
@@ -18510,7 +15704,7 @@
           <a:p>
             <a:fld id="{0CB1CD00-5424-4675-AB18-2C419B060449}" type="datetimeFigureOut">
               <a:rPr lang="en-US"/>
-              <a:t>12/1/2020</a:t>
+              <a:t>12/2/2020</a:t>
             </a:fld>
             <a:endParaRPr/>
           </a:p>
@@ -19155,7 +16349,7 @@
           <a:p>
             <a:fld id="{37CC0096-1860-4642-9CD2-0079EA5E7CD1}" type="datetimeFigureOut">
               <a:rPr lang="en-US" smtClean="0"/>
-              <a:t>12/1/2020</a:t>
+              <a:t>12/2/2020</a:t>
             </a:fld>
             <a:endParaRPr lang="en-US"/>
           </a:p>
@@ -19334,7 +16528,7 @@
           <a:p>
             <a:fld id="{37CC0096-1860-4642-9CD2-0079EA5E7CD1}" type="datetimeFigureOut">
               <a:rPr lang="en-US" smtClean="0"/>
-              <a:t>12/1/2020</a:t>
+              <a:t>12/2/2020</a:t>
             </a:fld>
             <a:endParaRPr lang="en-US"/>
           </a:p>
@@ -19507,7 +16701,7 @@
           <a:p>
             <a:fld id="{37CC0096-1860-4642-9CD2-0079EA5E7CD1}" type="datetimeFigureOut">
               <a:rPr lang="en-US" smtClean="0"/>
-              <a:t>12/1/2020</a:t>
+              <a:t>12/2/2020</a:t>
             </a:fld>
             <a:endParaRPr lang="en-US"/>
           </a:p>
@@ -19940,7 +17134,7 @@
           <a:p>
             <a:fld id="{37CC0096-1860-4642-9CD2-0079EA5E7CD1}" type="datetimeFigureOut">
               <a:rPr lang="en-US" smtClean="0"/>
-              <a:t>12/1/2020</a:t>
+              <a:t>12/2/2020</a:t>
             </a:fld>
             <a:endParaRPr lang="en-US"/>
           </a:p>
@@ -20379,7 +17573,7 @@
           <a:p>
             <a:fld id="{37CC0096-1860-4642-9CD2-0079EA5E7CD1}" type="datetimeFigureOut">
               <a:rPr lang="en-US" smtClean="0"/>
-              <a:t>12/1/2020</a:t>
+              <a:t>12/2/2020</a:t>
             </a:fld>
             <a:endParaRPr lang="en-US"/>
           </a:p>
@@ -20496,7 +17690,7 @@
           <a:p>
             <a:fld id="{37CC0096-1860-4642-9CD2-0079EA5E7CD1}" type="datetimeFigureOut">
               <a:rPr lang="en-US" smtClean="0"/>
-              <a:t>12/1/2020</a:t>
+              <a:t>12/2/2020</a:t>
             </a:fld>
             <a:endParaRPr lang="en-US"/>
           </a:p>
@@ -20591,7 +17785,7 @@
           <a:p>
             <a:fld id="{37CC0096-1860-4642-9CD2-0079EA5E7CD1}" type="datetimeFigureOut">
               <a:rPr lang="en-US" smtClean="0"/>
-              <a:t>12/1/2020</a:t>
+              <a:t>12/2/2020</a:t>
             </a:fld>
             <a:endParaRPr lang="en-US"/>
           </a:p>
@@ -20875,7 +18069,7 @@
           <a:p>
             <a:fld id="{37CC0096-1860-4642-9CD2-0079EA5E7CD1}" type="datetimeFigureOut">
               <a:rPr lang="en-US" smtClean="0"/>
-              <a:t>12/1/2020</a:t>
+              <a:t>12/2/2020</a:t>
             </a:fld>
             <a:endParaRPr lang="en-US"/>
           </a:p>
@@ -21186,7 +18380,7 @@
           <a:p>
             <a:fld id="{37CC0096-1860-4642-9CD2-0079EA5E7CD1}" type="datetimeFigureOut">
               <a:rPr lang="en-US" smtClean="0"/>
-              <a:t>12/1/2020</a:t>
+              <a:t>12/2/2020</a:t>
             </a:fld>
             <a:endParaRPr lang="en-US"/>
           </a:p>
@@ -21418,7 +18612,7 @@
             <a:fld id="{37CC0096-1860-4642-9CD2-0079EA5E7CD1}" type="datetimeFigureOut">
               <a:rPr lang="en-US" smtClean="0"/>
               <a:pPr/>
-              <a:t>12/1/2020</a:t>
+              <a:t>12/2/2020</a:t>
             </a:fld>
             <a:endParaRPr lang="en-US"/>
           </a:p>
@@ -21859,7 +19053,7 @@
           <a:p>
             <a:r>
               <a:rPr lang="en-US" sz="4800" dirty="0"/>
-              <a:t>Classifying Chaotic Synthesizers with a Multimodal Neural Network</a:t>
+              <a:t>Mapping Synthesizers to Real-World Instruments </a:t>
             </a:r>
             <a:endParaRPr sz="4800" dirty="0"/>
           </a:p>
@@ -22486,195 +19680,6 @@
 </file>
 
 <file path=ppt/slides/slide14.xml><?xml version="1.0" encoding="utf-8"?>
-<p:sld xmlns:a="http://schemas.openxmlformats.org/drawingml/2006/main" xmlns:r="http://schemas.openxmlformats.org/officeDocument/2006/relationships" xmlns:p="http://schemas.openxmlformats.org/presentationml/2006/main">
-  <p:cSld>
-    <p:spTree>
-      <p:nvGrpSpPr>
-        <p:cNvPr id="1" name=""/>
-        <p:cNvGrpSpPr/>
-        <p:nvPr/>
-      </p:nvGrpSpPr>
-      <p:grpSpPr>
-        <a:xfrm>
-          <a:off x="0" y="0"/>
-          <a:ext cx="0" cy="0"/>
-          <a:chOff x="0" y="0"/>
-          <a:chExt cx="0" cy="0"/>
-        </a:xfrm>
-      </p:grpSpPr>
-      <p:sp>
-        <p:nvSpPr>
-          <p:cNvPr id="2" name="Title 1">
-            <a:extLst>
-              <a:ext uri="{FF2B5EF4-FFF2-40B4-BE49-F238E27FC236}">
-                <a16:creationId xmlns:a16="http://schemas.microsoft.com/office/drawing/2014/main" id="{746F704E-FF07-4E4F-9C69-ABE19B4CB770}"/>
-              </a:ext>
-            </a:extLst>
-          </p:cNvPr>
-          <p:cNvSpPr>
-            <a:spLocks noGrp="1"/>
-          </p:cNvSpPr>
-          <p:nvPr>
-            <p:ph type="title"/>
-          </p:nvPr>
-        </p:nvSpPr>
-        <p:spPr/>
-        <p:txBody>
-          <a:bodyPr/>
-          <a:lstStyle/>
-          <a:p>
-            <a:r>
-              <a:rPr lang="en-US" dirty="0"/>
-              <a:t>Decision Boundaries</a:t>
-            </a:r>
-          </a:p>
-        </p:txBody>
-      </p:sp>
-      <p:sp>
-        <p:nvSpPr>
-          <p:cNvPr id="3" name="Text Placeholder 2">
-            <a:extLst>
-              <a:ext uri="{FF2B5EF4-FFF2-40B4-BE49-F238E27FC236}">
-                <a16:creationId xmlns:a16="http://schemas.microsoft.com/office/drawing/2014/main" id="{1997D637-D4EB-4CC9-A5D7-E124AD51AA3F}"/>
-              </a:ext>
-            </a:extLst>
-          </p:cNvPr>
-          <p:cNvSpPr>
-            <a:spLocks noGrp="1"/>
-          </p:cNvSpPr>
-          <p:nvPr>
-            <p:ph type="body" idx="1"/>
-          </p:nvPr>
-        </p:nvSpPr>
-        <p:spPr>
-          <a:xfrm>
-            <a:off x="457199" y="1828800"/>
-            <a:ext cx="5413249" cy="685800"/>
-          </a:xfrm>
-        </p:spPr>
-        <p:txBody>
-          <a:bodyPr/>
-          <a:lstStyle/>
-          <a:p>
-            <a:r>
-              <a:rPr lang="en-US" dirty="0"/>
-              <a:t>Linear Separable</a:t>
-            </a:r>
-          </a:p>
-        </p:txBody>
-      </p:sp>
-      <p:pic>
-        <p:nvPicPr>
-          <p:cNvPr id="8" name="Content Placeholder 7" descr="Chart, scatter chart&#10;&#10;Description automatically generated">
-            <a:extLst>
-              <a:ext uri="{FF2B5EF4-FFF2-40B4-BE49-F238E27FC236}">
-                <a16:creationId xmlns:a16="http://schemas.microsoft.com/office/drawing/2014/main" id="{0BC6FAB9-F7A1-437E-AD90-E16C26279939}"/>
-              </a:ext>
-            </a:extLst>
-          </p:cNvPr>
-          <p:cNvPicPr>
-            <a:picLocks noGrp="1" noChangeAspect="1"/>
-          </p:cNvPicPr>
-          <p:nvPr>
-            <p:ph sz="half" idx="2"/>
-          </p:nvPr>
-        </p:nvPicPr>
-        <p:blipFill>
-          <a:blip r:embed="rId2" cstate="print">
-            <a:extLst>
-              <a:ext uri="{28A0092B-C50C-407E-A947-70E740481C1C}">
-                <a14:useLocalDpi xmlns:a14="http://schemas.microsoft.com/office/drawing/2010/main" val="0"/>
-              </a:ext>
-            </a:extLst>
-          </a:blip>
-          <a:stretch>
-            <a:fillRect/>
-          </a:stretch>
-        </p:blipFill>
-        <p:spPr>
-          <a:xfrm>
-            <a:off x="6248400" y="2514600"/>
-            <a:ext cx="4971201" cy="2590800"/>
-          </a:xfrm>
-        </p:spPr>
-      </p:pic>
-      <p:sp>
-        <p:nvSpPr>
-          <p:cNvPr id="5" name="Text Placeholder 4">
-            <a:extLst>
-              <a:ext uri="{FF2B5EF4-FFF2-40B4-BE49-F238E27FC236}">
-                <a16:creationId xmlns:a16="http://schemas.microsoft.com/office/drawing/2014/main" id="{DDFC2A11-D414-4BA0-956E-614C36193B66}"/>
-              </a:ext>
-            </a:extLst>
-          </p:cNvPr>
-          <p:cNvSpPr>
-            <a:spLocks noGrp="1"/>
-          </p:cNvSpPr>
-          <p:nvPr>
-            <p:ph type="body" sz="quarter" idx="3"/>
-          </p:nvPr>
-        </p:nvSpPr>
-        <p:spPr/>
-        <p:txBody>
-          <a:bodyPr/>
-          <a:lstStyle/>
-          <a:p>
-            <a:r>
-              <a:rPr lang="en-US" dirty="0"/>
-              <a:t>Linear Non-Separable</a:t>
-            </a:r>
-          </a:p>
-        </p:txBody>
-      </p:sp>
-      <p:pic>
-        <p:nvPicPr>
-          <p:cNvPr id="10" name="Content Placeholder 9" descr="Chart, scatter chart&#10;&#10;Description automatically generated">
-            <a:extLst>
-              <a:ext uri="{FF2B5EF4-FFF2-40B4-BE49-F238E27FC236}">
-                <a16:creationId xmlns:a16="http://schemas.microsoft.com/office/drawing/2014/main" id="{507E246A-EA50-4A7D-870C-CFDEDC1F52D6}"/>
-              </a:ext>
-            </a:extLst>
-          </p:cNvPr>
-          <p:cNvPicPr>
-            <a:picLocks noGrp="1" noChangeAspect="1"/>
-          </p:cNvPicPr>
-          <p:nvPr>
-            <p:ph sz="quarter" idx="4"/>
-          </p:nvPr>
-        </p:nvPicPr>
-        <p:blipFill>
-          <a:blip r:embed="rId3" cstate="print">
-            <a:extLst>
-              <a:ext uri="{28A0092B-C50C-407E-A947-70E740481C1C}">
-                <a14:useLocalDpi xmlns:a14="http://schemas.microsoft.com/office/drawing/2010/main" val="0"/>
-              </a:ext>
-            </a:extLst>
-          </a:blip>
-          <a:stretch>
-            <a:fillRect/>
-          </a:stretch>
-        </p:blipFill>
-        <p:spPr>
-          <a:xfrm>
-            <a:off x="457200" y="2514600"/>
-            <a:ext cx="5029200" cy="2620150"/>
-          </a:xfrm>
-        </p:spPr>
-      </p:pic>
-    </p:spTree>
-    <p:extLst>
-      <p:ext uri="{BB962C8B-B14F-4D97-AF65-F5344CB8AC3E}">
-        <p14:creationId xmlns:p14="http://schemas.microsoft.com/office/powerpoint/2010/main" val="1875312511"/>
-      </p:ext>
-    </p:extLst>
-  </p:cSld>
-  <p:clrMapOvr>
-    <a:masterClrMapping/>
-  </p:clrMapOvr>
-</p:sld>
-</file>
-
-<file path=ppt/slides/slide15.xml><?xml version="1.0" encoding="utf-8"?>
 <p:sld xmlns:a="http://schemas.openxmlformats.org/drawingml/2006/main" xmlns:r="http://schemas.openxmlformats.org/officeDocument/2006/relationships" xmlns:p="http://schemas.openxmlformats.org/presentationml/2006/main">
   <p:cSld>
     <p:spTree>
@@ -23193,7 +20198,7 @@
 </p:sld>
 </file>
 
-<file path=ppt/slides/slide16.xml><?xml version="1.0" encoding="utf-8"?>
+<file path=ppt/slides/slide15.xml><?xml version="1.0" encoding="utf-8"?>
 <p:sld xmlns:a="http://schemas.openxmlformats.org/drawingml/2006/main" xmlns:r="http://schemas.openxmlformats.org/officeDocument/2006/relationships" xmlns:p="http://schemas.openxmlformats.org/presentationml/2006/main">
   <p:cSld>
     <p:spTree>
@@ -23406,7 +20411,7 @@
 </p:sld>
 </file>
 
-<file path=ppt/slides/slide17.xml><?xml version="1.0" encoding="utf-8"?>
+<file path=ppt/slides/slide16.xml><?xml version="1.0" encoding="utf-8"?>
 <p:sld xmlns:a="http://schemas.openxmlformats.org/drawingml/2006/main" xmlns:r="http://schemas.openxmlformats.org/officeDocument/2006/relationships" xmlns:p="http://schemas.openxmlformats.org/presentationml/2006/main">
   <p:cSld>
     <p:spTree>
@@ -23609,7 +20614,7 @@
 </p:sld>
 </file>
 
-<file path=ppt/slides/slide18.xml><?xml version="1.0" encoding="utf-8"?>
+<file path=ppt/slides/slide17.xml><?xml version="1.0" encoding="utf-8"?>
 <p:sld xmlns:a="http://schemas.openxmlformats.org/drawingml/2006/main" xmlns:r="http://schemas.openxmlformats.org/officeDocument/2006/relationships" xmlns:p="http://schemas.openxmlformats.org/presentationml/2006/main">
   <p:cSld>
     <p:spTree>
@@ -23838,7 +20843,7 @@
 </p:sld>
 </file>
 
-<file path=ppt/slides/slide19.xml><?xml version="1.0" encoding="utf-8"?>
+<file path=ppt/slides/slide18.xml><?xml version="1.0" encoding="utf-8"?>
 <p:sld xmlns:a="http://schemas.openxmlformats.org/drawingml/2006/main" xmlns:r="http://schemas.openxmlformats.org/officeDocument/2006/relationships" xmlns:p="http://schemas.openxmlformats.org/presentationml/2006/main">
   <p:cSld>
     <p:spTree>
@@ -23915,6 +20920,132 @@
     <p:extLst>
       <p:ext uri="{BB962C8B-B14F-4D97-AF65-F5344CB8AC3E}">
         <p14:creationId xmlns:p14="http://schemas.microsoft.com/office/powerpoint/2010/main" val="2156279359"/>
+      </p:ext>
+    </p:extLst>
+  </p:cSld>
+  <p:clrMapOvr>
+    <a:masterClrMapping/>
+  </p:clrMapOvr>
+</p:sld>
+</file>
+
+<file path=ppt/slides/slide19.xml><?xml version="1.0" encoding="utf-8"?>
+<p:sld xmlns:a="http://schemas.openxmlformats.org/drawingml/2006/main" xmlns:r="http://schemas.openxmlformats.org/officeDocument/2006/relationships" xmlns:p="http://schemas.openxmlformats.org/presentationml/2006/main">
+  <p:cSld>
+    <p:spTree>
+      <p:nvGrpSpPr>
+        <p:cNvPr id="1" name=""/>
+        <p:cNvGrpSpPr/>
+        <p:nvPr/>
+      </p:nvGrpSpPr>
+      <p:grpSpPr>
+        <a:xfrm>
+          <a:off x="0" y="0"/>
+          <a:ext cx="0" cy="0"/>
+          <a:chOff x="0" y="0"/>
+          <a:chExt cx="0" cy="0"/>
+        </a:xfrm>
+      </p:grpSpPr>
+      <p:sp>
+        <p:nvSpPr>
+          <p:cNvPr id="2" name="Title 1">
+            <a:extLst>
+              <a:ext uri="{FF2B5EF4-FFF2-40B4-BE49-F238E27FC236}">
+                <a16:creationId xmlns:a16="http://schemas.microsoft.com/office/drawing/2014/main" id="{BF569AA0-70C4-4DFB-A1CF-1195BE4F477D}"/>
+              </a:ext>
+            </a:extLst>
+          </p:cNvPr>
+          <p:cNvSpPr>
+            <a:spLocks noGrp="1"/>
+          </p:cNvSpPr>
+          <p:nvPr>
+            <p:ph type="title"/>
+          </p:nvPr>
+        </p:nvSpPr>
+        <p:spPr>
+          <a:xfrm>
+            <a:off x="8002587" y="1600200"/>
+            <a:ext cx="3122613" cy="1828800"/>
+          </a:xfrm>
+        </p:spPr>
+        <p:txBody>
+          <a:bodyPr anchor="b">
+            <a:normAutofit/>
+          </a:bodyPr>
+          <a:lstStyle/>
+          <a:p>
+            <a:r>
+              <a:rPr lang="en-US" dirty="0"/>
+              <a:t>Dual Modalities</a:t>
+            </a:r>
+          </a:p>
+        </p:txBody>
+      </p:sp>
+      <p:sp>
+        <p:nvSpPr>
+          <p:cNvPr id="9" name="Text Placeholder 3">
+            <a:extLst>
+              <a:ext uri="{FF2B5EF4-FFF2-40B4-BE49-F238E27FC236}">
+                <a16:creationId xmlns:a16="http://schemas.microsoft.com/office/drawing/2014/main" id="{92B93175-717B-4D72-B87B-4743D2BB0619}"/>
+              </a:ext>
+            </a:extLst>
+          </p:cNvPr>
+          <p:cNvSpPr>
+            <a:spLocks noGrp="1"/>
+          </p:cNvSpPr>
+          <p:nvPr>
+            <p:ph type="body" sz="half" idx="2"/>
+          </p:nvPr>
+        </p:nvSpPr>
+        <p:spPr>
+          <a:xfrm>
+            <a:off x="8001039" y="3429000"/>
+            <a:ext cx="3124161" cy="1828800"/>
+          </a:xfrm>
+        </p:spPr>
+        <p:txBody>
+          <a:bodyPr/>
+          <a:lstStyle/>
+          <a:p>
+            <a:endParaRPr lang="en-US"/>
+          </a:p>
+        </p:txBody>
+      </p:sp>
+      <p:graphicFrame>
+        <p:nvGraphicFramePr>
+          <p:cNvPr id="5" name="Content Placeholder 2">
+            <a:extLst>
+              <a:ext uri="{FF2B5EF4-FFF2-40B4-BE49-F238E27FC236}">
+                <a16:creationId xmlns:a16="http://schemas.microsoft.com/office/drawing/2014/main" id="{3A1566D7-AC1B-48CF-AAAD-CA34F71E74CB}"/>
+              </a:ext>
+            </a:extLst>
+          </p:cNvPr>
+          <p:cNvGraphicFramePr>
+            <a:graphicFrameLocks noGrp="1"/>
+          </p:cNvGraphicFramePr>
+          <p:nvPr>
+            <p:ph idx="1"/>
+            <p:extLst>
+              <p:ext uri="{D42A27DB-BD31-4B8C-83A1-F6EECF244321}">
+                <p14:modId xmlns:p14="http://schemas.microsoft.com/office/powerpoint/2010/main" val="2945829138"/>
+              </p:ext>
+            </p:extLst>
+          </p:nvPr>
+        </p:nvGraphicFramePr>
+        <p:xfrm>
+          <a:off x="760412" y="762000"/>
+          <a:ext cx="6400800" cy="5334000"/>
+        </p:xfrm>
+        <a:graphic>
+          <a:graphicData uri="http://schemas.openxmlformats.org/drawingml/2006/diagram">
+            <dgm:relIds xmlns:dgm="http://schemas.openxmlformats.org/drawingml/2006/diagram" xmlns:r="http://schemas.openxmlformats.org/officeDocument/2006/relationships" r:dm="rId2" r:lo="rId3" r:qs="rId4" r:cs="rId5"/>
+          </a:graphicData>
+        </a:graphic>
+      </p:graphicFrame>
+    </p:spTree>
+    <p:extLst>
+      <p:ext uri="{BB962C8B-B14F-4D97-AF65-F5344CB8AC3E}">
+        <p14:creationId xmlns:p14="http://schemas.microsoft.com/office/powerpoint/2010/main" val="1565125394"/>
       </p:ext>
     </p:extLst>
   </p:cSld>
@@ -24011,132 +21142,6 @@
 </file>
 
 <file path=ppt/slides/slide20.xml><?xml version="1.0" encoding="utf-8"?>
-<p:sld xmlns:a="http://schemas.openxmlformats.org/drawingml/2006/main" xmlns:r="http://schemas.openxmlformats.org/officeDocument/2006/relationships" xmlns:p="http://schemas.openxmlformats.org/presentationml/2006/main">
-  <p:cSld>
-    <p:spTree>
-      <p:nvGrpSpPr>
-        <p:cNvPr id="1" name=""/>
-        <p:cNvGrpSpPr/>
-        <p:nvPr/>
-      </p:nvGrpSpPr>
-      <p:grpSpPr>
-        <a:xfrm>
-          <a:off x="0" y="0"/>
-          <a:ext cx="0" cy="0"/>
-          <a:chOff x="0" y="0"/>
-          <a:chExt cx="0" cy="0"/>
-        </a:xfrm>
-      </p:grpSpPr>
-      <p:sp>
-        <p:nvSpPr>
-          <p:cNvPr id="2" name="Title 1">
-            <a:extLst>
-              <a:ext uri="{FF2B5EF4-FFF2-40B4-BE49-F238E27FC236}">
-                <a16:creationId xmlns:a16="http://schemas.microsoft.com/office/drawing/2014/main" id="{BF569AA0-70C4-4DFB-A1CF-1195BE4F477D}"/>
-              </a:ext>
-            </a:extLst>
-          </p:cNvPr>
-          <p:cNvSpPr>
-            <a:spLocks noGrp="1"/>
-          </p:cNvSpPr>
-          <p:nvPr>
-            <p:ph type="title"/>
-          </p:nvPr>
-        </p:nvSpPr>
-        <p:spPr>
-          <a:xfrm>
-            <a:off x="8002587" y="1600200"/>
-            <a:ext cx="3122613" cy="1828800"/>
-          </a:xfrm>
-        </p:spPr>
-        <p:txBody>
-          <a:bodyPr anchor="b">
-            <a:normAutofit/>
-          </a:bodyPr>
-          <a:lstStyle/>
-          <a:p>
-            <a:r>
-              <a:rPr lang="en-US" dirty="0"/>
-              <a:t>Dual Modalities</a:t>
-            </a:r>
-          </a:p>
-        </p:txBody>
-      </p:sp>
-      <p:sp>
-        <p:nvSpPr>
-          <p:cNvPr id="9" name="Text Placeholder 3">
-            <a:extLst>
-              <a:ext uri="{FF2B5EF4-FFF2-40B4-BE49-F238E27FC236}">
-                <a16:creationId xmlns:a16="http://schemas.microsoft.com/office/drawing/2014/main" id="{92B93175-717B-4D72-B87B-4743D2BB0619}"/>
-              </a:ext>
-            </a:extLst>
-          </p:cNvPr>
-          <p:cNvSpPr>
-            <a:spLocks noGrp="1"/>
-          </p:cNvSpPr>
-          <p:nvPr>
-            <p:ph type="body" sz="half" idx="2"/>
-          </p:nvPr>
-        </p:nvSpPr>
-        <p:spPr>
-          <a:xfrm>
-            <a:off x="8001039" y="3429000"/>
-            <a:ext cx="3124161" cy="1828800"/>
-          </a:xfrm>
-        </p:spPr>
-        <p:txBody>
-          <a:bodyPr/>
-          <a:lstStyle/>
-          <a:p>
-            <a:endParaRPr lang="en-US"/>
-          </a:p>
-        </p:txBody>
-      </p:sp>
-      <p:graphicFrame>
-        <p:nvGraphicFramePr>
-          <p:cNvPr id="5" name="Content Placeholder 2">
-            <a:extLst>
-              <a:ext uri="{FF2B5EF4-FFF2-40B4-BE49-F238E27FC236}">
-                <a16:creationId xmlns:a16="http://schemas.microsoft.com/office/drawing/2014/main" id="{3A1566D7-AC1B-48CF-AAAD-CA34F71E74CB}"/>
-              </a:ext>
-            </a:extLst>
-          </p:cNvPr>
-          <p:cNvGraphicFramePr>
-            <a:graphicFrameLocks noGrp="1"/>
-          </p:cNvGraphicFramePr>
-          <p:nvPr>
-            <p:ph idx="1"/>
-            <p:extLst>
-              <p:ext uri="{D42A27DB-BD31-4B8C-83A1-F6EECF244321}">
-                <p14:modId xmlns:p14="http://schemas.microsoft.com/office/powerpoint/2010/main" val="2945829138"/>
-              </p:ext>
-            </p:extLst>
-          </p:nvPr>
-        </p:nvGraphicFramePr>
-        <p:xfrm>
-          <a:off x="760412" y="762000"/>
-          <a:ext cx="6400800" cy="5334000"/>
-        </p:xfrm>
-        <a:graphic>
-          <a:graphicData uri="http://schemas.openxmlformats.org/drawingml/2006/diagram">
-            <dgm:relIds xmlns:dgm="http://schemas.openxmlformats.org/drawingml/2006/diagram" xmlns:r="http://schemas.openxmlformats.org/officeDocument/2006/relationships" r:dm="rId2" r:lo="rId3" r:qs="rId4" r:cs="rId5"/>
-          </a:graphicData>
-        </a:graphic>
-      </p:graphicFrame>
-    </p:spTree>
-    <p:extLst>
-      <p:ext uri="{BB962C8B-B14F-4D97-AF65-F5344CB8AC3E}">
-        <p14:creationId xmlns:p14="http://schemas.microsoft.com/office/powerpoint/2010/main" val="1565125394"/>
-      </p:ext>
-    </p:extLst>
-  </p:cSld>
-  <p:clrMapOvr>
-    <a:masterClrMapping/>
-  </p:clrMapOvr>
-</p:sld>
-</file>
-
-<file path=ppt/slides/slide21.xml><?xml version="1.0" encoding="utf-8"?>
 <p:sld xmlns:a="http://schemas.openxmlformats.org/drawingml/2006/main" xmlns:r="http://schemas.openxmlformats.org/officeDocument/2006/relationships" xmlns:p="http://schemas.openxmlformats.org/presentationml/2006/main">
   <p:cSld>
     <p:spTree>
@@ -24347,7 +21352,7 @@
 </p:sld>
 </file>
 
-<file path=ppt/slides/slide22.xml><?xml version="1.0" encoding="utf-8"?>
+<file path=ppt/slides/slide21.xml><?xml version="1.0" encoding="utf-8"?>
 <p:sld xmlns:a="http://schemas.openxmlformats.org/drawingml/2006/main" xmlns:r="http://schemas.openxmlformats.org/officeDocument/2006/relationships" xmlns:p="http://schemas.openxmlformats.org/presentationml/2006/main">
   <p:cSld>
     <p:spTree>
@@ -24433,103 +21438,7 @@
 </p:sld>
 </file>
 
-<file path=ppt/slides/slide23.xml><?xml version="1.0" encoding="utf-8"?>
-<p:sld xmlns:a="http://schemas.openxmlformats.org/drawingml/2006/main" xmlns:r="http://schemas.openxmlformats.org/officeDocument/2006/relationships" xmlns:p="http://schemas.openxmlformats.org/presentationml/2006/main">
-  <p:cSld>
-    <p:spTree>
-      <p:nvGrpSpPr>
-        <p:cNvPr id="1" name=""/>
-        <p:cNvGrpSpPr/>
-        <p:nvPr/>
-      </p:nvGrpSpPr>
-      <p:grpSpPr>
-        <a:xfrm>
-          <a:off x="0" y="0"/>
-          <a:ext cx="0" cy="0"/>
-          <a:chOff x="0" y="0"/>
-          <a:chExt cx="0" cy="0"/>
-        </a:xfrm>
-      </p:grpSpPr>
-      <p:sp>
-        <p:nvSpPr>
-          <p:cNvPr id="2" name="Title 1">
-            <a:extLst>
-              <a:ext uri="{FF2B5EF4-FFF2-40B4-BE49-F238E27FC236}">
-                <a16:creationId xmlns:a16="http://schemas.microsoft.com/office/drawing/2014/main" id="{8C154137-16A5-4480-A659-9561CF22FA12}"/>
-              </a:ext>
-            </a:extLst>
-          </p:cNvPr>
-          <p:cNvSpPr>
-            <a:spLocks noGrp="1"/>
-          </p:cNvSpPr>
-          <p:nvPr>
-            <p:ph type="title"/>
-          </p:nvPr>
-        </p:nvSpPr>
-        <p:spPr>
-          <a:xfrm>
-            <a:off x="1524000" y="457200"/>
-            <a:ext cx="9144000" cy="1143000"/>
-          </a:xfrm>
-        </p:spPr>
-        <p:txBody>
-          <a:bodyPr anchor="b">
-            <a:normAutofit/>
-          </a:bodyPr>
-          <a:lstStyle/>
-          <a:p>
-            <a:r>
-              <a:rPr lang="en-US" dirty="0"/>
-              <a:t>Resampling</a:t>
-            </a:r>
-          </a:p>
-        </p:txBody>
-      </p:sp>
-      <p:graphicFrame>
-        <p:nvGraphicFramePr>
-          <p:cNvPr id="6" name="Content Placeholder 2">
-            <a:extLst>
-              <a:ext uri="{FF2B5EF4-FFF2-40B4-BE49-F238E27FC236}">
-                <a16:creationId xmlns:a16="http://schemas.microsoft.com/office/drawing/2014/main" id="{074BDB8F-FE24-43BE-A69D-ECB279102C08}"/>
-              </a:ext>
-            </a:extLst>
-          </p:cNvPr>
-          <p:cNvGraphicFramePr>
-            <a:graphicFrameLocks noGrp="1"/>
-          </p:cNvGraphicFramePr>
-          <p:nvPr>
-            <p:ph idx="1"/>
-            <p:extLst>
-              <p:ext uri="{D42A27DB-BD31-4B8C-83A1-F6EECF244321}">
-                <p14:modId xmlns:p14="http://schemas.microsoft.com/office/powerpoint/2010/main" val="931765820"/>
-              </p:ext>
-            </p:extLst>
-          </p:nvPr>
-        </p:nvGraphicFramePr>
-        <p:xfrm>
-          <a:off x="1524000" y="1828800"/>
-          <a:ext cx="9144000" cy="4267200"/>
-        </p:xfrm>
-        <a:graphic>
-          <a:graphicData uri="http://schemas.openxmlformats.org/drawingml/2006/diagram">
-            <dgm:relIds xmlns:dgm="http://schemas.openxmlformats.org/drawingml/2006/diagram" xmlns:r="http://schemas.openxmlformats.org/officeDocument/2006/relationships" r:dm="rId2" r:lo="rId3" r:qs="rId4" r:cs="rId5"/>
-          </a:graphicData>
-        </a:graphic>
-      </p:graphicFrame>
-    </p:spTree>
-    <p:extLst>
-      <p:ext uri="{BB962C8B-B14F-4D97-AF65-F5344CB8AC3E}">
-        <p14:creationId xmlns:p14="http://schemas.microsoft.com/office/powerpoint/2010/main" val="1804266274"/>
-      </p:ext>
-    </p:extLst>
-  </p:cSld>
-  <p:clrMapOvr>
-    <a:masterClrMapping/>
-  </p:clrMapOvr>
-</p:sld>
-</file>
-
-<file path=ppt/slides/slide24.xml><?xml version="1.0" encoding="utf-8"?>
+<file path=ppt/slides/slide22.xml><?xml version="1.0" encoding="utf-8"?>
 <p:sld xmlns:a="http://schemas.openxmlformats.org/drawingml/2006/main" xmlns:r="http://schemas.openxmlformats.org/officeDocument/2006/relationships" xmlns:p="http://schemas.openxmlformats.org/presentationml/2006/main">
   <p:cSld>
     <p:spTree>
@@ -24968,7 +21877,7 @@
 </p:sld>
 </file>
 
-<file path=ppt/slides/slide25.xml><?xml version="1.0" encoding="utf-8"?>
+<file path=ppt/slides/slide23.xml><?xml version="1.0" encoding="utf-8"?>
 <p:sld xmlns:a="http://schemas.openxmlformats.org/drawingml/2006/main" xmlns:r="http://schemas.openxmlformats.org/officeDocument/2006/relationships" xmlns:p="http://schemas.openxmlformats.org/presentationml/2006/main">
   <p:cSld>
     <p:spTree>
@@ -25105,7 +22014,7 @@
 </p:sld>
 </file>
 
-<file path=ppt/slides/slide26.xml><?xml version="1.0" encoding="utf-8"?>
+<file path=ppt/slides/slide24.xml><?xml version="1.0" encoding="utf-8"?>
 <p:sld xmlns:a="http://schemas.openxmlformats.org/drawingml/2006/main" xmlns:r="http://schemas.openxmlformats.org/officeDocument/2006/relationships" xmlns:p="http://schemas.openxmlformats.org/presentationml/2006/main">
   <p:cSld>
     <p:spTree>
@@ -25253,7 +22162,7 @@
 </p:sld>
 </file>
 
-<file path=ppt/slides/slide27.xml><?xml version="1.0" encoding="utf-8"?>
+<file path=ppt/slides/slide25.xml><?xml version="1.0" encoding="utf-8"?>
 <p:sld xmlns:a="http://schemas.openxmlformats.org/drawingml/2006/main" xmlns:r="http://schemas.openxmlformats.org/officeDocument/2006/relationships" xmlns:p="http://schemas.openxmlformats.org/presentationml/2006/main">
   <p:cSld>
     <p:spTree>
@@ -25703,7 +22612,7 @@
 </p:sld>
 </file>
 
-<file path=ppt/slides/slide28.xml><?xml version="1.0" encoding="utf-8"?>
+<file path=ppt/slides/slide26.xml><?xml version="1.0" encoding="utf-8"?>
 <p:sld xmlns:a="http://schemas.openxmlformats.org/drawingml/2006/main" xmlns:r="http://schemas.openxmlformats.org/officeDocument/2006/relationships" xmlns:p="http://schemas.openxmlformats.org/presentationml/2006/main">
   <p:cSld>
     <p:spTree>
@@ -26967,7 +23876,7 @@
 </p:sld>
 </file>
 
-<file path=ppt/slides/slide29.xml><?xml version="1.0" encoding="utf-8"?>
+<file path=ppt/slides/slide27.xml><?xml version="1.0" encoding="utf-8"?>
 <p:sld xmlns:a="http://schemas.openxmlformats.org/drawingml/2006/main" xmlns:r="http://schemas.openxmlformats.org/officeDocument/2006/relationships" xmlns:p="http://schemas.openxmlformats.org/presentationml/2006/main">
   <p:cSld>
     <p:spTree>
@@ -26989,7 +23898,7 @@
           <p:cNvPr id="2" name="Title 1">
             <a:extLst>
               <a:ext uri="{FF2B5EF4-FFF2-40B4-BE49-F238E27FC236}">
-                <a16:creationId xmlns:a16="http://schemas.microsoft.com/office/drawing/2014/main" id="{5E7BC088-47CB-4EAF-9A82-F604328CBE63}"/>
+                <a16:creationId xmlns:a16="http://schemas.microsoft.com/office/drawing/2014/main" id="{46250BA0-8839-407A-8163-946DED24D1C7}"/>
               </a:ext>
             </a:extLst>
           </p:cNvPr>
@@ -27007,17 +23916,17 @@
           <a:p>
             <a:r>
               <a:rPr lang="en-US" dirty="0"/>
-              <a:t>Predicting on Unlabeled Synthesizers</a:t>
+              <a:t>Questions?</a:t>
             </a:r>
           </a:p>
         </p:txBody>
       </p:sp>
       <p:sp>
         <p:nvSpPr>
-          <p:cNvPr id="3" name="Content Placeholder 2">
+          <p:cNvPr id="3" name="Text Placeholder 2">
             <a:extLst>
               <a:ext uri="{FF2B5EF4-FFF2-40B4-BE49-F238E27FC236}">
-                <a16:creationId xmlns:a16="http://schemas.microsoft.com/office/drawing/2014/main" id="{2BDF75FA-8BFD-428F-8C1A-C553D51B61FF}"/>
+                <a16:creationId xmlns:a16="http://schemas.microsoft.com/office/drawing/2014/main" id="{353C2D4E-1E25-4A52-84F6-224156103CC1}"/>
               </a:ext>
             </a:extLst>
           </p:cNvPr>
@@ -27025,7 +23934,7 @@
             <a:spLocks noGrp="1"/>
           </p:cNvSpPr>
           <p:nvPr>
-            <p:ph sz="half" idx="1"/>
+            <p:ph type="body" idx="1"/>
           </p:nvPr>
         </p:nvSpPr>
         <p:spPr/>
@@ -27033,737 +23942,23 @@
           <a:bodyPr/>
           <a:lstStyle/>
           <a:p>
-            <a:endParaRPr lang="en-US" dirty="0"/>
-          </a:p>
-          <a:p>
             <a:r>
               <a:rPr lang="en-US" dirty="0"/>
-              <a:t>Horn – 83% Confidence</a:t>
-            </a:r>
-          </a:p>
-          <a:p>
-            <a:pPr marL="365760" lvl="1" indent="0">
-              <a:buNone/>
-            </a:pPr>
-            <a:endParaRPr lang="en-US" dirty="0"/>
-          </a:p>
-          <a:p>
-            <a:pPr marL="0" indent="0">
-              <a:buNone/>
-            </a:pPr>
-            <a:endParaRPr lang="en-US" dirty="0"/>
-          </a:p>
-          <a:p>
-            <a:pPr marL="0" indent="0">
-              <a:buNone/>
-            </a:pPr>
-            <a:endParaRPr lang="en-US" dirty="0"/>
-          </a:p>
-          <a:p>
-            <a:r>
-              <a:rPr lang="en-US" dirty="0"/>
-              <a:t>Sawtooth Wave – 99% </a:t>
-            </a:r>
-          </a:p>
-          <a:p>
-            <a:pPr marL="0" indent="0">
-              <a:buNone/>
-            </a:pPr>
-            <a:r>
-              <a:rPr lang="en-US" dirty="0"/>
-              <a:t>	</a:t>
+              <a:t>Thank you!</a:t>
             </a:r>
           </a:p>
         </p:txBody>
       </p:sp>
-      <p:pic>
-        <p:nvPicPr>
-          <p:cNvPr id="5" name="C0101011111Z">
-            <a:hlinkClick r:id="" action="ppaction://media"/>
-            <a:extLst>
-              <a:ext uri="{FF2B5EF4-FFF2-40B4-BE49-F238E27FC236}">
-                <a16:creationId xmlns:a16="http://schemas.microsoft.com/office/drawing/2014/main" id="{06DA587A-CA18-4F7A-8DA9-B04E815D24B1}"/>
-              </a:ext>
-            </a:extLst>
-          </p:cNvPr>
-          <p:cNvPicPr>
-            <a:picLocks noGrp="1" noChangeAspect="1"/>
-          </p:cNvPicPr>
-          <p:nvPr>
-            <p:ph sz="half" idx="2"/>
-            <a:audioFile r:link="rId2"/>
-            <p:extLst>
-              <p:ext uri="{DAA4B4D4-6D71-4841-9C94-3DE7FCFB9230}">
-                <p14:media xmlns:p14="http://schemas.microsoft.com/office/powerpoint/2010/main" r:embed="rId1"/>
-              </p:ext>
-            </p:extLst>
-          </p:nvPr>
-        </p:nvPicPr>
-        <p:blipFill>
-          <a:blip r:embed="rId10"/>
-          <a:stretch>
-            <a:fillRect/>
-          </a:stretch>
-        </p:blipFill>
-        <p:spPr>
-          <a:xfrm>
-            <a:off x="2286000" y="2819400"/>
-            <a:ext cx="406400" cy="406400"/>
-          </a:xfrm>
-        </p:spPr>
-      </p:pic>
-      <p:pic>
-        <p:nvPicPr>
-          <p:cNvPr id="6" name="C0001000101Y">
-            <a:hlinkClick r:id="" action="ppaction://media"/>
-            <a:extLst>
-              <a:ext uri="{FF2B5EF4-FFF2-40B4-BE49-F238E27FC236}">
-                <a16:creationId xmlns:a16="http://schemas.microsoft.com/office/drawing/2014/main" id="{174F6D33-FA28-4EFD-9929-0E2C0DA7F402}"/>
-              </a:ext>
-            </a:extLst>
-          </p:cNvPr>
-          <p:cNvPicPr>
-            <a:picLocks noChangeAspect="1"/>
-          </p:cNvPicPr>
-          <p:nvPr>
-            <a:audioFile r:link="rId4"/>
-            <p:extLst>
-              <p:ext uri="{DAA4B4D4-6D71-4841-9C94-3DE7FCFB9230}">
-                <p14:media xmlns:p14="http://schemas.microsoft.com/office/powerpoint/2010/main" r:embed="rId3"/>
-              </p:ext>
-            </p:extLst>
-          </p:nvPr>
-        </p:nvPicPr>
-        <p:blipFill>
-          <a:blip r:embed="rId10"/>
-          <a:stretch>
-            <a:fillRect/>
-          </a:stretch>
-        </p:blipFill>
-        <p:spPr>
-          <a:xfrm>
-            <a:off x="2209800" y="4648200"/>
-            <a:ext cx="406400" cy="406400"/>
-          </a:xfrm>
-          <a:prstGeom prst="rect">
-            <a:avLst/>
-          </a:prstGeom>
-        </p:spPr>
-      </p:pic>
-      <p:sp>
-        <p:nvSpPr>
-          <p:cNvPr id="7" name="Content Placeholder 2">
-            <a:extLst>
-              <a:ext uri="{FF2B5EF4-FFF2-40B4-BE49-F238E27FC236}">
-                <a16:creationId xmlns:a16="http://schemas.microsoft.com/office/drawing/2014/main" id="{7597C84E-EDCF-4302-81D2-87ACB140B240}"/>
-              </a:ext>
-            </a:extLst>
-          </p:cNvPr>
-          <p:cNvSpPr txBox="1">
-            <a:spLocks/>
-          </p:cNvSpPr>
-          <p:nvPr/>
-        </p:nvSpPr>
-        <p:spPr>
-          <a:xfrm>
-            <a:off x="6553200" y="1825624"/>
-            <a:ext cx="4343400" cy="4270375"/>
-          </a:xfrm>
-          <a:prstGeom prst="rect">
-            <a:avLst/>
-          </a:prstGeom>
-        </p:spPr>
-        <p:txBody>
-          <a:bodyPr vert="horz" lIns="91440" tIns="45720" rIns="91440" bIns="45720" rtlCol="0">
-            <a:normAutofit/>
-          </a:bodyPr>
-          <a:lstStyle>
-            <a:lvl1pPr marL="228600" indent="-228600" algn="l" defTabSz="914400" rtl="0" eaLnBrk="1" latinLnBrk="0" hangingPunct="1">
-              <a:lnSpc>
-                <a:spcPct val="90000"/>
-              </a:lnSpc>
-              <a:spcBef>
-                <a:spcPts val="1800"/>
-              </a:spcBef>
-              <a:buClr>
-                <a:schemeClr val="accent1"/>
-              </a:buClr>
-              <a:buFont typeface="Arial" pitchFamily="34" charset="0"/>
-              <a:buChar char="•"/>
-              <a:defRPr sz="2000" kern="1200">
-                <a:solidFill>
-                  <a:schemeClr val="tx1">
-                    <a:lumMod val="85000"/>
-                  </a:schemeClr>
-                </a:solidFill>
-                <a:latin typeface="+mn-lt"/>
-                <a:ea typeface="+mn-ea"/>
-                <a:cs typeface="+mn-cs"/>
-              </a:defRPr>
-            </a:lvl1pPr>
-            <a:lvl2pPr marL="594360" indent="-228600" algn="l" defTabSz="914400" rtl="0" eaLnBrk="1" latinLnBrk="0" hangingPunct="1">
-              <a:lnSpc>
-                <a:spcPct val="90000"/>
-              </a:lnSpc>
-              <a:spcBef>
-                <a:spcPts val="1000"/>
-              </a:spcBef>
-              <a:buClr>
-                <a:schemeClr val="accent1"/>
-              </a:buClr>
-              <a:buFont typeface="Arial" pitchFamily="34" charset="0"/>
-              <a:buChar char="•"/>
-              <a:defRPr sz="1800" kern="1200">
-                <a:solidFill>
-                  <a:schemeClr val="tx1">
-                    <a:lumMod val="85000"/>
-                  </a:schemeClr>
-                </a:solidFill>
-                <a:latin typeface="+mn-lt"/>
-                <a:ea typeface="+mn-ea"/>
-                <a:cs typeface="+mn-cs"/>
-              </a:defRPr>
-            </a:lvl2pPr>
-            <a:lvl3pPr marL="914400" indent="-228600" algn="l" defTabSz="914400" rtl="0" eaLnBrk="1" latinLnBrk="0" hangingPunct="1">
-              <a:lnSpc>
-                <a:spcPct val="90000"/>
-              </a:lnSpc>
-              <a:spcBef>
-                <a:spcPts val="800"/>
-              </a:spcBef>
-              <a:buClr>
-                <a:schemeClr val="accent1"/>
-              </a:buClr>
-              <a:buFont typeface="Arial" pitchFamily="34" charset="0"/>
-              <a:buChar char="•"/>
-              <a:defRPr sz="1600" kern="1200">
-                <a:solidFill>
-                  <a:schemeClr val="tx1">
-                    <a:lumMod val="85000"/>
-                  </a:schemeClr>
-                </a:solidFill>
-                <a:latin typeface="+mn-lt"/>
-                <a:ea typeface="+mn-ea"/>
-                <a:cs typeface="+mn-cs"/>
-              </a:defRPr>
-            </a:lvl3pPr>
-            <a:lvl4pPr marL="1234440" indent="-228600" algn="l" defTabSz="914400" rtl="0" eaLnBrk="1" latinLnBrk="0" hangingPunct="1">
-              <a:lnSpc>
-                <a:spcPct val="90000"/>
-              </a:lnSpc>
-              <a:spcBef>
-                <a:spcPts val="800"/>
-              </a:spcBef>
-              <a:buClr>
-                <a:schemeClr val="accent1"/>
-              </a:buClr>
-              <a:buFont typeface="Arial" pitchFamily="34" charset="0"/>
-              <a:buChar char="•"/>
-              <a:defRPr sz="1400" kern="1200">
-                <a:solidFill>
-                  <a:schemeClr val="tx1">
-                    <a:lumMod val="85000"/>
-                  </a:schemeClr>
-                </a:solidFill>
-                <a:latin typeface="+mn-lt"/>
-                <a:ea typeface="+mn-ea"/>
-                <a:cs typeface="+mn-cs"/>
-              </a:defRPr>
-            </a:lvl4pPr>
-            <a:lvl5pPr marL="1508760" indent="-228600" algn="l" defTabSz="914400" rtl="0" eaLnBrk="1" latinLnBrk="0" hangingPunct="1">
-              <a:lnSpc>
-                <a:spcPct val="90000"/>
-              </a:lnSpc>
-              <a:spcBef>
-                <a:spcPts val="800"/>
-              </a:spcBef>
-              <a:buClr>
-                <a:schemeClr val="accent1"/>
-              </a:buClr>
-              <a:buFont typeface="Arial" pitchFamily="34" charset="0"/>
-              <a:buChar char="•"/>
-              <a:defRPr sz="1400" kern="1200">
-                <a:solidFill>
-                  <a:schemeClr val="tx1">
-                    <a:lumMod val="85000"/>
-                  </a:schemeClr>
-                </a:solidFill>
-                <a:latin typeface="+mn-lt"/>
-                <a:ea typeface="+mn-ea"/>
-                <a:cs typeface="+mn-cs"/>
-              </a:defRPr>
-            </a:lvl5pPr>
-            <a:lvl6pPr marL="1783080" indent="-228600" algn="l" defTabSz="914400" rtl="0" eaLnBrk="1" latinLnBrk="0" hangingPunct="1">
-              <a:lnSpc>
-                <a:spcPct val="90000"/>
-              </a:lnSpc>
-              <a:spcBef>
-                <a:spcPts val="800"/>
-              </a:spcBef>
-              <a:buClr>
-                <a:schemeClr val="accent1"/>
-              </a:buClr>
-              <a:buFont typeface="Arial" pitchFamily="34" charset="0"/>
-              <a:buChar char="•"/>
-              <a:defRPr sz="1400" kern="1200">
-                <a:solidFill>
-                  <a:schemeClr val="tx1"/>
-                </a:solidFill>
-                <a:latin typeface="+mn-lt"/>
-                <a:ea typeface="+mn-ea"/>
-                <a:cs typeface="+mn-cs"/>
-              </a:defRPr>
-            </a:lvl6pPr>
-            <a:lvl7pPr marL="2057400" indent="-228600" algn="l" defTabSz="914400" rtl="0" eaLnBrk="1" latinLnBrk="0" hangingPunct="1">
-              <a:lnSpc>
-                <a:spcPct val="90000"/>
-              </a:lnSpc>
-              <a:spcBef>
-                <a:spcPts val="800"/>
-              </a:spcBef>
-              <a:buClr>
-                <a:schemeClr val="accent1"/>
-              </a:buClr>
-              <a:buFont typeface="Arial" pitchFamily="34" charset="0"/>
-              <a:buChar char="•"/>
-              <a:defRPr sz="1400" kern="1200">
-                <a:solidFill>
-                  <a:schemeClr val="tx1"/>
-                </a:solidFill>
-                <a:latin typeface="+mn-lt"/>
-                <a:ea typeface="+mn-ea"/>
-                <a:cs typeface="+mn-cs"/>
-              </a:defRPr>
-            </a:lvl7pPr>
-            <a:lvl8pPr marL="2331720" indent="-228600" algn="l" defTabSz="914400" rtl="0" eaLnBrk="1" latinLnBrk="0" hangingPunct="1">
-              <a:lnSpc>
-                <a:spcPct val="90000"/>
-              </a:lnSpc>
-              <a:spcBef>
-                <a:spcPts val="800"/>
-              </a:spcBef>
-              <a:buClr>
-                <a:schemeClr val="accent1"/>
-              </a:buClr>
-              <a:buFont typeface="Arial" pitchFamily="34" charset="0"/>
-              <a:buChar char="•"/>
-              <a:defRPr sz="1400" kern="1200">
-                <a:solidFill>
-                  <a:schemeClr val="tx1"/>
-                </a:solidFill>
-                <a:latin typeface="+mn-lt"/>
-                <a:ea typeface="+mn-ea"/>
-                <a:cs typeface="+mn-cs"/>
-              </a:defRPr>
-            </a:lvl8pPr>
-            <a:lvl9pPr marL="2606040" indent="-228600" algn="l" defTabSz="914400" rtl="0" eaLnBrk="1" latinLnBrk="0" hangingPunct="1">
-              <a:lnSpc>
-                <a:spcPct val="90000"/>
-              </a:lnSpc>
-              <a:spcBef>
-                <a:spcPts val="800"/>
-              </a:spcBef>
-              <a:buClr>
-                <a:schemeClr val="accent1"/>
-              </a:buClr>
-              <a:buFont typeface="Arial" pitchFamily="34" charset="0"/>
-              <a:buChar char="•"/>
-              <a:defRPr sz="1400" kern="1200">
-                <a:solidFill>
-                  <a:schemeClr val="tx1"/>
-                </a:solidFill>
-                <a:latin typeface="+mn-lt"/>
-                <a:ea typeface="+mn-ea"/>
-                <a:cs typeface="+mn-cs"/>
-              </a:defRPr>
-            </a:lvl9pPr>
-          </a:lstStyle>
-          <a:p>
-            <a:endParaRPr lang="en-US" dirty="0"/>
-          </a:p>
-          <a:p>
-            <a:r>
-              <a:rPr lang="en-US" dirty="0"/>
-              <a:t>Oboe – 97% Confidence</a:t>
-            </a:r>
-          </a:p>
-          <a:p>
-            <a:pPr marL="365760" lvl="1" indent="0">
-              <a:buFont typeface="Arial" pitchFamily="34" charset="0"/>
-              <a:buNone/>
-            </a:pPr>
-            <a:endParaRPr lang="en-US" dirty="0"/>
-          </a:p>
-          <a:p>
-            <a:pPr marL="0" indent="0">
-              <a:buFont typeface="Arial" pitchFamily="34" charset="0"/>
-              <a:buNone/>
-            </a:pPr>
-            <a:endParaRPr lang="en-US" dirty="0"/>
-          </a:p>
-          <a:p>
-            <a:pPr marL="0" indent="0">
-              <a:buFont typeface="Arial" pitchFamily="34" charset="0"/>
-              <a:buNone/>
-            </a:pPr>
-            <a:endParaRPr lang="en-US" dirty="0"/>
-          </a:p>
-          <a:p>
-            <a:r>
-              <a:rPr lang="en-US" dirty="0"/>
-              <a:t>Clarinet – 91% Confidence</a:t>
-            </a:r>
-          </a:p>
-          <a:p>
-            <a:pPr marL="365760" lvl="1" indent="0">
-              <a:buNone/>
-            </a:pPr>
-            <a:endParaRPr lang="en-US" dirty="0"/>
-          </a:p>
-          <a:p>
-            <a:pPr marL="0" indent="0">
-              <a:buFont typeface="Arial" pitchFamily="34" charset="0"/>
-              <a:buNone/>
-            </a:pPr>
-            <a:r>
-              <a:rPr lang="en-US" dirty="0"/>
-              <a:t>	</a:t>
-            </a:r>
-          </a:p>
-        </p:txBody>
-      </p:sp>
-      <p:pic>
-        <p:nvPicPr>
-          <p:cNvPr id="8" name="C000010011Z">
-            <a:hlinkClick r:id="" action="ppaction://media"/>
-            <a:extLst>
-              <a:ext uri="{FF2B5EF4-FFF2-40B4-BE49-F238E27FC236}">
-                <a16:creationId xmlns:a16="http://schemas.microsoft.com/office/drawing/2014/main" id="{11F76486-C948-487E-96C0-CD25F42819D6}"/>
-              </a:ext>
-            </a:extLst>
-          </p:cNvPr>
-          <p:cNvPicPr>
-            <a:picLocks noChangeAspect="1"/>
-          </p:cNvPicPr>
-          <p:nvPr>
-            <a:audioFile r:link="rId6"/>
-            <p:extLst>
-              <p:ext uri="{DAA4B4D4-6D71-4841-9C94-3DE7FCFB9230}">
-                <p14:media xmlns:p14="http://schemas.microsoft.com/office/powerpoint/2010/main" r:embed="rId5"/>
-              </p:ext>
-            </p:extLst>
-          </p:nvPr>
-        </p:nvPicPr>
-        <p:blipFill>
-          <a:blip r:embed="rId10"/>
-          <a:stretch>
-            <a:fillRect/>
-          </a:stretch>
-        </p:blipFill>
-        <p:spPr>
-          <a:xfrm>
-            <a:off x="7315200" y="2819400"/>
-            <a:ext cx="406400" cy="406400"/>
-          </a:xfrm>
-          <a:prstGeom prst="rect">
-            <a:avLst/>
-          </a:prstGeom>
-        </p:spPr>
-      </p:pic>
-      <p:pic>
-        <p:nvPicPr>
-          <p:cNvPr id="9" name="C000010111Y">
-            <a:hlinkClick r:id="" action="ppaction://media"/>
-            <a:extLst>
-              <a:ext uri="{FF2B5EF4-FFF2-40B4-BE49-F238E27FC236}">
-                <a16:creationId xmlns:a16="http://schemas.microsoft.com/office/drawing/2014/main" id="{D57CC47E-0377-4A8F-BDE7-0DAA7E77DB03}"/>
-              </a:ext>
-            </a:extLst>
-          </p:cNvPr>
-          <p:cNvPicPr>
-            <a:picLocks noChangeAspect="1"/>
-          </p:cNvPicPr>
-          <p:nvPr>
-            <a:audioFile r:link="rId8"/>
-            <p:extLst>
-              <p:ext uri="{DAA4B4D4-6D71-4841-9C94-3DE7FCFB9230}">
-                <p14:media xmlns:p14="http://schemas.microsoft.com/office/powerpoint/2010/main" r:embed="rId7"/>
-              </p:ext>
-            </p:extLst>
-          </p:nvPr>
-        </p:nvPicPr>
-        <p:blipFill>
-          <a:blip r:embed="rId10"/>
-          <a:stretch>
-            <a:fillRect/>
-          </a:stretch>
-        </p:blipFill>
-        <p:spPr>
-          <a:xfrm>
-            <a:off x="7315200" y="4648200"/>
-            <a:ext cx="406400" cy="406400"/>
-          </a:xfrm>
-          <a:prstGeom prst="rect">
-            <a:avLst/>
-          </a:prstGeom>
-        </p:spPr>
-      </p:pic>
     </p:spTree>
     <p:extLst>
       <p:ext uri="{BB962C8B-B14F-4D97-AF65-F5344CB8AC3E}">
-        <p14:creationId xmlns:p14="http://schemas.microsoft.com/office/powerpoint/2010/main" val="1013870862"/>
+        <p14:creationId xmlns:p14="http://schemas.microsoft.com/office/powerpoint/2010/main" val="3457821330"/>
       </p:ext>
     </p:extLst>
   </p:cSld>
   <p:clrMapOvr>
     <a:masterClrMapping/>
   </p:clrMapOvr>
-  <p:timing>
-    <p:tnLst>
-      <p:par>
-        <p:cTn id="1" dur="indefinite" restart="never" nodeType="tmRoot">
-          <p:childTnLst>
-            <p:seq concurrent="1" nextAc="seek">
-              <p:cTn id="2" dur="indefinite" nodeType="mainSeq">
-                <p:childTnLst>
-                  <p:par>
-                    <p:cTn id="3" fill="hold">
-                      <p:stCondLst>
-                        <p:cond delay="indefinite"/>
-                      </p:stCondLst>
-                      <p:childTnLst>
-                        <p:par>
-                          <p:cTn id="4" fill="hold">
-                            <p:stCondLst>
-                              <p:cond delay="0"/>
-                            </p:stCondLst>
-                            <p:childTnLst>
-                              <p:par>
-                                <p:cTn id="5" presetID="1" presetClass="mediacall" presetSubtype="0" fill="hold" nodeType="clickEffect">
-                                  <p:stCondLst>
-                                    <p:cond delay="0"/>
-                                  </p:stCondLst>
-                                  <p:childTnLst>
-                                    <p:cmd type="call" cmd="playFrom(0.0)">
-                                      <p:cBhvr>
-                                        <p:cTn id="6" dur="2972" fill="hold"/>
-                                        <p:tgtEl>
-                                          <p:spTgt spid="5"/>
-                                        </p:tgtEl>
-                                      </p:cBhvr>
-                                    </p:cmd>
-                                  </p:childTnLst>
-                                </p:cTn>
-                              </p:par>
-                            </p:childTnLst>
-                          </p:cTn>
-                        </p:par>
-                      </p:childTnLst>
-                    </p:cTn>
-                  </p:par>
-                  <p:par>
-                    <p:cTn id="7" fill="hold">
-                      <p:stCondLst>
-                        <p:cond delay="indefinite"/>
-                      </p:stCondLst>
-                      <p:childTnLst>
-                        <p:par>
-                          <p:cTn id="8" fill="hold">
-                            <p:stCondLst>
-                              <p:cond delay="0"/>
-                            </p:stCondLst>
-                            <p:childTnLst>
-                              <p:par>
-                                <p:cTn id="9" presetID="1" presetClass="mediacall" presetSubtype="0" fill="hold" nodeType="clickEffect">
-                                  <p:stCondLst>
-                                    <p:cond delay="0"/>
-                                  </p:stCondLst>
-                                  <p:childTnLst>
-                                    <p:cmd type="call" cmd="playFrom(0.0)">
-                                      <p:cBhvr>
-                                        <p:cTn id="10" dur="2972" fill="hold"/>
-                                        <p:tgtEl>
-                                          <p:spTgt spid="6"/>
-                                        </p:tgtEl>
-                                      </p:cBhvr>
-                                    </p:cmd>
-                                  </p:childTnLst>
-                                </p:cTn>
-                              </p:par>
-                            </p:childTnLst>
-                          </p:cTn>
-                        </p:par>
-                      </p:childTnLst>
-                    </p:cTn>
-                  </p:par>
-                  <p:par>
-                    <p:cTn id="11" fill="hold">
-                      <p:stCondLst>
-                        <p:cond delay="indefinite"/>
-                      </p:stCondLst>
-                      <p:childTnLst>
-                        <p:par>
-                          <p:cTn id="12" fill="hold">
-                            <p:stCondLst>
-                              <p:cond delay="0"/>
-                            </p:stCondLst>
-                            <p:childTnLst>
-                              <p:par>
-                                <p:cTn id="13" presetID="1" presetClass="mediacall" presetSubtype="0" fill="hold" nodeType="clickEffect">
-                                  <p:stCondLst>
-                                    <p:cond delay="0"/>
-                                  </p:stCondLst>
-                                  <p:childTnLst>
-                                    <p:cmd type="call" cmd="playFrom(0.0)">
-                                      <p:cBhvr>
-                                        <p:cTn id="14" dur="2972" fill="hold"/>
-                                        <p:tgtEl>
-                                          <p:spTgt spid="8"/>
-                                        </p:tgtEl>
-                                      </p:cBhvr>
-                                    </p:cmd>
-                                  </p:childTnLst>
-                                </p:cTn>
-                              </p:par>
-                            </p:childTnLst>
-                          </p:cTn>
-                        </p:par>
-                      </p:childTnLst>
-                    </p:cTn>
-                  </p:par>
-                  <p:par>
-                    <p:cTn id="15" fill="hold">
-                      <p:stCondLst>
-                        <p:cond delay="indefinite"/>
-                      </p:stCondLst>
-                      <p:childTnLst>
-                        <p:par>
-                          <p:cTn id="16" fill="hold">
-                            <p:stCondLst>
-                              <p:cond delay="0"/>
-                            </p:stCondLst>
-                            <p:childTnLst>
-                              <p:par>
-                                <p:cTn id="17" presetID="1" presetClass="mediacall" presetSubtype="0" fill="hold" nodeType="clickEffect">
-                                  <p:stCondLst>
-                                    <p:cond delay="0"/>
-                                  </p:stCondLst>
-                                  <p:childTnLst>
-                                    <p:cmd type="call" cmd="playFrom(0.0)">
-                                      <p:cBhvr>
-                                        <p:cTn id="18" dur="2972" fill="hold"/>
-                                        <p:tgtEl>
-                                          <p:spTgt spid="9"/>
-                                        </p:tgtEl>
-                                      </p:cBhvr>
-                                    </p:cmd>
-                                  </p:childTnLst>
-                                </p:cTn>
-                              </p:par>
-                            </p:childTnLst>
-                          </p:cTn>
-                        </p:par>
-                      </p:childTnLst>
-                    </p:cTn>
-                  </p:par>
-                </p:childTnLst>
-              </p:cTn>
-              <p:prevCondLst>
-                <p:cond evt="onPrev" delay="0">
-                  <p:tgtEl>
-                    <p:sldTgt/>
-                  </p:tgtEl>
-                </p:cond>
-              </p:prevCondLst>
-              <p:nextCondLst>
-                <p:cond evt="onNext" delay="0">
-                  <p:tgtEl>
-                    <p:sldTgt/>
-                  </p:tgtEl>
-                </p:cond>
-              </p:nextCondLst>
-            </p:seq>
-            <p:audio>
-              <p:cMediaNode vol="80000">
-                <p:cTn id="19" fill="hold" display="0">
-                  <p:stCondLst>
-                    <p:cond delay="indefinite"/>
-                  </p:stCondLst>
-                  <p:endCondLst>
-                    <p:cond evt="onStopAudio" delay="0">
-                      <p:tgtEl>
-                        <p:sldTgt/>
-                      </p:tgtEl>
-                    </p:cond>
-                  </p:endCondLst>
-                </p:cTn>
-                <p:tgtEl>
-                  <p:spTgt spid="5"/>
-                </p:tgtEl>
-              </p:cMediaNode>
-            </p:audio>
-            <p:audio>
-              <p:cMediaNode vol="80000">
-                <p:cTn id="20" fill="hold" display="0">
-                  <p:stCondLst>
-                    <p:cond delay="indefinite"/>
-                  </p:stCondLst>
-                  <p:endCondLst>
-                    <p:cond evt="onStopAudio" delay="0">
-                      <p:tgtEl>
-                        <p:sldTgt/>
-                      </p:tgtEl>
-                    </p:cond>
-                  </p:endCondLst>
-                </p:cTn>
-                <p:tgtEl>
-                  <p:spTgt spid="6"/>
-                </p:tgtEl>
-              </p:cMediaNode>
-            </p:audio>
-            <p:audio>
-              <p:cMediaNode vol="80000">
-                <p:cTn id="21" fill="hold" display="0">
-                  <p:stCondLst>
-                    <p:cond delay="indefinite"/>
-                  </p:stCondLst>
-                  <p:endCondLst>
-                    <p:cond evt="onStopAudio" delay="0">
-                      <p:tgtEl>
-                        <p:sldTgt/>
-                      </p:tgtEl>
-                    </p:cond>
-                  </p:endCondLst>
-                </p:cTn>
-                <p:tgtEl>
-                  <p:spTgt spid="8"/>
-                </p:tgtEl>
-              </p:cMediaNode>
-            </p:audio>
-            <p:audio>
-              <p:cMediaNode vol="80000">
-                <p:cTn id="22" fill="hold" display="0">
-                  <p:stCondLst>
-                    <p:cond delay="indefinite"/>
-                  </p:stCondLst>
-                  <p:endCondLst>
-                    <p:cond evt="onStopAudio" delay="0">
-                      <p:tgtEl>
-                        <p:sldTgt/>
-                      </p:tgtEl>
-                    </p:cond>
-                  </p:endCondLst>
-                </p:cTn>
-                <p:tgtEl>
-                  <p:spTgt spid="9"/>
-                </p:tgtEl>
-              </p:cMediaNode>
-            </p:audio>
-          </p:childTnLst>
-        </p:cTn>
-      </p:par>
-    </p:tnLst>
-  </p:timing>
 </p:sld>
 </file>
 
@@ -28345,92 +24540,6 @@
 </p:sld>
 </file>
 
-<file path=ppt/slides/slide30.xml><?xml version="1.0" encoding="utf-8"?>
-<p:sld xmlns:a="http://schemas.openxmlformats.org/drawingml/2006/main" xmlns:r="http://schemas.openxmlformats.org/officeDocument/2006/relationships" xmlns:p="http://schemas.openxmlformats.org/presentationml/2006/main">
-  <p:cSld>
-    <p:spTree>
-      <p:nvGrpSpPr>
-        <p:cNvPr id="1" name=""/>
-        <p:cNvGrpSpPr/>
-        <p:nvPr/>
-      </p:nvGrpSpPr>
-      <p:grpSpPr>
-        <a:xfrm>
-          <a:off x="0" y="0"/>
-          <a:ext cx="0" cy="0"/>
-          <a:chOff x="0" y="0"/>
-          <a:chExt cx="0" cy="0"/>
-        </a:xfrm>
-      </p:grpSpPr>
-      <p:sp>
-        <p:nvSpPr>
-          <p:cNvPr id="2" name="Title 1">
-            <a:extLst>
-              <a:ext uri="{FF2B5EF4-FFF2-40B4-BE49-F238E27FC236}">
-                <a16:creationId xmlns:a16="http://schemas.microsoft.com/office/drawing/2014/main" id="{46250BA0-8839-407A-8163-946DED24D1C7}"/>
-              </a:ext>
-            </a:extLst>
-          </p:cNvPr>
-          <p:cNvSpPr>
-            <a:spLocks noGrp="1"/>
-          </p:cNvSpPr>
-          <p:nvPr>
-            <p:ph type="title"/>
-          </p:nvPr>
-        </p:nvSpPr>
-        <p:spPr/>
-        <p:txBody>
-          <a:bodyPr/>
-          <a:lstStyle/>
-          <a:p>
-            <a:r>
-              <a:rPr lang="en-US" dirty="0"/>
-              <a:t>Questions?</a:t>
-            </a:r>
-          </a:p>
-        </p:txBody>
-      </p:sp>
-      <p:sp>
-        <p:nvSpPr>
-          <p:cNvPr id="3" name="Text Placeholder 2">
-            <a:extLst>
-              <a:ext uri="{FF2B5EF4-FFF2-40B4-BE49-F238E27FC236}">
-                <a16:creationId xmlns:a16="http://schemas.microsoft.com/office/drawing/2014/main" id="{353C2D4E-1E25-4A52-84F6-224156103CC1}"/>
-              </a:ext>
-            </a:extLst>
-          </p:cNvPr>
-          <p:cNvSpPr>
-            <a:spLocks noGrp="1"/>
-          </p:cNvSpPr>
-          <p:nvPr>
-            <p:ph type="body" idx="1"/>
-          </p:nvPr>
-        </p:nvSpPr>
-        <p:spPr/>
-        <p:txBody>
-          <a:bodyPr/>
-          <a:lstStyle/>
-          <a:p>
-            <a:r>
-              <a:rPr lang="en-US" dirty="0"/>
-              <a:t>Thank you!</a:t>
-            </a:r>
-          </a:p>
-        </p:txBody>
-      </p:sp>
-    </p:spTree>
-    <p:extLst>
-      <p:ext uri="{BB962C8B-B14F-4D97-AF65-F5344CB8AC3E}">
-        <p14:creationId xmlns:p14="http://schemas.microsoft.com/office/powerpoint/2010/main" val="3457821330"/>
-      </p:ext>
-    </p:extLst>
-  </p:cSld>
-  <p:clrMapOvr>
-    <a:masterClrMapping/>
-  </p:clrMapOvr>
-</p:sld>
-</file>
-
 <file path=ppt/slides/slide4.xml><?xml version="1.0" encoding="utf-8"?>
 <p:sld xmlns:a="http://schemas.openxmlformats.org/drawingml/2006/main" xmlns:r="http://schemas.openxmlformats.org/officeDocument/2006/relationships" xmlns:p="http://schemas.openxmlformats.org/presentationml/2006/main">
   <p:cSld>
@@ -29024,42 +25133,6 @@
       </p:sp>
       <p:sp>
         <p:nvSpPr>
-          <p:cNvPr id="3" name="Content Placeholder 2">
-            <a:extLst>
-              <a:ext uri="{FF2B5EF4-FFF2-40B4-BE49-F238E27FC236}">
-                <a16:creationId xmlns:a16="http://schemas.microsoft.com/office/drawing/2014/main" id="{B98ECD82-CD96-4DCF-97A5-309F8B69726F}"/>
-              </a:ext>
-            </a:extLst>
-          </p:cNvPr>
-          <p:cNvSpPr>
-            <a:spLocks noGrp="1"/>
-          </p:cNvSpPr>
-          <p:nvPr>
-            <p:ph sz="half" idx="1"/>
-          </p:nvPr>
-        </p:nvSpPr>
-        <p:spPr>
-          <a:xfrm>
-            <a:off x="609600" y="2286000"/>
-            <a:ext cx="5105400" cy="457200"/>
-          </a:xfrm>
-        </p:spPr>
-        <p:txBody>
-          <a:bodyPr/>
-          <a:lstStyle/>
-          <a:p>
-            <a:pPr marL="0" indent="0">
-              <a:buNone/>
-            </a:pPr>
-            <a:r>
-              <a:rPr lang="en-US" dirty="0"/>
-              <a:t>Categorical Cross Entropy</a:t>
-            </a:r>
-          </a:p>
-        </p:txBody>
-      </p:sp>
-      <p:sp>
-        <p:nvSpPr>
           <p:cNvPr id="4" name="Content Placeholder 3">
             <a:extLst>
               <a:ext uri="{FF2B5EF4-FFF2-40B4-BE49-F238E27FC236}">
@@ -29128,369 +25201,31 @@
           </a:p>
         </p:txBody>
       </p:sp>
-      <mc:AlternateContent xmlns:mc="http://schemas.openxmlformats.org/markup-compatibility/2006">
-        <mc:Choice xmlns:a14="http://schemas.microsoft.com/office/drawing/2010/main" Requires="a14">
-          <p:sp>
-            <p:nvSpPr>
-              <p:cNvPr id="9" name="TextBox 8">
-                <a:extLst>
-                  <a:ext uri="{FF2B5EF4-FFF2-40B4-BE49-F238E27FC236}">
-                    <a16:creationId xmlns:a16="http://schemas.microsoft.com/office/drawing/2014/main" id="{B2CFFA9B-980B-4941-B0DF-9B7F94178F73}"/>
-                  </a:ext>
-                </a:extLst>
-              </p:cNvPr>
-              <p:cNvSpPr txBox="1"/>
-              <p:nvPr/>
-            </p:nvSpPr>
-            <p:spPr>
-              <a:xfrm>
-                <a:off x="914400" y="4887843"/>
-                <a:ext cx="4953000" cy="1038811"/>
-              </a:xfrm>
-              <a:prstGeom prst="rect">
-                <a:avLst/>
-              </a:prstGeom>
-              <a:noFill/>
-            </p:spPr>
-            <p:txBody>
-              <a:bodyPr wrap="square" lIns="0" tIns="0" rIns="0" bIns="0" rtlCol="0">
-                <a:spAutoFit/>
-              </a:bodyPr>
-              <a:lstStyle/>
-              <a:p>
-                <a:pPr/>
-                <a14:m>
-                  <m:oMathPara xmlns:m="http://schemas.openxmlformats.org/officeDocument/2006/math">
-                    <m:oMathParaPr>
-                      <m:jc m:val="centerGroup"/>
-                    </m:oMathParaPr>
-                    <m:oMath xmlns:m="http://schemas.openxmlformats.org/officeDocument/2006/math">
-                      <m:r>
-                        <m:rPr>
-                          <m:sty m:val="p"/>
-                        </m:rPr>
-                        <a:rPr lang="en-US" sz="2400" smtClean="0">
-                          <a:latin typeface="Cambria Math" panose="02040503050406030204" pitchFamily="18" charset="0"/>
-                        </a:rPr>
-                        <m:t>C</m:t>
-                      </m:r>
-                      <m:r>
-                        <m:rPr>
-                          <m:sty m:val="p"/>
-                        </m:rPr>
-                        <a:rPr lang="en-US" sz="2400" b="0" i="0" smtClean="0">
-                          <a:latin typeface="Cambria Math" panose="02040503050406030204" pitchFamily="18" charset="0"/>
-                        </a:rPr>
-                        <m:t>XE</m:t>
-                      </m:r>
-                      <m:d>
-                        <m:dPr>
-                          <m:begChr m:val="["/>
-                          <m:endChr m:val="]"/>
-                          <m:ctrlPr>
-                            <a:rPr lang="en-US" sz="2400" b="0" i="1" smtClean="0">
-                              <a:latin typeface="Cambria Math" panose="02040503050406030204" pitchFamily="18" charset="0"/>
-                            </a:rPr>
-                          </m:ctrlPr>
-                        </m:dPr>
-                        <m:e>
-                          <m:r>
-                            <m:rPr>
-                              <m:sty m:val="p"/>
-                            </m:rPr>
-                            <a:rPr lang="en-US" sz="2400" b="0" i="0" smtClean="0">
-                              <a:latin typeface="Cambria Math" panose="02040503050406030204" pitchFamily="18" charset="0"/>
-                            </a:rPr>
-                            <m:t>y</m:t>
-                          </m:r>
-                          <m:r>
-                            <a:rPr lang="en-US" sz="2400" b="0" i="0" smtClean="0">
-                              <a:latin typeface="Cambria Math" panose="02040503050406030204" pitchFamily="18" charset="0"/>
-                            </a:rPr>
-                            <m:t>,</m:t>
-                          </m:r>
-                          <m:sSup>
-                            <m:sSupPr>
-                              <m:ctrlPr>
-                                <a:rPr lang="en-US" sz="2400" b="0" i="1" smtClean="0">
-                                  <a:latin typeface="Cambria Math" panose="02040503050406030204" pitchFamily="18" charset="0"/>
-                                </a:rPr>
-                              </m:ctrlPr>
-                            </m:sSupPr>
-                            <m:e>
-                              <m:r>
-                                <m:rPr>
-                                  <m:sty m:val="p"/>
-                                </m:rPr>
-                                <a:rPr lang="en-US" sz="2400" b="0" i="0" smtClean="0">
-                                  <a:latin typeface="Cambria Math" panose="02040503050406030204" pitchFamily="18" charset="0"/>
-                                </a:rPr>
-                                <m:t>y</m:t>
-                              </m:r>
-                            </m:e>
-                            <m:sup>
-                              <m:r>
-                                <a:rPr lang="en-US" sz="2400" b="0" i="0" smtClean="0">
-                                  <a:latin typeface="Cambria Math" panose="02040503050406030204" pitchFamily="18" charset="0"/>
-                                </a:rPr>
-                                <m:t>∗</m:t>
-                              </m:r>
-                            </m:sup>
-                          </m:sSup>
-                        </m:e>
-                      </m:d>
-                      <m:r>
-                        <a:rPr lang="en-US" sz="2400" b="0" i="0" smtClean="0">
-                          <a:latin typeface="Cambria Math" panose="02040503050406030204" pitchFamily="18" charset="0"/>
-                        </a:rPr>
-                        <m:t>=</m:t>
-                      </m:r>
-                      <m:r>
-                        <a:rPr lang="en-US" sz="2400" b="0" i="1" smtClean="0">
-                          <a:latin typeface="Cambria Math" panose="02040503050406030204" pitchFamily="18" charset="0"/>
-                        </a:rPr>
-                        <m:t>−</m:t>
-                      </m:r>
-                      <m:nary>
-                        <m:naryPr>
-                          <m:chr m:val="∑"/>
-                          <m:ctrlPr>
-                            <a:rPr lang="en-US" sz="2400" i="1" smtClean="0">
-                              <a:latin typeface="Cambria Math" panose="02040503050406030204" pitchFamily="18" charset="0"/>
-                            </a:rPr>
-                          </m:ctrlPr>
-                        </m:naryPr>
-                        <m:sub>
-                          <m:r>
-                            <m:rPr>
-                              <m:brk m:alnAt="23"/>
-                            </m:rPr>
-                            <a:rPr lang="en-US" sz="2400" b="0" i="1" smtClean="0">
-                              <a:latin typeface="Cambria Math" panose="02040503050406030204" pitchFamily="18" charset="0"/>
-                            </a:rPr>
-                            <m:t>𝑖</m:t>
-                          </m:r>
-                          <m:r>
-                            <a:rPr lang="en-US" sz="2400" b="0" i="1" smtClean="0">
-                              <a:latin typeface="Cambria Math" panose="02040503050406030204" pitchFamily="18" charset="0"/>
-                            </a:rPr>
-                            <m:t>=0</m:t>
-                          </m:r>
-                        </m:sub>
-                        <m:sup>
-                          <m:r>
-                            <a:rPr lang="en-US" sz="2400" b="0" i="1" smtClean="0">
-                              <a:latin typeface="Cambria Math" panose="02040503050406030204" pitchFamily="18" charset="0"/>
-                            </a:rPr>
-                            <m:t>𝐾</m:t>
-                          </m:r>
-                          <m:r>
-                            <a:rPr lang="en-US" sz="2400" b="0" i="1" smtClean="0">
-                              <a:latin typeface="Cambria Math" panose="02040503050406030204" pitchFamily="18" charset="0"/>
-                            </a:rPr>
-                            <m:t>−1</m:t>
-                          </m:r>
-                        </m:sup>
-                        <m:e>
-                          <m:sSub>
-                            <m:sSubPr>
-                              <m:ctrlPr>
-                                <a:rPr lang="en-US" sz="2400" b="0" i="1" smtClean="0">
-                                  <a:latin typeface="Cambria Math" panose="02040503050406030204" pitchFamily="18" charset="0"/>
-                                </a:rPr>
-                              </m:ctrlPr>
-                            </m:sSubPr>
-                            <m:e>
-                              <m:r>
-                                <a:rPr lang="en-US" sz="2400" b="0" i="1" smtClean="0">
-                                  <a:latin typeface="Cambria Math" panose="02040503050406030204" pitchFamily="18" charset="0"/>
-                                </a:rPr>
-                                <m:t>𝑦</m:t>
-                              </m:r>
-                            </m:e>
-                            <m:sub>
-                              <m:r>
-                                <a:rPr lang="en-US" sz="2400" b="0" i="1" smtClean="0">
-                                  <a:latin typeface="Cambria Math" panose="02040503050406030204" pitchFamily="18" charset="0"/>
-                                </a:rPr>
-                                <m:t>𝑖</m:t>
-                              </m:r>
-                            </m:sub>
-                          </m:sSub>
-                          <m:r>
-                            <m:rPr>
-                              <m:sty m:val="p"/>
-                            </m:rPr>
-                            <a:rPr lang="en-US" sz="2400" b="0" i="0" smtClean="0">
-                              <a:latin typeface="Cambria Math" panose="02040503050406030204" pitchFamily="18" charset="0"/>
-                            </a:rPr>
-                            <m:t>log</m:t>
-                          </m:r>
-                          <m:r>
-                            <a:rPr lang="en-US" sz="2400" b="0" i="1" smtClean="0">
-                              <a:latin typeface="Cambria Math" panose="02040503050406030204" pitchFamily="18" charset="0"/>
-                            </a:rPr>
-                            <m:t>⁡(</m:t>
-                          </m:r>
-                          <m:sSubSup>
-                            <m:sSubSupPr>
-                              <m:ctrlPr>
-                                <a:rPr lang="en-US" sz="2400" b="0" i="1" smtClean="0">
-                                  <a:latin typeface="Cambria Math" panose="02040503050406030204" pitchFamily="18" charset="0"/>
-                                </a:rPr>
-                              </m:ctrlPr>
-                            </m:sSubSupPr>
-                            <m:e>
-                              <m:r>
-                                <a:rPr lang="en-US" sz="2400" b="0" i="1" smtClean="0">
-                                  <a:latin typeface="Cambria Math" panose="02040503050406030204" pitchFamily="18" charset="0"/>
-                                </a:rPr>
-                                <m:t>𝑦</m:t>
-                              </m:r>
-                            </m:e>
-                            <m:sub>
-                              <m:r>
-                                <a:rPr lang="en-US" sz="2400" b="0" i="1" smtClean="0">
-                                  <a:latin typeface="Cambria Math" panose="02040503050406030204" pitchFamily="18" charset="0"/>
-                                </a:rPr>
-                                <m:t>𝑖</m:t>
-                              </m:r>
-                            </m:sub>
-                            <m:sup>
-                              <m:r>
-                                <a:rPr lang="en-US" sz="2400" b="0" i="1" smtClean="0">
-                                  <a:latin typeface="Cambria Math" panose="02040503050406030204" pitchFamily="18" charset="0"/>
-                                </a:rPr>
-                                <m:t>∗</m:t>
-                              </m:r>
-                            </m:sup>
-                          </m:sSubSup>
-                          <m:r>
-                            <a:rPr lang="en-US" sz="2400" b="0" i="1" smtClean="0">
-                              <a:latin typeface="Cambria Math" panose="02040503050406030204" pitchFamily="18" charset="0"/>
-                            </a:rPr>
-                            <m:t>)</m:t>
-                          </m:r>
-                        </m:e>
-                      </m:nary>
-                    </m:oMath>
-                  </m:oMathPara>
-                </a14:m>
-                <a:endParaRPr lang="en-US" sz="2400" dirty="0"/>
-              </a:p>
-            </p:txBody>
-          </p:sp>
-        </mc:Choice>
-        <mc:Fallback>
-          <p:sp>
-            <p:nvSpPr>
-              <p:cNvPr id="9" name="TextBox 8">
-                <a:extLst>
-                  <a:ext uri="{FF2B5EF4-FFF2-40B4-BE49-F238E27FC236}">
-                    <a16:creationId xmlns:a16="http://schemas.microsoft.com/office/drawing/2014/main" id="{B2CFFA9B-980B-4941-B0DF-9B7F94178F73}"/>
-                  </a:ext>
-                </a:extLst>
-              </p:cNvPr>
-              <p:cNvSpPr txBox="1">
-                <a:spLocks noRot="1" noChangeAspect="1" noMove="1" noResize="1" noEditPoints="1" noAdjustHandles="1" noChangeArrowheads="1" noChangeShapeType="1" noTextEdit="1"/>
-              </p:cNvSpPr>
-              <p:nvPr/>
-            </p:nvSpPr>
-            <p:spPr>
-              <a:xfrm>
-                <a:off x="914400" y="4887843"/>
-                <a:ext cx="4953000" cy="1038811"/>
-              </a:xfrm>
-              <a:prstGeom prst="rect">
-                <a:avLst/>
-              </a:prstGeom>
-              <a:blipFill>
-                <a:blip r:embed="rId2"/>
-                <a:stretch>
-                  <a:fillRect/>
-                </a:stretch>
-              </a:blipFill>
-            </p:spPr>
-            <p:txBody>
-              <a:bodyPr/>
-              <a:lstStyle/>
-              <a:p>
-                <a:r>
-                  <a:rPr lang="en-US">
-                    <a:noFill/>
-                  </a:rPr>
-                  <a:t> </a:t>
-                </a:r>
-              </a:p>
-            </p:txBody>
-          </p:sp>
-        </mc:Fallback>
-      </mc:AlternateContent>
-      <p:pic>
-        <p:nvPicPr>
-          <p:cNvPr id="8" name="Picture 7">
+      <p:sp>
+        <p:nvSpPr>
+          <p:cNvPr id="6" name="Content Placeholder 5">
             <a:extLst>
               <a:ext uri="{FF2B5EF4-FFF2-40B4-BE49-F238E27FC236}">
-                <a16:creationId xmlns:a16="http://schemas.microsoft.com/office/drawing/2014/main" id="{93168194-B0C0-4080-8133-B62CC0B23816}"/>
+                <a16:creationId xmlns:a16="http://schemas.microsoft.com/office/drawing/2014/main" id="{9E304FCB-8806-467F-84E0-9F9AD5ED9613}"/>
               </a:ext>
             </a:extLst>
           </p:cNvPr>
-          <p:cNvPicPr>
-            <a:picLocks noChangeAspect="1"/>
-          </p:cNvPicPr>
-          <p:nvPr/>
-        </p:nvPicPr>
-        <p:blipFill>
-          <a:blip r:embed="rId3" cstate="print">
-            <a:extLst>
-              <a:ext uri="{28A0092B-C50C-407E-A947-70E740481C1C}">
-                <a14:useLocalDpi xmlns:a14="http://schemas.microsoft.com/office/drawing/2010/main" val="0"/>
-              </a:ext>
-            </a:extLst>
-          </a:blip>
-          <a:srcRect/>
-          <a:stretch/>
-        </p:blipFill>
-        <p:spPr>
-          <a:xfrm>
-            <a:off x="609599" y="2908479"/>
-            <a:ext cx="5257801" cy="1752600"/>
-          </a:xfrm>
-          <a:prstGeom prst="rect">
-            <a:avLst/>
-          </a:prstGeom>
-          <a:solidFill>
-            <a:srgbClr val="FFFFFF">
-              <a:shade val="85000"/>
-            </a:srgbClr>
-          </a:solidFill>
-          <a:ln w="3175" cap="sq">
-            <a:solidFill>
-              <a:srgbClr val="FFFFFF"/>
-            </a:solidFill>
-            <a:miter lim="800000"/>
-          </a:ln>
-          <a:effectLst>
-            <a:outerShdw blurRad="55000" dist="18000" dir="5400000" algn="tl" rotWithShape="0">
-              <a:srgbClr val="000000">
-                <a:alpha val="40000"/>
-              </a:srgbClr>
-            </a:outerShdw>
-          </a:effectLst>
-          <a:scene3d>
-            <a:camera prst="orthographicFront"/>
-            <a:lightRig rig="twoPt" dir="t">
-              <a:rot lat="0" lon="0" rev="7200000"/>
-            </a:lightRig>
-          </a:scene3d>
-          <a:sp3d>
-            <a:bevelT w="25400" h="19050"/>
-            <a:contourClr>
-              <a:srgbClr val="FFFFFF"/>
-            </a:contourClr>
-          </a:sp3d>
-        </p:spPr>
-      </p:pic>
+          <p:cNvSpPr>
+            <a:spLocks noGrp="1"/>
+          </p:cNvSpPr>
+          <p:nvPr>
+            <p:ph sz="half" idx="1"/>
+          </p:nvPr>
+        </p:nvSpPr>
+        <p:spPr/>
+        <p:txBody>
+          <a:bodyPr/>
+          <a:lstStyle/>
+          <a:p>
+            <a:endParaRPr lang="en-US"/>
+          </a:p>
+        </p:txBody>
+      </p:sp>
     </p:spTree>
     <p:extLst>
       <p:ext uri="{BB962C8B-B14F-4D97-AF65-F5344CB8AC3E}">

</xml_diff>

<commit_message>
Small Updates to Capstone Presentations
</commit_message>
<xml_diff>
--- a/Thesis/CapstonePresentaion/Classifying Chaotic Synthesizers with a Multimodal Neural Network.pptx
+++ b/Thesis/CapstonePresentaion/Classifying Chaotic Synthesizers with a Multimodal Neural Network.pptx
@@ -5,10 +5,10 @@
     <p:sldMasterId id="2147483648" r:id="rId1"/>
   </p:sldMasterIdLst>
   <p:notesMasterIdLst>
-    <p:notesMasterId r:id="rId29"/>
+    <p:notesMasterId r:id="rId28"/>
   </p:notesMasterIdLst>
   <p:handoutMasterIdLst>
-    <p:handoutMasterId r:id="rId30"/>
+    <p:handoutMasterId r:id="rId29"/>
   </p:handoutMasterIdLst>
   <p:sldIdLst>
     <p:sldId id="256" r:id="rId2"/>
@@ -21,9 +21,9 @@
     <p:sldId id="262" r:id="rId9"/>
     <p:sldId id="269" r:id="rId10"/>
     <p:sldId id="270" r:id="rId11"/>
-    <p:sldId id="272" r:id="rId12"/>
-    <p:sldId id="264" r:id="rId13"/>
-    <p:sldId id="267" r:id="rId14"/>
+    <p:sldId id="264" r:id="rId12"/>
+    <p:sldId id="267" r:id="rId13"/>
+    <p:sldId id="296" r:id="rId14"/>
     <p:sldId id="265" r:id="rId15"/>
     <p:sldId id="281" r:id="rId16"/>
     <p:sldId id="282" r:id="rId17"/>
@@ -35,9 +35,8 @@
     <p:sldId id="289" r:id="rId23"/>
     <p:sldId id="288" r:id="rId24"/>
     <p:sldId id="290" r:id="rId25"/>
-    <p:sldId id="291" r:id="rId26"/>
-    <p:sldId id="292" r:id="rId27"/>
-    <p:sldId id="295" r:id="rId28"/>
+    <p:sldId id="292" r:id="rId26"/>
+    <p:sldId id="295" r:id="rId27"/>
   </p:sldIdLst>
   <p:sldSz cx="12192000" cy="6858000"/>
   <p:notesSz cx="6858000" cy="9144000"/>
@@ -5004,7 +5003,23 @@
                 <a:schemeClr val="bg1"/>
               </a:solidFill>
             </a:rPr>
-            <a:t>Do wee </a:t>
+            <a:t>Do we </a:t>
+          </a:r>
+          <a:r>
+            <a:rPr lang="en-US" i="1" dirty="0">
+              <a:solidFill>
+                <a:schemeClr val="bg1"/>
+              </a:solidFill>
+            </a:rPr>
+            <a:t>train </a:t>
+          </a:r>
+          <a:r>
+            <a:rPr lang="en-US" i="0" dirty="0">
+              <a:solidFill>
+                <a:schemeClr val="bg1"/>
+              </a:solidFill>
+            </a:rPr>
+            <a:t>or </a:t>
           </a:r>
           <a:r>
             <a:rPr lang="en-US" i="1" dirty="0">
@@ -5015,13 +5030,18 @@
             <a:t>Optimize</a:t>
           </a:r>
           <a:r>
-            <a:rPr lang="en-US" dirty="0">
+            <a:rPr lang="en-US" i="0" dirty="0">
               <a:solidFill>
                 <a:schemeClr val="bg1"/>
               </a:solidFill>
             </a:rPr>
-            <a:t> a Neural Network?</a:t>
+            <a:t> a Neural Network</a:t>
           </a:r>
+          <a:endParaRPr lang="en-US" dirty="0">
+            <a:solidFill>
+              <a:schemeClr val="bg1"/>
+            </a:solidFill>
+          </a:endParaRPr>
         </a:p>
       </dgm:t>
     </dgm:pt>
@@ -7331,7 +7351,23 @@
                 <a:schemeClr val="bg1"/>
               </a:solidFill>
             </a:rPr>
-            <a:t>Do wee </a:t>
+            <a:t>Do we </a:t>
+          </a:r>
+          <a:r>
+            <a:rPr lang="en-US" sz="2500" i="1" kern="1200" dirty="0">
+              <a:solidFill>
+                <a:schemeClr val="bg1"/>
+              </a:solidFill>
+            </a:rPr>
+            <a:t>train </a:t>
+          </a:r>
+          <a:r>
+            <a:rPr lang="en-US" sz="2500" i="0" kern="1200" dirty="0">
+              <a:solidFill>
+                <a:schemeClr val="bg1"/>
+              </a:solidFill>
+            </a:rPr>
+            <a:t>or </a:t>
           </a:r>
           <a:r>
             <a:rPr lang="en-US" sz="2500" i="1" kern="1200" dirty="0">
@@ -7342,13 +7378,18 @@
             <a:t>Optimize</a:t>
           </a:r>
           <a:r>
-            <a:rPr lang="en-US" sz="2500" kern="1200" dirty="0">
+            <a:rPr lang="en-US" sz="2500" i="0" kern="1200" dirty="0">
               <a:solidFill>
                 <a:schemeClr val="bg1"/>
               </a:solidFill>
             </a:rPr>
-            <a:t> a Neural Network?</a:t>
+            <a:t> a Neural Network</a:t>
           </a:r>
+          <a:endParaRPr lang="en-US" sz="2500" kern="1200" dirty="0">
+            <a:solidFill>
+              <a:schemeClr val="bg1"/>
+            </a:solidFill>
+          </a:endParaRPr>
         </a:p>
       </dsp:txBody>
       <dsp:txXfrm>
@@ -15539,7 +15580,7 @@
           <a:p>
             <a:fld id="{762B48F5-BACC-47D6-A0F7-82FBF9C6BC85}" type="datetimeFigureOut">
               <a:rPr lang="en-US"/>
-              <a:t>12/2/2020</a:t>
+              <a:t>12/3/2020</a:t>
             </a:fld>
             <a:endParaRPr/>
           </a:p>
@@ -15704,7 +15745,7 @@
           <a:p>
             <a:fld id="{0CB1CD00-5424-4675-AB18-2C419B060449}" type="datetimeFigureOut">
               <a:rPr lang="en-US"/>
-              <a:t>12/2/2020</a:t>
+              <a:t>12/3/2020</a:t>
             </a:fld>
             <a:endParaRPr/>
           </a:p>
@@ -16349,7 +16390,7 @@
           <a:p>
             <a:fld id="{37CC0096-1860-4642-9CD2-0079EA5E7CD1}" type="datetimeFigureOut">
               <a:rPr lang="en-US" smtClean="0"/>
-              <a:t>12/2/2020</a:t>
+              <a:t>12/3/2020</a:t>
             </a:fld>
             <a:endParaRPr lang="en-US"/>
           </a:p>
@@ -16528,7 +16569,7 @@
           <a:p>
             <a:fld id="{37CC0096-1860-4642-9CD2-0079EA5E7CD1}" type="datetimeFigureOut">
               <a:rPr lang="en-US" smtClean="0"/>
-              <a:t>12/2/2020</a:t>
+              <a:t>12/3/2020</a:t>
             </a:fld>
             <a:endParaRPr lang="en-US"/>
           </a:p>
@@ -16701,7 +16742,7 @@
           <a:p>
             <a:fld id="{37CC0096-1860-4642-9CD2-0079EA5E7CD1}" type="datetimeFigureOut">
               <a:rPr lang="en-US" smtClean="0"/>
-              <a:t>12/2/2020</a:t>
+              <a:t>12/3/2020</a:t>
             </a:fld>
             <a:endParaRPr lang="en-US"/>
           </a:p>
@@ -17134,7 +17175,7 @@
           <a:p>
             <a:fld id="{37CC0096-1860-4642-9CD2-0079EA5E7CD1}" type="datetimeFigureOut">
               <a:rPr lang="en-US" smtClean="0"/>
-              <a:t>12/2/2020</a:t>
+              <a:t>12/3/2020</a:t>
             </a:fld>
             <a:endParaRPr lang="en-US"/>
           </a:p>
@@ -17573,7 +17614,7 @@
           <a:p>
             <a:fld id="{37CC0096-1860-4642-9CD2-0079EA5E7CD1}" type="datetimeFigureOut">
               <a:rPr lang="en-US" smtClean="0"/>
-              <a:t>12/2/2020</a:t>
+              <a:t>12/3/2020</a:t>
             </a:fld>
             <a:endParaRPr lang="en-US"/>
           </a:p>
@@ -17690,7 +17731,7 @@
           <a:p>
             <a:fld id="{37CC0096-1860-4642-9CD2-0079EA5E7CD1}" type="datetimeFigureOut">
               <a:rPr lang="en-US" smtClean="0"/>
-              <a:t>12/2/2020</a:t>
+              <a:t>12/3/2020</a:t>
             </a:fld>
             <a:endParaRPr lang="en-US"/>
           </a:p>
@@ -17785,7 +17826,7 @@
           <a:p>
             <a:fld id="{37CC0096-1860-4642-9CD2-0079EA5E7CD1}" type="datetimeFigureOut">
               <a:rPr lang="en-US" smtClean="0"/>
-              <a:t>12/2/2020</a:t>
+              <a:t>12/3/2020</a:t>
             </a:fld>
             <a:endParaRPr lang="en-US"/>
           </a:p>
@@ -18069,7 +18110,7 @@
           <a:p>
             <a:fld id="{37CC0096-1860-4642-9CD2-0079EA5E7CD1}" type="datetimeFigureOut">
               <a:rPr lang="en-US" smtClean="0"/>
-              <a:t>12/2/2020</a:t>
+              <a:t>12/3/2020</a:t>
             </a:fld>
             <a:endParaRPr lang="en-US"/>
           </a:p>
@@ -18380,7 +18421,7 @@
           <a:p>
             <a:fld id="{37CC0096-1860-4642-9CD2-0079EA5E7CD1}" type="datetimeFigureOut">
               <a:rPr lang="en-US" smtClean="0"/>
-              <a:t>12/2/2020</a:t>
+              <a:t>12/3/2020</a:t>
             </a:fld>
             <a:endParaRPr lang="en-US"/>
           </a:p>
@@ -18612,7 +18653,7 @@
             <a:fld id="{37CC0096-1860-4642-9CD2-0079EA5E7CD1}" type="datetimeFigureOut">
               <a:rPr lang="en-US" smtClean="0"/>
               <a:pPr/>
-              <a:t>12/2/2020</a:t>
+              <a:t>12/3/2020</a:t>
             </a:fld>
             <a:endParaRPr lang="en-US"/>
           </a:p>
@@ -19215,7 +19256,7 @@
             <p:ph idx="1"/>
             <p:extLst>
               <p:ext uri="{D42A27DB-BD31-4B8C-83A1-F6EECF244321}">
-                <p14:modId xmlns:p14="http://schemas.microsoft.com/office/powerpoint/2010/main" val="856024489"/>
+                <p14:modId xmlns:p14="http://schemas.microsoft.com/office/powerpoint/2010/main" val="2162838229"/>
               </p:ext>
             </p:extLst>
           </p:nvPr>
@@ -19265,207 +19306,6 @@
           <p:cNvPr id="2" name="Title 1">
             <a:extLst>
               <a:ext uri="{FF2B5EF4-FFF2-40B4-BE49-F238E27FC236}">
-                <a16:creationId xmlns:a16="http://schemas.microsoft.com/office/drawing/2014/main" id="{B5EAC733-646D-4D5E-A742-5A8E3D3B5EA1}"/>
-              </a:ext>
-            </a:extLst>
-          </p:cNvPr>
-          <p:cNvSpPr>
-            <a:spLocks noGrp="1"/>
-          </p:cNvSpPr>
-          <p:nvPr>
-            <p:ph type="title"/>
-          </p:nvPr>
-        </p:nvSpPr>
-        <p:spPr/>
-        <p:txBody>
-          <a:bodyPr/>
-          <a:lstStyle/>
-          <a:p>
-            <a:r>
-              <a:rPr lang="en-US" dirty="0"/>
-              <a:t>Optimization (Cont.)</a:t>
-            </a:r>
-          </a:p>
-        </p:txBody>
-      </p:sp>
-      <p:sp>
-        <p:nvSpPr>
-          <p:cNvPr id="9" name="Content Placeholder 8">
-            <a:extLst>
-              <a:ext uri="{FF2B5EF4-FFF2-40B4-BE49-F238E27FC236}">
-                <a16:creationId xmlns:a16="http://schemas.microsoft.com/office/drawing/2014/main" id="{3197CA5C-B926-42BF-9393-E9E3D343DE8E}"/>
-              </a:ext>
-            </a:extLst>
-          </p:cNvPr>
-          <p:cNvSpPr>
-            <a:spLocks noGrp="1"/>
-          </p:cNvSpPr>
-          <p:nvPr>
-            <p:ph sz="half" idx="1"/>
-          </p:nvPr>
-        </p:nvSpPr>
-        <p:spPr>
-          <a:xfrm>
-            <a:off x="6324600" y="1825624"/>
-            <a:ext cx="4343400" cy="4270375"/>
-          </a:xfrm>
-        </p:spPr>
-        <p:txBody>
-          <a:bodyPr>
-            <a:normAutofit/>
-          </a:bodyPr>
-          <a:lstStyle/>
-          <a:p>
-            <a:endParaRPr lang="en-US" dirty="0"/>
-          </a:p>
-          <a:p>
-            <a:endParaRPr lang="en-US" dirty="0"/>
-          </a:p>
-        </p:txBody>
-      </p:sp>
-      <p:sp>
-        <p:nvSpPr>
-          <p:cNvPr id="4" name="Content Placeholder 3">
-            <a:extLst>
-              <a:ext uri="{FF2B5EF4-FFF2-40B4-BE49-F238E27FC236}">
-                <a16:creationId xmlns:a16="http://schemas.microsoft.com/office/drawing/2014/main" id="{01A39B9C-DABB-4F96-8286-A4CDA766D77F}"/>
-              </a:ext>
-            </a:extLst>
-          </p:cNvPr>
-          <p:cNvSpPr>
-            <a:spLocks noGrp="1"/>
-          </p:cNvSpPr>
-          <p:nvPr>
-            <p:ph sz="half" idx="2"/>
-          </p:nvPr>
-        </p:nvSpPr>
-        <p:spPr/>
-        <p:txBody>
-          <a:bodyPr>
-            <a:normAutofit/>
-          </a:bodyPr>
-          <a:lstStyle/>
-          <a:p>
-            <a:endParaRPr lang="en-US" dirty="0"/>
-          </a:p>
-          <a:p>
-            <a:r>
-              <a:rPr lang="en-US" dirty="0"/>
-              <a:t>“Adaptive-Moments” Optimizer</a:t>
-            </a:r>
-          </a:p>
-          <a:p>
-            <a:pPr lvl="1"/>
-            <a:r>
-              <a:rPr lang="en-US" dirty="0"/>
-              <a:t>Gradient Descent Method</a:t>
-            </a:r>
-          </a:p>
-          <a:p>
-            <a:pPr lvl="1"/>
-            <a:r>
-              <a:rPr lang="en-US" dirty="0"/>
-              <a:t>Powerful, Robust, Stable</a:t>
-            </a:r>
-          </a:p>
-          <a:p>
-            <a:pPr marL="365760" lvl="1" indent="0">
-              <a:buNone/>
-            </a:pPr>
-            <a:endParaRPr lang="en-US" dirty="0"/>
-          </a:p>
-          <a:p>
-            <a:pPr lvl="1"/>
-            <a:endParaRPr lang="en-US" dirty="0"/>
-          </a:p>
-          <a:p>
-            <a:r>
-              <a:rPr lang="en-US" dirty="0"/>
-              <a:t>Adjust each parameter to minimize cost function</a:t>
-            </a:r>
-          </a:p>
-          <a:p>
-            <a:pPr marL="365760" lvl="1" indent="0">
-              <a:buNone/>
-            </a:pPr>
-            <a:endParaRPr lang="en-US" dirty="0"/>
-          </a:p>
-          <a:p>
-            <a:endParaRPr lang="en-US" dirty="0"/>
-          </a:p>
-        </p:txBody>
-      </p:sp>
-      <p:pic>
-        <p:nvPicPr>
-          <p:cNvPr id="6" name="Picture 5" descr="A picture containing indoor, sitting, green, front&#10;&#10;Description automatically generated">
-            <a:extLst>
-              <a:ext uri="{FF2B5EF4-FFF2-40B4-BE49-F238E27FC236}">
-                <a16:creationId xmlns:a16="http://schemas.microsoft.com/office/drawing/2014/main" id="{A79C29C4-D5A5-4BD9-A68A-F44CA13A4BDC}"/>
-              </a:ext>
-            </a:extLst>
-          </p:cNvPr>
-          <p:cNvPicPr>
-            <a:picLocks noChangeAspect="1"/>
-          </p:cNvPicPr>
-          <p:nvPr/>
-        </p:nvPicPr>
-        <p:blipFill>
-          <a:blip r:embed="rId2" cstate="print">
-            <a:extLst>
-              <a:ext uri="{28A0092B-C50C-407E-A947-70E740481C1C}">
-                <a14:useLocalDpi xmlns:a14="http://schemas.microsoft.com/office/drawing/2010/main" val="0"/>
-              </a:ext>
-            </a:extLst>
-          </a:blip>
-          <a:stretch>
-            <a:fillRect/>
-          </a:stretch>
-        </p:blipFill>
-        <p:spPr>
-          <a:xfrm>
-            <a:off x="775291" y="2743200"/>
-            <a:ext cx="5092110" cy="2705608"/>
-          </a:xfrm>
-          <a:prstGeom prst="rect">
-            <a:avLst/>
-          </a:prstGeom>
-        </p:spPr>
-      </p:pic>
-    </p:spTree>
-    <p:extLst>
-      <p:ext uri="{BB962C8B-B14F-4D97-AF65-F5344CB8AC3E}">
-        <p14:creationId xmlns:p14="http://schemas.microsoft.com/office/powerpoint/2010/main" val="4167631759"/>
-      </p:ext>
-    </p:extLst>
-  </p:cSld>
-  <p:clrMapOvr>
-    <a:masterClrMapping/>
-  </p:clrMapOvr>
-</p:sld>
-</file>
-
-<file path=ppt/slides/slide12.xml><?xml version="1.0" encoding="utf-8"?>
-<p:sld xmlns:a="http://schemas.openxmlformats.org/drawingml/2006/main" xmlns:r="http://schemas.openxmlformats.org/officeDocument/2006/relationships" xmlns:p="http://schemas.openxmlformats.org/presentationml/2006/main">
-  <p:cSld>
-    <p:spTree>
-      <p:nvGrpSpPr>
-        <p:cNvPr id="1" name=""/>
-        <p:cNvGrpSpPr/>
-        <p:nvPr/>
-      </p:nvGrpSpPr>
-      <p:grpSpPr>
-        <a:xfrm>
-          <a:off x="0" y="0"/>
-          <a:ext cx="0" cy="0"/>
-          <a:chOff x="0" y="0"/>
-          <a:chExt cx="0" cy="0"/>
-        </a:xfrm>
-      </p:grpSpPr>
-      <p:sp>
-        <p:nvSpPr>
-          <p:cNvPr id="2" name="Title 1">
-            <a:extLst>
-              <a:ext uri="{FF2B5EF4-FFF2-40B4-BE49-F238E27FC236}">
                 <a16:creationId xmlns:a16="http://schemas.microsoft.com/office/drawing/2014/main" id="{6E245FA5-1622-40FD-9D94-81D541C99921}"/>
               </a:ext>
             </a:extLst>
@@ -19530,7 +19370,7 @@
 </p:sld>
 </file>
 
-<file path=ppt/slides/slide13.xml><?xml version="1.0" encoding="utf-8"?>
+<file path=ppt/slides/slide12.xml><?xml version="1.0" encoding="utf-8"?>
 <p:sld xmlns:a="http://schemas.openxmlformats.org/drawingml/2006/main" xmlns:r="http://schemas.openxmlformats.org/officeDocument/2006/relationships" xmlns:p="http://schemas.openxmlformats.org/presentationml/2006/main">
   <p:cSld>
     <p:spTree>
@@ -19670,6 +19510,182 @@
     <p:extLst>
       <p:ext uri="{BB962C8B-B14F-4D97-AF65-F5344CB8AC3E}">
         <p14:creationId xmlns:p14="http://schemas.microsoft.com/office/powerpoint/2010/main" val="2978267041"/>
+      </p:ext>
+    </p:extLst>
+  </p:cSld>
+  <p:clrMapOvr>
+    <a:masterClrMapping/>
+  </p:clrMapOvr>
+</p:sld>
+</file>
+
+<file path=ppt/slides/slide13.xml><?xml version="1.0" encoding="utf-8"?>
+<p:sld xmlns:a="http://schemas.openxmlformats.org/drawingml/2006/main" xmlns:r="http://schemas.openxmlformats.org/officeDocument/2006/relationships" xmlns:p="http://schemas.openxmlformats.org/presentationml/2006/main">
+  <p:cSld>
+    <p:spTree>
+      <p:nvGrpSpPr>
+        <p:cNvPr id="1" name=""/>
+        <p:cNvGrpSpPr/>
+        <p:nvPr/>
+      </p:nvGrpSpPr>
+      <p:grpSpPr>
+        <a:xfrm>
+          <a:off x="0" y="0"/>
+          <a:ext cx="0" cy="0"/>
+          <a:chOff x="0" y="0"/>
+          <a:chExt cx="0" cy="0"/>
+        </a:xfrm>
+      </p:grpSpPr>
+      <p:sp>
+        <p:nvSpPr>
+          <p:cNvPr id="2" name="Title 1">
+            <a:extLst>
+              <a:ext uri="{FF2B5EF4-FFF2-40B4-BE49-F238E27FC236}">
+                <a16:creationId xmlns:a16="http://schemas.microsoft.com/office/drawing/2014/main" id="{B4595D45-8484-4266-B6B7-5A75B0A35F0D}"/>
+              </a:ext>
+            </a:extLst>
+          </p:cNvPr>
+          <p:cNvSpPr>
+            <a:spLocks noGrp="1"/>
+          </p:cNvSpPr>
+          <p:nvPr>
+            <p:ph type="title"/>
+          </p:nvPr>
+        </p:nvSpPr>
+        <p:spPr>
+          <a:xfrm>
+            <a:off x="8002587" y="1600200"/>
+            <a:ext cx="3122613" cy="1828800"/>
+          </a:xfrm>
+        </p:spPr>
+        <p:txBody>
+          <a:bodyPr anchor="b">
+            <a:normAutofit/>
+          </a:bodyPr>
+          <a:lstStyle/>
+          <a:p>
+            <a:r>
+              <a:rPr lang="en-US" dirty="0"/>
+              <a:t>Analysis Frames</a:t>
+            </a:r>
+          </a:p>
+        </p:txBody>
+      </p:sp>
+      <p:pic>
+        <p:nvPicPr>
+          <p:cNvPr id="6" name="Content Placeholder 5" descr="A picture containing diagram&#10;&#10;Description automatically generated">
+            <a:extLst>
+              <a:ext uri="{FF2B5EF4-FFF2-40B4-BE49-F238E27FC236}">
+                <a16:creationId xmlns:a16="http://schemas.microsoft.com/office/drawing/2014/main" id="{CC024462-8802-453F-A444-F2C6734B18D2}"/>
+              </a:ext>
+            </a:extLst>
+          </p:cNvPr>
+          <p:cNvPicPr>
+            <a:picLocks noGrp="1" noChangeAspect="1"/>
+          </p:cNvPicPr>
+          <p:nvPr>
+            <p:ph idx="1"/>
+          </p:nvPr>
+        </p:nvPicPr>
+        <p:blipFill>
+          <a:blip r:embed="rId2" cstate="print">
+            <a:extLst>
+              <a:ext uri="{28A0092B-C50C-407E-A947-70E740481C1C}">
+                <a14:useLocalDpi xmlns:a14="http://schemas.microsoft.com/office/drawing/2010/main" val="0"/>
+              </a:ext>
+            </a:extLst>
+          </a:blip>
+          <a:stretch>
+            <a:fillRect/>
+          </a:stretch>
+        </p:blipFill>
+        <p:spPr>
+          <a:xfrm>
+            <a:off x="760412" y="1812798"/>
+            <a:ext cx="6400800" cy="3232403"/>
+          </a:xfrm>
+          <a:noFill/>
+        </p:spPr>
+      </p:pic>
+      <p:sp>
+        <p:nvSpPr>
+          <p:cNvPr id="3" name="Content Placeholder 2">
+            <a:extLst>
+              <a:ext uri="{FF2B5EF4-FFF2-40B4-BE49-F238E27FC236}">
+                <a16:creationId xmlns:a16="http://schemas.microsoft.com/office/drawing/2014/main" id="{D7E024A7-63FD-4416-80AB-72F13633D04C}"/>
+              </a:ext>
+            </a:extLst>
+          </p:cNvPr>
+          <p:cNvSpPr>
+            <a:spLocks noGrp="1"/>
+          </p:cNvSpPr>
+          <p:nvPr>
+            <p:ph type="body" sz="half" idx="2"/>
+          </p:nvPr>
+        </p:nvSpPr>
+        <p:spPr>
+          <a:xfrm>
+            <a:off x="8001039" y="3429000"/>
+            <a:ext cx="3124161" cy="1828800"/>
+          </a:xfrm>
+        </p:spPr>
+        <p:txBody>
+          <a:bodyPr>
+            <a:normAutofit/>
+          </a:bodyPr>
+          <a:lstStyle/>
+          <a:p>
+            <a:pPr>
+              <a:spcAft>
+                <a:spcPts val="600"/>
+              </a:spcAft>
+            </a:pPr>
+            <a:endParaRPr lang="en-US" dirty="0"/>
+          </a:p>
+          <a:p>
+            <a:pPr>
+              <a:spcAft>
+                <a:spcPts val="600"/>
+              </a:spcAft>
+            </a:pPr>
+            <a:r>
+              <a:rPr lang="en-US" dirty="0"/>
+              <a:t>“Preprocessing” Step</a:t>
+            </a:r>
+          </a:p>
+          <a:p>
+            <a:pPr>
+              <a:spcAft>
+                <a:spcPts val="600"/>
+              </a:spcAft>
+            </a:pPr>
+            <a:endParaRPr lang="en-US" dirty="0"/>
+          </a:p>
+          <a:p>
+            <a:pPr>
+              <a:spcAft>
+                <a:spcPts val="600"/>
+              </a:spcAft>
+            </a:pPr>
+            <a:r>
+              <a:rPr lang="en-US" dirty="0"/>
+              <a:t>Examine waveform in a “</a:t>
+            </a:r>
+            <a:r>
+              <a:rPr lang="en-US" dirty="0" err="1"/>
+              <a:t>Quazi</a:t>
+            </a:r>
+            <a:r>
+              <a:rPr lang="en-US" dirty="0"/>
+              <a:t> Stationary state” </a:t>
+            </a:r>
+          </a:p>
+        </p:txBody>
+      </p:sp>
+    </p:spTree>
+    <p:extLst>
+      <p:ext uri="{BB962C8B-B14F-4D97-AF65-F5344CB8AC3E}">
+        <p14:creationId xmlns:p14="http://schemas.microsoft.com/office/powerpoint/2010/main" val="1008995759"/>
       </p:ext>
     </p:extLst>
   </p:cSld>
@@ -20238,7 +20254,7 @@
           <a:p>
             <a:r>
               <a:rPr lang="en-US" dirty="0"/>
-              <a:t>Time–Space Features</a:t>
+              <a:t>Some Features</a:t>
             </a:r>
           </a:p>
         </p:txBody>
@@ -20266,61 +20282,8 @@
           <a:p>
             <a:r>
               <a:rPr lang="en-US" b="1" dirty="0"/>
-              <a:t>Time Domain Envelope (x5)</a:t>
+              <a:t>Time &amp; Frequency Center of Mass</a:t>
             </a:r>
-          </a:p>
-        </p:txBody>
-      </p:sp>
-      <p:sp>
-        <p:nvSpPr>
-          <p:cNvPr id="6" name="Content Placeholder 5">
-            <a:extLst>
-              <a:ext uri="{FF2B5EF4-FFF2-40B4-BE49-F238E27FC236}">
-                <a16:creationId xmlns:a16="http://schemas.microsoft.com/office/drawing/2014/main" id="{199610CE-5190-4529-8D23-80CE33DA67F3}"/>
-              </a:ext>
-            </a:extLst>
-          </p:cNvPr>
-          <p:cNvSpPr>
-            <a:spLocks noGrp="1"/>
-          </p:cNvSpPr>
-          <p:nvPr>
-            <p:ph sz="half" idx="2"/>
-          </p:nvPr>
-        </p:nvSpPr>
-        <p:spPr/>
-        <p:txBody>
-          <a:bodyPr/>
-          <a:lstStyle/>
-          <a:p>
-            <a:endParaRPr lang="en-US" dirty="0"/>
-          </a:p>
-          <a:p>
-            <a:endParaRPr lang="en-US" dirty="0"/>
-          </a:p>
-          <a:p>
-            <a:r>
-              <a:rPr lang="en-US" dirty="0"/>
-              <a:t>Divide waveform into 5 sections</a:t>
-            </a:r>
-          </a:p>
-          <a:p>
-            <a:pPr lvl="1"/>
-            <a:r>
-              <a:rPr lang="en-US" dirty="0"/>
-              <a:t>Approximated energy time domain</a:t>
-            </a:r>
-          </a:p>
-          <a:p>
-            <a:endParaRPr lang="en-US" dirty="0"/>
-          </a:p>
-          <a:p>
-            <a:r>
-              <a:rPr lang="en-US" dirty="0"/>
-              <a:t>Compute TDE for each, use as features</a:t>
-            </a:r>
-          </a:p>
-          <a:p>
-            <a:endParaRPr lang="en-US" dirty="0"/>
           </a:p>
         </p:txBody>
       </p:sp>
@@ -20345,10 +20308,7 @@
           <a:bodyPr/>
           <a:lstStyle/>
           <a:p>
-            <a:r>
-              <a:rPr lang="en-US" b="1" dirty="0"/>
-              <a:t>Zero Crossing Rate</a:t>
-            </a:r>
+            <a:endParaRPr lang="en-US" b="1" dirty="0"/>
           </a:p>
         </p:txBody>
       </p:sp>
@@ -20379,22 +20339,32 @@
             <a:endParaRPr lang="en-US" dirty="0"/>
           </a:p>
           <a:p>
-            <a:r>
-              <a:rPr lang="en-US" dirty="0"/>
-              <a:t>Number of times a waveform crosses equilibrium</a:t>
-            </a:r>
-          </a:p>
-          <a:p>
             <a:endParaRPr lang="en-US" dirty="0"/>
           </a:p>
-          <a:p>
-            <a:r>
-              <a:rPr lang="en-US" dirty="0"/>
-              <a:t>Identifies Jagged vs. periodic waveforms</a:t>
-            </a:r>
-          </a:p>
-          <a:p>
-            <a:endParaRPr lang="en-US" dirty="0"/>
+        </p:txBody>
+      </p:sp>
+      <p:sp>
+        <p:nvSpPr>
+          <p:cNvPr id="4" name="Content Placeholder 3">
+            <a:extLst>
+              <a:ext uri="{FF2B5EF4-FFF2-40B4-BE49-F238E27FC236}">
+                <a16:creationId xmlns:a16="http://schemas.microsoft.com/office/drawing/2014/main" id="{C43E8E9E-2AC3-42D3-AF24-539D6804EA11}"/>
+              </a:ext>
+            </a:extLst>
+          </p:cNvPr>
+          <p:cNvSpPr>
+            <a:spLocks noGrp="1"/>
+          </p:cNvSpPr>
+          <p:nvPr>
+            <p:ph sz="half" idx="2"/>
+          </p:nvPr>
+        </p:nvSpPr>
+        <p:spPr/>
+        <p:txBody>
+          <a:bodyPr/>
+          <a:lstStyle/>
+          <a:p>
+            <a:endParaRPr lang="en-US"/>
           </a:p>
         </p:txBody>
       </p:sp>
@@ -21984,7 +21954,7 @@
         <p:spPr>
           <a:xfrm>
             <a:off x="8001039" y="3429000"/>
-            <a:ext cx="3124161" cy="1828800"/>
+            <a:ext cx="3124161" cy="2743200"/>
           </a:xfrm>
         </p:spPr>
         <p:txBody>
@@ -21997,6 +21967,27 @@
             <a:r>
               <a:rPr lang="en-US" dirty="0"/>
               <a:t>Averaged over K=10 Folds Cross Validation</a:t>
+            </a:r>
+          </a:p>
+          <a:p>
+            <a:endParaRPr lang="en-US" dirty="0"/>
+          </a:p>
+          <a:p>
+            <a:endParaRPr lang="en-US" dirty="0"/>
+          </a:p>
+          <a:p>
+            <a:r>
+              <a:rPr lang="en-US" dirty="0"/>
+              <a:t>Each integer label represents a class</a:t>
+            </a:r>
+          </a:p>
+          <a:p>
+            <a:endParaRPr lang="en-US" dirty="0"/>
+          </a:p>
+          <a:p>
+            <a:r>
+              <a:rPr lang="en-US" dirty="0"/>
+              <a:t>e.g. 10 = Cello, 32 = Vibraphone</a:t>
             </a:r>
           </a:p>
         </p:txBody>
@@ -22184,456 +22175,6 @@
           <p:cNvPr id="2" name="Title 1">
             <a:extLst>
               <a:ext uri="{FF2B5EF4-FFF2-40B4-BE49-F238E27FC236}">
-                <a16:creationId xmlns:a16="http://schemas.microsoft.com/office/drawing/2014/main" id="{97DFF24D-800A-47BA-9327-900E7A71934F}"/>
-              </a:ext>
-            </a:extLst>
-          </p:cNvPr>
-          <p:cNvSpPr>
-            <a:spLocks noGrp="1"/>
-          </p:cNvSpPr>
-          <p:nvPr>
-            <p:ph type="title"/>
-          </p:nvPr>
-        </p:nvSpPr>
-        <p:spPr/>
-        <p:txBody>
-          <a:bodyPr/>
-          <a:lstStyle/>
-          <a:p>
-            <a:r>
-              <a:rPr lang="en-US" dirty="0"/>
-              <a:t>Quicker Metrics</a:t>
-            </a:r>
-          </a:p>
-        </p:txBody>
-      </p:sp>
-      <p:sp>
-        <p:nvSpPr>
-          <p:cNvPr id="3" name="Text Placeholder 2">
-            <a:extLst>
-              <a:ext uri="{FF2B5EF4-FFF2-40B4-BE49-F238E27FC236}">
-                <a16:creationId xmlns:a16="http://schemas.microsoft.com/office/drawing/2014/main" id="{58EA22D9-A364-475A-80C8-0A63966AC2E9}"/>
-              </a:ext>
-            </a:extLst>
-          </p:cNvPr>
-          <p:cNvSpPr>
-            <a:spLocks noGrp="1"/>
-          </p:cNvSpPr>
-          <p:nvPr>
-            <p:ph type="body" idx="1"/>
-          </p:nvPr>
-        </p:nvSpPr>
-        <p:spPr/>
-        <p:txBody>
-          <a:bodyPr/>
-          <a:lstStyle/>
-          <a:p>
-            <a:r>
-              <a:rPr lang="en-US" b="1" dirty="0"/>
-              <a:t>Precision / Specificity Score</a:t>
-            </a:r>
-          </a:p>
-        </p:txBody>
-      </p:sp>
-      <mc:AlternateContent xmlns:mc="http://schemas.openxmlformats.org/markup-compatibility/2006" xmlns:a14="http://schemas.microsoft.com/office/drawing/2010/main">
-        <mc:Choice Requires="a14">
-          <p:sp>
-            <p:nvSpPr>
-              <p:cNvPr id="4" name="Content Placeholder 3">
-                <a:extLst>
-                  <a:ext uri="{FF2B5EF4-FFF2-40B4-BE49-F238E27FC236}">
-                    <a16:creationId xmlns:a16="http://schemas.microsoft.com/office/drawing/2014/main" id="{43A44C14-11B5-49CE-A779-A1F040F4A257}"/>
-                  </a:ext>
-                </a:extLst>
-              </p:cNvPr>
-              <p:cNvSpPr>
-                <a:spLocks noGrp="1"/>
-              </p:cNvSpPr>
-              <p:nvPr>
-                <p:ph sz="half" idx="2"/>
-              </p:nvPr>
-            </p:nvSpPr>
-            <p:spPr/>
-            <p:txBody>
-              <a:bodyPr>
-                <a:normAutofit/>
-              </a:bodyPr>
-              <a:lstStyle/>
-              <a:p>
-                <a:endParaRPr lang="en-US" dirty="0"/>
-              </a:p>
-              <a:p>
-                <a:r>
-                  <a:rPr lang="en-US" dirty="0"/>
-                  <a:t>How </a:t>
-                </a:r>
-                <a:r>
-                  <a:rPr lang="en-US" i="1" dirty="0"/>
-                  <a:t>specific </a:t>
-                </a:r>
-                <a:r>
-                  <a:rPr lang="en-US" dirty="0"/>
-                  <a:t>is the model?</a:t>
-                </a:r>
-              </a:p>
-              <a:p>
-                <a:pPr marL="0" indent="0">
-                  <a:buNone/>
-                </a:pPr>
-                <a:endParaRPr lang="en-US" b="0" i="1" dirty="0">
-                  <a:latin typeface="Cambria Math" panose="02040503050406030204" pitchFamily="18" charset="0"/>
-                </a:endParaRPr>
-              </a:p>
-              <a:p>
-                <a:pPr marL="0" indent="0">
-                  <a:buNone/>
-                </a:pPr>
-                <a14:m>
-                  <m:oMathPara xmlns:m="http://schemas.openxmlformats.org/officeDocument/2006/math">
-                    <m:oMathParaPr>
-                      <m:jc m:val="centerGroup"/>
-                    </m:oMathParaPr>
-                    <m:oMath xmlns:m="http://schemas.openxmlformats.org/officeDocument/2006/math">
-                      <m:r>
-                        <a:rPr lang="en-US" sz="2800" b="0" i="1" smtClean="0">
-                          <a:latin typeface="Cambria Math" panose="02040503050406030204" pitchFamily="18" charset="0"/>
-                        </a:rPr>
-                        <m:t>𝑃𝑟𝑒𝑐𝑖𝑠𝑖𝑜𝑛</m:t>
-                      </m:r>
-                      <m:r>
-                        <a:rPr lang="en-US" sz="2800" b="0" i="1" smtClean="0">
-                          <a:latin typeface="Cambria Math" panose="02040503050406030204" pitchFamily="18" charset="0"/>
-                        </a:rPr>
-                        <m:t>= </m:t>
-                      </m:r>
-                      <m:f>
-                        <m:fPr>
-                          <m:ctrlPr>
-                            <a:rPr lang="en-US" sz="2800" b="0" i="1" smtClean="0">
-                              <a:latin typeface="Cambria Math" panose="02040503050406030204" pitchFamily="18" charset="0"/>
-                            </a:rPr>
-                          </m:ctrlPr>
-                        </m:fPr>
-                        <m:num>
-                          <m:r>
-                            <a:rPr lang="en-US" sz="2800" b="0" i="1" smtClean="0">
-                              <a:latin typeface="Cambria Math" panose="02040503050406030204" pitchFamily="18" charset="0"/>
-                            </a:rPr>
-                            <m:t>𝑇𝑃</m:t>
-                          </m:r>
-                        </m:num>
-                        <m:den>
-                          <m:r>
-                            <a:rPr lang="en-US" sz="2800" b="0" i="1" smtClean="0">
-                              <a:latin typeface="Cambria Math" panose="02040503050406030204" pitchFamily="18" charset="0"/>
-                            </a:rPr>
-                            <m:t>𝑇𝑃</m:t>
-                          </m:r>
-                          <m:r>
-                            <a:rPr lang="en-US" sz="2800" b="0" i="1" smtClean="0">
-                              <a:latin typeface="Cambria Math" panose="02040503050406030204" pitchFamily="18" charset="0"/>
-                            </a:rPr>
-                            <m:t>+</m:t>
-                          </m:r>
-                          <m:r>
-                            <a:rPr lang="en-US" sz="2800" b="0" i="1" smtClean="0">
-                              <a:latin typeface="Cambria Math" panose="02040503050406030204" pitchFamily="18" charset="0"/>
-                            </a:rPr>
-                            <m:t>𝐹𝑃</m:t>
-                          </m:r>
-                        </m:den>
-                      </m:f>
-                    </m:oMath>
-                  </m:oMathPara>
-                </a14:m>
-                <a:endParaRPr lang="en-US" sz="1600" dirty="0"/>
-              </a:p>
-              <a:p>
-                <a:pPr marL="0" indent="0">
-                  <a:buNone/>
-                </a:pPr>
-                <a:endParaRPr lang="en-US" dirty="0"/>
-              </a:p>
-              <a:p>
-                <a:r>
-                  <a:rPr lang="en-US" dirty="0"/>
-                  <a:t>“How many selected items are relevant to the problem?”</a:t>
-                </a:r>
-              </a:p>
-            </p:txBody>
-          </p:sp>
-        </mc:Choice>
-        <mc:Fallback xmlns="">
-          <p:sp>
-            <p:nvSpPr>
-              <p:cNvPr id="4" name="Content Placeholder 3">
-                <a:extLst>
-                  <a:ext uri="{FF2B5EF4-FFF2-40B4-BE49-F238E27FC236}">
-                    <a16:creationId xmlns:a16="http://schemas.microsoft.com/office/drawing/2014/main" id="{43A44C14-11B5-49CE-A779-A1F040F4A257}"/>
-                  </a:ext>
-                </a:extLst>
-              </p:cNvPr>
-              <p:cNvSpPr>
-                <a:spLocks noGrp="1" noRot="1" noChangeAspect="1" noMove="1" noResize="1" noEditPoints="1" noAdjustHandles="1" noChangeArrowheads="1" noChangeShapeType="1" noTextEdit="1"/>
-              </p:cNvSpPr>
-              <p:nvPr>
-                <p:ph sz="half" idx="2"/>
-              </p:nvPr>
-            </p:nvSpPr>
-            <p:spPr>
-              <a:blipFill>
-                <a:blip r:embed="rId2"/>
-                <a:stretch>
-                  <a:fillRect l="-1264"/>
-                </a:stretch>
-              </a:blipFill>
-            </p:spPr>
-            <p:txBody>
-              <a:bodyPr/>
-              <a:lstStyle/>
-              <a:p>
-                <a:r>
-                  <a:rPr lang="en-US">
-                    <a:noFill/>
-                  </a:rPr>
-                  <a:t> </a:t>
-                </a:r>
-              </a:p>
-            </p:txBody>
-          </p:sp>
-        </mc:Fallback>
-      </mc:AlternateContent>
-      <p:sp>
-        <p:nvSpPr>
-          <p:cNvPr id="5" name="Text Placeholder 4">
-            <a:extLst>
-              <a:ext uri="{FF2B5EF4-FFF2-40B4-BE49-F238E27FC236}">
-                <a16:creationId xmlns:a16="http://schemas.microsoft.com/office/drawing/2014/main" id="{B0EAC4D2-5B52-4DD7-B6F1-805CF2A7C669}"/>
-              </a:ext>
-            </a:extLst>
-          </p:cNvPr>
-          <p:cNvSpPr>
-            <a:spLocks noGrp="1"/>
-          </p:cNvSpPr>
-          <p:nvPr>
-            <p:ph type="body" sz="quarter" idx="3"/>
-          </p:nvPr>
-        </p:nvSpPr>
-        <p:spPr/>
-        <p:txBody>
-          <a:bodyPr/>
-          <a:lstStyle/>
-          <a:p>
-            <a:r>
-              <a:rPr lang="en-US" b="1" dirty="0"/>
-              <a:t>Recall / Sensitivity Score</a:t>
-            </a:r>
-          </a:p>
-        </p:txBody>
-      </p:sp>
-      <mc:AlternateContent xmlns:mc="http://schemas.openxmlformats.org/markup-compatibility/2006" xmlns:a14="http://schemas.microsoft.com/office/drawing/2010/main">
-        <mc:Choice Requires="a14">
-          <p:sp>
-            <p:nvSpPr>
-              <p:cNvPr id="6" name="Content Placeholder 5">
-                <a:extLst>
-                  <a:ext uri="{FF2B5EF4-FFF2-40B4-BE49-F238E27FC236}">
-                    <a16:creationId xmlns:a16="http://schemas.microsoft.com/office/drawing/2014/main" id="{0ECAAA49-F4E9-426C-AEBB-192CBE549293}"/>
-                  </a:ext>
-                </a:extLst>
-              </p:cNvPr>
-              <p:cNvSpPr>
-                <a:spLocks noGrp="1"/>
-              </p:cNvSpPr>
-              <p:nvPr>
-                <p:ph sz="quarter" idx="4"/>
-              </p:nvPr>
-            </p:nvSpPr>
-            <p:spPr/>
-            <p:txBody>
-              <a:bodyPr>
-                <a:normAutofit/>
-              </a:bodyPr>
-              <a:lstStyle/>
-              <a:p>
-                <a:endParaRPr lang="en-US" dirty="0"/>
-              </a:p>
-              <a:p>
-                <a:r>
-                  <a:rPr lang="en-US" dirty="0"/>
-                  <a:t>How </a:t>
-                </a:r>
-                <a:r>
-                  <a:rPr lang="en-US" i="1" dirty="0"/>
-                  <a:t>sensitive </a:t>
-                </a:r>
-                <a:r>
-                  <a:rPr lang="en-US" dirty="0"/>
-                  <a:t>is the model?</a:t>
-                </a:r>
-              </a:p>
-              <a:p>
-                <a:pPr marL="0" indent="0">
-                  <a:buNone/>
-                </a:pPr>
-                <a:endParaRPr lang="en-US" b="0" i="1" dirty="0">
-                  <a:latin typeface="Cambria Math" panose="02040503050406030204" pitchFamily="18" charset="0"/>
-                </a:endParaRPr>
-              </a:p>
-              <a:p>
-                <a:pPr marL="0" indent="0">
-                  <a:buNone/>
-                </a:pPr>
-                <a14:m>
-                  <m:oMathPara xmlns:m="http://schemas.openxmlformats.org/officeDocument/2006/math">
-                    <m:oMathParaPr>
-                      <m:jc m:val="centerGroup"/>
-                    </m:oMathParaPr>
-                    <m:oMath xmlns:m="http://schemas.openxmlformats.org/officeDocument/2006/math">
-                      <m:r>
-                        <a:rPr lang="en-US" sz="2800" b="0" i="1" smtClean="0">
-                          <a:latin typeface="Cambria Math" panose="02040503050406030204" pitchFamily="18" charset="0"/>
-                        </a:rPr>
-                        <m:t>𝑅𝑒𝑐𝑎𝑙𝑙</m:t>
-                      </m:r>
-                      <m:r>
-                        <a:rPr lang="en-US" sz="2800" b="0" i="1" smtClean="0">
-                          <a:latin typeface="Cambria Math" panose="02040503050406030204" pitchFamily="18" charset="0"/>
-                        </a:rPr>
-                        <m:t>= </m:t>
-                      </m:r>
-                      <m:f>
-                        <m:fPr>
-                          <m:ctrlPr>
-                            <a:rPr lang="en-US" sz="2800" b="0" i="1" smtClean="0">
-                              <a:latin typeface="Cambria Math" panose="02040503050406030204" pitchFamily="18" charset="0"/>
-                            </a:rPr>
-                          </m:ctrlPr>
-                        </m:fPr>
-                        <m:num>
-                          <m:r>
-                            <a:rPr lang="en-US" sz="2800" b="0" i="1" smtClean="0">
-                              <a:latin typeface="Cambria Math" panose="02040503050406030204" pitchFamily="18" charset="0"/>
-                            </a:rPr>
-                            <m:t>𝑇𝑃</m:t>
-                          </m:r>
-                        </m:num>
-                        <m:den>
-                          <m:r>
-                            <a:rPr lang="en-US" sz="2800" b="0" i="1" smtClean="0">
-                              <a:latin typeface="Cambria Math" panose="02040503050406030204" pitchFamily="18" charset="0"/>
-                            </a:rPr>
-                            <m:t>𝑇𝑃</m:t>
-                          </m:r>
-                          <m:r>
-                            <a:rPr lang="en-US" sz="2800" b="0" i="1" smtClean="0">
-                              <a:latin typeface="Cambria Math" panose="02040503050406030204" pitchFamily="18" charset="0"/>
-                            </a:rPr>
-                            <m:t>+</m:t>
-                          </m:r>
-                          <m:r>
-                            <a:rPr lang="en-US" sz="2800" b="0" i="1" smtClean="0">
-                              <a:latin typeface="Cambria Math" panose="02040503050406030204" pitchFamily="18" charset="0"/>
-                            </a:rPr>
-                            <m:t>𝐹𝑁</m:t>
-                          </m:r>
-                        </m:den>
-                      </m:f>
-                    </m:oMath>
-                  </m:oMathPara>
-                </a14:m>
-                <a:endParaRPr lang="en-US" sz="2800" dirty="0"/>
-              </a:p>
-              <a:p>
-                <a:endParaRPr lang="en-US" dirty="0"/>
-              </a:p>
-              <a:p>
-                <a:r>
-                  <a:rPr lang="en-US" dirty="0"/>
-                  <a:t>“How many relevant items to the problem were selected?”</a:t>
-                </a:r>
-              </a:p>
-              <a:p>
-                <a:endParaRPr lang="en-US" dirty="0"/>
-              </a:p>
-            </p:txBody>
-          </p:sp>
-        </mc:Choice>
-        <mc:Fallback xmlns="">
-          <p:sp>
-            <p:nvSpPr>
-              <p:cNvPr id="6" name="Content Placeholder 5">
-                <a:extLst>
-                  <a:ext uri="{FF2B5EF4-FFF2-40B4-BE49-F238E27FC236}">
-                    <a16:creationId xmlns:a16="http://schemas.microsoft.com/office/drawing/2014/main" id="{0ECAAA49-F4E9-426C-AEBB-192CBE549293}"/>
-                  </a:ext>
-                </a:extLst>
-              </p:cNvPr>
-              <p:cNvSpPr>
-                <a:spLocks noGrp="1" noRot="1" noChangeAspect="1" noMove="1" noResize="1" noEditPoints="1" noAdjustHandles="1" noChangeArrowheads="1" noChangeShapeType="1" noTextEdit="1"/>
-              </p:cNvSpPr>
-              <p:nvPr>
-                <p:ph sz="quarter" idx="4"/>
-              </p:nvPr>
-            </p:nvSpPr>
-            <p:spPr>
-              <a:blipFill>
-                <a:blip r:embed="rId3"/>
-                <a:stretch>
-                  <a:fillRect l="-1262"/>
-                </a:stretch>
-              </a:blipFill>
-            </p:spPr>
-            <p:txBody>
-              <a:bodyPr/>
-              <a:lstStyle/>
-              <a:p>
-                <a:r>
-                  <a:rPr lang="en-US">
-                    <a:noFill/>
-                  </a:rPr>
-                  <a:t> </a:t>
-                </a:r>
-              </a:p>
-            </p:txBody>
-          </p:sp>
-        </mc:Fallback>
-      </mc:AlternateContent>
-    </p:spTree>
-    <p:extLst>
-      <p:ext uri="{BB962C8B-B14F-4D97-AF65-F5344CB8AC3E}">
-        <p14:creationId xmlns:p14="http://schemas.microsoft.com/office/powerpoint/2010/main" val="3939635069"/>
-      </p:ext>
-    </p:extLst>
-  </p:cSld>
-  <p:clrMapOvr>
-    <a:masterClrMapping/>
-  </p:clrMapOvr>
-</p:sld>
-</file>
-
-<file path=ppt/slides/slide26.xml><?xml version="1.0" encoding="utf-8"?>
-<p:sld xmlns:a="http://schemas.openxmlformats.org/drawingml/2006/main" xmlns:r="http://schemas.openxmlformats.org/officeDocument/2006/relationships" xmlns:p="http://schemas.openxmlformats.org/presentationml/2006/main">
-  <p:cSld>
-    <p:spTree>
-      <p:nvGrpSpPr>
-        <p:cNvPr id="1" name=""/>
-        <p:cNvGrpSpPr/>
-        <p:nvPr/>
-      </p:nvGrpSpPr>
-      <p:grpSpPr>
-        <a:xfrm>
-          <a:off x="0" y="0"/>
-          <a:ext cx="0" cy="0"/>
-          <a:chOff x="0" y="0"/>
-          <a:chExt cx="0" cy="0"/>
-        </a:xfrm>
-      </p:grpSpPr>
-      <p:sp>
-        <p:nvSpPr>
-          <p:cNvPr id="2" name="Title 1">
-            <a:extLst>
-              <a:ext uri="{FF2B5EF4-FFF2-40B4-BE49-F238E27FC236}">
                 <a16:creationId xmlns:a16="http://schemas.microsoft.com/office/drawing/2014/main" id="{8C69528F-A08C-41E8-BE93-D6C4299A90E6}"/>
               </a:ext>
             </a:extLst>
@@ -22657,1160 +22198,6 @@
           </a:p>
         </p:txBody>
       </p:sp>
-      <mc:AlternateContent xmlns:mc="http://schemas.openxmlformats.org/markup-compatibility/2006" xmlns:a14="http://schemas.microsoft.com/office/drawing/2010/main">
-        <mc:Choice Requires="a14">
-          <p:graphicFrame>
-            <p:nvGraphicFramePr>
-              <p:cNvPr id="5" name="Table 5">
-                <a:extLst>
-                  <a:ext uri="{FF2B5EF4-FFF2-40B4-BE49-F238E27FC236}">
-                    <a16:creationId xmlns:a16="http://schemas.microsoft.com/office/drawing/2014/main" id="{0B2ECCAF-A8C9-47DB-817F-EBFEAA4BB2C2}"/>
-                  </a:ext>
-                </a:extLst>
-              </p:cNvPr>
-              <p:cNvGraphicFramePr>
-                <a:graphicFrameLocks noGrp="1"/>
-              </p:cNvGraphicFramePr>
-              <p:nvPr>
-                <p:ph idx="1"/>
-                <p:extLst>
-                  <p:ext uri="{D42A27DB-BD31-4B8C-83A1-F6EECF244321}">
-                    <p14:modId xmlns:p14="http://schemas.microsoft.com/office/powerpoint/2010/main" val="3256228634"/>
-                  </p:ext>
-                </p:extLst>
-              </p:nvPr>
-            </p:nvGraphicFramePr>
-            <p:xfrm>
-              <a:off x="761999" y="1371600"/>
-              <a:ext cx="6400800" cy="4572000"/>
-            </p:xfrm>
-            <a:graphic>
-              <a:graphicData uri="http://schemas.openxmlformats.org/drawingml/2006/table">
-                <a:tbl>
-                  <a:tblPr firstRow="1" bandRow="1">
-                    <a:tableStyleId>{5C22544A-7EE6-4342-B048-85BDC9FD1C3A}</a:tableStyleId>
-                  </a:tblPr>
-                  <a:tblGrid>
-                    <a:gridCol w="1280160">
-                      <a:extLst>
-                        <a:ext uri="{9D8B030D-6E8A-4147-A177-3AD203B41FA5}">
-                          <a16:colId xmlns:a16="http://schemas.microsoft.com/office/drawing/2014/main" val="4009580105"/>
-                        </a:ext>
-                      </a:extLst>
-                    </a:gridCol>
-                    <a:gridCol w="1280160">
-                      <a:extLst>
-                        <a:ext uri="{9D8B030D-6E8A-4147-A177-3AD203B41FA5}">
-                          <a16:colId xmlns:a16="http://schemas.microsoft.com/office/drawing/2014/main" val="3276782937"/>
-                        </a:ext>
-                      </a:extLst>
-                    </a:gridCol>
-                    <a:gridCol w="1280160">
-                      <a:extLst>
-                        <a:ext uri="{9D8B030D-6E8A-4147-A177-3AD203B41FA5}">
-                          <a16:colId xmlns:a16="http://schemas.microsoft.com/office/drawing/2014/main" val="3734813379"/>
-                        </a:ext>
-                      </a:extLst>
-                    </a:gridCol>
-                    <a:gridCol w="1280160">
-                      <a:extLst>
-                        <a:ext uri="{9D8B030D-6E8A-4147-A177-3AD203B41FA5}">
-                          <a16:colId xmlns:a16="http://schemas.microsoft.com/office/drawing/2014/main" val="1443744421"/>
-                        </a:ext>
-                      </a:extLst>
-                    </a:gridCol>
-                    <a:gridCol w="1280160">
-                      <a:extLst>
-                        <a:ext uri="{9D8B030D-6E8A-4147-A177-3AD203B41FA5}">
-                          <a16:colId xmlns:a16="http://schemas.microsoft.com/office/drawing/2014/main" val="1039256635"/>
-                        </a:ext>
-                      </a:extLst>
-                    </a:gridCol>
-                  </a:tblGrid>
-                  <a:tr h="914400">
-                    <a:tc>
-                      <a:txBody>
-                        <a:bodyPr/>
-                        <a:lstStyle/>
-                        <a:p>
-                          <a:pPr algn="ctr"/>
-                          <a:endParaRPr lang="en-US" sz="2000" dirty="0"/>
-                        </a:p>
-                      </a:txBody>
-                      <a:tcPr anchor="ctr"/>
-                    </a:tc>
-                    <a:tc>
-                      <a:txBody>
-                        <a:bodyPr/>
-                        <a:lstStyle/>
-                        <a:p>
-                          <a:pPr algn="ctr"/>
-                          <a:r>
-                            <a:rPr lang="en-US" sz="2000" dirty="0"/>
-                            <a:t>Accuracy</a:t>
-                          </a:r>
-                        </a:p>
-                      </a:txBody>
-                      <a:tcPr anchor="ctr"/>
-                    </a:tc>
-                    <a:tc>
-                      <a:txBody>
-                        <a:bodyPr/>
-                        <a:lstStyle/>
-                        <a:p>
-                          <a:pPr algn="ctr"/>
-                          <a:r>
-                            <a:rPr lang="en-US" sz="2000" dirty="0"/>
-                            <a:t>Precision</a:t>
-                          </a:r>
-                        </a:p>
-                      </a:txBody>
-                      <a:tcPr anchor="ctr"/>
-                    </a:tc>
-                    <a:tc>
-                      <a:txBody>
-                        <a:bodyPr/>
-                        <a:lstStyle/>
-                        <a:p>
-                          <a:pPr algn="ctr"/>
-                          <a:r>
-                            <a:rPr lang="en-US" sz="2000" dirty="0"/>
-                            <a:t>Recall</a:t>
-                          </a:r>
-                        </a:p>
-                      </a:txBody>
-                      <a:tcPr anchor="ctr"/>
-                    </a:tc>
-                    <a:tc>
-                      <a:txBody>
-                        <a:bodyPr/>
-                        <a:lstStyle/>
-                        <a:p>
-                          <a:pPr algn="ctr"/>
-                          <a:r>
-                            <a:rPr lang="en-US" sz="2000" dirty="0"/>
-                            <a:t>F1</a:t>
-                          </a:r>
-                        </a:p>
-                      </a:txBody>
-                      <a:tcPr anchor="ctr"/>
-                    </a:tc>
-                    <a:extLst>
-                      <a:ext uri="{0D108BD9-81ED-4DB2-BD59-A6C34878D82A}">
-                        <a16:rowId xmlns:a16="http://schemas.microsoft.com/office/drawing/2014/main" val="3282941011"/>
-                      </a:ext>
-                    </a:extLst>
-                  </a:tr>
-                  <a:tr h="914400">
-                    <a:tc>
-                      <a:txBody>
-                        <a:bodyPr/>
-                        <a:lstStyle/>
-                        <a:p>
-                          <a:pPr algn="ctr"/>
-                          <a:r>
-                            <a:rPr lang="en-US" sz="2000" dirty="0"/>
-                            <a:t>Average</a:t>
-                          </a:r>
-                        </a:p>
-                      </a:txBody>
-                      <a:tcPr anchor="ctr"/>
-                    </a:tc>
-                    <a:tc>
-                      <a:txBody>
-                        <a:bodyPr/>
-                        <a:lstStyle/>
-                        <a:p>
-                          <a:pPr algn="ctr"/>
-                          <a:r>
-                            <a:rPr lang="en-US" sz="2000" dirty="0"/>
-                            <a:t>99%</a:t>
-                          </a:r>
-                        </a:p>
-                      </a:txBody>
-                      <a:tcPr anchor="ctr"/>
-                    </a:tc>
-                    <a:tc>
-                      <a:txBody>
-                        <a:bodyPr/>
-                        <a:lstStyle/>
-                        <a:p>
-                          <a:pPr algn="ctr"/>
-                          <a:r>
-                            <a:rPr lang="en-US" sz="2000" dirty="0"/>
-                            <a:t>86%</a:t>
-                          </a:r>
-                        </a:p>
-                      </a:txBody>
-                      <a:tcPr anchor="ctr"/>
-                    </a:tc>
-                    <a:tc>
-                      <a:txBody>
-                        <a:bodyPr/>
-                        <a:lstStyle/>
-                        <a:p>
-                          <a:pPr algn="ctr"/>
-                          <a:r>
-                            <a:rPr lang="en-US" sz="2000" dirty="0"/>
-                            <a:t>87%</a:t>
-                          </a:r>
-                        </a:p>
-                      </a:txBody>
-                      <a:tcPr anchor="ctr"/>
-                    </a:tc>
-                    <a:tc>
-                      <a:txBody>
-                        <a:bodyPr/>
-                        <a:lstStyle/>
-                        <a:p>
-                          <a:pPr algn="ctr"/>
-                          <a:r>
-                            <a:rPr lang="en-US" sz="2000" dirty="0"/>
-                            <a:t>85%</a:t>
-                          </a:r>
-                        </a:p>
-                      </a:txBody>
-                      <a:tcPr anchor="ctr"/>
-                    </a:tc>
-                    <a:extLst>
-                      <a:ext uri="{0D108BD9-81ED-4DB2-BD59-A6C34878D82A}">
-                        <a16:rowId xmlns:a16="http://schemas.microsoft.com/office/drawing/2014/main" val="1061077293"/>
-                      </a:ext>
-                    </a:extLst>
-                  </a:tr>
-                  <a:tr h="914400">
-                    <a:tc>
-                      <a:txBody>
-                        <a:bodyPr/>
-                        <a:lstStyle/>
-                        <a:p>
-                          <a:pPr algn="ctr"/>
-                          <a:r>
-                            <a:rPr lang="en-US" sz="2000" dirty="0"/>
-                            <a:t>Low</a:t>
-                          </a:r>
-                        </a:p>
-                      </a:txBody>
-                      <a:tcPr anchor="ctr"/>
-                    </a:tc>
-                    <a:tc>
-                      <a:txBody>
-                        <a:bodyPr/>
-                        <a:lstStyle/>
-                        <a:p>
-                          <a:pPr marL="0" marR="0" lvl="0" indent="0" algn="ctr" defTabSz="914400" rtl="0" eaLnBrk="1" fontAlgn="auto" latinLnBrk="0" hangingPunct="1">
-                            <a:lnSpc>
-                              <a:spcPct val="100000"/>
-                            </a:lnSpc>
-                            <a:spcBef>
-                              <a:spcPts val="0"/>
-                            </a:spcBef>
-                            <a:spcAft>
-                              <a:spcPts val="0"/>
-                            </a:spcAft>
-                            <a:buClrTx/>
-                            <a:buSzTx/>
-                            <a:buFontTx/>
-                            <a:buNone/>
-                            <a:tabLst/>
-                            <a:defRPr/>
-                          </a:pPr>
-                          <a:r>
-                            <a:rPr lang="en-US" sz="2000" dirty="0"/>
-                            <a:t>99%</a:t>
-                          </a:r>
-                        </a:p>
-                      </a:txBody>
-                      <a:tcPr anchor="ctr"/>
-                    </a:tc>
-                    <a:tc>
-                      <a:txBody>
-                        <a:bodyPr/>
-                        <a:lstStyle/>
-                        <a:p>
-                          <a:pPr algn="ctr"/>
-                          <a:r>
-                            <a:rPr lang="en-US" sz="2000" dirty="0"/>
-                            <a:t>84%</a:t>
-                          </a:r>
-                        </a:p>
-                      </a:txBody>
-                      <a:tcPr anchor="ctr"/>
-                    </a:tc>
-                    <a:tc>
-                      <a:txBody>
-                        <a:bodyPr/>
-                        <a:lstStyle/>
-                        <a:p>
-                          <a:pPr algn="ctr"/>
-                          <a:r>
-                            <a:rPr lang="en-US" sz="2000" dirty="0"/>
-                            <a:t>84%</a:t>
-                          </a:r>
-                        </a:p>
-                      </a:txBody>
-                      <a:tcPr anchor="ctr"/>
-                    </a:tc>
-                    <a:tc>
-                      <a:txBody>
-                        <a:bodyPr/>
-                        <a:lstStyle/>
-                        <a:p>
-                          <a:pPr algn="ctr"/>
-                          <a:r>
-                            <a:rPr lang="en-US" sz="2000" dirty="0"/>
-                            <a:t>83%</a:t>
-                          </a:r>
-                        </a:p>
-                      </a:txBody>
-                      <a:tcPr anchor="ctr"/>
-                    </a:tc>
-                    <a:extLst>
-                      <a:ext uri="{0D108BD9-81ED-4DB2-BD59-A6C34878D82A}">
-                        <a16:rowId xmlns:a16="http://schemas.microsoft.com/office/drawing/2014/main" val="3258978186"/>
-                      </a:ext>
-                    </a:extLst>
-                  </a:tr>
-                  <a:tr h="914400">
-                    <a:tc>
-                      <a:txBody>
-                        <a:bodyPr/>
-                        <a:lstStyle/>
-                        <a:p>
-                          <a:pPr algn="ctr"/>
-                          <a:r>
-                            <a:rPr lang="en-US" sz="2000" dirty="0"/>
-                            <a:t>High</a:t>
-                          </a:r>
-                        </a:p>
-                      </a:txBody>
-                      <a:tcPr anchor="ctr"/>
-                    </a:tc>
-                    <a:tc>
-                      <a:txBody>
-                        <a:bodyPr/>
-                        <a:lstStyle/>
-                        <a:p>
-                          <a:pPr marL="0" marR="0" lvl="0" indent="0" algn="ctr" defTabSz="914400" rtl="0" eaLnBrk="1" fontAlgn="auto" latinLnBrk="0" hangingPunct="1">
-                            <a:lnSpc>
-                              <a:spcPct val="100000"/>
-                            </a:lnSpc>
-                            <a:spcBef>
-                              <a:spcPts val="0"/>
-                            </a:spcBef>
-                            <a:spcAft>
-                              <a:spcPts val="0"/>
-                            </a:spcAft>
-                            <a:buClrTx/>
-                            <a:buSzTx/>
-                            <a:buFontTx/>
-                            <a:buNone/>
-                            <a:tabLst/>
-                            <a:defRPr/>
-                          </a:pPr>
-                          <a:r>
-                            <a:rPr lang="en-US" sz="2000" dirty="0"/>
-                            <a:t>99%</a:t>
-                          </a:r>
-                        </a:p>
-                      </a:txBody>
-                      <a:tcPr anchor="ctr"/>
-                    </a:tc>
-                    <a:tc>
-                      <a:txBody>
-                        <a:bodyPr/>
-                        <a:lstStyle/>
-                        <a:p>
-                          <a:pPr algn="ctr"/>
-                          <a:r>
-                            <a:rPr lang="en-US" sz="2000" dirty="0"/>
-                            <a:t>89%</a:t>
-                          </a:r>
-                        </a:p>
-                      </a:txBody>
-                      <a:tcPr anchor="ctr"/>
-                    </a:tc>
-                    <a:tc>
-                      <a:txBody>
-                        <a:bodyPr/>
-                        <a:lstStyle/>
-                        <a:p>
-                          <a:pPr algn="ctr"/>
-                          <a:r>
-                            <a:rPr lang="en-US" sz="2000" dirty="0"/>
-                            <a:t>90%</a:t>
-                          </a:r>
-                        </a:p>
-                      </a:txBody>
-                      <a:tcPr anchor="ctr"/>
-                    </a:tc>
-                    <a:tc>
-                      <a:txBody>
-                        <a:bodyPr/>
-                        <a:lstStyle/>
-                        <a:p>
-                          <a:pPr algn="ctr"/>
-                          <a:r>
-                            <a:rPr lang="en-US" sz="2000" dirty="0"/>
-                            <a:t>88%</a:t>
-                          </a:r>
-                        </a:p>
-                      </a:txBody>
-                      <a:tcPr anchor="ctr"/>
-                    </a:tc>
-                    <a:extLst>
-                      <a:ext uri="{0D108BD9-81ED-4DB2-BD59-A6C34878D82A}">
-                        <a16:rowId xmlns:a16="http://schemas.microsoft.com/office/drawing/2014/main" val="3467709775"/>
-                      </a:ext>
-                    </a:extLst>
-                  </a:tr>
-                  <a:tr h="914400">
-                    <a:tc>
-                      <a:txBody>
-                        <a:bodyPr/>
-                        <a:lstStyle/>
-                        <a:p>
-                          <a:pPr algn="ctr"/>
-                          <a:r>
-                            <a:rPr lang="en-US" sz="2000" dirty="0"/>
-                            <a:t>Var</a:t>
-                          </a:r>
-                        </a:p>
-                      </a:txBody>
-                      <a:tcPr anchor="ctr"/>
-                    </a:tc>
-                    <a:tc>
-                      <a:txBody>
-                        <a:bodyPr/>
-                        <a:lstStyle/>
-                        <a:p>
-                          <a:pPr marL="0" marR="0" lvl="0" indent="0" algn="ctr" defTabSz="914400" rtl="0" eaLnBrk="1" fontAlgn="auto" latinLnBrk="0" hangingPunct="1">
-                            <a:lnSpc>
-                              <a:spcPct val="100000"/>
-                            </a:lnSpc>
-                            <a:spcBef>
-                              <a:spcPts val="0"/>
-                            </a:spcBef>
-                            <a:spcAft>
-                              <a:spcPts val="0"/>
-                            </a:spcAft>
-                            <a:buClrTx/>
-                            <a:buSzTx/>
-                            <a:buFontTx/>
-                            <a:buNone/>
-                            <a:tabLst/>
-                            <a:defRPr/>
-                          </a:pPr>
-                          <a14:m>
-                            <m:oMathPara xmlns:m="http://schemas.openxmlformats.org/officeDocument/2006/math">
-                              <m:oMathParaPr>
-                                <m:jc m:val="centerGroup"/>
-                              </m:oMathParaPr>
-                              <m:oMath xmlns:m="http://schemas.openxmlformats.org/officeDocument/2006/math">
-                                <m:r>
-                                  <a:rPr lang="en-US" sz="1800" b="0" i="1" smtClean="0">
-                                    <a:latin typeface="Cambria Math" panose="02040503050406030204" pitchFamily="18" charset="0"/>
-                                  </a:rPr>
-                                  <m:t>2.9×</m:t>
-                                </m:r>
-                                <m:sSup>
-                                  <m:sSupPr>
-                                    <m:ctrlPr>
-                                      <a:rPr lang="en-US" sz="1800" b="0" i="1" smtClean="0">
-                                        <a:latin typeface="Cambria Math" panose="02040503050406030204" pitchFamily="18" charset="0"/>
-                                      </a:rPr>
-                                    </m:ctrlPr>
-                                  </m:sSupPr>
-                                  <m:e>
-                                    <m:r>
-                                      <a:rPr lang="en-US" sz="1800" b="0" i="1" smtClean="0">
-                                        <a:latin typeface="Cambria Math" panose="02040503050406030204" pitchFamily="18" charset="0"/>
-                                      </a:rPr>
-                                      <m:t>10</m:t>
-                                    </m:r>
-                                  </m:e>
-                                  <m:sup>
-                                    <m:r>
-                                      <a:rPr lang="en-US" sz="1800" b="0" i="1" smtClean="0">
-                                        <a:latin typeface="Cambria Math" panose="02040503050406030204" pitchFamily="18" charset="0"/>
-                                      </a:rPr>
-                                      <m:t>−7</m:t>
-                                    </m:r>
-                                  </m:sup>
-                                </m:sSup>
-                              </m:oMath>
-                            </m:oMathPara>
-                          </a14:m>
-                          <a:endParaRPr lang="en-US" sz="1800" dirty="0"/>
-                        </a:p>
-                      </a:txBody>
-                      <a:tcPr anchor="ctr"/>
-                    </a:tc>
-                    <a:tc>
-                      <a:txBody>
-                        <a:bodyPr/>
-                        <a:lstStyle/>
-                        <a:p>
-                          <a:pPr algn="ctr"/>
-                          <a14:m>
-                            <m:oMathPara xmlns:m="http://schemas.openxmlformats.org/officeDocument/2006/math">
-                              <m:oMathParaPr>
-                                <m:jc m:val="centerGroup"/>
-                              </m:oMathParaPr>
-                              <m:oMath xmlns:m="http://schemas.openxmlformats.org/officeDocument/2006/math">
-                                <m:r>
-                                  <a:rPr lang="en-US" sz="1800" b="0" i="1" smtClean="0">
-                                    <a:latin typeface="Cambria Math" panose="02040503050406030204" pitchFamily="18" charset="0"/>
-                                  </a:rPr>
-                                  <m:t>2.2×</m:t>
-                                </m:r>
-                                <m:sSup>
-                                  <m:sSupPr>
-                                    <m:ctrlPr>
-                                      <a:rPr lang="en-US" sz="1800" b="0" i="1" smtClean="0">
-                                        <a:latin typeface="Cambria Math" panose="02040503050406030204" pitchFamily="18" charset="0"/>
-                                      </a:rPr>
-                                    </m:ctrlPr>
-                                  </m:sSupPr>
-                                  <m:e>
-                                    <m:r>
-                                      <a:rPr lang="en-US" sz="1800" b="0" i="1" smtClean="0">
-                                        <a:latin typeface="Cambria Math" panose="02040503050406030204" pitchFamily="18" charset="0"/>
-                                      </a:rPr>
-                                      <m:t>10</m:t>
-                                    </m:r>
-                                  </m:e>
-                                  <m:sup>
-                                    <m:r>
-                                      <a:rPr lang="en-US" sz="1800" b="0" i="1" smtClean="0">
-                                        <a:latin typeface="Cambria Math" panose="02040503050406030204" pitchFamily="18" charset="0"/>
-                                      </a:rPr>
-                                      <m:t>−4</m:t>
-                                    </m:r>
-                                  </m:sup>
-                                </m:sSup>
-                              </m:oMath>
-                            </m:oMathPara>
-                          </a14:m>
-                          <a:endParaRPr lang="en-US" sz="1800" dirty="0"/>
-                        </a:p>
-                      </a:txBody>
-                      <a:tcPr anchor="ctr"/>
-                    </a:tc>
-                    <a:tc>
-                      <a:txBody>
-                        <a:bodyPr/>
-                        <a:lstStyle/>
-                        <a:p>
-                          <a:pPr algn="ctr"/>
-                          <a14:m>
-                            <m:oMathPara xmlns:m="http://schemas.openxmlformats.org/officeDocument/2006/math">
-                              <m:oMathParaPr>
-                                <m:jc m:val="centerGroup"/>
-                              </m:oMathParaPr>
-                              <m:oMath xmlns:m="http://schemas.openxmlformats.org/officeDocument/2006/math">
-                                <m:r>
-                                  <a:rPr lang="en-US" sz="1800" b="0" i="1" smtClean="0">
-                                    <a:latin typeface="Cambria Math" panose="02040503050406030204" pitchFamily="18" charset="0"/>
-                                  </a:rPr>
-                                  <m:t>3.7×</m:t>
-                                </m:r>
-                                <m:sSup>
-                                  <m:sSupPr>
-                                    <m:ctrlPr>
-                                      <a:rPr lang="en-US" sz="1800" b="0" i="1" smtClean="0">
-                                        <a:latin typeface="Cambria Math" panose="02040503050406030204" pitchFamily="18" charset="0"/>
-                                      </a:rPr>
-                                    </m:ctrlPr>
-                                  </m:sSupPr>
-                                  <m:e>
-                                    <m:r>
-                                      <a:rPr lang="en-US" sz="1800" b="0" i="1" smtClean="0">
-                                        <a:latin typeface="Cambria Math" panose="02040503050406030204" pitchFamily="18" charset="0"/>
-                                      </a:rPr>
-                                      <m:t>10</m:t>
-                                    </m:r>
-                                  </m:e>
-                                  <m:sup>
-                                    <m:r>
-                                      <a:rPr lang="en-US" sz="1800" b="0" i="1" smtClean="0">
-                                        <a:latin typeface="Cambria Math" panose="02040503050406030204" pitchFamily="18" charset="0"/>
-                                      </a:rPr>
-                                      <m:t>−4</m:t>
-                                    </m:r>
-                                  </m:sup>
-                                </m:sSup>
-                              </m:oMath>
-                            </m:oMathPara>
-                          </a14:m>
-                          <a:endParaRPr lang="en-US" sz="1800" dirty="0"/>
-                        </a:p>
-                      </a:txBody>
-                      <a:tcPr anchor="ctr"/>
-                    </a:tc>
-                    <a:tc>
-                      <a:txBody>
-                        <a:bodyPr/>
-                        <a:lstStyle/>
-                        <a:p>
-                          <a:pPr algn="ctr"/>
-                          <a14:m>
-                            <m:oMathPara xmlns:m="http://schemas.openxmlformats.org/officeDocument/2006/math">
-                              <m:oMathParaPr>
-                                <m:jc m:val="centerGroup"/>
-                              </m:oMathParaPr>
-                              <m:oMath xmlns:m="http://schemas.openxmlformats.org/officeDocument/2006/math">
-                                <m:r>
-                                  <a:rPr lang="en-US" sz="1800" b="0" i="1" smtClean="0">
-                                    <a:latin typeface="Cambria Math" panose="02040503050406030204" pitchFamily="18" charset="0"/>
-                                  </a:rPr>
-                                  <m:t>2.9×</m:t>
-                                </m:r>
-                                <m:sSup>
-                                  <m:sSupPr>
-                                    <m:ctrlPr>
-                                      <a:rPr lang="en-US" sz="1800" b="0" i="1" smtClean="0">
-                                        <a:latin typeface="Cambria Math" panose="02040503050406030204" pitchFamily="18" charset="0"/>
-                                      </a:rPr>
-                                    </m:ctrlPr>
-                                  </m:sSupPr>
-                                  <m:e>
-                                    <m:r>
-                                      <a:rPr lang="en-US" sz="1800" b="0" i="1" smtClean="0">
-                                        <a:latin typeface="Cambria Math" panose="02040503050406030204" pitchFamily="18" charset="0"/>
-                                      </a:rPr>
-                                      <m:t>10</m:t>
-                                    </m:r>
-                                  </m:e>
-                                  <m:sup>
-                                    <m:r>
-                                      <a:rPr lang="en-US" sz="1800" b="0" i="1" smtClean="0">
-                                        <a:latin typeface="Cambria Math" panose="02040503050406030204" pitchFamily="18" charset="0"/>
-                                      </a:rPr>
-                                      <m:t>−4</m:t>
-                                    </m:r>
-                                  </m:sup>
-                                </m:sSup>
-                              </m:oMath>
-                            </m:oMathPara>
-                          </a14:m>
-                          <a:endParaRPr lang="en-US" sz="1800" dirty="0"/>
-                        </a:p>
-                      </a:txBody>
-                      <a:tcPr anchor="ctr"/>
-                    </a:tc>
-                    <a:extLst>
-                      <a:ext uri="{0D108BD9-81ED-4DB2-BD59-A6C34878D82A}">
-                        <a16:rowId xmlns:a16="http://schemas.microsoft.com/office/drawing/2014/main" val="1908144934"/>
-                      </a:ext>
-                    </a:extLst>
-                  </a:tr>
-                </a:tbl>
-              </a:graphicData>
-            </a:graphic>
-          </p:graphicFrame>
-        </mc:Choice>
-        <mc:Fallback xmlns="">
-          <p:graphicFrame>
-            <p:nvGraphicFramePr>
-              <p:cNvPr id="5" name="Table 5">
-                <a:extLst>
-                  <a:ext uri="{FF2B5EF4-FFF2-40B4-BE49-F238E27FC236}">
-                    <a16:creationId xmlns:a16="http://schemas.microsoft.com/office/drawing/2014/main" id="{0B2ECCAF-A8C9-47DB-817F-EBFEAA4BB2C2}"/>
-                  </a:ext>
-                </a:extLst>
-              </p:cNvPr>
-              <p:cNvGraphicFramePr>
-                <a:graphicFrameLocks noGrp="1"/>
-              </p:cNvGraphicFramePr>
-              <p:nvPr>
-                <p:ph idx="1"/>
-                <p:extLst>
-                  <p:ext uri="{D42A27DB-BD31-4B8C-83A1-F6EECF244321}">
-                    <p14:modId xmlns:p14="http://schemas.microsoft.com/office/powerpoint/2010/main" val="3256228634"/>
-                  </p:ext>
-                </p:extLst>
-              </p:nvPr>
-            </p:nvGraphicFramePr>
-            <p:xfrm>
-              <a:off x="761999" y="1371600"/>
-              <a:ext cx="6400800" cy="4572000"/>
-            </p:xfrm>
-            <a:graphic>
-              <a:graphicData uri="http://schemas.openxmlformats.org/drawingml/2006/table">
-                <a:tbl>
-                  <a:tblPr firstRow="1" bandRow="1">
-                    <a:tableStyleId>{5C22544A-7EE6-4342-B048-85BDC9FD1C3A}</a:tableStyleId>
-                  </a:tblPr>
-                  <a:tblGrid>
-                    <a:gridCol w="1280160">
-                      <a:extLst>
-                        <a:ext uri="{9D8B030D-6E8A-4147-A177-3AD203B41FA5}">
-                          <a16:colId xmlns:a16="http://schemas.microsoft.com/office/drawing/2014/main" val="4009580105"/>
-                        </a:ext>
-                      </a:extLst>
-                    </a:gridCol>
-                    <a:gridCol w="1280160">
-                      <a:extLst>
-                        <a:ext uri="{9D8B030D-6E8A-4147-A177-3AD203B41FA5}">
-                          <a16:colId xmlns:a16="http://schemas.microsoft.com/office/drawing/2014/main" val="3276782937"/>
-                        </a:ext>
-                      </a:extLst>
-                    </a:gridCol>
-                    <a:gridCol w="1280160">
-                      <a:extLst>
-                        <a:ext uri="{9D8B030D-6E8A-4147-A177-3AD203B41FA5}">
-                          <a16:colId xmlns:a16="http://schemas.microsoft.com/office/drawing/2014/main" val="3734813379"/>
-                        </a:ext>
-                      </a:extLst>
-                    </a:gridCol>
-                    <a:gridCol w="1280160">
-                      <a:extLst>
-                        <a:ext uri="{9D8B030D-6E8A-4147-A177-3AD203B41FA5}">
-                          <a16:colId xmlns:a16="http://schemas.microsoft.com/office/drawing/2014/main" val="1443744421"/>
-                        </a:ext>
-                      </a:extLst>
-                    </a:gridCol>
-                    <a:gridCol w="1280160">
-                      <a:extLst>
-                        <a:ext uri="{9D8B030D-6E8A-4147-A177-3AD203B41FA5}">
-                          <a16:colId xmlns:a16="http://schemas.microsoft.com/office/drawing/2014/main" val="1039256635"/>
-                        </a:ext>
-                      </a:extLst>
-                    </a:gridCol>
-                  </a:tblGrid>
-                  <a:tr h="914400">
-                    <a:tc>
-                      <a:txBody>
-                        <a:bodyPr/>
-                        <a:lstStyle/>
-                        <a:p>
-                          <a:pPr algn="ctr"/>
-                          <a:endParaRPr lang="en-US" sz="2000" dirty="0"/>
-                        </a:p>
-                      </a:txBody>
-                      <a:tcPr anchor="ctr"/>
-                    </a:tc>
-                    <a:tc>
-                      <a:txBody>
-                        <a:bodyPr/>
-                        <a:lstStyle/>
-                        <a:p>
-                          <a:pPr algn="ctr"/>
-                          <a:r>
-                            <a:rPr lang="en-US" sz="2000" dirty="0"/>
-                            <a:t>Accuracy</a:t>
-                          </a:r>
-                        </a:p>
-                      </a:txBody>
-                      <a:tcPr anchor="ctr"/>
-                    </a:tc>
-                    <a:tc>
-                      <a:txBody>
-                        <a:bodyPr/>
-                        <a:lstStyle/>
-                        <a:p>
-                          <a:pPr algn="ctr"/>
-                          <a:r>
-                            <a:rPr lang="en-US" sz="2000" dirty="0"/>
-                            <a:t>Precision</a:t>
-                          </a:r>
-                        </a:p>
-                      </a:txBody>
-                      <a:tcPr anchor="ctr"/>
-                    </a:tc>
-                    <a:tc>
-                      <a:txBody>
-                        <a:bodyPr/>
-                        <a:lstStyle/>
-                        <a:p>
-                          <a:pPr algn="ctr"/>
-                          <a:r>
-                            <a:rPr lang="en-US" sz="2000" dirty="0"/>
-                            <a:t>Recall</a:t>
-                          </a:r>
-                        </a:p>
-                      </a:txBody>
-                      <a:tcPr anchor="ctr"/>
-                    </a:tc>
-                    <a:tc>
-                      <a:txBody>
-                        <a:bodyPr/>
-                        <a:lstStyle/>
-                        <a:p>
-                          <a:pPr algn="ctr"/>
-                          <a:r>
-                            <a:rPr lang="en-US" sz="2000" dirty="0"/>
-                            <a:t>F1</a:t>
-                          </a:r>
-                        </a:p>
-                      </a:txBody>
-                      <a:tcPr anchor="ctr"/>
-                    </a:tc>
-                    <a:extLst>
-                      <a:ext uri="{0D108BD9-81ED-4DB2-BD59-A6C34878D82A}">
-                        <a16:rowId xmlns:a16="http://schemas.microsoft.com/office/drawing/2014/main" val="3282941011"/>
-                      </a:ext>
-                    </a:extLst>
-                  </a:tr>
-                  <a:tr h="914400">
-                    <a:tc>
-                      <a:txBody>
-                        <a:bodyPr/>
-                        <a:lstStyle/>
-                        <a:p>
-                          <a:pPr algn="ctr"/>
-                          <a:r>
-                            <a:rPr lang="en-US" sz="2000" dirty="0"/>
-                            <a:t>Average</a:t>
-                          </a:r>
-                        </a:p>
-                      </a:txBody>
-                      <a:tcPr anchor="ctr"/>
-                    </a:tc>
-                    <a:tc>
-                      <a:txBody>
-                        <a:bodyPr/>
-                        <a:lstStyle/>
-                        <a:p>
-                          <a:pPr algn="ctr"/>
-                          <a:r>
-                            <a:rPr lang="en-US" sz="2000" dirty="0"/>
-                            <a:t>99%</a:t>
-                          </a:r>
-                        </a:p>
-                      </a:txBody>
-                      <a:tcPr anchor="ctr"/>
-                    </a:tc>
-                    <a:tc>
-                      <a:txBody>
-                        <a:bodyPr/>
-                        <a:lstStyle/>
-                        <a:p>
-                          <a:pPr algn="ctr"/>
-                          <a:r>
-                            <a:rPr lang="en-US" sz="2000" dirty="0"/>
-                            <a:t>86%</a:t>
-                          </a:r>
-                        </a:p>
-                      </a:txBody>
-                      <a:tcPr anchor="ctr"/>
-                    </a:tc>
-                    <a:tc>
-                      <a:txBody>
-                        <a:bodyPr/>
-                        <a:lstStyle/>
-                        <a:p>
-                          <a:pPr algn="ctr"/>
-                          <a:r>
-                            <a:rPr lang="en-US" sz="2000" dirty="0"/>
-                            <a:t>87%</a:t>
-                          </a:r>
-                        </a:p>
-                      </a:txBody>
-                      <a:tcPr anchor="ctr"/>
-                    </a:tc>
-                    <a:tc>
-                      <a:txBody>
-                        <a:bodyPr/>
-                        <a:lstStyle/>
-                        <a:p>
-                          <a:pPr algn="ctr"/>
-                          <a:r>
-                            <a:rPr lang="en-US" sz="2000" dirty="0"/>
-                            <a:t>85%</a:t>
-                          </a:r>
-                        </a:p>
-                      </a:txBody>
-                      <a:tcPr anchor="ctr"/>
-                    </a:tc>
-                    <a:extLst>
-                      <a:ext uri="{0D108BD9-81ED-4DB2-BD59-A6C34878D82A}">
-                        <a16:rowId xmlns:a16="http://schemas.microsoft.com/office/drawing/2014/main" val="1061077293"/>
-                      </a:ext>
-                    </a:extLst>
-                  </a:tr>
-                  <a:tr h="914400">
-                    <a:tc>
-                      <a:txBody>
-                        <a:bodyPr/>
-                        <a:lstStyle/>
-                        <a:p>
-                          <a:pPr algn="ctr"/>
-                          <a:r>
-                            <a:rPr lang="en-US" sz="2000" dirty="0"/>
-                            <a:t>Low</a:t>
-                          </a:r>
-                        </a:p>
-                      </a:txBody>
-                      <a:tcPr anchor="ctr"/>
-                    </a:tc>
-                    <a:tc>
-                      <a:txBody>
-                        <a:bodyPr/>
-                        <a:lstStyle/>
-                        <a:p>
-                          <a:pPr marL="0" marR="0" lvl="0" indent="0" algn="ctr" defTabSz="914400" rtl="0" eaLnBrk="1" fontAlgn="auto" latinLnBrk="0" hangingPunct="1">
-                            <a:lnSpc>
-                              <a:spcPct val="100000"/>
-                            </a:lnSpc>
-                            <a:spcBef>
-                              <a:spcPts val="0"/>
-                            </a:spcBef>
-                            <a:spcAft>
-                              <a:spcPts val="0"/>
-                            </a:spcAft>
-                            <a:buClrTx/>
-                            <a:buSzTx/>
-                            <a:buFontTx/>
-                            <a:buNone/>
-                            <a:tabLst/>
-                            <a:defRPr/>
-                          </a:pPr>
-                          <a:r>
-                            <a:rPr lang="en-US" sz="2000" dirty="0"/>
-                            <a:t>99%</a:t>
-                          </a:r>
-                        </a:p>
-                      </a:txBody>
-                      <a:tcPr anchor="ctr"/>
-                    </a:tc>
-                    <a:tc>
-                      <a:txBody>
-                        <a:bodyPr/>
-                        <a:lstStyle/>
-                        <a:p>
-                          <a:pPr algn="ctr"/>
-                          <a:r>
-                            <a:rPr lang="en-US" sz="2000" dirty="0"/>
-                            <a:t>84%</a:t>
-                          </a:r>
-                        </a:p>
-                      </a:txBody>
-                      <a:tcPr anchor="ctr"/>
-                    </a:tc>
-                    <a:tc>
-                      <a:txBody>
-                        <a:bodyPr/>
-                        <a:lstStyle/>
-                        <a:p>
-                          <a:pPr algn="ctr"/>
-                          <a:r>
-                            <a:rPr lang="en-US" sz="2000" dirty="0"/>
-                            <a:t>84%</a:t>
-                          </a:r>
-                        </a:p>
-                      </a:txBody>
-                      <a:tcPr anchor="ctr"/>
-                    </a:tc>
-                    <a:tc>
-                      <a:txBody>
-                        <a:bodyPr/>
-                        <a:lstStyle/>
-                        <a:p>
-                          <a:pPr algn="ctr"/>
-                          <a:r>
-                            <a:rPr lang="en-US" sz="2000" dirty="0"/>
-                            <a:t>83%</a:t>
-                          </a:r>
-                        </a:p>
-                      </a:txBody>
-                      <a:tcPr anchor="ctr"/>
-                    </a:tc>
-                    <a:extLst>
-                      <a:ext uri="{0D108BD9-81ED-4DB2-BD59-A6C34878D82A}">
-                        <a16:rowId xmlns:a16="http://schemas.microsoft.com/office/drawing/2014/main" val="3258978186"/>
-                      </a:ext>
-                    </a:extLst>
-                  </a:tr>
-                  <a:tr h="914400">
-                    <a:tc>
-                      <a:txBody>
-                        <a:bodyPr/>
-                        <a:lstStyle/>
-                        <a:p>
-                          <a:pPr algn="ctr"/>
-                          <a:r>
-                            <a:rPr lang="en-US" sz="2000" dirty="0"/>
-                            <a:t>High</a:t>
-                          </a:r>
-                        </a:p>
-                      </a:txBody>
-                      <a:tcPr anchor="ctr"/>
-                    </a:tc>
-                    <a:tc>
-                      <a:txBody>
-                        <a:bodyPr/>
-                        <a:lstStyle/>
-                        <a:p>
-                          <a:pPr marL="0" marR="0" lvl="0" indent="0" algn="ctr" defTabSz="914400" rtl="0" eaLnBrk="1" fontAlgn="auto" latinLnBrk="0" hangingPunct="1">
-                            <a:lnSpc>
-                              <a:spcPct val="100000"/>
-                            </a:lnSpc>
-                            <a:spcBef>
-                              <a:spcPts val="0"/>
-                            </a:spcBef>
-                            <a:spcAft>
-                              <a:spcPts val="0"/>
-                            </a:spcAft>
-                            <a:buClrTx/>
-                            <a:buSzTx/>
-                            <a:buFontTx/>
-                            <a:buNone/>
-                            <a:tabLst/>
-                            <a:defRPr/>
-                          </a:pPr>
-                          <a:r>
-                            <a:rPr lang="en-US" sz="2000" dirty="0"/>
-                            <a:t>99%</a:t>
-                          </a:r>
-                        </a:p>
-                      </a:txBody>
-                      <a:tcPr anchor="ctr"/>
-                    </a:tc>
-                    <a:tc>
-                      <a:txBody>
-                        <a:bodyPr/>
-                        <a:lstStyle/>
-                        <a:p>
-                          <a:pPr algn="ctr"/>
-                          <a:r>
-                            <a:rPr lang="en-US" sz="2000" dirty="0"/>
-                            <a:t>89%</a:t>
-                          </a:r>
-                        </a:p>
-                      </a:txBody>
-                      <a:tcPr anchor="ctr"/>
-                    </a:tc>
-                    <a:tc>
-                      <a:txBody>
-                        <a:bodyPr/>
-                        <a:lstStyle/>
-                        <a:p>
-                          <a:pPr algn="ctr"/>
-                          <a:r>
-                            <a:rPr lang="en-US" sz="2000" dirty="0"/>
-                            <a:t>90%</a:t>
-                          </a:r>
-                        </a:p>
-                      </a:txBody>
-                      <a:tcPr anchor="ctr"/>
-                    </a:tc>
-                    <a:tc>
-                      <a:txBody>
-                        <a:bodyPr/>
-                        <a:lstStyle/>
-                        <a:p>
-                          <a:pPr algn="ctr"/>
-                          <a:r>
-                            <a:rPr lang="en-US" sz="2000" dirty="0"/>
-                            <a:t>88%</a:t>
-                          </a:r>
-                        </a:p>
-                      </a:txBody>
-                      <a:tcPr anchor="ctr"/>
-                    </a:tc>
-                    <a:extLst>
-                      <a:ext uri="{0D108BD9-81ED-4DB2-BD59-A6C34878D82A}">
-                        <a16:rowId xmlns:a16="http://schemas.microsoft.com/office/drawing/2014/main" val="3467709775"/>
-                      </a:ext>
-                    </a:extLst>
-                  </a:tr>
-                  <a:tr h="914400">
-                    <a:tc>
-                      <a:txBody>
-                        <a:bodyPr/>
-                        <a:lstStyle/>
-                        <a:p>
-                          <a:pPr algn="ctr"/>
-                          <a:r>
-                            <a:rPr lang="en-US" sz="2000" dirty="0"/>
-                            <a:t>Var</a:t>
-                          </a:r>
-                        </a:p>
-                      </a:txBody>
-                      <a:tcPr anchor="ctr"/>
-                    </a:tc>
-                    <a:tc>
-                      <a:txBody>
-                        <a:bodyPr/>
-                        <a:lstStyle/>
-                        <a:p>
-                          <a:endParaRPr lang="en-US"/>
-                        </a:p>
-                      </a:txBody>
-                      <a:tcPr anchor="ctr">
-                        <a:blipFill>
-                          <a:blip r:embed="rId2"/>
-                          <a:stretch>
-                            <a:fillRect l="-100476" t="-401333" r="-302857" b="-2000"/>
-                          </a:stretch>
-                        </a:blipFill>
-                      </a:tcPr>
-                    </a:tc>
-                    <a:tc>
-                      <a:txBody>
-                        <a:bodyPr/>
-                        <a:lstStyle/>
-                        <a:p>
-                          <a:endParaRPr lang="en-US"/>
-                        </a:p>
-                      </a:txBody>
-                      <a:tcPr anchor="ctr">
-                        <a:blipFill>
-                          <a:blip r:embed="rId2"/>
-                          <a:stretch>
-                            <a:fillRect l="-199526" t="-401333" r="-201422" b="-2000"/>
-                          </a:stretch>
-                        </a:blipFill>
-                      </a:tcPr>
-                    </a:tc>
-                    <a:tc>
-                      <a:txBody>
-                        <a:bodyPr/>
-                        <a:lstStyle/>
-                        <a:p>
-                          <a:endParaRPr lang="en-US"/>
-                        </a:p>
-                      </a:txBody>
-                      <a:tcPr anchor="ctr">
-                        <a:blipFill>
-                          <a:blip r:embed="rId2"/>
-                          <a:stretch>
-                            <a:fillRect l="-300952" t="-401333" r="-102381" b="-2000"/>
-                          </a:stretch>
-                        </a:blipFill>
-                      </a:tcPr>
-                    </a:tc>
-                    <a:tc>
-                      <a:txBody>
-                        <a:bodyPr/>
-                        <a:lstStyle/>
-                        <a:p>
-                          <a:endParaRPr lang="en-US"/>
-                        </a:p>
-                      </a:txBody>
-                      <a:tcPr anchor="ctr">
-                        <a:blipFill>
-                          <a:blip r:embed="rId2"/>
-                          <a:stretch>
-                            <a:fillRect l="-400952" t="-401333" r="-2381" b="-2000"/>
-                          </a:stretch>
-                        </a:blipFill>
-                      </a:tcPr>
-                    </a:tc>
-                    <a:extLst>
-                      <a:ext uri="{0D108BD9-81ED-4DB2-BD59-A6C34878D82A}">
-                        <a16:rowId xmlns:a16="http://schemas.microsoft.com/office/drawing/2014/main" val="1908144934"/>
-                      </a:ext>
-                    </a:extLst>
-                  </a:tr>
-                </a:tbl>
-              </a:graphicData>
-            </a:graphic>
-          </p:graphicFrame>
-        </mc:Fallback>
-      </mc:AlternateContent>
       <p:sp>
         <p:nvSpPr>
           <p:cNvPr id="4" name="Text Placeholder 3">
@@ -23863,6 +22250,31 @@
           </a:p>
         </p:txBody>
       </p:sp>
+      <p:sp>
+        <p:nvSpPr>
+          <p:cNvPr id="6" name="Content Placeholder 5">
+            <a:extLst>
+              <a:ext uri="{FF2B5EF4-FFF2-40B4-BE49-F238E27FC236}">
+                <a16:creationId xmlns:a16="http://schemas.microsoft.com/office/drawing/2014/main" id="{558B70B6-84EB-4814-957F-37870896A523}"/>
+              </a:ext>
+            </a:extLst>
+          </p:cNvPr>
+          <p:cNvSpPr>
+            <a:spLocks noGrp="1"/>
+          </p:cNvSpPr>
+          <p:nvPr>
+            <p:ph idx="1"/>
+          </p:nvPr>
+        </p:nvSpPr>
+        <p:spPr/>
+        <p:txBody>
+          <a:bodyPr/>
+          <a:lstStyle/>
+          <a:p>
+            <a:endParaRPr lang="en-US"/>
+          </a:p>
+        </p:txBody>
+      </p:sp>
     </p:spTree>
     <p:extLst>
       <p:ext uri="{BB962C8B-B14F-4D97-AF65-F5344CB8AC3E}">
@@ -23876,7 +22288,7 @@
 </p:sld>
 </file>
 
-<file path=ppt/slides/slide27.xml><?xml version="1.0" encoding="utf-8"?>
+<file path=ppt/slides/slide26.xml><?xml version="1.0" encoding="utf-8"?>
 <p:sld xmlns:a="http://schemas.openxmlformats.org/drawingml/2006/main" xmlns:r="http://schemas.openxmlformats.org/officeDocument/2006/relationships" xmlns:p="http://schemas.openxmlformats.org/presentationml/2006/main">
   <p:cSld>
     <p:spTree>

</xml_diff>

<commit_message>
Added new Figs, Notebooks, Updated Presentation
</commit_message>
<xml_diff>
--- a/Thesis/CapstonePresentaion/Classifying Chaotic Synthesizers with a Multimodal Neural Network.pptx
+++ b/Thesis/CapstonePresentaion/Classifying Chaotic Synthesizers with a Multimodal Neural Network.pptx
@@ -5,10 +5,10 @@
     <p:sldMasterId id="2147483648" r:id="rId1"/>
   </p:sldMasterIdLst>
   <p:notesMasterIdLst>
-    <p:notesMasterId r:id="rId28"/>
+    <p:notesMasterId r:id="rId29"/>
   </p:notesMasterIdLst>
   <p:handoutMasterIdLst>
-    <p:handoutMasterId r:id="rId29"/>
+    <p:handoutMasterId r:id="rId30"/>
   </p:handoutMasterIdLst>
   <p:sldIdLst>
     <p:sldId id="256" r:id="rId2"/>
@@ -19,24 +19,25 @@
     <p:sldId id="280" r:id="rId7"/>
     <p:sldId id="261" r:id="rId8"/>
     <p:sldId id="262" r:id="rId9"/>
-    <p:sldId id="269" r:id="rId10"/>
-    <p:sldId id="270" r:id="rId11"/>
-    <p:sldId id="264" r:id="rId12"/>
-    <p:sldId id="267" r:id="rId13"/>
-    <p:sldId id="296" r:id="rId14"/>
-    <p:sldId id="265" r:id="rId15"/>
-    <p:sldId id="281" r:id="rId16"/>
-    <p:sldId id="282" r:id="rId17"/>
-    <p:sldId id="279" r:id="rId18"/>
-    <p:sldId id="283" r:id="rId19"/>
-    <p:sldId id="284" r:id="rId20"/>
-    <p:sldId id="285" r:id="rId21"/>
-    <p:sldId id="286" r:id="rId22"/>
-    <p:sldId id="289" r:id="rId23"/>
-    <p:sldId id="288" r:id="rId24"/>
-    <p:sldId id="290" r:id="rId25"/>
-    <p:sldId id="292" r:id="rId26"/>
-    <p:sldId id="295" r:id="rId27"/>
+    <p:sldId id="297" r:id="rId10"/>
+    <p:sldId id="269" r:id="rId11"/>
+    <p:sldId id="298" r:id="rId12"/>
+    <p:sldId id="264" r:id="rId13"/>
+    <p:sldId id="267" r:id="rId14"/>
+    <p:sldId id="296" r:id="rId15"/>
+    <p:sldId id="265" r:id="rId16"/>
+    <p:sldId id="281" r:id="rId17"/>
+    <p:sldId id="282" r:id="rId18"/>
+    <p:sldId id="279" r:id="rId19"/>
+    <p:sldId id="283" r:id="rId20"/>
+    <p:sldId id="284" r:id="rId21"/>
+    <p:sldId id="285" r:id="rId22"/>
+    <p:sldId id="286" r:id="rId23"/>
+    <p:sldId id="289" r:id="rId24"/>
+    <p:sldId id="288" r:id="rId25"/>
+    <p:sldId id="290" r:id="rId26"/>
+    <p:sldId id="292" r:id="rId27"/>
+    <p:sldId id="295" r:id="rId28"/>
   </p:sldIdLst>
   <p:sldSz cx="12192000" cy="6858000"/>
   <p:notesSz cx="6858000" cy="9144000"/>
@@ -4162,7 +4163,7 @@
             <a:defRPr cap="all"/>
           </a:pPr>
           <a:r>
-            <a:rPr lang="en-US"/>
+            <a:rPr lang="en-US" dirty="0"/>
             <a:t>A Neural network is a mathematical function</a:t>
           </a:r>
         </a:p>
@@ -4201,7 +4202,7 @@
             <a:defRPr cap="all"/>
           </a:pPr>
           <a:r>
-            <a:rPr lang="en-US"/>
+            <a:rPr lang="en-US" dirty="0"/>
             <a:t>Composed of Layers, with “trainable” Parameters</a:t>
           </a:r>
         </a:p>
@@ -4863,7 +4864,7 @@
 <file path=ppt/diagrams/data4.xml><?xml version="1.0" encoding="utf-8"?>
 <dgm:dataModel xmlns:dgm="http://schemas.openxmlformats.org/drawingml/2006/diagram" xmlns:a="http://schemas.openxmlformats.org/drawingml/2006/main">
   <dgm:ptLst>
-    <dgm:pt modelId="{92323B8E-DFC4-4323-864D-C626CE0FFDE2}" type="doc">
+    <dgm:pt modelId="{F02C8AE1-4705-4AD3-9537-441C57E1E07D}" type="doc">
       <dgm:prSet loTypeId="urn:microsoft.com/office/officeart/2018/2/layout/IconVerticalSolidList" loCatId="icon" qsTypeId="urn:microsoft.com/office/officeart/2005/8/quickstyle/simple1" qsCatId="simple" csTypeId="urn:microsoft.com/office/officeart/2005/8/colors/accent0_3" csCatId="mainScheme" phldr="1"/>
       <dgm:spPr/>
       <dgm:t>
@@ -4874,7 +4875,7 @@
         </a:p>
       </dgm:t>
     </dgm:pt>
-    <dgm:pt modelId="{55E9625C-F1F1-49B1-B977-D016D2F9981A}">
+    <dgm:pt modelId="{D4DD0BC3-3758-4B56-B1C3-9B7C5FD6BB7F}">
       <dgm:prSet/>
       <dgm:spPr/>
       <dgm:t>
@@ -4889,15 +4890,18 @@
           <a:r>
             <a:rPr lang="en-US" dirty="0">
               <a:solidFill>
-                <a:schemeClr val="bg1"/>
+                <a:schemeClr val="bg1">
+                  <a:lumMod val="95000"/>
+                  <a:lumOff val="5000"/>
+                </a:schemeClr>
               </a:solidFill>
             </a:rPr>
-            <a:t>Choose parameters to minimize the objective function</a:t>
+            <a:t>Iterative method based on gradient descent</a:t>
           </a:r>
         </a:p>
       </dgm:t>
     </dgm:pt>
-    <dgm:pt modelId="{6A650FD7-AFDC-4C8C-9699-FDAC458F7279}" type="parTrans" cxnId="{B903A0A4-B5C7-4B95-9462-614834F9C00E}">
+    <dgm:pt modelId="{E474C166-CAAE-4000-8559-657623D2E74C}" type="parTrans" cxnId="{CF832B86-7902-4122-B91D-0DDF2D7133EB}">
       <dgm:prSet/>
       <dgm:spPr/>
       <dgm:t>
@@ -4908,7 +4912,7 @@
         </a:p>
       </dgm:t>
     </dgm:pt>
-    <dgm:pt modelId="{E91A498F-721C-4E67-B28A-5C1456D5C710}" type="sibTrans" cxnId="{B903A0A4-B5C7-4B95-9462-614834F9C00E}">
+    <dgm:pt modelId="{A928295F-799B-4400-80EF-52735D2B028A}" type="sibTrans" cxnId="{CF832B86-7902-4122-B91D-0DDF2D7133EB}">
       <dgm:prSet/>
       <dgm:spPr/>
       <dgm:t>
@@ -4919,7 +4923,7 @@
         </a:p>
       </dgm:t>
     </dgm:pt>
-    <dgm:pt modelId="{C55D7D7B-455B-44D0-8A9B-27D5793AFD24}">
+    <dgm:pt modelId="{295559D4-06AF-40E9-859C-F5906059D346}">
       <dgm:prSet/>
       <dgm:spPr/>
       <dgm:t>
@@ -4934,7 +4938,10 @@
           <a:r>
             <a:rPr lang="en-US" dirty="0">
               <a:solidFill>
-                <a:schemeClr val="bg1"/>
+                <a:schemeClr val="bg1">
+                  <a:lumMod val="95000"/>
+                  <a:lumOff val="5000"/>
+                </a:schemeClr>
               </a:solidFill>
             </a:rPr>
             <a:t>Do we </a:t>
@@ -4942,7 +4949,10 @@
           <a:r>
             <a:rPr lang="en-US" i="1" dirty="0">
               <a:solidFill>
-                <a:schemeClr val="bg1"/>
+                <a:schemeClr val="bg1">
+                  <a:lumMod val="95000"/>
+                  <a:lumOff val="5000"/>
+                </a:schemeClr>
               </a:solidFill>
             </a:rPr>
             <a:t>Train </a:t>
@@ -4950,20 +4960,26 @@
           <a:r>
             <a:rPr lang="en-US" i="0" dirty="0">
               <a:solidFill>
-                <a:schemeClr val="bg1"/>
+                <a:schemeClr val="bg1">
+                  <a:lumMod val="95000"/>
+                  <a:lumOff val="5000"/>
+                </a:schemeClr>
               </a:solidFill>
             </a:rPr>
             <a:t>a Neural Network?</a:t>
           </a:r>
           <a:endParaRPr lang="en-US" dirty="0">
             <a:solidFill>
-              <a:schemeClr val="bg1"/>
+              <a:schemeClr val="bg1">
+                <a:lumMod val="95000"/>
+                <a:lumOff val="5000"/>
+              </a:schemeClr>
             </a:solidFill>
           </a:endParaRPr>
         </a:p>
       </dgm:t>
     </dgm:pt>
-    <dgm:pt modelId="{B19C4FA4-66F8-4D98-9624-3B9B8FD6A2B3}" type="parTrans" cxnId="{714E9AD1-83E8-46D0-8698-84309DB6B27F}">
+    <dgm:pt modelId="{6B0CB7D4-39A5-4FFB-9F07-249D83CF56EB}" type="parTrans" cxnId="{0B35F955-3987-4B3A-8829-E78C4A751D7B}">
       <dgm:prSet/>
       <dgm:spPr/>
       <dgm:t>
@@ -4974,7 +4990,7 @@
         </a:p>
       </dgm:t>
     </dgm:pt>
-    <dgm:pt modelId="{C23FEA0E-3E7A-45C7-9546-11D8918E44F1}" type="sibTrans" cxnId="{714E9AD1-83E8-46D0-8698-84309DB6B27F}">
+    <dgm:pt modelId="{052726C1-1BAD-4C13-A518-EEB0BB1682FE}" type="sibTrans" cxnId="{0B35F955-3987-4B3A-8829-E78C4A751D7B}">
       <dgm:prSet/>
       <dgm:spPr/>
       <dgm:t>
@@ -4985,7 +5001,7 @@
         </a:p>
       </dgm:t>
     </dgm:pt>
-    <dgm:pt modelId="{F46F1C4F-788B-4FCE-95CA-7291176371F4}">
+    <dgm:pt modelId="{CFD6E7C7-3EB4-410A-9B63-532FD46D840C}">
       <dgm:prSet/>
       <dgm:spPr/>
       <dgm:t>
@@ -5000,7 +5016,10 @@
           <a:r>
             <a:rPr lang="en-US" dirty="0">
               <a:solidFill>
-                <a:schemeClr val="bg1"/>
+                <a:schemeClr val="bg1">
+                  <a:lumMod val="95000"/>
+                  <a:lumOff val="5000"/>
+                </a:schemeClr>
               </a:solidFill>
             </a:rPr>
             <a:t>Do we </a:t>
@@ -5008,44 +5027,37 @@
           <a:r>
             <a:rPr lang="en-US" i="1" dirty="0">
               <a:solidFill>
-                <a:schemeClr val="bg1"/>
+                <a:schemeClr val="bg1">
+                  <a:lumMod val="95000"/>
+                  <a:lumOff val="5000"/>
+                </a:schemeClr>
               </a:solidFill>
             </a:rPr>
-            <a:t>train </a:t>
+            <a:t>Optimize </a:t>
           </a:r>
           <a:r>
             <a:rPr lang="en-US" i="0" dirty="0">
               <a:solidFill>
-                <a:schemeClr val="bg1"/>
+                <a:schemeClr val="bg1">
+                  <a:lumMod val="95000"/>
+                  <a:lumOff val="5000"/>
+                </a:schemeClr>
               </a:solidFill>
             </a:rPr>
-            <a:t>or </a:t>
-          </a:r>
-          <a:r>
-            <a:rPr lang="en-US" i="1" dirty="0">
-              <a:solidFill>
-                <a:schemeClr val="bg1"/>
-              </a:solidFill>
-            </a:rPr>
-            <a:t>Optimize</a:t>
-          </a:r>
-          <a:r>
-            <a:rPr lang="en-US" i="0" dirty="0">
-              <a:solidFill>
-                <a:schemeClr val="bg1"/>
-              </a:solidFill>
-            </a:rPr>
-            <a:t> a Neural Network</a:t>
+            <a:t>a Neural Network?</a:t>
           </a:r>
           <a:endParaRPr lang="en-US" dirty="0">
             <a:solidFill>
-              <a:schemeClr val="bg1"/>
+              <a:schemeClr val="bg1">
+                <a:lumMod val="95000"/>
+                <a:lumOff val="5000"/>
+              </a:schemeClr>
             </a:solidFill>
           </a:endParaRPr>
         </a:p>
       </dgm:t>
     </dgm:pt>
-    <dgm:pt modelId="{EC168C01-9496-4FD4-BDB4-EAE248F494D5}" type="parTrans" cxnId="{67D7C0E3-33D3-41E6-898B-60C7983C92A4}">
+    <dgm:pt modelId="{FE0F8ACD-0EB3-4218-B3B5-DC69ED1ACF36}" type="parTrans" cxnId="{63C68970-0BCE-4CA1-92C8-63BF20205A4F}">
       <dgm:prSet/>
       <dgm:spPr/>
       <dgm:t>
@@ -5056,7 +5068,7 @@
         </a:p>
       </dgm:t>
     </dgm:pt>
-    <dgm:pt modelId="{BB6733DF-92DF-4F04-A8BB-1E3068BFE47F}" type="sibTrans" cxnId="{67D7C0E3-33D3-41E6-898B-60C7983C92A4}">
+    <dgm:pt modelId="{B846AA74-36D7-4CD5-966A-CE5C8E825D8F}" type="sibTrans" cxnId="{63C68970-0BCE-4CA1-92C8-63BF20205A4F}">
       <dgm:prSet/>
       <dgm:spPr/>
       <dgm:t>
@@ -5067,8 +5079,8 @@
         </a:p>
       </dgm:t>
     </dgm:pt>
-    <dgm:pt modelId="{146C0FDC-6D23-44F7-98CE-DE1167D3F235}" type="pres">
-      <dgm:prSet presAssocID="{92323B8E-DFC4-4323-864D-C626CE0FFDE2}" presName="root" presStyleCnt="0">
+    <dgm:pt modelId="{6B77402A-6F53-463F-BA96-19DA506CD305}" type="pres">
+      <dgm:prSet presAssocID="{F02C8AE1-4705-4AD3-9537-441C57E1E07D}" presName="root" presStyleCnt="0">
         <dgm:presLayoutVars>
           <dgm:dir/>
           <dgm:resizeHandles val="exact"/>
@@ -5076,16 +5088,16 @@
       </dgm:prSet>
       <dgm:spPr/>
     </dgm:pt>
-    <dgm:pt modelId="{B5C4F67F-1467-44CF-BA99-731F4FA7AE3B}" type="pres">
-      <dgm:prSet presAssocID="{55E9625C-F1F1-49B1-B977-D016D2F9981A}" presName="compNode" presStyleCnt="0"/>
+    <dgm:pt modelId="{01E95FE6-7F63-4FAA-A643-6F24460CA1D2}" type="pres">
+      <dgm:prSet presAssocID="{D4DD0BC3-3758-4B56-B1C3-9B7C5FD6BB7F}" presName="compNode" presStyleCnt="0"/>
       <dgm:spPr/>
     </dgm:pt>
-    <dgm:pt modelId="{292242AD-FF61-4216-B659-1BB831C85042}" type="pres">
-      <dgm:prSet presAssocID="{55E9625C-F1F1-49B1-B977-D016D2F9981A}" presName="bgRect" presStyleLbl="bgShp" presStyleIdx="0" presStyleCnt="3"/>
+    <dgm:pt modelId="{79320D3D-4810-4059-8CA3-03133B43AFE8}" type="pres">
+      <dgm:prSet presAssocID="{D4DD0BC3-3758-4B56-B1C3-9B7C5FD6BB7F}" presName="bgRect" presStyleLbl="bgShp" presStyleIdx="0" presStyleCnt="3" custLinFactNeighborX="-17039" custLinFactNeighborY="-10045"/>
       <dgm:spPr/>
     </dgm:pt>
-    <dgm:pt modelId="{95F58589-9712-4454-9BFD-FD6CAED45C6E}" type="pres">
-      <dgm:prSet presAssocID="{55E9625C-F1F1-49B1-B977-D016D2F9981A}" presName="iconRect" presStyleLbl="node1" presStyleIdx="0" presStyleCnt="3"/>
+    <dgm:pt modelId="{5DD6696A-9E6C-4726-8055-6350DF424F78}" type="pres">
+      <dgm:prSet presAssocID="{D4DD0BC3-3758-4B56-B1C3-9B7C5FD6BB7F}" presName="iconRect" presStyleLbl="node1" presStyleIdx="0" presStyleCnt="3"/>
       <dgm:spPr>
         <a:blipFill>
           <a:blip xmlns:r="http://schemas.openxmlformats.org/officeDocument/2006/relationships" r:embed="rId1">
@@ -5098,6 +5110,7 @@
               </a:ext>
             </a:extLst>
           </a:blip>
+          <a:srcRect/>
           <a:stretch>
             <a:fillRect/>
           </a:stretch>
@@ -5105,16 +5118,16 @@
       </dgm:spPr>
       <dgm:extLst>
         <a:ext uri="{E40237B7-FDA0-4F09-8148-C483321AD2D9}">
-          <dgm14:cNvPr xmlns:dgm14="http://schemas.microsoft.com/office/drawing/2010/diagram" id="0" name="" descr="Hierarchy"/>
+          <dgm14:cNvPr xmlns:dgm14="http://schemas.microsoft.com/office/drawing/2010/diagram" id="0" name="" descr="Future with solid fill"/>
         </a:ext>
       </dgm:extLst>
     </dgm:pt>
-    <dgm:pt modelId="{02A2C674-6FE2-4C92-BE58-DBB9F36ED766}" type="pres">
-      <dgm:prSet presAssocID="{55E9625C-F1F1-49B1-B977-D016D2F9981A}" presName="spaceRect" presStyleCnt="0"/>
+    <dgm:pt modelId="{18DBBA57-C5B8-4CE0-B27F-C34107FE1335}" type="pres">
+      <dgm:prSet presAssocID="{D4DD0BC3-3758-4B56-B1C3-9B7C5FD6BB7F}" presName="spaceRect" presStyleCnt="0"/>
       <dgm:spPr/>
     </dgm:pt>
-    <dgm:pt modelId="{7E6EB30D-CD13-426C-B58A-B36BAFA2307F}" type="pres">
-      <dgm:prSet presAssocID="{55E9625C-F1F1-49B1-B977-D016D2F9981A}" presName="parTx" presStyleLbl="revTx" presStyleIdx="0" presStyleCnt="3">
+    <dgm:pt modelId="{C694E9BA-8872-4BB5-B593-F935A2D1664B}" type="pres">
+      <dgm:prSet presAssocID="{D4DD0BC3-3758-4B56-B1C3-9B7C5FD6BB7F}" presName="parTx" presStyleLbl="revTx" presStyleIdx="0" presStyleCnt="3">
         <dgm:presLayoutVars>
           <dgm:chMax val="0"/>
           <dgm:chPref val="0"/>
@@ -5122,20 +5135,20 @@
       </dgm:prSet>
       <dgm:spPr/>
     </dgm:pt>
-    <dgm:pt modelId="{3F8A02BA-D648-4012-A9BA-40E3B050406A}" type="pres">
-      <dgm:prSet presAssocID="{E91A498F-721C-4E67-B28A-5C1456D5C710}" presName="sibTrans" presStyleCnt="0"/>
+    <dgm:pt modelId="{2C7DA8E9-DA9C-44F0-BCAD-06FBD5F66BE1}" type="pres">
+      <dgm:prSet presAssocID="{A928295F-799B-4400-80EF-52735D2B028A}" presName="sibTrans" presStyleCnt="0"/>
       <dgm:spPr/>
     </dgm:pt>
-    <dgm:pt modelId="{B6ECF521-A5D5-4299-A601-D9366BA45C86}" type="pres">
-      <dgm:prSet presAssocID="{C55D7D7B-455B-44D0-8A9B-27D5793AFD24}" presName="compNode" presStyleCnt="0"/>
+    <dgm:pt modelId="{EB762768-7D6E-4FB6-894E-23E4822DD3BD}" type="pres">
+      <dgm:prSet presAssocID="{295559D4-06AF-40E9-859C-F5906059D346}" presName="compNode" presStyleCnt="0"/>
       <dgm:spPr/>
     </dgm:pt>
-    <dgm:pt modelId="{C7D822CA-C4FF-43EB-97C9-3957A1B34C91}" type="pres">
-      <dgm:prSet presAssocID="{C55D7D7B-455B-44D0-8A9B-27D5793AFD24}" presName="bgRect" presStyleLbl="bgShp" presStyleIdx="1" presStyleCnt="3"/>
+    <dgm:pt modelId="{F6F71E3C-271F-4039-8929-4206DE82116A}" type="pres">
+      <dgm:prSet presAssocID="{295559D4-06AF-40E9-859C-F5906059D346}" presName="bgRect" presStyleLbl="bgShp" presStyleIdx="1" presStyleCnt="3" custLinFactNeighborX="-24975"/>
       <dgm:spPr/>
     </dgm:pt>
-    <dgm:pt modelId="{192976B9-7FD1-4CFB-BA22-D90A547F2A2D}" type="pres">
-      <dgm:prSet presAssocID="{C55D7D7B-455B-44D0-8A9B-27D5793AFD24}" presName="iconRect" presStyleLbl="node1" presStyleIdx="1" presStyleCnt="3"/>
+    <dgm:pt modelId="{BE9A71B0-E621-4B63-9D4B-AD74C6E7335B}" type="pres">
+      <dgm:prSet presAssocID="{295559D4-06AF-40E9-859C-F5906059D346}" presName="iconRect" presStyleLbl="node1" presStyleIdx="1" presStyleCnt="3"/>
       <dgm:spPr>
         <a:blipFill>
           <a:blip xmlns:r="http://schemas.openxmlformats.org/officeDocument/2006/relationships" r:embed="rId3">
@@ -5159,12 +5172,12 @@
         </a:ext>
       </dgm:extLst>
     </dgm:pt>
-    <dgm:pt modelId="{D0DBBE72-D38B-437B-AE6C-CE608B4DBE7E}" type="pres">
-      <dgm:prSet presAssocID="{C55D7D7B-455B-44D0-8A9B-27D5793AFD24}" presName="spaceRect" presStyleCnt="0"/>
+    <dgm:pt modelId="{2F59682C-4EF1-44BF-B03B-CBE166A411AB}" type="pres">
+      <dgm:prSet presAssocID="{295559D4-06AF-40E9-859C-F5906059D346}" presName="spaceRect" presStyleCnt="0"/>
       <dgm:spPr/>
     </dgm:pt>
-    <dgm:pt modelId="{7ADEE424-9284-48B9-879C-D002AA67A8E2}" type="pres">
-      <dgm:prSet presAssocID="{C55D7D7B-455B-44D0-8A9B-27D5793AFD24}" presName="parTx" presStyleLbl="revTx" presStyleIdx="1" presStyleCnt="3">
+    <dgm:pt modelId="{53B5C541-8782-4733-B15D-CBB4184D607C}" type="pres">
+      <dgm:prSet presAssocID="{295559D4-06AF-40E9-859C-F5906059D346}" presName="parTx" presStyleLbl="revTx" presStyleIdx="1" presStyleCnt="3">
         <dgm:presLayoutVars>
           <dgm:chMax val="0"/>
           <dgm:chPref val="0"/>
@@ -5172,20 +5185,20 @@
       </dgm:prSet>
       <dgm:spPr/>
     </dgm:pt>
-    <dgm:pt modelId="{E41BEEC5-7C05-4914-861D-2C5F40D68179}" type="pres">
-      <dgm:prSet presAssocID="{C23FEA0E-3E7A-45C7-9546-11D8918E44F1}" presName="sibTrans" presStyleCnt="0"/>
+    <dgm:pt modelId="{8CCF3787-721E-4031-BDDE-204AE6FAD803}" type="pres">
+      <dgm:prSet presAssocID="{052726C1-1BAD-4C13-A518-EEB0BB1682FE}" presName="sibTrans" presStyleCnt="0"/>
       <dgm:spPr/>
     </dgm:pt>
-    <dgm:pt modelId="{41FAED26-0555-4C28-A654-7D0E2639A3DA}" type="pres">
-      <dgm:prSet presAssocID="{F46F1C4F-788B-4FCE-95CA-7291176371F4}" presName="compNode" presStyleCnt="0"/>
+    <dgm:pt modelId="{CD5231F0-0237-44E5-8A21-6DA032CF5AA9}" type="pres">
+      <dgm:prSet presAssocID="{CFD6E7C7-3EB4-410A-9B63-532FD46D840C}" presName="compNode" presStyleCnt="0"/>
       <dgm:spPr/>
     </dgm:pt>
-    <dgm:pt modelId="{4D704669-4DF4-4296-8594-313245A25DE6}" type="pres">
-      <dgm:prSet presAssocID="{F46F1C4F-788B-4FCE-95CA-7291176371F4}" presName="bgRect" presStyleLbl="bgShp" presStyleIdx="2" presStyleCnt="3" custLinFactNeighborX="-22594" custLinFactNeighborY="5020"/>
+    <dgm:pt modelId="{A4F3006B-1C1E-4328-A2A9-7EAB6AEAAEDC}" type="pres">
+      <dgm:prSet presAssocID="{CFD6E7C7-3EB4-410A-9B63-532FD46D840C}" presName="bgRect" presStyleLbl="bgShp" presStyleIdx="2" presStyleCnt="3"/>
       <dgm:spPr/>
     </dgm:pt>
-    <dgm:pt modelId="{00654C7D-3997-4C25-961E-C15206912944}" type="pres">
-      <dgm:prSet presAssocID="{F46F1C4F-788B-4FCE-95CA-7291176371F4}" presName="iconRect" presStyleLbl="node1" presStyleIdx="2" presStyleCnt="3"/>
+    <dgm:pt modelId="{44B43527-9613-42B2-9A73-0ECDF1161CFA}" type="pres">
+      <dgm:prSet presAssocID="{CFD6E7C7-3EB4-410A-9B63-532FD46D840C}" presName="iconRect" presStyleLbl="node1" presStyleIdx="2" presStyleCnt="3"/>
       <dgm:spPr>
         <a:blipFill>
           <a:blip xmlns:r="http://schemas.openxmlformats.org/officeDocument/2006/relationships" r:embed="rId5">
@@ -5205,16 +5218,16 @@
       </dgm:spPr>
       <dgm:extLst>
         <a:ext uri="{E40237B7-FDA0-4F09-8148-C483321AD2D9}">
-          <dgm14:cNvPr xmlns:dgm14="http://schemas.microsoft.com/office/drawing/2010/diagram" id="0" name="" descr="Gears"/>
+          <dgm14:cNvPr xmlns:dgm14="http://schemas.microsoft.com/office/drawing/2010/diagram" id="0" name="" descr="Head with Gears"/>
         </a:ext>
       </dgm:extLst>
     </dgm:pt>
-    <dgm:pt modelId="{88B639EF-9D01-415E-840D-ABFA16581A7A}" type="pres">
-      <dgm:prSet presAssocID="{F46F1C4F-788B-4FCE-95CA-7291176371F4}" presName="spaceRect" presStyleCnt="0"/>
+    <dgm:pt modelId="{1CF4A9C5-F29D-42A0-BFC5-6E5D69FEFA97}" type="pres">
+      <dgm:prSet presAssocID="{CFD6E7C7-3EB4-410A-9B63-532FD46D840C}" presName="spaceRect" presStyleCnt="0"/>
       <dgm:spPr/>
     </dgm:pt>
-    <dgm:pt modelId="{30CCCACB-246F-418F-9136-A3C9433C56AD}" type="pres">
-      <dgm:prSet presAssocID="{F46F1C4F-788B-4FCE-95CA-7291176371F4}" presName="parTx" presStyleLbl="revTx" presStyleIdx="2" presStyleCnt="3">
+    <dgm:pt modelId="{62174484-E9E3-4772-818B-30B2990E266D}" type="pres">
+      <dgm:prSet presAssocID="{CFD6E7C7-3EB4-410A-9B63-532FD46D840C}" presName="parTx" presStyleLbl="revTx" presStyleIdx="2" presStyleCnt="3">
         <dgm:presLayoutVars>
           <dgm:chMax val="0"/>
           <dgm:chPref val="0"/>
@@ -5224,30 +5237,30 @@
     </dgm:pt>
   </dgm:ptLst>
   <dgm:cxnLst>
-    <dgm:cxn modelId="{1BA85F20-EE33-48BD-8756-0CB7D3EE78E3}" type="presOf" srcId="{F46F1C4F-788B-4FCE-95CA-7291176371F4}" destId="{30CCCACB-246F-418F-9136-A3C9433C56AD}" srcOrd="0" destOrd="0" presId="urn:microsoft.com/office/officeart/2018/2/layout/IconVerticalSolidList"/>
-    <dgm:cxn modelId="{C5ABA141-FA79-4E27-887A-E65B32E5AFC4}" type="presOf" srcId="{55E9625C-F1F1-49B1-B977-D016D2F9981A}" destId="{7E6EB30D-CD13-426C-B58A-B36BAFA2307F}" srcOrd="0" destOrd="0" presId="urn:microsoft.com/office/officeart/2018/2/layout/IconVerticalSolidList"/>
-    <dgm:cxn modelId="{B903A0A4-B5C7-4B95-9462-614834F9C00E}" srcId="{92323B8E-DFC4-4323-864D-C626CE0FFDE2}" destId="{55E9625C-F1F1-49B1-B977-D016D2F9981A}" srcOrd="0" destOrd="0" parTransId="{6A650FD7-AFDC-4C8C-9699-FDAC458F7279}" sibTransId="{E91A498F-721C-4E67-B28A-5C1456D5C710}"/>
-    <dgm:cxn modelId="{714E9AD1-83E8-46D0-8698-84309DB6B27F}" srcId="{92323B8E-DFC4-4323-864D-C626CE0FFDE2}" destId="{C55D7D7B-455B-44D0-8A9B-27D5793AFD24}" srcOrd="1" destOrd="0" parTransId="{B19C4FA4-66F8-4D98-9624-3B9B8FD6A2B3}" sibTransId="{C23FEA0E-3E7A-45C7-9546-11D8918E44F1}"/>
-    <dgm:cxn modelId="{1D5BDAD4-2456-4C09-B937-B3373BF85FFC}" type="presOf" srcId="{C55D7D7B-455B-44D0-8A9B-27D5793AFD24}" destId="{7ADEE424-9284-48B9-879C-D002AA67A8E2}" srcOrd="0" destOrd="0" presId="urn:microsoft.com/office/officeart/2018/2/layout/IconVerticalSolidList"/>
-    <dgm:cxn modelId="{BA24F9DD-DB98-4207-9D70-17B30D926A78}" type="presOf" srcId="{92323B8E-DFC4-4323-864D-C626CE0FFDE2}" destId="{146C0FDC-6D23-44F7-98CE-DE1167D3F235}" srcOrd="0" destOrd="0" presId="urn:microsoft.com/office/officeart/2018/2/layout/IconVerticalSolidList"/>
-    <dgm:cxn modelId="{67D7C0E3-33D3-41E6-898B-60C7983C92A4}" srcId="{92323B8E-DFC4-4323-864D-C626CE0FFDE2}" destId="{F46F1C4F-788B-4FCE-95CA-7291176371F4}" srcOrd="2" destOrd="0" parTransId="{EC168C01-9496-4FD4-BDB4-EAE248F494D5}" sibTransId="{BB6733DF-92DF-4F04-A8BB-1E3068BFE47F}"/>
-    <dgm:cxn modelId="{0DD06AF3-0EB7-4CA1-A04C-3A1FA6411D87}" type="presParOf" srcId="{146C0FDC-6D23-44F7-98CE-DE1167D3F235}" destId="{B5C4F67F-1467-44CF-BA99-731F4FA7AE3B}" srcOrd="0" destOrd="0" presId="urn:microsoft.com/office/officeart/2018/2/layout/IconVerticalSolidList"/>
-    <dgm:cxn modelId="{E590F3F1-9236-47B1-A936-E006D4BB9765}" type="presParOf" srcId="{B5C4F67F-1467-44CF-BA99-731F4FA7AE3B}" destId="{292242AD-FF61-4216-B659-1BB831C85042}" srcOrd="0" destOrd="0" presId="urn:microsoft.com/office/officeart/2018/2/layout/IconVerticalSolidList"/>
-    <dgm:cxn modelId="{873D1F17-10C8-4C8E-80AD-95952C914528}" type="presParOf" srcId="{B5C4F67F-1467-44CF-BA99-731F4FA7AE3B}" destId="{95F58589-9712-4454-9BFD-FD6CAED45C6E}" srcOrd="1" destOrd="0" presId="urn:microsoft.com/office/officeart/2018/2/layout/IconVerticalSolidList"/>
-    <dgm:cxn modelId="{9887EBD1-1B0F-42BD-AFD8-5BD0F0119251}" type="presParOf" srcId="{B5C4F67F-1467-44CF-BA99-731F4FA7AE3B}" destId="{02A2C674-6FE2-4C92-BE58-DBB9F36ED766}" srcOrd="2" destOrd="0" presId="urn:microsoft.com/office/officeart/2018/2/layout/IconVerticalSolidList"/>
-    <dgm:cxn modelId="{4D097BDC-C56E-4ADC-B384-20EB22240554}" type="presParOf" srcId="{B5C4F67F-1467-44CF-BA99-731F4FA7AE3B}" destId="{7E6EB30D-CD13-426C-B58A-B36BAFA2307F}" srcOrd="3" destOrd="0" presId="urn:microsoft.com/office/officeart/2018/2/layout/IconVerticalSolidList"/>
-    <dgm:cxn modelId="{BAF2CE89-62B6-4E0D-A831-3DB4E54D606D}" type="presParOf" srcId="{146C0FDC-6D23-44F7-98CE-DE1167D3F235}" destId="{3F8A02BA-D648-4012-A9BA-40E3B050406A}" srcOrd="1" destOrd="0" presId="urn:microsoft.com/office/officeart/2018/2/layout/IconVerticalSolidList"/>
-    <dgm:cxn modelId="{60AF8495-6687-4043-AE11-565D3AA39B0D}" type="presParOf" srcId="{146C0FDC-6D23-44F7-98CE-DE1167D3F235}" destId="{B6ECF521-A5D5-4299-A601-D9366BA45C86}" srcOrd="2" destOrd="0" presId="urn:microsoft.com/office/officeart/2018/2/layout/IconVerticalSolidList"/>
-    <dgm:cxn modelId="{06AE4C2D-39D3-46DE-9A36-5FFF727FECF1}" type="presParOf" srcId="{B6ECF521-A5D5-4299-A601-D9366BA45C86}" destId="{C7D822CA-C4FF-43EB-97C9-3957A1B34C91}" srcOrd="0" destOrd="0" presId="urn:microsoft.com/office/officeart/2018/2/layout/IconVerticalSolidList"/>
-    <dgm:cxn modelId="{27E26BF3-9841-4B48-93E5-F10D3A5A6885}" type="presParOf" srcId="{B6ECF521-A5D5-4299-A601-D9366BA45C86}" destId="{192976B9-7FD1-4CFB-BA22-D90A547F2A2D}" srcOrd="1" destOrd="0" presId="urn:microsoft.com/office/officeart/2018/2/layout/IconVerticalSolidList"/>
-    <dgm:cxn modelId="{F8AD0677-53DF-46A2-B00E-182CE224CC04}" type="presParOf" srcId="{B6ECF521-A5D5-4299-A601-D9366BA45C86}" destId="{D0DBBE72-D38B-437B-AE6C-CE608B4DBE7E}" srcOrd="2" destOrd="0" presId="urn:microsoft.com/office/officeart/2018/2/layout/IconVerticalSolidList"/>
-    <dgm:cxn modelId="{26DA4A11-D9F0-4200-92B5-430780329EF1}" type="presParOf" srcId="{B6ECF521-A5D5-4299-A601-D9366BA45C86}" destId="{7ADEE424-9284-48B9-879C-D002AA67A8E2}" srcOrd="3" destOrd="0" presId="urn:microsoft.com/office/officeart/2018/2/layout/IconVerticalSolidList"/>
-    <dgm:cxn modelId="{78B7BDA1-8837-44EA-95AE-C2F1282BEBF3}" type="presParOf" srcId="{146C0FDC-6D23-44F7-98CE-DE1167D3F235}" destId="{E41BEEC5-7C05-4914-861D-2C5F40D68179}" srcOrd="3" destOrd="0" presId="urn:microsoft.com/office/officeart/2018/2/layout/IconVerticalSolidList"/>
-    <dgm:cxn modelId="{65061732-FAEB-4910-BCAD-E233BB03132D}" type="presParOf" srcId="{146C0FDC-6D23-44F7-98CE-DE1167D3F235}" destId="{41FAED26-0555-4C28-A654-7D0E2639A3DA}" srcOrd="4" destOrd="0" presId="urn:microsoft.com/office/officeart/2018/2/layout/IconVerticalSolidList"/>
-    <dgm:cxn modelId="{4753E866-D025-435C-9712-1EF56C05041F}" type="presParOf" srcId="{41FAED26-0555-4C28-A654-7D0E2639A3DA}" destId="{4D704669-4DF4-4296-8594-313245A25DE6}" srcOrd="0" destOrd="0" presId="urn:microsoft.com/office/officeart/2018/2/layout/IconVerticalSolidList"/>
-    <dgm:cxn modelId="{751D036D-2FEC-4B7A-9D43-15DC410F5E66}" type="presParOf" srcId="{41FAED26-0555-4C28-A654-7D0E2639A3DA}" destId="{00654C7D-3997-4C25-961E-C15206912944}" srcOrd="1" destOrd="0" presId="urn:microsoft.com/office/officeart/2018/2/layout/IconVerticalSolidList"/>
-    <dgm:cxn modelId="{8BC261C4-F165-4C15-B69D-6FED3CB9C9A1}" type="presParOf" srcId="{41FAED26-0555-4C28-A654-7D0E2639A3DA}" destId="{88B639EF-9D01-415E-840D-ABFA16581A7A}" srcOrd="2" destOrd="0" presId="urn:microsoft.com/office/officeart/2018/2/layout/IconVerticalSolidList"/>
-    <dgm:cxn modelId="{B4E9CA3E-88B2-4CB8-9103-3BB1DFA68E2E}" type="presParOf" srcId="{41FAED26-0555-4C28-A654-7D0E2639A3DA}" destId="{30CCCACB-246F-418F-9136-A3C9433C56AD}" srcOrd="3" destOrd="0" presId="urn:microsoft.com/office/officeart/2018/2/layout/IconVerticalSolidList"/>
+    <dgm:cxn modelId="{92BA6A35-4A8A-4183-B963-F6A1726F5141}" type="presOf" srcId="{F02C8AE1-4705-4AD3-9537-441C57E1E07D}" destId="{6B77402A-6F53-463F-BA96-19DA506CD305}" srcOrd="0" destOrd="0" presId="urn:microsoft.com/office/officeart/2018/2/layout/IconVerticalSolidList"/>
+    <dgm:cxn modelId="{63C68970-0BCE-4CA1-92C8-63BF20205A4F}" srcId="{F02C8AE1-4705-4AD3-9537-441C57E1E07D}" destId="{CFD6E7C7-3EB4-410A-9B63-532FD46D840C}" srcOrd="2" destOrd="0" parTransId="{FE0F8ACD-0EB3-4218-B3B5-DC69ED1ACF36}" sibTransId="{B846AA74-36D7-4CD5-966A-CE5C8E825D8F}"/>
+    <dgm:cxn modelId="{0B35F955-3987-4B3A-8829-E78C4A751D7B}" srcId="{F02C8AE1-4705-4AD3-9537-441C57E1E07D}" destId="{295559D4-06AF-40E9-859C-F5906059D346}" srcOrd="1" destOrd="0" parTransId="{6B0CB7D4-39A5-4FFB-9F07-249D83CF56EB}" sibTransId="{052726C1-1BAD-4C13-A518-EEB0BB1682FE}"/>
+    <dgm:cxn modelId="{CF832B86-7902-4122-B91D-0DDF2D7133EB}" srcId="{F02C8AE1-4705-4AD3-9537-441C57E1E07D}" destId="{D4DD0BC3-3758-4B56-B1C3-9B7C5FD6BB7F}" srcOrd="0" destOrd="0" parTransId="{E474C166-CAAE-4000-8559-657623D2E74C}" sibTransId="{A928295F-799B-4400-80EF-52735D2B028A}"/>
+    <dgm:cxn modelId="{D2D838C2-4115-4269-BFF9-317043267D2F}" type="presOf" srcId="{295559D4-06AF-40E9-859C-F5906059D346}" destId="{53B5C541-8782-4733-B15D-CBB4184D607C}" srcOrd="0" destOrd="0" presId="urn:microsoft.com/office/officeart/2018/2/layout/IconVerticalSolidList"/>
+    <dgm:cxn modelId="{0E9A0DD1-8B16-4C0C-B9C0-233BF745390E}" type="presOf" srcId="{CFD6E7C7-3EB4-410A-9B63-532FD46D840C}" destId="{62174484-E9E3-4772-818B-30B2990E266D}" srcOrd="0" destOrd="0" presId="urn:microsoft.com/office/officeart/2018/2/layout/IconVerticalSolidList"/>
+    <dgm:cxn modelId="{C8BDF6E8-6CD4-4B08-93D2-9AA5460ACB2E}" type="presOf" srcId="{D4DD0BC3-3758-4B56-B1C3-9B7C5FD6BB7F}" destId="{C694E9BA-8872-4BB5-B593-F935A2D1664B}" srcOrd="0" destOrd="0" presId="urn:microsoft.com/office/officeart/2018/2/layout/IconVerticalSolidList"/>
+    <dgm:cxn modelId="{46F86A5E-B8DB-4546-A576-7D0B8FC82328}" type="presParOf" srcId="{6B77402A-6F53-463F-BA96-19DA506CD305}" destId="{01E95FE6-7F63-4FAA-A643-6F24460CA1D2}" srcOrd="0" destOrd="0" presId="urn:microsoft.com/office/officeart/2018/2/layout/IconVerticalSolidList"/>
+    <dgm:cxn modelId="{3D838766-6E8E-4B74-928B-A07E0EDC3212}" type="presParOf" srcId="{01E95FE6-7F63-4FAA-A643-6F24460CA1D2}" destId="{79320D3D-4810-4059-8CA3-03133B43AFE8}" srcOrd="0" destOrd="0" presId="urn:microsoft.com/office/officeart/2018/2/layout/IconVerticalSolidList"/>
+    <dgm:cxn modelId="{B7D28BC6-9D5A-40F1-8821-41D396455E6C}" type="presParOf" srcId="{01E95FE6-7F63-4FAA-A643-6F24460CA1D2}" destId="{5DD6696A-9E6C-4726-8055-6350DF424F78}" srcOrd="1" destOrd="0" presId="urn:microsoft.com/office/officeart/2018/2/layout/IconVerticalSolidList"/>
+    <dgm:cxn modelId="{E272A808-81D5-4192-9B51-C5C498500CAD}" type="presParOf" srcId="{01E95FE6-7F63-4FAA-A643-6F24460CA1D2}" destId="{18DBBA57-C5B8-4CE0-B27F-C34107FE1335}" srcOrd="2" destOrd="0" presId="urn:microsoft.com/office/officeart/2018/2/layout/IconVerticalSolidList"/>
+    <dgm:cxn modelId="{5D10E296-832E-416B-92B8-6C9E71FB5AA5}" type="presParOf" srcId="{01E95FE6-7F63-4FAA-A643-6F24460CA1D2}" destId="{C694E9BA-8872-4BB5-B593-F935A2D1664B}" srcOrd="3" destOrd="0" presId="urn:microsoft.com/office/officeart/2018/2/layout/IconVerticalSolidList"/>
+    <dgm:cxn modelId="{050C03D8-ABD6-49B0-8741-F7370D08EC46}" type="presParOf" srcId="{6B77402A-6F53-463F-BA96-19DA506CD305}" destId="{2C7DA8E9-DA9C-44F0-BCAD-06FBD5F66BE1}" srcOrd="1" destOrd="0" presId="urn:microsoft.com/office/officeart/2018/2/layout/IconVerticalSolidList"/>
+    <dgm:cxn modelId="{1B07559C-CEA8-4436-867F-0F10954ADAC2}" type="presParOf" srcId="{6B77402A-6F53-463F-BA96-19DA506CD305}" destId="{EB762768-7D6E-4FB6-894E-23E4822DD3BD}" srcOrd="2" destOrd="0" presId="urn:microsoft.com/office/officeart/2018/2/layout/IconVerticalSolidList"/>
+    <dgm:cxn modelId="{9D253507-0792-4623-BD5F-0575AC0B3CCC}" type="presParOf" srcId="{EB762768-7D6E-4FB6-894E-23E4822DD3BD}" destId="{F6F71E3C-271F-4039-8929-4206DE82116A}" srcOrd="0" destOrd="0" presId="urn:microsoft.com/office/officeart/2018/2/layout/IconVerticalSolidList"/>
+    <dgm:cxn modelId="{BA390ECB-A385-4082-B53F-D708AE1D88D8}" type="presParOf" srcId="{EB762768-7D6E-4FB6-894E-23E4822DD3BD}" destId="{BE9A71B0-E621-4B63-9D4B-AD74C6E7335B}" srcOrd="1" destOrd="0" presId="urn:microsoft.com/office/officeart/2018/2/layout/IconVerticalSolidList"/>
+    <dgm:cxn modelId="{6D741132-66C3-4CFB-A47E-794E5129A9A5}" type="presParOf" srcId="{EB762768-7D6E-4FB6-894E-23E4822DD3BD}" destId="{2F59682C-4EF1-44BF-B03B-CBE166A411AB}" srcOrd="2" destOrd="0" presId="urn:microsoft.com/office/officeart/2018/2/layout/IconVerticalSolidList"/>
+    <dgm:cxn modelId="{2133EADE-F8CE-47AF-85FB-5239B8CC020D}" type="presParOf" srcId="{EB762768-7D6E-4FB6-894E-23E4822DD3BD}" destId="{53B5C541-8782-4733-B15D-CBB4184D607C}" srcOrd="3" destOrd="0" presId="urn:microsoft.com/office/officeart/2018/2/layout/IconVerticalSolidList"/>
+    <dgm:cxn modelId="{D46C2B1C-2155-4A60-9E20-BE4A42DA8F0E}" type="presParOf" srcId="{6B77402A-6F53-463F-BA96-19DA506CD305}" destId="{8CCF3787-721E-4031-BDDE-204AE6FAD803}" srcOrd="3" destOrd="0" presId="urn:microsoft.com/office/officeart/2018/2/layout/IconVerticalSolidList"/>
+    <dgm:cxn modelId="{F6AB86BE-E62C-4AC5-8F08-4108655AFB84}" type="presParOf" srcId="{6B77402A-6F53-463F-BA96-19DA506CD305}" destId="{CD5231F0-0237-44E5-8A21-6DA032CF5AA9}" srcOrd="4" destOrd="0" presId="urn:microsoft.com/office/officeart/2018/2/layout/IconVerticalSolidList"/>
+    <dgm:cxn modelId="{B56B8C36-0022-4992-8B51-5FD16541CF4E}" type="presParOf" srcId="{CD5231F0-0237-44E5-8A21-6DA032CF5AA9}" destId="{A4F3006B-1C1E-4328-A2A9-7EAB6AEAAEDC}" srcOrd="0" destOrd="0" presId="urn:microsoft.com/office/officeart/2018/2/layout/IconVerticalSolidList"/>
+    <dgm:cxn modelId="{E9CB656B-F1F8-4643-9694-7E8CB1AD567E}" type="presParOf" srcId="{CD5231F0-0237-44E5-8A21-6DA032CF5AA9}" destId="{44B43527-9613-42B2-9A73-0ECDF1161CFA}" srcOrd="1" destOrd="0" presId="urn:microsoft.com/office/officeart/2018/2/layout/IconVerticalSolidList"/>
+    <dgm:cxn modelId="{E0849C63-444B-43C4-99EC-CF7AC5AD61E0}" type="presParOf" srcId="{CD5231F0-0237-44E5-8A21-6DA032CF5AA9}" destId="{1CF4A9C5-F29D-42A0-BFC5-6E5D69FEFA97}" srcOrd="2" destOrd="0" presId="urn:microsoft.com/office/officeart/2018/2/layout/IconVerticalSolidList"/>
+    <dgm:cxn modelId="{F42E5F55-B761-4640-AB53-695B83634F62}" type="presParOf" srcId="{CD5231F0-0237-44E5-8A21-6DA032CF5AA9}" destId="{62174484-E9E3-4772-818B-30B2990E266D}" srcOrd="3" destOrd="0" presId="urn:microsoft.com/office/officeart/2018/2/layout/IconVerticalSolidList"/>
   </dgm:cxnLst>
   <dgm:bg/>
   <dgm:whole/>
@@ -6058,7 +6071,7 @@
             <a:defRPr cap="all"/>
           </a:pPr>
           <a:r>
-            <a:rPr lang="en-US" sz="1700" kern="1200"/>
+            <a:rPr lang="en-US" sz="1700" kern="1200" dirty="0"/>
             <a:t>A Neural network is a mathematical function</a:t>
           </a:r>
         </a:p>
@@ -6209,7 +6222,7 @@
             <a:defRPr cap="all"/>
           </a:pPr>
           <a:r>
-            <a:rPr lang="en-US" sz="1700" kern="1200"/>
+            <a:rPr lang="en-US" sz="1700" kern="1200" dirty="0"/>
             <a:t>Composed of Layers, with “trainable” Parameters</a:t>
           </a:r>
         </a:p>
@@ -6850,14 +6863,14 @@
       <dsp:cNvGrpSpPr/>
     </dsp:nvGrpSpPr>
     <dsp:grpSpPr/>
-    <dsp:sp modelId="{292242AD-FF61-4216-B659-1BB831C85042}">
+    <dsp:sp modelId="{79320D3D-4810-4059-8CA3-03133B43AFE8}">
       <dsp:nvSpPr>
         <dsp:cNvPr id="0" name=""/>
         <dsp:cNvSpPr/>
       </dsp:nvSpPr>
       <dsp:spPr>
         <a:xfrm>
-          <a:off x="0" y="651"/>
+          <a:off x="0" y="0"/>
           <a:ext cx="6400800" cy="1523627"/>
         </a:xfrm>
         <a:prstGeom prst="roundRect">
@@ -6892,7 +6905,7 @@
         <a:fontRef idx="minor"/>
       </dsp:style>
     </dsp:sp>
-    <dsp:sp modelId="{95F58589-9712-4454-9BFD-FD6CAED45C6E}">
+    <dsp:sp modelId="{5DD6696A-9E6C-4726-8055-6350DF424F78}">
       <dsp:nvSpPr>
         <dsp:cNvPr id="0" name=""/>
         <dsp:cNvSpPr/>
@@ -6916,6 +6929,7 @@
               </a:ext>
             </a:extLst>
           </a:blip>
+          <a:srcRect/>
           <a:stretch>
             <a:fillRect/>
           </a:stretch>
@@ -6949,7 +6963,7 @@
         </a:fontRef>
       </dsp:style>
     </dsp:sp>
-    <dsp:sp modelId="{7E6EB30D-CD13-426C-B58A-B36BAFA2307F}">
+    <dsp:sp modelId="{C694E9BA-8872-4BB5-B593-F935A2D1664B}">
       <dsp:nvSpPr>
         <dsp:cNvPr id="0" name=""/>
         <dsp:cNvSpPr/>
@@ -7001,10 +7015,13 @@
           <a:r>
             <a:rPr lang="en-US" sz="2500" kern="1200" dirty="0">
               <a:solidFill>
-                <a:schemeClr val="bg1"/>
+                <a:schemeClr val="bg1">
+                  <a:lumMod val="95000"/>
+                  <a:lumOff val="5000"/>
+                </a:schemeClr>
               </a:solidFill>
             </a:rPr>
-            <a:t>Choose parameters to minimize the objective function</a:t>
+            <a:t>Iterative method based on gradient descent</a:t>
           </a:r>
         </a:p>
       </dsp:txBody>
@@ -7013,7 +7030,7 @@
         <a:ext cx="4641009" cy="1523627"/>
       </dsp:txXfrm>
     </dsp:sp>
-    <dsp:sp modelId="{C7D822CA-C4FF-43EB-97C9-3957A1B34C91}">
+    <dsp:sp modelId="{F6F71E3C-271F-4039-8929-4206DE82116A}">
       <dsp:nvSpPr>
         <dsp:cNvPr id="0" name=""/>
         <dsp:cNvSpPr/>
@@ -7055,7 +7072,7 @@
         <a:fontRef idx="minor"/>
       </dsp:style>
     </dsp:sp>
-    <dsp:sp modelId="{192976B9-7FD1-4CFB-BA22-D90A547F2A2D}">
+    <dsp:sp modelId="{BE9A71B0-E621-4B63-9D4B-AD74C6E7335B}">
       <dsp:nvSpPr>
         <dsp:cNvPr id="0" name=""/>
         <dsp:cNvSpPr/>
@@ -7112,7 +7129,7 @@
         </a:fontRef>
       </dsp:style>
     </dsp:sp>
-    <dsp:sp modelId="{7ADEE424-9284-48B9-879C-D002AA67A8E2}">
+    <dsp:sp modelId="{53B5C541-8782-4733-B15D-CBB4184D607C}">
       <dsp:nvSpPr>
         <dsp:cNvPr id="0" name=""/>
         <dsp:cNvSpPr/>
@@ -7164,7 +7181,10 @@
           <a:r>
             <a:rPr lang="en-US" sz="2500" kern="1200" dirty="0">
               <a:solidFill>
-                <a:schemeClr val="bg1"/>
+                <a:schemeClr val="bg1">
+                  <a:lumMod val="95000"/>
+                  <a:lumOff val="5000"/>
+                </a:schemeClr>
               </a:solidFill>
             </a:rPr>
             <a:t>Do we </a:t>
@@ -7172,7 +7192,10 @@
           <a:r>
             <a:rPr lang="en-US" sz="2500" i="1" kern="1200" dirty="0">
               <a:solidFill>
-                <a:schemeClr val="bg1"/>
+                <a:schemeClr val="bg1">
+                  <a:lumMod val="95000"/>
+                  <a:lumOff val="5000"/>
+                </a:schemeClr>
               </a:solidFill>
             </a:rPr>
             <a:t>Train </a:t>
@@ -7180,14 +7203,20 @@
           <a:r>
             <a:rPr lang="en-US" sz="2500" i="0" kern="1200" dirty="0">
               <a:solidFill>
-                <a:schemeClr val="bg1"/>
+                <a:schemeClr val="bg1">
+                  <a:lumMod val="95000"/>
+                  <a:lumOff val="5000"/>
+                </a:schemeClr>
               </a:solidFill>
             </a:rPr>
             <a:t>a Neural Network?</a:t>
           </a:r>
           <a:endParaRPr lang="en-US" sz="2500" kern="1200" dirty="0">
             <a:solidFill>
-              <a:schemeClr val="bg1"/>
+              <a:schemeClr val="bg1">
+                <a:lumMod val="95000"/>
+                <a:lumOff val="5000"/>
+              </a:schemeClr>
             </a:solidFill>
           </a:endParaRPr>
         </a:p>
@@ -7197,14 +7226,14 @@
         <a:ext cx="4641009" cy="1523627"/>
       </dsp:txXfrm>
     </dsp:sp>
-    <dsp:sp modelId="{4D704669-4DF4-4296-8594-313245A25DE6}">
+    <dsp:sp modelId="{A4F3006B-1C1E-4328-A2A9-7EAB6AEAAEDC}">
       <dsp:nvSpPr>
         <dsp:cNvPr id="0" name=""/>
         <dsp:cNvSpPr/>
       </dsp:nvSpPr>
       <dsp:spPr>
         <a:xfrm>
-          <a:off x="0" y="3810372"/>
+          <a:off x="0" y="3809720"/>
           <a:ext cx="6400800" cy="1523627"/>
         </a:xfrm>
         <a:prstGeom prst="roundRect">
@@ -7239,7 +7268,7 @@
         <a:fontRef idx="minor"/>
       </dsp:style>
     </dsp:sp>
-    <dsp:sp modelId="{00654C7D-3997-4C25-961E-C15206912944}">
+    <dsp:sp modelId="{44B43527-9613-42B2-9A73-0ECDF1161CFA}">
       <dsp:nvSpPr>
         <dsp:cNvPr id="0" name=""/>
         <dsp:cNvSpPr/>
@@ -7296,7 +7325,7 @@
         </a:fontRef>
       </dsp:style>
     </dsp:sp>
-    <dsp:sp modelId="{30CCCACB-246F-418F-9136-A3C9433C56AD}">
+    <dsp:sp modelId="{62174484-E9E3-4772-818B-30B2990E266D}">
       <dsp:nvSpPr>
         <dsp:cNvPr id="0" name=""/>
         <dsp:cNvSpPr/>
@@ -7348,7 +7377,10 @@
           <a:r>
             <a:rPr lang="en-US" sz="2500" kern="1200" dirty="0">
               <a:solidFill>
-                <a:schemeClr val="bg1"/>
+                <a:schemeClr val="bg1">
+                  <a:lumMod val="95000"/>
+                  <a:lumOff val="5000"/>
+                </a:schemeClr>
               </a:solidFill>
             </a:rPr>
             <a:t>Do we </a:t>
@@ -7356,38 +7388,31 @@
           <a:r>
             <a:rPr lang="en-US" sz="2500" i="1" kern="1200" dirty="0">
               <a:solidFill>
-                <a:schemeClr val="bg1"/>
+                <a:schemeClr val="bg1">
+                  <a:lumMod val="95000"/>
+                  <a:lumOff val="5000"/>
+                </a:schemeClr>
               </a:solidFill>
             </a:rPr>
-            <a:t>train </a:t>
+            <a:t>Optimize </a:t>
           </a:r>
           <a:r>
             <a:rPr lang="en-US" sz="2500" i="0" kern="1200" dirty="0">
               <a:solidFill>
-                <a:schemeClr val="bg1"/>
+                <a:schemeClr val="bg1">
+                  <a:lumMod val="95000"/>
+                  <a:lumOff val="5000"/>
+                </a:schemeClr>
               </a:solidFill>
             </a:rPr>
-            <a:t>or </a:t>
-          </a:r>
-          <a:r>
-            <a:rPr lang="en-US" sz="2500" i="1" kern="1200" dirty="0">
-              <a:solidFill>
-                <a:schemeClr val="bg1"/>
-              </a:solidFill>
-            </a:rPr>
-            <a:t>Optimize</a:t>
-          </a:r>
-          <a:r>
-            <a:rPr lang="en-US" sz="2500" i="0" kern="1200" dirty="0">
-              <a:solidFill>
-                <a:schemeClr val="bg1"/>
-              </a:solidFill>
-            </a:rPr>
-            <a:t> a Neural Network</a:t>
+            <a:t>a Neural Network?</a:t>
           </a:r>
           <a:endParaRPr lang="en-US" sz="2500" kern="1200" dirty="0">
             <a:solidFill>
-              <a:schemeClr val="bg1"/>
+              <a:schemeClr val="bg1">
+                <a:lumMod val="95000"/>
+                <a:lumOff val="5000"/>
+              </a:schemeClr>
             </a:solidFill>
           </a:endParaRPr>
         </a:p>
@@ -19164,7 +19189,169 @@
           <p:cNvPr id="2" name="Title 1">
             <a:extLst>
               <a:ext uri="{FF2B5EF4-FFF2-40B4-BE49-F238E27FC236}">
-                <a16:creationId xmlns:a16="http://schemas.microsoft.com/office/drawing/2014/main" id="{B5EAC733-646D-4D5E-A742-5A8E3D3B5EA1}"/>
+                <a16:creationId xmlns:a16="http://schemas.microsoft.com/office/drawing/2014/main" id="{B387B196-7625-4202-A62C-876327F84B08}"/>
+              </a:ext>
+            </a:extLst>
+          </p:cNvPr>
+          <p:cNvSpPr>
+            <a:spLocks noGrp="1"/>
+          </p:cNvSpPr>
+          <p:nvPr>
+            <p:ph type="title"/>
+          </p:nvPr>
+        </p:nvSpPr>
+        <p:spPr/>
+        <p:txBody>
+          <a:bodyPr/>
+          <a:lstStyle/>
+          <a:p>
+            <a:r>
+              <a:rPr lang="en-US" dirty="0"/>
+              <a:t>Training A Network</a:t>
+            </a:r>
+          </a:p>
+        </p:txBody>
+      </p:sp>
+      <p:sp>
+        <p:nvSpPr>
+          <p:cNvPr id="4" name="Content Placeholder 3">
+            <a:extLst>
+              <a:ext uri="{FF2B5EF4-FFF2-40B4-BE49-F238E27FC236}">
+                <a16:creationId xmlns:a16="http://schemas.microsoft.com/office/drawing/2014/main" id="{91157336-CCEB-44D9-B080-2E99B1057895}"/>
+              </a:ext>
+            </a:extLst>
+          </p:cNvPr>
+          <p:cNvSpPr>
+            <a:spLocks noGrp="1"/>
+          </p:cNvSpPr>
+          <p:nvPr>
+            <p:ph sz="half" idx="2"/>
+          </p:nvPr>
+        </p:nvSpPr>
+        <p:spPr/>
+        <p:txBody>
+          <a:bodyPr/>
+          <a:lstStyle/>
+          <a:p>
+            <a:endParaRPr lang="en-US" dirty="0"/>
+          </a:p>
+          <a:p>
+            <a:r>
+              <a:rPr lang="en-US" dirty="0"/>
+              <a:t>Provide the model with labeled training samples</a:t>
+            </a:r>
+          </a:p>
+          <a:p>
+            <a:endParaRPr lang="en-US" dirty="0"/>
+          </a:p>
+          <a:p>
+            <a:r>
+              <a:rPr lang="en-US" dirty="0"/>
+              <a:t>We quantify the error with an </a:t>
+            </a:r>
+            <a:r>
+              <a:rPr lang="en-US" i="1" dirty="0"/>
+              <a:t>Objective Function</a:t>
+            </a:r>
+            <a:endParaRPr lang="en-US" dirty="0"/>
+          </a:p>
+          <a:p>
+            <a:pPr lvl="1"/>
+            <a:endParaRPr lang="en-US" dirty="0"/>
+          </a:p>
+          <a:p>
+            <a:r>
+              <a:rPr lang="en-US" dirty="0"/>
+              <a:t>Choose the parameters that </a:t>
+            </a:r>
+            <a:r>
+              <a:rPr lang="en-US" i="1" dirty="0"/>
+              <a:t>minimize </a:t>
+            </a:r>
+            <a:r>
+              <a:rPr lang="en-US" dirty="0"/>
+              <a:t>the objective function</a:t>
+            </a:r>
+          </a:p>
+          <a:p>
+            <a:endParaRPr lang="en-US" dirty="0"/>
+          </a:p>
+        </p:txBody>
+      </p:sp>
+      <p:pic>
+        <p:nvPicPr>
+          <p:cNvPr id="5" name="Content Placeholder 4" descr="A picture containing indoor, green, sitting, computer&#10;&#10;Description automatically generated">
+            <a:extLst>
+              <a:ext uri="{FF2B5EF4-FFF2-40B4-BE49-F238E27FC236}">
+                <a16:creationId xmlns:a16="http://schemas.microsoft.com/office/drawing/2014/main" id="{6005B828-2799-4B1D-88D9-13D506B3C023}"/>
+              </a:ext>
+            </a:extLst>
+          </p:cNvPr>
+          <p:cNvPicPr>
+            <a:picLocks noGrp="1" noChangeAspect="1"/>
+          </p:cNvPicPr>
+          <p:nvPr>
+            <p:ph sz="half" idx="1"/>
+          </p:nvPr>
+        </p:nvPicPr>
+        <p:blipFill>
+          <a:blip r:embed="rId2">
+            <a:extLst>
+              <a:ext uri="{28A0092B-C50C-407E-A947-70E740481C1C}">
+                <a14:useLocalDpi xmlns:a14="http://schemas.microsoft.com/office/drawing/2010/main" val="0"/>
+              </a:ext>
+            </a:extLst>
+          </a:blip>
+          <a:stretch>
+            <a:fillRect/>
+          </a:stretch>
+        </p:blipFill>
+        <p:spPr>
+          <a:xfrm>
+            <a:off x="990600" y="2438400"/>
+            <a:ext cx="4735594" cy="2514600"/>
+          </a:xfrm>
+          <a:prstGeom prst="rect">
+            <a:avLst/>
+          </a:prstGeom>
+        </p:spPr>
+      </p:pic>
+    </p:spTree>
+    <p:extLst>
+      <p:ext uri="{BB962C8B-B14F-4D97-AF65-F5344CB8AC3E}">
+        <p14:creationId xmlns:p14="http://schemas.microsoft.com/office/powerpoint/2010/main" val="4061583203"/>
+      </p:ext>
+    </p:extLst>
+  </p:cSld>
+  <p:clrMapOvr>
+    <a:masterClrMapping/>
+  </p:clrMapOvr>
+</p:sld>
+</file>
+
+<file path=ppt/slides/slide11.xml><?xml version="1.0" encoding="utf-8"?>
+<p:sld xmlns:a="http://schemas.openxmlformats.org/drawingml/2006/main" xmlns:r="http://schemas.openxmlformats.org/officeDocument/2006/relationships" xmlns:p="http://schemas.openxmlformats.org/presentationml/2006/main">
+  <p:cSld>
+    <p:spTree>
+      <p:nvGrpSpPr>
+        <p:cNvPr id="1" name=""/>
+        <p:cNvGrpSpPr/>
+        <p:nvPr/>
+      </p:nvGrpSpPr>
+      <p:grpSpPr>
+        <a:xfrm>
+          <a:off x="0" y="0"/>
+          <a:ext cx="0" cy="0"/>
+          <a:chOff x="0" y="0"/>
+          <a:chExt cx="0" cy="0"/>
+        </a:xfrm>
+      </p:grpSpPr>
+      <p:sp>
+        <p:nvSpPr>
+          <p:cNvPr id="2" name="Title 1">
+            <a:extLst>
+              <a:ext uri="{FF2B5EF4-FFF2-40B4-BE49-F238E27FC236}">
+                <a16:creationId xmlns:a16="http://schemas.microsoft.com/office/drawing/2014/main" id="{B8E4DEBA-61BA-4C68-881C-8A4020B428C0}"/>
               </a:ext>
             </a:extLst>
           </p:cNvPr>
@@ -19188,7 +19375,7 @@
           <a:lstStyle/>
           <a:p>
             <a:r>
-              <a:rPr lang="en-US"/>
+              <a:rPr lang="en-US" dirty="0"/>
               <a:t>Optimization</a:t>
             </a:r>
           </a:p>
@@ -19196,10 +19383,10 @@
       </p:sp>
       <p:sp>
         <p:nvSpPr>
-          <p:cNvPr id="4" name="Content Placeholder 3">
+          <p:cNvPr id="9" name="Text Placeholder 3">
             <a:extLst>
               <a:ext uri="{FF2B5EF4-FFF2-40B4-BE49-F238E27FC236}">
-                <a16:creationId xmlns:a16="http://schemas.microsoft.com/office/drawing/2014/main" id="{01A39B9C-DABB-4F96-8286-A4CDA766D77F}"/>
+                <a16:creationId xmlns:a16="http://schemas.microsoft.com/office/drawing/2014/main" id="{63F1F5A5-089C-4146-B028-B9B9F28A8C20}"/>
               </a:ext>
             </a:extLst>
           </p:cNvPr>
@@ -19217,35 +19404,19 @@
           </a:xfrm>
         </p:spPr>
         <p:txBody>
-          <a:bodyPr>
-            <a:normAutofit/>
-          </a:bodyPr>
+          <a:bodyPr/>
           <a:lstStyle/>
           <a:p>
-            <a:pPr>
-              <a:spcAft>
-                <a:spcPts val="600"/>
-              </a:spcAft>
-            </a:pPr>
-            <a:endParaRPr lang="en-US"/>
-          </a:p>
-          <a:p>
-            <a:pPr marL="0" indent="0">
-              <a:spcAft>
-                <a:spcPts val="600"/>
-              </a:spcAft>
-              <a:buNone/>
-            </a:pPr>
             <a:endParaRPr lang="en-US"/>
           </a:p>
         </p:txBody>
       </p:sp>
       <p:graphicFrame>
         <p:nvGraphicFramePr>
-          <p:cNvPr id="6" name="Content Placeholder 2">
+          <p:cNvPr id="5" name="Content Placeholder 2">
             <a:extLst>
               <a:ext uri="{FF2B5EF4-FFF2-40B4-BE49-F238E27FC236}">
-                <a16:creationId xmlns:a16="http://schemas.microsoft.com/office/drawing/2014/main" id="{E8732D5F-2264-42AE-804B-6319B5989AD5}"/>
+                <a16:creationId xmlns:a16="http://schemas.microsoft.com/office/drawing/2014/main" id="{9EAD6ECE-82FE-4629-BC06-AC0EFAC5E479}"/>
               </a:ext>
             </a:extLst>
           </p:cNvPr>
@@ -19256,7 +19427,7 @@
             <p:ph idx="1"/>
             <p:extLst>
               <p:ext uri="{D42A27DB-BD31-4B8C-83A1-F6EECF244321}">
-                <p14:modId xmlns:p14="http://schemas.microsoft.com/office/powerpoint/2010/main" val="2162838229"/>
+                <p14:modId xmlns:p14="http://schemas.microsoft.com/office/powerpoint/2010/main" val="1873146500"/>
               </p:ext>
             </p:extLst>
           </p:nvPr>
@@ -19274,7 +19445,7 @@
     </p:spTree>
     <p:extLst>
       <p:ext uri="{BB962C8B-B14F-4D97-AF65-F5344CB8AC3E}">
-        <p14:creationId xmlns:p14="http://schemas.microsoft.com/office/powerpoint/2010/main" val="1073855754"/>
+        <p14:creationId xmlns:p14="http://schemas.microsoft.com/office/powerpoint/2010/main" val="2671506087"/>
       </p:ext>
     </p:extLst>
   </p:cSld>
@@ -19284,7 +19455,7 @@
 </p:sld>
 </file>
 
-<file path=ppt/slides/slide11.xml><?xml version="1.0" encoding="utf-8"?>
+<file path=ppt/slides/slide12.xml><?xml version="1.0" encoding="utf-8"?>
 <p:sld xmlns:a="http://schemas.openxmlformats.org/drawingml/2006/main" xmlns:r="http://schemas.openxmlformats.org/officeDocument/2006/relationships" xmlns:p="http://schemas.openxmlformats.org/presentationml/2006/main">
   <p:cSld>
     <p:spTree>
@@ -19370,7 +19541,7 @@
 </p:sld>
 </file>
 
-<file path=ppt/slides/slide12.xml><?xml version="1.0" encoding="utf-8"?>
+<file path=ppt/slides/slide13.xml><?xml version="1.0" encoding="utf-8"?>
 <p:sld xmlns:a="http://schemas.openxmlformats.org/drawingml/2006/main" xmlns:r="http://schemas.openxmlformats.org/officeDocument/2006/relationships" xmlns:p="http://schemas.openxmlformats.org/presentationml/2006/main">
   <p:cSld>
     <p:spTree>
@@ -19502,7 +19673,7 @@
           <a:bodyPr/>
           <a:lstStyle/>
           <a:p>
-            <a:endParaRPr lang="en-US"/>
+            <a:endParaRPr lang="en-US" dirty="0"/>
           </a:p>
         </p:txBody>
       </p:sp>
@@ -19519,7 +19690,7 @@
 </p:sld>
 </file>
 
-<file path=ppt/slides/slide13.xml><?xml version="1.0" encoding="utf-8"?>
+<file path=ppt/slides/slide14.xml><?xml version="1.0" encoding="utf-8"?>
 <p:sld xmlns:a="http://schemas.openxmlformats.org/drawingml/2006/main" xmlns:r="http://schemas.openxmlformats.org/officeDocument/2006/relationships" xmlns:p="http://schemas.openxmlformats.org/presentationml/2006/main">
   <p:cSld>
     <p:spTree>
@@ -19669,15 +19840,7 @@
             </a:pPr>
             <a:r>
               <a:rPr lang="en-US" dirty="0"/>
-              <a:t>Examine waveform in a “</a:t>
-            </a:r>
-            <a:r>
-              <a:rPr lang="en-US" dirty="0" err="1"/>
-              <a:t>Quazi</a:t>
-            </a:r>
-            <a:r>
-              <a:rPr lang="en-US" dirty="0"/>
-              <a:t> Stationary state” </a:t>
+              <a:t>Examine waveform in a “Quasi- Stationary state” </a:t>
             </a:r>
           </a:p>
         </p:txBody>
@@ -19695,7 +19858,7 @@
 </p:sld>
 </file>
 
-<file path=ppt/slides/slide14.xml><?xml version="1.0" encoding="utf-8"?>
+<file path=ppt/slides/slide15.xml><?xml version="1.0" encoding="utf-8"?>
 <p:sld xmlns:a="http://schemas.openxmlformats.org/drawingml/2006/main" xmlns:r="http://schemas.openxmlformats.org/officeDocument/2006/relationships" xmlns:p="http://schemas.openxmlformats.org/presentationml/2006/main">
   <p:cSld>
     <p:spTree>
@@ -20214,7 +20377,7 @@
 </p:sld>
 </file>
 
-<file path=ppt/slides/slide15.xml><?xml version="1.0" encoding="utf-8"?>
+<file path=ppt/slides/slide16.xml><?xml version="1.0" encoding="utf-8"?>
 <p:sld xmlns:a="http://schemas.openxmlformats.org/drawingml/2006/main" xmlns:r="http://schemas.openxmlformats.org/officeDocument/2006/relationships" xmlns:p="http://schemas.openxmlformats.org/presentationml/2006/main">
   <p:cSld>
     <p:spTree>
@@ -20254,7 +20417,7 @@
           <a:p>
             <a:r>
               <a:rPr lang="en-US" dirty="0"/>
-              <a:t>Some Features</a:t>
+              <a:t>The Feature Vector</a:t>
             </a:r>
           </a:p>
         </p:txBody>
@@ -20282,7 +20445,7 @@
           <a:p>
             <a:r>
               <a:rPr lang="en-US" b="1" dirty="0"/>
-              <a:t>Time &amp; Frequency Center of Mass</a:t>
+              <a:t>Time Center of Mass</a:t>
             </a:r>
           </a:p>
         </p:txBody>
@@ -20308,7 +20471,10 @@
           <a:bodyPr/>
           <a:lstStyle/>
           <a:p>
-            <a:endParaRPr lang="en-US" b="1" dirty="0"/>
+            <a:r>
+              <a:rPr lang="en-US" b="1" dirty="0"/>
+              <a:t>Frequency Center of Mass</a:t>
+            </a:r>
           </a:p>
         </p:txBody>
       </p:sp>
@@ -20343,31 +20509,150 @@
           </a:p>
         </p:txBody>
       </p:sp>
-      <p:sp>
-        <p:nvSpPr>
-          <p:cNvPr id="4" name="Content Placeholder 3">
+      <p:pic>
+        <p:nvPicPr>
+          <p:cNvPr id="6" name="Picture 5">
             <a:extLst>
               <a:ext uri="{FF2B5EF4-FFF2-40B4-BE49-F238E27FC236}">
-                <a16:creationId xmlns:a16="http://schemas.microsoft.com/office/drawing/2014/main" id="{C43E8E9E-2AC3-42D3-AF24-539D6804EA11}"/>
+                <a16:creationId xmlns:a16="http://schemas.microsoft.com/office/drawing/2014/main" id="{12F398A4-EDDA-4196-AFA0-2EBC7D782CA1}"/>
               </a:ext>
             </a:extLst>
           </p:cNvPr>
-          <p:cNvSpPr>
-            <a:spLocks noGrp="1"/>
-          </p:cNvSpPr>
-          <p:nvPr>
-            <p:ph sz="half" idx="2"/>
-          </p:nvPr>
-        </p:nvSpPr>
-        <p:spPr/>
-        <p:txBody>
-          <a:bodyPr/>
-          <a:lstStyle/>
-          <a:p>
-            <a:endParaRPr lang="en-US"/>
-          </a:p>
-        </p:txBody>
-      </p:sp>
+          <p:cNvPicPr>
+            <a:picLocks noChangeAspect="1"/>
+          </p:cNvPicPr>
+          <p:nvPr/>
+        </p:nvPicPr>
+        <p:blipFill>
+          <a:blip r:embed="rId2" cstate="print">
+            <a:extLst>
+              <a:ext uri="{28A0092B-C50C-407E-A947-70E740481C1C}">
+                <a14:useLocalDpi xmlns:a14="http://schemas.microsoft.com/office/drawing/2010/main" val="0"/>
+              </a:ext>
+            </a:extLst>
+          </a:blip>
+          <a:stretch>
+            <a:fillRect/>
+          </a:stretch>
+        </p:blipFill>
+        <p:spPr>
+          <a:xfrm>
+            <a:off x="6085840" y="2448560"/>
+            <a:ext cx="4754880" cy="1783080"/>
+          </a:xfrm>
+          <a:prstGeom prst="rect">
+            <a:avLst/>
+          </a:prstGeom>
+        </p:spPr>
+      </p:pic>
+      <p:pic>
+        <p:nvPicPr>
+          <p:cNvPr id="10" name="Picture 9">
+            <a:extLst>
+              <a:ext uri="{FF2B5EF4-FFF2-40B4-BE49-F238E27FC236}">
+                <a16:creationId xmlns:a16="http://schemas.microsoft.com/office/drawing/2014/main" id="{A7C709E2-77E1-431B-9DB7-FF5ECAB455EB}"/>
+              </a:ext>
+            </a:extLst>
+          </p:cNvPr>
+          <p:cNvPicPr>
+            <a:picLocks noChangeAspect="1"/>
+          </p:cNvPicPr>
+          <p:nvPr/>
+        </p:nvPicPr>
+        <p:blipFill>
+          <a:blip r:embed="rId3" cstate="print">
+            <a:extLst>
+              <a:ext uri="{28A0092B-C50C-407E-A947-70E740481C1C}">
+                <a14:useLocalDpi xmlns:a14="http://schemas.microsoft.com/office/drawing/2010/main" val="0"/>
+              </a:ext>
+            </a:extLst>
+          </a:blip>
+          <a:stretch>
+            <a:fillRect/>
+          </a:stretch>
+        </p:blipFill>
+        <p:spPr>
+          <a:xfrm>
+            <a:off x="609600" y="2438400"/>
+            <a:ext cx="4754880" cy="1783080"/>
+          </a:xfrm>
+          <a:prstGeom prst="rect">
+            <a:avLst/>
+          </a:prstGeom>
+        </p:spPr>
+      </p:pic>
+      <p:pic>
+        <p:nvPicPr>
+          <p:cNvPr id="12" name="Picture 11">
+            <a:extLst>
+              <a:ext uri="{FF2B5EF4-FFF2-40B4-BE49-F238E27FC236}">
+                <a16:creationId xmlns:a16="http://schemas.microsoft.com/office/drawing/2014/main" id="{F0B5BB76-3CBA-43E3-A5E7-8EAB1C40920B}"/>
+              </a:ext>
+            </a:extLst>
+          </p:cNvPr>
+          <p:cNvPicPr>
+            <a:picLocks noChangeAspect="1"/>
+          </p:cNvPicPr>
+          <p:nvPr/>
+        </p:nvPicPr>
+        <p:blipFill>
+          <a:blip r:embed="rId4" cstate="print">
+            <a:extLst>
+              <a:ext uri="{28A0092B-C50C-407E-A947-70E740481C1C}">
+                <a14:useLocalDpi xmlns:a14="http://schemas.microsoft.com/office/drawing/2010/main" val="0"/>
+              </a:ext>
+            </a:extLst>
+          </a:blip>
+          <a:stretch>
+            <a:fillRect/>
+          </a:stretch>
+        </p:blipFill>
+        <p:spPr>
+          <a:xfrm>
+            <a:off x="609600" y="4419600"/>
+            <a:ext cx="4754880" cy="1783080"/>
+          </a:xfrm>
+          <a:prstGeom prst="rect">
+            <a:avLst/>
+          </a:prstGeom>
+        </p:spPr>
+      </p:pic>
+      <p:pic>
+        <p:nvPicPr>
+          <p:cNvPr id="14" name="Picture 13">
+            <a:extLst>
+              <a:ext uri="{FF2B5EF4-FFF2-40B4-BE49-F238E27FC236}">
+                <a16:creationId xmlns:a16="http://schemas.microsoft.com/office/drawing/2014/main" id="{ACA09F6B-8216-46CC-A9E2-C499E5E06783}"/>
+              </a:ext>
+            </a:extLst>
+          </p:cNvPr>
+          <p:cNvPicPr>
+            <a:picLocks noChangeAspect="1"/>
+          </p:cNvPicPr>
+          <p:nvPr/>
+        </p:nvPicPr>
+        <p:blipFill>
+          <a:blip r:embed="rId5" cstate="print">
+            <a:extLst>
+              <a:ext uri="{28A0092B-C50C-407E-A947-70E740481C1C}">
+                <a14:useLocalDpi xmlns:a14="http://schemas.microsoft.com/office/drawing/2010/main" val="0"/>
+              </a:ext>
+            </a:extLst>
+          </a:blip>
+          <a:stretch>
+            <a:fillRect/>
+          </a:stretch>
+        </p:blipFill>
+        <p:spPr>
+          <a:xfrm>
+            <a:off x="6085840" y="4419600"/>
+            <a:ext cx="4754880" cy="1783080"/>
+          </a:xfrm>
+          <a:prstGeom prst="rect">
+            <a:avLst/>
+          </a:prstGeom>
+        </p:spPr>
+      </p:pic>
     </p:spTree>
     <p:extLst>
       <p:ext uri="{BB962C8B-B14F-4D97-AF65-F5344CB8AC3E}">
@@ -20381,7 +20666,7 @@
 </p:sld>
 </file>
 
-<file path=ppt/slides/slide16.xml><?xml version="1.0" encoding="utf-8"?>
+<file path=ppt/slides/slide17.xml><?xml version="1.0" encoding="utf-8"?>
 <p:sld xmlns:a="http://schemas.openxmlformats.org/drawingml/2006/main" xmlns:r="http://schemas.openxmlformats.org/officeDocument/2006/relationships" xmlns:p="http://schemas.openxmlformats.org/presentationml/2006/main">
   <p:cSld>
     <p:spTree>
@@ -20421,7 +20706,7 @@
           <a:p>
             <a:r>
               <a:rPr lang="en-US" dirty="0"/>
-              <a:t>Time-Space Features (Cont.)</a:t>
+              <a:t>Feature Vector (Cont.)</a:t>
             </a:r>
           </a:p>
         </p:txBody>
@@ -20444,12 +20729,22 @@
         </p:nvSpPr>
         <p:spPr/>
         <p:txBody>
-          <a:bodyPr/>
+          <a:bodyPr>
+            <a:normAutofit lnSpcReduction="10000"/>
+          </a:bodyPr>
           <a:lstStyle/>
           <a:p>
             <a:r>
               <a:rPr lang="en-US" b="1" dirty="0"/>
-              <a:t>Temporal Center of Mass</a:t>
+              <a:t>Mel Frequency </a:t>
+            </a:r>
+            <a:r>
+              <a:rPr lang="en-US" b="1" dirty="0" err="1"/>
+              <a:t>Cepstrum</a:t>
+            </a:r>
+            <a:r>
+              <a:rPr lang="en-US" b="1" dirty="0"/>
+              <a:t> Coefficients</a:t>
             </a:r>
           </a:p>
         </p:txBody>
@@ -20481,50 +20776,10 @@
             <a:endParaRPr lang="en-US" dirty="0"/>
           </a:p>
           <a:p>
-            <a:r>
-              <a:rPr lang="en-US" dirty="0"/>
-              <a:t>Treat waveform as 1D mass-distribution</a:t>
-            </a:r>
-          </a:p>
-          <a:p>
             <a:endParaRPr lang="en-US" dirty="0"/>
           </a:p>
           <a:p>
-            <a:r>
-              <a:rPr lang="en-US" dirty="0"/>
-              <a:t>Short sustains vs. long sustains</a:t>
-            </a:r>
-          </a:p>
-          <a:p>
             <a:endParaRPr lang="en-US" dirty="0"/>
-          </a:p>
-        </p:txBody>
-      </p:sp>
-      <p:sp>
-        <p:nvSpPr>
-          <p:cNvPr id="5" name="Text Placeholder 4">
-            <a:extLst>
-              <a:ext uri="{FF2B5EF4-FFF2-40B4-BE49-F238E27FC236}">
-                <a16:creationId xmlns:a16="http://schemas.microsoft.com/office/drawing/2014/main" id="{55EB235A-9FB6-4251-9B43-585673BD3ECF}"/>
-              </a:ext>
-            </a:extLst>
-          </p:cNvPr>
-          <p:cNvSpPr>
-            <a:spLocks noGrp="1"/>
-          </p:cNvSpPr>
-          <p:nvPr>
-            <p:ph type="body" sz="quarter" idx="3"/>
-          </p:nvPr>
-        </p:nvSpPr>
-        <p:spPr/>
-        <p:txBody>
-          <a:bodyPr/>
-          <a:lstStyle/>
-          <a:p>
-            <a:r>
-              <a:rPr lang="en-US" b="1" dirty="0"/>
-              <a:t>Auto Correlation Coefficients (x4)</a:t>
-            </a:r>
           </a:p>
         </p:txBody>
       </p:sp>
@@ -20555,19 +20810,34 @@
             <a:endParaRPr lang="en-US" dirty="0"/>
           </a:p>
           <a:p>
-            <a:r>
-              <a:rPr lang="en-US" dirty="0"/>
-              <a:t>Dotting a signal to a time-delayed version of itself</a:t>
-            </a:r>
-          </a:p>
-          <a:p>
             <a:endParaRPr lang="en-US" dirty="0"/>
           </a:p>
-          <a:p>
-            <a:r>
-              <a:rPr lang="en-US" dirty="0"/>
-              <a:t>Useful for detecting periodicity</a:t>
-            </a:r>
+        </p:txBody>
+      </p:sp>
+      <p:sp>
+        <p:nvSpPr>
+          <p:cNvPr id="8" name="Text Placeholder 7">
+            <a:extLst>
+              <a:ext uri="{FF2B5EF4-FFF2-40B4-BE49-F238E27FC236}">
+                <a16:creationId xmlns:a16="http://schemas.microsoft.com/office/drawing/2014/main" id="{177EE3EE-0B39-460C-93F4-A1999E8F90EF}"/>
+              </a:ext>
+            </a:extLst>
+          </p:cNvPr>
+          <p:cNvSpPr>
+            <a:spLocks noGrp="1"/>
+          </p:cNvSpPr>
+          <p:nvPr>
+            <p:ph type="body" sz="quarter" idx="3"/>
+          </p:nvPr>
+        </p:nvSpPr>
+        <p:spPr/>
+        <p:txBody>
+          <a:bodyPr>
+            <a:normAutofit lnSpcReduction="10000"/>
+          </a:bodyPr>
+          <a:lstStyle/>
+          <a:p>
+            <a:endParaRPr lang="en-US" dirty="0"/>
           </a:p>
         </p:txBody>
       </p:sp>
@@ -20584,7 +20854,7 @@
 </p:sld>
 </file>
 
-<file path=ppt/slides/slide17.xml><?xml version="1.0" encoding="utf-8"?>
+<file path=ppt/slides/slide18.xml><?xml version="1.0" encoding="utf-8"?>
 <p:sld xmlns:a="http://schemas.openxmlformats.org/drawingml/2006/main" xmlns:r="http://schemas.openxmlformats.org/officeDocument/2006/relationships" xmlns:p="http://schemas.openxmlformats.org/presentationml/2006/main">
   <p:cSld>
     <p:spTree>
@@ -20813,7 +21083,7 @@
 </p:sld>
 </file>
 
-<file path=ppt/slides/slide18.xml><?xml version="1.0" encoding="utf-8"?>
+<file path=ppt/slides/slide19.xml><?xml version="1.0" encoding="utf-8"?>
 <p:sld xmlns:a="http://schemas.openxmlformats.org/drawingml/2006/main" xmlns:r="http://schemas.openxmlformats.org/officeDocument/2006/relationships" xmlns:p="http://schemas.openxmlformats.org/presentationml/2006/main">
   <p:cSld>
     <p:spTree>
@@ -20899,7 +21169,93 @@
 </p:sld>
 </file>
 
-<file path=ppt/slides/slide19.xml><?xml version="1.0" encoding="utf-8"?>
+<file path=ppt/slides/slide2.xml><?xml version="1.0" encoding="utf-8"?>
+<p:sld xmlns:a="http://schemas.openxmlformats.org/drawingml/2006/main" xmlns:r="http://schemas.openxmlformats.org/officeDocument/2006/relationships" xmlns:p="http://schemas.openxmlformats.org/presentationml/2006/main">
+  <p:cSld>
+    <p:spTree>
+      <p:nvGrpSpPr>
+        <p:cNvPr id="1" name=""/>
+        <p:cNvGrpSpPr/>
+        <p:nvPr/>
+      </p:nvGrpSpPr>
+      <p:grpSpPr>
+        <a:xfrm>
+          <a:off x="0" y="0"/>
+          <a:ext cx="0" cy="0"/>
+          <a:chOff x="0" y="0"/>
+          <a:chExt cx="0" cy="0"/>
+        </a:xfrm>
+      </p:grpSpPr>
+      <p:sp>
+        <p:nvSpPr>
+          <p:cNvPr id="2" name="Title 1">
+            <a:extLst>
+              <a:ext uri="{FF2B5EF4-FFF2-40B4-BE49-F238E27FC236}">
+                <a16:creationId xmlns:a16="http://schemas.microsoft.com/office/drawing/2014/main" id="{58F3AE01-0501-4D0A-8DD0-5C3D7341F5FE}"/>
+              </a:ext>
+            </a:extLst>
+          </p:cNvPr>
+          <p:cNvSpPr>
+            <a:spLocks noGrp="1"/>
+          </p:cNvSpPr>
+          <p:nvPr>
+            <p:ph type="title"/>
+          </p:nvPr>
+        </p:nvSpPr>
+        <p:spPr/>
+        <p:txBody>
+          <a:bodyPr/>
+          <a:lstStyle/>
+          <a:p>
+            <a:r>
+              <a:rPr lang="en-US" dirty="0"/>
+              <a:t>Let’s Play a Game</a:t>
+            </a:r>
+          </a:p>
+        </p:txBody>
+      </p:sp>
+      <p:sp>
+        <p:nvSpPr>
+          <p:cNvPr id="3" name="Text Placeholder 2">
+            <a:extLst>
+              <a:ext uri="{FF2B5EF4-FFF2-40B4-BE49-F238E27FC236}">
+                <a16:creationId xmlns:a16="http://schemas.microsoft.com/office/drawing/2014/main" id="{745B31D9-4AA6-45C8-899B-3DE854CCB2B6}"/>
+              </a:ext>
+            </a:extLst>
+          </p:cNvPr>
+          <p:cNvSpPr>
+            <a:spLocks noGrp="1"/>
+          </p:cNvSpPr>
+          <p:nvPr>
+            <p:ph type="body" idx="1"/>
+          </p:nvPr>
+        </p:nvSpPr>
+        <p:spPr/>
+        <p:txBody>
+          <a:bodyPr/>
+          <a:lstStyle/>
+          <a:p>
+            <a:r>
+              <a:rPr lang="en-US" dirty="0"/>
+              <a:t>What made the sound being played?</a:t>
+            </a:r>
+          </a:p>
+        </p:txBody>
+      </p:sp>
+    </p:spTree>
+    <p:extLst>
+      <p:ext uri="{BB962C8B-B14F-4D97-AF65-F5344CB8AC3E}">
+        <p14:creationId xmlns:p14="http://schemas.microsoft.com/office/powerpoint/2010/main" val="3060856925"/>
+      </p:ext>
+    </p:extLst>
+  </p:cSld>
+  <p:clrMapOvr>
+    <a:masterClrMapping/>
+  </p:clrMapOvr>
+</p:sld>
+</file>
+
+<file path=ppt/slides/slide20.xml><?xml version="1.0" encoding="utf-8"?>
 <p:sld xmlns:a="http://schemas.openxmlformats.org/drawingml/2006/main" xmlns:r="http://schemas.openxmlformats.org/officeDocument/2006/relationships" xmlns:p="http://schemas.openxmlformats.org/presentationml/2006/main">
   <p:cSld>
     <p:spTree>
@@ -21025,93 +21381,7 @@
 </p:sld>
 </file>
 
-<file path=ppt/slides/slide2.xml><?xml version="1.0" encoding="utf-8"?>
-<p:sld xmlns:a="http://schemas.openxmlformats.org/drawingml/2006/main" xmlns:r="http://schemas.openxmlformats.org/officeDocument/2006/relationships" xmlns:p="http://schemas.openxmlformats.org/presentationml/2006/main">
-  <p:cSld>
-    <p:spTree>
-      <p:nvGrpSpPr>
-        <p:cNvPr id="1" name=""/>
-        <p:cNvGrpSpPr/>
-        <p:nvPr/>
-      </p:nvGrpSpPr>
-      <p:grpSpPr>
-        <a:xfrm>
-          <a:off x="0" y="0"/>
-          <a:ext cx="0" cy="0"/>
-          <a:chOff x="0" y="0"/>
-          <a:chExt cx="0" cy="0"/>
-        </a:xfrm>
-      </p:grpSpPr>
-      <p:sp>
-        <p:nvSpPr>
-          <p:cNvPr id="2" name="Title 1">
-            <a:extLst>
-              <a:ext uri="{FF2B5EF4-FFF2-40B4-BE49-F238E27FC236}">
-                <a16:creationId xmlns:a16="http://schemas.microsoft.com/office/drawing/2014/main" id="{58F3AE01-0501-4D0A-8DD0-5C3D7341F5FE}"/>
-              </a:ext>
-            </a:extLst>
-          </p:cNvPr>
-          <p:cNvSpPr>
-            <a:spLocks noGrp="1"/>
-          </p:cNvSpPr>
-          <p:nvPr>
-            <p:ph type="title"/>
-          </p:nvPr>
-        </p:nvSpPr>
-        <p:spPr/>
-        <p:txBody>
-          <a:bodyPr/>
-          <a:lstStyle/>
-          <a:p>
-            <a:r>
-              <a:rPr lang="en-US" dirty="0"/>
-              <a:t>Let’s Play a Game</a:t>
-            </a:r>
-          </a:p>
-        </p:txBody>
-      </p:sp>
-      <p:sp>
-        <p:nvSpPr>
-          <p:cNvPr id="3" name="Text Placeholder 2">
-            <a:extLst>
-              <a:ext uri="{FF2B5EF4-FFF2-40B4-BE49-F238E27FC236}">
-                <a16:creationId xmlns:a16="http://schemas.microsoft.com/office/drawing/2014/main" id="{745B31D9-4AA6-45C8-899B-3DE854CCB2B6}"/>
-              </a:ext>
-            </a:extLst>
-          </p:cNvPr>
-          <p:cNvSpPr>
-            <a:spLocks noGrp="1"/>
-          </p:cNvSpPr>
-          <p:nvPr>
-            <p:ph type="body" idx="1"/>
-          </p:nvPr>
-        </p:nvSpPr>
-        <p:spPr/>
-        <p:txBody>
-          <a:bodyPr/>
-          <a:lstStyle/>
-          <a:p>
-            <a:r>
-              <a:rPr lang="en-US" dirty="0"/>
-              <a:t>What made the sound being played?</a:t>
-            </a:r>
-          </a:p>
-        </p:txBody>
-      </p:sp>
-    </p:spTree>
-    <p:extLst>
-      <p:ext uri="{BB962C8B-B14F-4D97-AF65-F5344CB8AC3E}">
-        <p14:creationId xmlns:p14="http://schemas.microsoft.com/office/powerpoint/2010/main" val="3060856925"/>
-      </p:ext>
-    </p:extLst>
-  </p:cSld>
-  <p:clrMapOvr>
-    <a:masterClrMapping/>
-  </p:clrMapOvr>
-</p:sld>
-</file>
-
-<file path=ppt/slides/slide20.xml><?xml version="1.0" encoding="utf-8"?>
+<file path=ppt/slides/slide21.xml><?xml version="1.0" encoding="utf-8"?>
 <p:sld xmlns:a="http://schemas.openxmlformats.org/drawingml/2006/main" xmlns:r="http://schemas.openxmlformats.org/officeDocument/2006/relationships" xmlns:p="http://schemas.openxmlformats.org/presentationml/2006/main">
   <p:cSld>
     <p:spTree>
@@ -21322,7 +21592,7 @@
 </p:sld>
 </file>
 
-<file path=ppt/slides/slide21.xml><?xml version="1.0" encoding="utf-8"?>
+<file path=ppt/slides/slide22.xml><?xml version="1.0" encoding="utf-8"?>
 <p:sld xmlns:a="http://schemas.openxmlformats.org/drawingml/2006/main" xmlns:r="http://schemas.openxmlformats.org/officeDocument/2006/relationships" xmlns:p="http://schemas.openxmlformats.org/presentationml/2006/main">
   <p:cSld>
     <p:spTree>
@@ -21408,7 +21678,7 @@
 </p:sld>
 </file>
 
-<file path=ppt/slides/slide22.xml><?xml version="1.0" encoding="utf-8"?>
+<file path=ppt/slides/slide23.xml><?xml version="1.0" encoding="utf-8"?>
 <p:sld xmlns:a="http://schemas.openxmlformats.org/drawingml/2006/main" xmlns:r="http://schemas.openxmlformats.org/officeDocument/2006/relationships" xmlns:p="http://schemas.openxmlformats.org/presentationml/2006/main">
   <p:cSld>
     <p:spTree>
@@ -21847,7 +22117,7 @@
 </p:sld>
 </file>
 
-<file path=ppt/slides/slide23.xml><?xml version="1.0" encoding="utf-8"?>
+<file path=ppt/slides/slide24.xml><?xml version="1.0" encoding="utf-8"?>
 <p:sld xmlns:a="http://schemas.openxmlformats.org/drawingml/2006/main" xmlns:r="http://schemas.openxmlformats.org/officeDocument/2006/relationships" xmlns:p="http://schemas.openxmlformats.org/presentationml/2006/main">
   <p:cSld>
     <p:spTree>
@@ -22005,7 +22275,7 @@
 </p:sld>
 </file>
 
-<file path=ppt/slides/slide24.xml><?xml version="1.0" encoding="utf-8"?>
+<file path=ppt/slides/slide25.xml><?xml version="1.0" encoding="utf-8"?>
 <p:sld xmlns:a="http://schemas.openxmlformats.org/drawingml/2006/main" xmlns:r="http://schemas.openxmlformats.org/officeDocument/2006/relationships" xmlns:p="http://schemas.openxmlformats.org/presentationml/2006/main">
   <p:cSld>
     <p:spTree>
@@ -22153,7 +22423,7 @@
 </p:sld>
 </file>
 
-<file path=ppt/slides/slide25.xml><?xml version="1.0" encoding="utf-8"?>
+<file path=ppt/slides/slide26.xml><?xml version="1.0" encoding="utf-8"?>
 <p:sld xmlns:a="http://schemas.openxmlformats.org/drawingml/2006/main" xmlns:r="http://schemas.openxmlformats.org/officeDocument/2006/relationships" xmlns:p="http://schemas.openxmlformats.org/presentationml/2006/main">
   <p:cSld>
     <p:spTree>
@@ -22288,7 +22558,7 @@
 </p:sld>
 </file>
 
-<file path=ppt/slides/slide26.xml><?xml version="1.0" encoding="utf-8"?>
+<file path=ppt/slides/slide27.xml><?xml version="1.0" encoding="utf-8"?>
 <p:sld xmlns:a="http://schemas.openxmlformats.org/drawingml/2006/main" xmlns:r="http://schemas.openxmlformats.org/officeDocument/2006/relationships" xmlns:p="http://schemas.openxmlformats.org/presentationml/2006/main">
   <p:cSld>
     <p:spTree>
@@ -23374,7 +23644,7 @@
           <p:nvPr>
             <p:extLst>
               <p:ext uri="{D42A27DB-BD31-4B8C-83A1-F6EECF244321}">
-                <p14:modId xmlns:p14="http://schemas.microsoft.com/office/powerpoint/2010/main" val="478174190"/>
+                <p14:modId xmlns:p14="http://schemas.microsoft.com/office/powerpoint/2010/main" val="538553973"/>
               </p:ext>
             </p:extLst>
           </p:nvPr>
@@ -23520,7 +23790,7 @@
           <p:cNvPr id="2" name="Title 1">
             <a:extLst>
               <a:ext uri="{FF2B5EF4-FFF2-40B4-BE49-F238E27FC236}">
-                <a16:creationId xmlns:a16="http://schemas.microsoft.com/office/drawing/2014/main" id="{B387B196-7625-4202-A62C-876327F84B08}"/>
+                <a16:creationId xmlns:a16="http://schemas.microsoft.com/office/drawing/2014/main" id="{DCFA0196-E2B4-4B11-87AF-0C46A337E84A}"/>
               </a:ext>
             </a:extLst>
           </p:cNvPr>
@@ -23538,7 +23808,35 @@
           <a:p>
             <a:r>
               <a:rPr lang="en-US" dirty="0"/>
-              <a:t>Training A Network</a:t>
+              <a:t>Main Types of Layers</a:t>
+            </a:r>
+          </a:p>
+        </p:txBody>
+      </p:sp>
+      <p:sp>
+        <p:nvSpPr>
+          <p:cNvPr id="3" name="Text Placeholder 2">
+            <a:extLst>
+              <a:ext uri="{FF2B5EF4-FFF2-40B4-BE49-F238E27FC236}">
+                <a16:creationId xmlns:a16="http://schemas.microsoft.com/office/drawing/2014/main" id="{609C2F40-636B-409A-B88E-92F082C09B61}"/>
+              </a:ext>
+            </a:extLst>
+          </p:cNvPr>
+          <p:cNvSpPr>
+            <a:spLocks noGrp="1"/>
+          </p:cNvSpPr>
+          <p:nvPr>
+            <p:ph type="body" idx="1"/>
+          </p:nvPr>
+        </p:nvSpPr>
+        <p:spPr/>
+        <p:txBody>
+          <a:bodyPr/>
+          <a:lstStyle/>
+          <a:p>
+            <a:r>
+              <a:rPr lang="en-US" dirty="0"/>
+              <a:t>2D Convolution Layer</a:t>
             </a:r>
           </a:p>
         </p:txBody>
@@ -23548,7 +23846,7 @@
           <p:cNvPr id="4" name="Content Placeholder 3">
             <a:extLst>
               <a:ext uri="{FF2B5EF4-FFF2-40B4-BE49-F238E27FC236}">
-                <a16:creationId xmlns:a16="http://schemas.microsoft.com/office/drawing/2014/main" id="{91157336-CCEB-44D9-B080-2E99B1057895}"/>
+                <a16:creationId xmlns:a16="http://schemas.microsoft.com/office/drawing/2014/main" id="{14D7C688-D1B2-4E4B-97B9-162AD44179F7}"/>
               </a:ext>
             </a:extLst>
           </p:cNvPr>
@@ -23561,55 +23859,64 @@
         </p:nvSpPr>
         <p:spPr/>
         <p:txBody>
+          <a:bodyPr>
+            <a:normAutofit lnSpcReduction="10000"/>
+          </a:bodyPr>
+          <a:lstStyle/>
+          <a:p>
+            <a:r>
+              <a:rPr lang="en-US" dirty="0"/>
+              <a:t>Sparse Connectivity</a:t>
+            </a:r>
+          </a:p>
+          <a:p>
+            <a:endParaRPr lang="en-US" dirty="0"/>
+          </a:p>
+          <a:p>
+            <a:endParaRPr lang="en-US" dirty="0"/>
+          </a:p>
+          <a:p>
+            <a:endParaRPr lang="en-US" dirty="0"/>
+          </a:p>
+          <a:p>
+            <a:endParaRPr lang="en-US" dirty="0"/>
+          </a:p>
+          <a:p>
+            <a:endParaRPr lang="en-US" dirty="0"/>
+          </a:p>
+          <a:p>
+            <a:r>
+              <a:rPr lang="en-US" dirty="0"/>
+              <a:t>Outputs are a convolution product of kernel &amp; Inputs</a:t>
+            </a:r>
+          </a:p>
+        </p:txBody>
+      </p:sp>
+      <p:sp>
+        <p:nvSpPr>
+          <p:cNvPr id="5" name="Text Placeholder 4">
+            <a:extLst>
+              <a:ext uri="{FF2B5EF4-FFF2-40B4-BE49-F238E27FC236}">
+                <a16:creationId xmlns:a16="http://schemas.microsoft.com/office/drawing/2014/main" id="{4E328D43-B4A6-4168-BFDC-E0A578E7CD07}"/>
+              </a:ext>
+            </a:extLst>
+          </p:cNvPr>
+          <p:cNvSpPr>
+            <a:spLocks noGrp="1"/>
+          </p:cNvSpPr>
+          <p:nvPr>
+            <p:ph type="body" sz="quarter" idx="3"/>
+          </p:nvPr>
+        </p:nvSpPr>
+        <p:spPr/>
+        <p:txBody>
           <a:bodyPr/>
           <a:lstStyle/>
           <a:p>
-            <a:endParaRPr lang="en-US"/>
-          </a:p>
-          <a:p>
             <a:r>
-              <a:rPr lang="en-US"/>
-              <a:t>Provide the model with labeled training samples</a:t>
+              <a:rPr lang="en-US" dirty="0"/>
+              <a:t>Dense Layer</a:t>
             </a:r>
-          </a:p>
-          <a:p>
-            <a:endParaRPr lang="en-US"/>
-          </a:p>
-          <a:p>
-            <a:r>
-              <a:rPr lang="en-US"/>
-              <a:t>The model makes a prediction</a:t>
-            </a:r>
-          </a:p>
-          <a:p>
-            <a:pPr lvl="1"/>
-            <a:r>
-              <a:rPr lang="en-US"/>
-              <a:t>For an untrained network, this is likely to be </a:t>
-            </a:r>
-            <a:r>
-              <a:rPr lang="en-US" i="1"/>
-              <a:t>very poor</a:t>
-            </a:r>
-            <a:endParaRPr lang="en-US"/>
-          </a:p>
-          <a:p>
-            <a:pPr lvl="1"/>
-            <a:endParaRPr lang="en-US"/>
-          </a:p>
-          <a:p>
-            <a:r>
-              <a:rPr lang="en-US"/>
-              <a:t>We quantify the error with an </a:t>
-            </a:r>
-            <a:r>
-              <a:rPr lang="en-US" i="1"/>
-              <a:t>Objective Function</a:t>
-            </a:r>
-            <a:endParaRPr lang="en-US"/>
-          </a:p>
-          <a:p>
-            <a:endParaRPr lang="en-US" dirty="0"/>
           </a:p>
         </p:txBody>
       </p:sp>
@@ -23618,7 +23925,7 @@
           <p:cNvPr id="6" name="Content Placeholder 5">
             <a:extLst>
               <a:ext uri="{FF2B5EF4-FFF2-40B4-BE49-F238E27FC236}">
-                <a16:creationId xmlns:a16="http://schemas.microsoft.com/office/drawing/2014/main" id="{9E304FCB-8806-467F-84E0-9F9AD5ED9613}"/>
+                <a16:creationId xmlns:a16="http://schemas.microsoft.com/office/drawing/2014/main" id="{872C304B-1717-41FA-B442-2FEAAA101A35}"/>
               </a:ext>
             </a:extLst>
           </p:cNvPr>
@@ -23626,22 +23933,48 @@
             <a:spLocks noGrp="1"/>
           </p:cNvSpPr>
           <p:nvPr>
-            <p:ph sz="half" idx="1"/>
+            <p:ph sz="quarter" idx="4"/>
           </p:nvPr>
         </p:nvSpPr>
         <p:spPr/>
         <p:txBody>
-          <a:bodyPr/>
+          <a:bodyPr>
+            <a:normAutofit lnSpcReduction="10000"/>
+          </a:bodyPr>
           <a:lstStyle/>
           <a:p>
-            <a:endParaRPr lang="en-US"/>
+            <a:r>
+              <a:rPr lang="en-US" dirty="0"/>
+              <a:t>“Dense” Connectivity</a:t>
+            </a:r>
+          </a:p>
+          <a:p>
+            <a:endParaRPr lang="en-US" dirty="0"/>
+          </a:p>
+          <a:p>
+            <a:endParaRPr lang="en-US" dirty="0"/>
+          </a:p>
+          <a:p>
+            <a:endParaRPr lang="en-US" dirty="0"/>
+          </a:p>
+          <a:p>
+            <a:endParaRPr lang="en-US" dirty="0"/>
+          </a:p>
+          <a:p>
+            <a:endParaRPr lang="en-US" dirty="0"/>
+          </a:p>
+          <a:p>
+            <a:r>
+              <a:rPr lang="en-US" dirty="0"/>
+              <a:t>Outputs are a linear combination of inputs</a:t>
+            </a:r>
           </a:p>
         </p:txBody>
       </p:sp>
     </p:spTree>
     <p:extLst>
       <p:ext uri="{BB962C8B-B14F-4D97-AF65-F5344CB8AC3E}">
-        <p14:creationId xmlns:p14="http://schemas.microsoft.com/office/powerpoint/2010/main" val="4061583203"/>
+        <p14:creationId xmlns:p14="http://schemas.microsoft.com/office/powerpoint/2010/main" val="1306407767"/>
       </p:ext>
     </p:extLst>
   </p:cSld>

</xml_diff>

<commit_message>
Updates to Slide Shown, New Figures
</commit_message>
<xml_diff>
--- a/Thesis/CapstonePresentaion/Classifying Chaotic Synthesizers with a Multimodal Neural Network.pptx
+++ b/Thesis/CapstonePresentaion/Classifying Chaotic Synthesizers with a Multimodal Neural Network.pptx
@@ -5,10 +5,10 @@
     <p:sldMasterId id="2147483648" r:id="rId1"/>
   </p:sldMasterIdLst>
   <p:notesMasterIdLst>
-    <p:notesMasterId r:id="rId29"/>
+    <p:notesMasterId r:id="rId28"/>
   </p:notesMasterIdLst>
   <p:handoutMasterIdLst>
-    <p:handoutMasterId r:id="rId30"/>
+    <p:handoutMasterId r:id="rId29"/>
   </p:handoutMasterIdLst>
   <p:sldIdLst>
     <p:sldId id="256" r:id="rId2"/>
@@ -28,16 +28,15 @@
     <p:sldId id="265" r:id="rId16"/>
     <p:sldId id="281" r:id="rId17"/>
     <p:sldId id="282" r:id="rId18"/>
-    <p:sldId id="279" r:id="rId19"/>
-    <p:sldId id="283" r:id="rId20"/>
-    <p:sldId id="284" r:id="rId21"/>
-    <p:sldId id="285" r:id="rId22"/>
-    <p:sldId id="286" r:id="rId23"/>
-    <p:sldId id="289" r:id="rId24"/>
-    <p:sldId id="288" r:id="rId25"/>
-    <p:sldId id="290" r:id="rId26"/>
-    <p:sldId id="292" r:id="rId27"/>
-    <p:sldId id="295" r:id="rId28"/>
+    <p:sldId id="283" r:id="rId19"/>
+    <p:sldId id="284" r:id="rId20"/>
+    <p:sldId id="285" r:id="rId21"/>
+    <p:sldId id="286" r:id="rId22"/>
+    <p:sldId id="289" r:id="rId23"/>
+    <p:sldId id="288" r:id="rId24"/>
+    <p:sldId id="290" r:id="rId25"/>
+    <p:sldId id="292" r:id="rId26"/>
+    <p:sldId id="295" r:id="rId27"/>
   </p:sldIdLst>
   <p:sldSz cx="12192000" cy="6858000"/>
   <p:notesSz cx="6858000" cy="9144000"/>
@@ -20837,6 +20836,14 @@
           </a:bodyPr>
           <a:lstStyle/>
           <a:p>
+            <a:r>
+              <a:rPr lang="en-US" dirty="0"/>
+              <a:t>Time </a:t>
+            </a:r>
+            <a:r>
+              <a:rPr lang="en-US"/>
+              <a:t>Domain Envelope</a:t>
+            </a:r>
             <a:endParaRPr lang="en-US" dirty="0"/>
           </a:p>
         </p:txBody>
@@ -20855,235 +20862,6 @@
 </file>
 
 <file path=ppt/slides/slide18.xml><?xml version="1.0" encoding="utf-8"?>
-<p:sld xmlns:a="http://schemas.openxmlformats.org/drawingml/2006/main" xmlns:r="http://schemas.openxmlformats.org/officeDocument/2006/relationships" xmlns:p="http://schemas.openxmlformats.org/presentationml/2006/main">
-  <p:cSld>
-    <p:spTree>
-      <p:nvGrpSpPr>
-        <p:cNvPr id="1" name=""/>
-        <p:cNvGrpSpPr/>
-        <p:nvPr/>
-      </p:nvGrpSpPr>
-      <p:grpSpPr>
-        <a:xfrm>
-          <a:off x="0" y="0"/>
-          <a:ext cx="0" cy="0"/>
-          <a:chOff x="0" y="0"/>
-          <a:chExt cx="0" cy="0"/>
-        </a:xfrm>
-      </p:grpSpPr>
-      <p:sp>
-        <p:nvSpPr>
-          <p:cNvPr id="2" name="Title 1">
-            <a:extLst>
-              <a:ext uri="{FF2B5EF4-FFF2-40B4-BE49-F238E27FC236}">
-                <a16:creationId xmlns:a16="http://schemas.microsoft.com/office/drawing/2014/main" id="{4987E51D-3917-4712-A089-1367DF7E8D2A}"/>
-              </a:ext>
-            </a:extLst>
-          </p:cNvPr>
-          <p:cNvSpPr>
-            <a:spLocks noGrp="1"/>
-          </p:cNvSpPr>
-          <p:nvPr>
-            <p:ph type="title"/>
-          </p:nvPr>
-        </p:nvSpPr>
-        <p:spPr/>
-        <p:txBody>
-          <a:bodyPr/>
-          <a:lstStyle/>
-          <a:p>
-            <a:r>
-              <a:rPr lang="en-US" dirty="0"/>
-              <a:t>Frequency-Space Features</a:t>
-            </a:r>
-          </a:p>
-        </p:txBody>
-      </p:sp>
-      <p:sp>
-        <p:nvSpPr>
-          <p:cNvPr id="5" name="Text Placeholder 4">
-            <a:extLst>
-              <a:ext uri="{FF2B5EF4-FFF2-40B4-BE49-F238E27FC236}">
-                <a16:creationId xmlns:a16="http://schemas.microsoft.com/office/drawing/2014/main" id="{F502C553-EC2B-41E9-9F01-B3EB4A4EECA8}"/>
-              </a:ext>
-            </a:extLst>
-          </p:cNvPr>
-          <p:cNvSpPr>
-            <a:spLocks noGrp="1"/>
-          </p:cNvSpPr>
-          <p:nvPr>
-            <p:ph type="body" idx="1"/>
-          </p:nvPr>
-        </p:nvSpPr>
-        <p:spPr/>
-        <p:txBody>
-          <a:bodyPr>
-            <a:normAutofit lnSpcReduction="10000"/>
-          </a:bodyPr>
-          <a:lstStyle/>
-          <a:p>
-            <a:r>
-              <a:rPr lang="en-US" b="1" dirty="0"/>
-              <a:t>Mel Frequency </a:t>
-            </a:r>
-            <a:r>
-              <a:rPr lang="en-US" b="1" dirty="0" err="1"/>
-              <a:t>Cepstrum</a:t>
-            </a:r>
-            <a:r>
-              <a:rPr lang="en-US" b="1" dirty="0"/>
-              <a:t> Coefficients</a:t>
-            </a:r>
-          </a:p>
-        </p:txBody>
-      </p:sp>
-      <p:sp>
-        <p:nvSpPr>
-          <p:cNvPr id="6" name="Content Placeholder 5">
-            <a:extLst>
-              <a:ext uri="{FF2B5EF4-FFF2-40B4-BE49-F238E27FC236}">
-                <a16:creationId xmlns:a16="http://schemas.microsoft.com/office/drawing/2014/main" id="{04EDF16B-D1EE-4A88-B577-69976F389E59}"/>
-              </a:ext>
-            </a:extLst>
-          </p:cNvPr>
-          <p:cNvSpPr>
-            <a:spLocks noGrp="1"/>
-          </p:cNvSpPr>
-          <p:nvPr>
-            <p:ph sz="half" idx="2"/>
-          </p:nvPr>
-        </p:nvSpPr>
-        <p:spPr/>
-        <p:txBody>
-          <a:bodyPr/>
-          <a:lstStyle/>
-          <a:p>
-            <a:endParaRPr lang="en-US" dirty="0"/>
-          </a:p>
-          <a:p>
-            <a:r>
-              <a:rPr lang="en-US" dirty="0"/>
-              <a:t>Detect periodicity in frequency spectrum</a:t>
-            </a:r>
-          </a:p>
-          <a:p>
-            <a:endParaRPr lang="en-US" dirty="0"/>
-          </a:p>
-          <a:p>
-            <a:r>
-              <a:rPr lang="en-US" dirty="0"/>
-              <a:t>Computed using </a:t>
-            </a:r>
-            <a:r>
-              <a:rPr lang="en-US" i="1" dirty="0"/>
-              <a:t>Mel </a:t>
-            </a:r>
-            <a:r>
-              <a:rPr lang="en-US" i="1" dirty="0" err="1"/>
-              <a:t>Filterbank</a:t>
-            </a:r>
-            <a:r>
-              <a:rPr lang="en-US" i="1" dirty="0"/>
-              <a:t> Energies</a:t>
-            </a:r>
-            <a:endParaRPr lang="en-US" dirty="0"/>
-          </a:p>
-          <a:p>
-            <a:pPr lvl="1"/>
-            <a:r>
-              <a:rPr lang="en-US" dirty="0"/>
-              <a:t>Dot the frequency spectrum with overlapping triangular filters</a:t>
-            </a:r>
-          </a:p>
-          <a:p>
-            <a:endParaRPr lang="en-US" dirty="0"/>
-          </a:p>
-        </p:txBody>
-      </p:sp>
-      <p:sp>
-        <p:nvSpPr>
-          <p:cNvPr id="7" name="Text Placeholder 6">
-            <a:extLst>
-              <a:ext uri="{FF2B5EF4-FFF2-40B4-BE49-F238E27FC236}">
-                <a16:creationId xmlns:a16="http://schemas.microsoft.com/office/drawing/2014/main" id="{F52E8C4C-C9D9-426E-A08E-6ADA2A28E94E}"/>
-              </a:ext>
-            </a:extLst>
-          </p:cNvPr>
-          <p:cNvSpPr>
-            <a:spLocks noGrp="1"/>
-          </p:cNvSpPr>
-          <p:nvPr>
-            <p:ph type="body" sz="quarter" idx="3"/>
-          </p:nvPr>
-        </p:nvSpPr>
-        <p:spPr/>
-        <p:txBody>
-          <a:bodyPr>
-            <a:normAutofit lnSpcReduction="10000"/>
-          </a:bodyPr>
-          <a:lstStyle/>
-          <a:p>
-            <a:r>
-              <a:rPr lang="en-US" b="1" dirty="0"/>
-              <a:t>Frequency Center of Mass</a:t>
-            </a:r>
-          </a:p>
-        </p:txBody>
-      </p:sp>
-      <p:sp>
-        <p:nvSpPr>
-          <p:cNvPr id="8" name="Content Placeholder 7">
-            <a:extLst>
-              <a:ext uri="{FF2B5EF4-FFF2-40B4-BE49-F238E27FC236}">
-                <a16:creationId xmlns:a16="http://schemas.microsoft.com/office/drawing/2014/main" id="{10289456-E617-4BDD-8E4C-4DFD29E61A21}"/>
-              </a:ext>
-            </a:extLst>
-          </p:cNvPr>
-          <p:cNvSpPr>
-            <a:spLocks noGrp="1"/>
-          </p:cNvSpPr>
-          <p:nvPr>
-            <p:ph sz="quarter" idx="4"/>
-          </p:nvPr>
-        </p:nvSpPr>
-        <p:spPr/>
-        <p:txBody>
-          <a:bodyPr/>
-          <a:lstStyle/>
-          <a:p>
-            <a:endParaRPr lang="en-US" dirty="0"/>
-          </a:p>
-          <a:p>
-            <a:r>
-              <a:rPr lang="en-US" dirty="0"/>
-              <a:t>Treat frequency spectrum as 1D mass distribution</a:t>
-            </a:r>
-          </a:p>
-          <a:p>
-            <a:endParaRPr lang="en-US" dirty="0"/>
-          </a:p>
-          <a:p>
-            <a:r>
-              <a:rPr lang="en-US" dirty="0"/>
-              <a:t>Lower Instruments vs. Higher Instruments</a:t>
-            </a:r>
-          </a:p>
-        </p:txBody>
-      </p:sp>
-    </p:spTree>
-    <p:extLst>
-      <p:ext uri="{BB962C8B-B14F-4D97-AF65-F5344CB8AC3E}">
-        <p14:creationId xmlns:p14="http://schemas.microsoft.com/office/powerpoint/2010/main" val="759717338"/>
-      </p:ext>
-    </p:extLst>
-  </p:cSld>
-  <p:clrMapOvr>
-    <a:masterClrMapping/>
-  </p:clrMapOvr>
-</p:sld>
-</file>
-
-<file path=ppt/slides/slide19.xml><?xml version="1.0" encoding="utf-8"?>
 <p:sld xmlns:a="http://schemas.openxmlformats.org/drawingml/2006/main" xmlns:r="http://schemas.openxmlformats.org/officeDocument/2006/relationships" xmlns:p="http://schemas.openxmlformats.org/presentationml/2006/main">
   <p:cSld>
     <p:spTree>
@@ -21160,6 +20938,132 @@
     <p:extLst>
       <p:ext uri="{BB962C8B-B14F-4D97-AF65-F5344CB8AC3E}">
         <p14:creationId xmlns:p14="http://schemas.microsoft.com/office/powerpoint/2010/main" val="2156279359"/>
+      </p:ext>
+    </p:extLst>
+  </p:cSld>
+  <p:clrMapOvr>
+    <a:masterClrMapping/>
+  </p:clrMapOvr>
+</p:sld>
+</file>
+
+<file path=ppt/slides/slide19.xml><?xml version="1.0" encoding="utf-8"?>
+<p:sld xmlns:a="http://schemas.openxmlformats.org/drawingml/2006/main" xmlns:r="http://schemas.openxmlformats.org/officeDocument/2006/relationships" xmlns:p="http://schemas.openxmlformats.org/presentationml/2006/main">
+  <p:cSld>
+    <p:spTree>
+      <p:nvGrpSpPr>
+        <p:cNvPr id="1" name=""/>
+        <p:cNvGrpSpPr/>
+        <p:nvPr/>
+      </p:nvGrpSpPr>
+      <p:grpSpPr>
+        <a:xfrm>
+          <a:off x="0" y="0"/>
+          <a:ext cx="0" cy="0"/>
+          <a:chOff x="0" y="0"/>
+          <a:chExt cx="0" cy="0"/>
+        </a:xfrm>
+      </p:grpSpPr>
+      <p:sp>
+        <p:nvSpPr>
+          <p:cNvPr id="2" name="Title 1">
+            <a:extLst>
+              <a:ext uri="{FF2B5EF4-FFF2-40B4-BE49-F238E27FC236}">
+                <a16:creationId xmlns:a16="http://schemas.microsoft.com/office/drawing/2014/main" id="{BF569AA0-70C4-4DFB-A1CF-1195BE4F477D}"/>
+              </a:ext>
+            </a:extLst>
+          </p:cNvPr>
+          <p:cNvSpPr>
+            <a:spLocks noGrp="1"/>
+          </p:cNvSpPr>
+          <p:nvPr>
+            <p:ph type="title"/>
+          </p:nvPr>
+        </p:nvSpPr>
+        <p:spPr>
+          <a:xfrm>
+            <a:off x="8002587" y="1600200"/>
+            <a:ext cx="3122613" cy="1828800"/>
+          </a:xfrm>
+        </p:spPr>
+        <p:txBody>
+          <a:bodyPr anchor="b">
+            <a:normAutofit/>
+          </a:bodyPr>
+          <a:lstStyle/>
+          <a:p>
+            <a:r>
+              <a:rPr lang="en-US" dirty="0"/>
+              <a:t>Dual Modalities</a:t>
+            </a:r>
+          </a:p>
+        </p:txBody>
+      </p:sp>
+      <p:sp>
+        <p:nvSpPr>
+          <p:cNvPr id="9" name="Text Placeholder 3">
+            <a:extLst>
+              <a:ext uri="{FF2B5EF4-FFF2-40B4-BE49-F238E27FC236}">
+                <a16:creationId xmlns:a16="http://schemas.microsoft.com/office/drawing/2014/main" id="{92B93175-717B-4D72-B87B-4743D2BB0619}"/>
+              </a:ext>
+            </a:extLst>
+          </p:cNvPr>
+          <p:cNvSpPr>
+            <a:spLocks noGrp="1"/>
+          </p:cNvSpPr>
+          <p:nvPr>
+            <p:ph type="body" sz="half" idx="2"/>
+          </p:nvPr>
+        </p:nvSpPr>
+        <p:spPr>
+          <a:xfrm>
+            <a:off x="8001039" y="3429000"/>
+            <a:ext cx="3124161" cy="1828800"/>
+          </a:xfrm>
+        </p:spPr>
+        <p:txBody>
+          <a:bodyPr/>
+          <a:lstStyle/>
+          <a:p>
+            <a:endParaRPr lang="en-US"/>
+          </a:p>
+        </p:txBody>
+      </p:sp>
+      <p:graphicFrame>
+        <p:nvGraphicFramePr>
+          <p:cNvPr id="5" name="Content Placeholder 2">
+            <a:extLst>
+              <a:ext uri="{FF2B5EF4-FFF2-40B4-BE49-F238E27FC236}">
+                <a16:creationId xmlns:a16="http://schemas.microsoft.com/office/drawing/2014/main" id="{3A1566D7-AC1B-48CF-AAAD-CA34F71E74CB}"/>
+              </a:ext>
+            </a:extLst>
+          </p:cNvPr>
+          <p:cNvGraphicFramePr>
+            <a:graphicFrameLocks noGrp="1"/>
+          </p:cNvGraphicFramePr>
+          <p:nvPr>
+            <p:ph idx="1"/>
+            <p:extLst>
+              <p:ext uri="{D42A27DB-BD31-4B8C-83A1-F6EECF244321}">
+                <p14:modId xmlns:p14="http://schemas.microsoft.com/office/powerpoint/2010/main" val="2945829138"/>
+              </p:ext>
+            </p:extLst>
+          </p:nvPr>
+        </p:nvGraphicFramePr>
+        <p:xfrm>
+          <a:off x="760412" y="762000"/>
+          <a:ext cx="6400800" cy="5334000"/>
+        </p:xfrm>
+        <a:graphic>
+          <a:graphicData uri="http://schemas.openxmlformats.org/drawingml/2006/diagram">
+            <dgm:relIds xmlns:dgm="http://schemas.openxmlformats.org/drawingml/2006/diagram" xmlns:r="http://schemas.openxmlformats.org/officeDocument/2006/relationships" r:dm="rId2" r:lo="rId3" r:qs="rId4" r:cs="rId5"/>
+          </a:graphicData>
+        </a:graphic>
+      </p:graphicFrame>
+    </p:spTree>
+    <p:extLst>
+      <p:ext uri="{BB962C8B-B14F-4D97-AF65-F5344CB8AC3E}">
+        <p14:creationId xmlns:p14="http://schemas.microsoft.com/office/powerpoint/2010/main" val="1565125394"/>
       </p:ext>
     </p:extLst>
   </p:cSld>
@@ -21256,132 +21160,6 @@
 </file>
 
 <file path=ppt/slides/slide20.xml><?xml version="1.0" encoding="utf-8"?>
-<p:sld xmlns:a="http://schemas.openxmlformats.org/drawingml/2006/main" xmlns:r="http://schemas.openxmlformats.org/officeDocument/2006/relationships" xmlns:p="http://schemas.openxmlformats.org/presentationml/2006/main">
-  <p:cSld>
-    <p:spTree>
-      <p:nvGrpSpPr>
-        <p:cNvPr id="1" name=""/>
-        <p:cNvGrpSpPr/>
-        <p:nvPr/>
-      </p:nvGrpSpPr>
-      <p:grpSpPr>
-        <a:xfrm>
-          <a:off x="0" y="0"/>
-          <a:ext cx="0" cy="0"/>
-          <a:chOff x="0" y="0"/>
-          <a:chExt cx="0" cy="0"/>
-        </a:xfrm>
-      </p:grpSpPr>
-      <p:sp>
-        <p:nvSpPr>
-          <p:cNvPr id="2" name="Title 1">
-            <a:extLst>
-              <a:ext uri="{FF2B5EF4-FFF2-40B4-BE49-F238E27FC236}">
-                <a16:creationId xmlns:a16="http://schemas.microsoft.com/office/drawing/2014/main" id="{BF569AA0-70C4-4DFB-A1CF-1195BE4F477D}"/>
-              </a:ext>
-            </a:extLst>
-          </p:cNvPr>
-          <p:cNvSpPr>
-            <a:spLocks noGrp="1"/>
-          </p:cNvSpPr>
-          <p:nvPr>
-            <p:ph type="title"/>
-          </p:nvPr>
-        </p:nvSpPr>
-        <p:spPr>
-          <a:xfrm>
-            <a:off x="8002587" y="1600200"/>
-            <a:ext cx="3122613" cy="1828800"/>
-          </a:xfrm>
-        </p:spPr>
-        <p:txBody>
-          <a:bodyPr anchor="b">
-            <a:normAutofit/>
-          </a:bodyPr>
-          <a:lstStyle/>
-          <a:p>
-            <a:r>
-              <a:rPr lang="en-US" dirty="0"/>
-              <a:t>Dual Modalities</a:t>
-            </a:r>
-          </a:p>
-        </p:txBody>
-      </p:sp>
-      <p:sp>
-        <p:nvSpPr>
-          <p:cNvPr id="9" name="Text Placeholder 3">
-            <a:extLst>
-              <a:ext uri="{FF2B5EF4-FFF2-40B4-BE49-F238E27FC236}">
-                <a16:creationId xmlns:a16="http://schemas.microsoft.com/office/drawing/2014/main" id="{92B93175-717B-4D72-B87B-4743D2BB0619}"/>
-              </a:ext>
-            </a:extLst>
-          </p:cNvPr>
-          <p:cNvSpPr>
-            <a:spLocks noGrp="1"/>
-          </p:cNvSpPr>
-          <p:nvPr>
-            <p:ph type="body" sz="half" idx="2"/>
-          </p:nvPr>
-        </p:nvSpPr>
-        <p:spPr>
-          <a:xfrm>
-            <a:off x="8001039" y="3429000"/>
-            <a:ext cx="3124161" cy="1828800"/>
-          </a:xfrm>
-        </p:spPr>
-        <p:txBody>
-          <a:bodyPr/>
-          <a:lstStyle/>
-          <a:p>
-            <a:endParaRPr lang="en-US"/>
-          </a:p>
-        </p:txBody>
-      </p:sp>
-      <p:graphicFrame>
-        <p:nvGraphicFramePr>
-          <p:cNvPr id="5" name="Content Placeholder 2">
-            <a:extLst>
-              <a:ext uri="{FF2B5EF4-FFF2-40B4-BE49-F238E27FC236}">
-                <a16:creationId xmlns:a16="http://schemas.microsoft.com/office/drawing/2014/main" id="{3A1566D7-AC1B-48CF-AAAD-CA34F71E74CB}"/>
-              </a:ext>
-            </a:extLst>
-          </p:cNvPr>
-          <p:cNvGraphicFramePr>
-            <a:graphicFrameLocks noGrp="1"/>
-          </p:cNvGraphicFramePr>
-          <p:nvPr>
-            <p:ph idx="1"/>
-            <p:extLst>
-              <p:ext uri="{D42A27DB-BD31-4B8C-83A1-F6EECF244321}">
-                <p14:modId xmlns:p14="http://schemas.microsoft.com/office/powerpoint/2010/main" val="2945829138"/>
-              </p:ext>
-            </p:extLst>
-          </p:nvPr>
-        </p:nvGraphicFramePr>
-        <p:xfrm>
-          <a:off x="760412" y="762000"/>
-          <a:ext cx="6400800" cy="5334000"/>
-        </p:xfrm>
-        <a:graphic>
-          <a:graphicData uri="http://schemas.openxmlformats.org/drawingml/2006/diagram">
-            <dgm:relIds xmlns:dgm="http://schemas.openxmlformats.org/drawingml/2006/diagram" xmlns:r="http://schemas.openxmlformats.org/officeDocument/2006/relationships" r:dm="rId2" r:lo="rId3" r:qs="rId4" r:cs="rId5"/>
-          </a:graphicData>
-        </a:graphic>
-      </p:graphicFrame>
-    </p:spTree>
-    <p:extLst>
-      <p:ext uri="{BB962C8B-B14F-4D97-AF65-F5344CB8AC3E}">
-        <p14:creationId xmlns:p14="http://schemas.microsoft.com/office/powerpoint/2010/main" val="1565125394"/>
-      </p:ext>
-    </p:extLst>
-  </p:cSld>
-  <p:clrMapOvr>
-    <a:masterClrMapping/>
-  </p:clrMapOvr>
-</p:sld>
-</file>
-
-<file path=ppt/slides/slide21.xml><?xml version="1.0" encoding="utf-8"?>
 <p:sld xmlns:a="http://schemas.openxmlformats.org/drawingml/2006/main" xmlns:r="http://schemas.openxmlformats.org/officeDocument/2006/relationships" xmlns:p="http://schemas.openxmlformats.org/presentationml/2006/main">
   <p:cSld>
     <p:spTree>
@@ -21592,7 +21370,7 @@
 </p:sld>
 </file>
 
-<file path=ppt/slides/slide22.xml><?xml version="1.0" encoding="utf-8"?>
+<file path=ppt/slides/slide21.xml><?xml version="1.0" encoding="utf-8"?>
 <p:sld xmlns:a="http://schemas.openxmlformats.org/drawingml/2006/main" xmlns:r="http://schemas.openxmlformats.org/officeDocument/2006/relationships" xmlns:p="http://schemas.openxmlformats.org/presentationml/2006/main">
   <p:cSld>
     <p:spTree>
@@ -21678,7 +21456,7 @@
 </p:sld>
 </file>
 
-<file path=ppt/slides/slide23.xml><?xml version="1.0" encoding="utf-8"?>
+<file path=ppt/slides/slide22.xml><?xml version="1.0" encoding="utf-8"?>
 <p:sld xmlns:a="http://schemas.openxmlformats.org/drawingml/2006/main" xmlns:r="http://schemas.openxmlformats.org/officeDocument/2006/relationships" xmlns:p="http://schemas.openxmlformats.org/presentationml/2006/main">
   <p:cSld>
     <p:spTree>
@@ -22117,7 +21895,7 @@
 </p:sld>
 </file>
 
-<file path=ppt/slides/slide24.xml><?xml version="1.0" encoding="utf-8"?>
+<file path=ppt/slides/slide23.xml><?xml version="1.0" encoding="utf-8"?>
 <p:sld xmlns:a="http://schemas.openxmlformats.org/drawingml/2006/main" xmlns:r="http://schemas.openxmlformats.org/officeDocument/2006/relationships" xmlns:p="http://schemas.openxmlformats.org/presentationml/2006/main">
   <p:cSld>
     <p:spTree>
@@ -22275,7 +22053,7 @@
 </p:sld>
 </file>
 
-<file path=ppt/slides/slide25.xml><?xml version="1.0" encoding="utf-8"?>
+<file path=ppt/slides/slide24.xml><?xml version="1.0" encoding="utf-8"?>
 <p:sld xmlns:a="http://schemas.openxmlformats.org/drawingml/2006/main" xmlns:r="http://schemas.openxmlformats.org/officeDocument/2006/relationships" xmlns:p="http://schemas.openxmlformats.org/presentationml/2006/main">
   <p:cSld>
     <p:spTree>
@@ -22423,7 +22201,7 @@
 </p:sld>
 </file>
 
-<file path=ppt/slides/slide26.xml><?xml version="1.0" encoding="utf-8"?>
+<file path=ppt/slides/slide25.xml><?xml version="1.0" encoding="utf-8"?>
 <p:sld xmlns:a="http://schemas.openxmlformats.org/drawingml/2006/main" xmlns:r="http://schemas.openxmlformats.org/officeDocument/2006/relationships" xmlns:p="http://schemas.openxmlformats.org/presentationml/2006/main">
   <p:cSld>
     <p:spTree>
@@ -22504,44 +22282,300 @@
             <a:endParaRPr lang="en-US" dirty="0"/>
           </a:p>
           <a:p>
+            <a:endParaRPr lang="en-US" dirty="0"/>
+          </a:p>
+          <a:p>
             <a:r>
               <a:rPr lang="en-US" dirty="0"/>
-              <a:t>Averaged over 10 folds</a:t>
+              <a:t>Results averaged over 10 folds</a:t>
             </a:r>
           </a:p>
           <a:p>
             <a:endParaRPr lang="en-US" dirty="0"/>
           </a:p>
+        </p:txBody>
+      </p:sp>
+      <p:pic>
+        <p:nvPicPr>
+          <p:cNvPr id="10" name="Picture 9" descr="Chart, bar chart&#10;&#10;Description automatically generated">
+            <a:extLst>
+              <a:ext uri="{FF2B5EF4-FFF2-40B4-BE49-F238E27FC236}">
+                <a16:creationId xmlns:a16="http://schemas.microsoft.com/office/drawing/2014/main" id="{DA5688C0-1704-4AB4-B1C2-70E4EF1DCCF7}"/>
+              </a:ext>
+            </a:extLst>
+          </p:cNvPr>
+          <p:cNvPicPr>
+            <a:picLocks noChangeAspect="1"/>
+          </p:cNvPicPr>
+          <p:nvPr/>
+        </p:nvPicPr>
+        <p:blipFill>
+          <a:blip r:embed="rId2" cstate="print">
+            <a:extLst>
+              <a:ext uri="{28A0092B-C50C-407E-A947-70E740481C1C}">
+                <a14:useLocalDpi xmlns:a14="http://schemas.microsoft.com/office/drawing/2010/main" val="0"/>
+              </a:ext>
+            </a:extLst>
+          </a:blip>
+          <a:stretch>
+            <a:fillRect/>
+          </a:stretch>
+        </p:blipFill>
+        <p:spPr>
+          <a:xfrm>
+            <a:off x="609600" y="1356360"/>
+            <a:ext cx="3108960" cy="2072640"/>
+          </a:xfrm>
+          <a:prstGeom prst="rect">
+            <a:avLst/>
+          </a:prstGeom>
+        </p:spPr>
+      </p:pic>
+      <p:pic>
+        <p:nvPicPr>
+          <p:cNvPr id="12" name="Picture 11" descr="Chart, bar chart&#10;&#10;Description automatically generated">
+            <a:extLst>
+              <a:ext uri="{FF2B5EF4-FFF2-40B4-BE49-F238E27FC236}">
+                <a16:creationId xmlns:a16="http://schemas.microsoft.com/office/drawing/2014/main" id="{18D96975-8A65-44BF-929B-6CE47E0EE88A}"/>
+              </a:ext>
+            </a:extLst>
+          </p:cNvPr>
+          <p:cNvPicPr>
+            <a:picLocks noChangeAspect="1"/>
+          </p:cNvPicPr>
+          <p:nvPr/>
+        </p:nvPicPr>
+        <p:blipFill>
+          <a:blip r:embed="rId3" cstate="print">
+            <a:extLst>
+              <a:ext uri="{28A0092B-C50C-407E-A947-70E740481C1C}">
+                <a14:useLocalDpi xmlns:a14="http://schemas.microsoft.com/office/drawing/2010/main" val="0"/>
+              </a:ext>
+            </a:extLst>
+          </a:blip>
+          <a:stretch>
+            <a:fillRect/>
+          </a:stretch>
+        </p:blipFill>
+        <p:spPr>
+          <a:xfrm>
+            <a:off x="4061460" y="1356360"/>
+            <a:ext cx="3108960" cy="2072640"/>
+          </a:xfrm>
+          <a:prstGeom prst="rect">
+            <a:avLst/>
+          </a:prstGeom>
+        </p:spPr>
+      </p:pic>
+      <p:pic>
+        <p:nvPicPr>
+          <p:cNvPr id="14" name="Picture 13" descr="Chart, bar chart&#10;&#10;Description automatically generated">
+            <a:extLst>
+              <a:ext uri="{FF2B5EF4-FFF2-40B4-BE49-F238E27FC236}">
+                <a16:creationId xmlns:a16="http://schemas.microsoft.com/office/drawing/2014/main" id="{6D5A6D7D-C12B-43B6-8DB1-0B5EA94F0737}"/>
+              </a:ext>
+            </a:extLst>
+          </p:cNvPr>
+          <p:cNvPicPr>
+            <a:picLocks noChangeAspect="1"/>
+          </p:cNvPicPr>
+          <p:nvPr/>
+        </p:nvPicPr>
+        <p:blipFill>
+          <a:blip r:embed="rId4" cstate="print">
+            <a:extLst>
+              <a:ext uri="{28A0092B-C50C-407E-A947-70E740481C1C}">
+                <a14:useLocalDpi xmlns:a14="http://schemas.microsoft.com/office/drawing/2010/main" val="0"/>
+              </a:ext>
+            </a:extLst>
+          </a:blip>
+          <a:stretch>
+            <a:fillRect/>
+          </a:stretch>
+        </p:blipFill>
+        <p:spPr>
+          <a:xfrm>
+            <a:off x="609600" y="3962400"/>
+            <a:ext cx="3108960" cy="2072640"/>
+          </a:xfrm>
+          <a:prstGeom prst="rect">
+            <a:avLst/>
+          </a:prstGeom>
+        </p:spPr>
+      </p:pic>
+      <p:pic>
+        <p:nvPicPr>
+          <p:cNvPr id="16" name="Picture 15" descr="Chart, bar chart&#10;&#10;Description automatically generated">
+            <a:extLst>
+              <a:ext uri="{FF2B5EF4-FFF2-40B4-BE49-F238E27FC236}">
+                <a16:creationId xmlns:a16="http://schemas.microsoft.com/office/drawing/2014/main" id="{1B2F1C49-BBC9-44BF-AC5D-BE0871EA5DB0}"/>
+              </a:ext>
+            </a:extLst>
+          </p:cNvPr>
+          <p:cNvPicPr>
+            <a:picLocks noChangeAspect="1"/>
+          </p:cNvPicPr>
+          <p:nvPr/>
+        </p:nvPicPr>
+        <p:blipFill>
+          <a:blip r:embed="rId5" cstate="print">
+            <a:extLst>
+              <a:ext uri="{28A0092B-C50C-407E-A947-70E740481C1C}">
+                <a14:useLocalDpi xmlns:a14="http://schemas.microsoft.com/office/drawing/2010/main" val="0"/>
+              </a:ext>
+            </a:extLst>
+          </a:blip>
+          <a:stretch>
+            <a:fillRect/>
+          </a:stretch>
+        </p:blipFill>
+        <p:spPr>
+          <a:xfrm>
+            <a:off x="4061460" y="3962400"/>
+            <a:ext cx="3108960" cy="2072640"/>
+          </a:xfrm>
+          <a:prstGeom prst="rect">
+            <a:avLst/>
+          </a:prstGeom>
+        </p:spPr>
+      </p:pic>
+      <p:sp>
+        <p:nvSpPr>
+          <p:cNvPr id="17" name="TextBox 16">
+            <a:extLst>
+              <a:ext uri="{FF2B5EF4-FFF2-40B4-BE49-F238E27FC236}">
+                <a16:creationId xmlns:a16="http://schemas.microsoft.com/office/drawing/2014/main" id="{1F4309D5-E6E7-41AB-8550-60DE2C8198BA}"/>
+              </a:ext>
+            </a:extLst>
+          </p:cNvPr>
+          <p:cNvSpPr txBox="1"/>
+          <p:nvPr/>
+        </p:nvSpPr>
+        <p:spPr>
+          <a:xfrm>
+            <a:off x="609600" y="3429000"/>
+            <a:ext cx="771365" cy="369332"/>
+          </a:xfrm>
+          <a:prstGeom prst="rect">
+            <a:avLst/>
+          </a:prstGeom>
+          <a:noFill/>
+        </p:spPr>
+        <p:txBody>
+          <a:bodyPr wrap="none" rtlCol="0">
+            <a:spAutoFit/>
+          </a:bodyPr>
+          <a:lstStyle/>
           <a:p>
             <a:r>
               <a:rPr lang="en-US" dirty="0"/>
-              <a:t>Averaged Across 37 classes</a:t>
+              <a:t>Flutes</a:t>
             </a:r>
           </a:p>
         </p:txBody>
       </p:sp>
       <p:sp>
         <p:nvSpPr>
-          <p:cNvPr id="6" name="Content Placeholder 5">
+          <p:cNvPr id="18" name="TextBox 17">
             <a:extLst>
               <a:ext uri="{FF2B5EF4-FFF2-40B4-BE49-F238E27FC236}">
-                <a16:creationId xmlns:a16="http://schemas.microsoft.com/office/drawing/2014/main" id="{558B70B6-84EB-4814-957F-37870896A523}"/>
+                <a16:creationId xmlns:a16="http://schemas.microsoft.com/office/drawing/2014/main" id="{893E93DF-E118-47B7-A625-99D11218A6E6}"/>
               </a:ext>
             </a:extLst>
           </p:cNvPr>
-          <p:cNvSpPr>
-            <a:spLocks noGrp="1"/>
-          </p:cNvSpPr>
-          <p:nvPr>
-            <p:ph idx="1"/>
-          </p:nvPr>
+          <p:cNvSpPr txBox="1"/>
+          <p:nvPr/>
         </p:nvSpPr>
-        <p:spPr/>
+        <p:spPr>
+          <a:xfrm>
+            <a:off x="4061460" y="3429000"/>
+            <a:ext cx="967740" cy="369332"/>
+          </a:xfrm>
+          <a:prstGeom prst="rect">
+            <a:avLst/>
+          </a:prstGeom>
+          <a:noFill/>
+        </p:spPr>
         <p:txBody>
-          <a:bodyPr/>
+          <a:bodyPr wrap="square" rtlCol="0">
+            <a:spAutoFit/>
+          </a:bodyPr>
           <a:lstStyle/>
           <a:p>
-            <a:endParaRPr lang="en-US"/>
+            <a:r>
+              <a:rPr lang="en-US" dirty="0"/>
+              <a:t>Guitars</a:t>
+            </a:r>
+          </a:p>
+        </p:txBody>
+      </p:sp>
+      <p:sp>
+        <p:nvSpPr>
+          <p:cNvPr id="19" name="TextBox 18">
+            <a:extLst>
+              <a:ext uri="{FF2B5EF4-FFF2-40B4-BE49-F238E27FC236}">
+                <a16:creationId xmlns:a16="http://schemas.microsoft.com/office/drawing/2014/main" id="{6DF92A11-50BD-4285-B03C-477131594FC7}"/>
+              </a:ext>
+            </a:extLst>
+          </p:cNvPr>
+          <p:cNvSpPr txBox="1"/>
+          <p:nvPr/>
+        </p:nvSpPr>
+        <p:spPr>
+          <a:xfrm>
+            <a:off x="609600" y="6035040"/>
+            <a:ext cx="1066800" cy="369332"/>
+          </a:xfrm>
+          <a:prstGeom prst="rect">
+            <a:avLst/>
+          </a:prstGeom>
+          <a:noFill/>
+        </p:spPr>
+        <p:txBody>
+          <a:bodyPr wrap="square" rtlCol="0">
+            <a:spAutoFit/>
+          </a:bodyPr>
+          <a:lstStyle/>
+          <a:p>
+            <a:r>
+              <a:rPr lang="en-US" dirty="0"/>
+              <a:t>Trumpet</a:t>
+            </a:r>
+          </a:p>
+        </p:txBody>
+      </p:sp>
+      <p:sp>
+        <p:nvSpPr>
+          <p:cNvPr id="20" name="TextBox 19">
+            <a:extLst>
+              <a:ext uri="{FF2B5EF4-FFF2-40B4-BE49-F238E27FC236}">
+                <a16:creationId xmlns:a16="http://schemas.microsoft.com/office/drawing/2014/main" id="{6FC06A89-145B-40BE-8E50-DC1C79F59D09}"/>
+              </a:ext>
+            </a:extLst>
+          </p:cNvPr>
+          <p:cNvSpPr txBox="1"/>
+          <p:nvPr/>
+        </p:nvSpPr>
+        <p:spPr>
+          <a:xfrm>
+            <a:off x="4061460" y="6035040"/>
+            <a:ext cx="1805940" cy="369332"/>
+          </a:xfrm>
+          <a:prstGeom prst="rect">
+            <a:avLst/>
+          </a:prstGeom>
+          <a:noFill/>
+        </p:spPr>
+        <p:txBody>
+          <a:bodyPr wrap="square" rtlCol="0">
+            <a:spAutoFit/>
+          </a:bodyPr>
+          <a:lstStyle/>
+          <a:p>
+            <a:r>
+              <a:rPr lang="en-US" dirty="0"/>
+              <a:t>Xylophone</a:t>
+            </a:r>
           </a:p>
         </p:txBody>
       </p:sp>
@@ -22558,7 +22592,7 @@
 </p:sld>
 </file>
 
-<file path=ppt/slides/slide27.xml><?xml version="1.0" encoding="utf-8"?>
+<file path=ppt/slides/slide26.xml><?xml version="1.0" encoding="utf-8"?>
 <p:sld xmlns:a="http://schemas.openxmlformats.org/drawingml/2006/main" xmlns:r="http://schemas.openxmlformats.org/officeDocument/2006/relationships" xmlns:p="http://schemas.openxmlformats.org/presentationml/2006/main">
   <p:cSld>
     <p:spTree>
@@ -22626,7 +22660,7 @@
           <a:p>
             <a:r>
               <a:rPr lang="en-US" dirty="0"/>
-              <a:t>Thank you!</a:t>
+              <a:t>lhb1007@wildcats.unh.edu</a:t>
             </a:r>
           </a:p>
         </p:txBody>
@@ -23836,7 +23870,7 @@
           <a:p>
             <a:r>
               <a:rPr lang="en-US" dirty="0"/>
-              <a:t>2D Convolution Layer</a:t>
+              <a:t>Dense Layer</a:t>
             </a:r>
           </a:p>
         </p:txBody>
@@ -23866,7 +23900,7 @@
           <a:p>
             <a:r>
               <a:rPr lang="en-US" dirty="0"/>
-              <a:t>Sparse Connectivity</a:t>
+              <a:t>“Dense” Connectivity</a:t>
             </a:r>
           </a:p>
           <a:p>
@@ -23887,7 +23921,7 @@
           <a:p>
             <a:r>
               <a:rPr lang="en-US" dirty="0"/>
-              <a:t>Outputs are a convolution product of kernel &amp; Inputs</a:t>
+              <a:t>Outputs are a linear combination of inputs</a:t>
             </a:r>
           </a:p>
         </p:txBody>
@@ -23915,7 +23949,7 @@
           <a:p>
             <a:r>
               <a:rPr lang="en-US" dirty="0"/>
-              <a:t>Dense Layer</a:t>
+              <a:t>2D Convolution Layer</a:t>
             </a:r>
           </a:p>
         </p:txBody>
@@ -23945,7 +23979,7 @@
           <a:p>
             <a:r>
               <a:rPr lang="en-US" dirty="0"/>
-              <a:t>“Dense” Connectivity</a:t>
+              <a:t>“Sparse” Connectivity</a:t>
             </a:r>
           </a:p>
           <a:p>
@@ -23966,11 +24000,113 @@
           <a:p>
             <a:r>
               <a:rPr lang="en-US" dirty="0"/>
-              <a:t>Outputs are a linear combination of inputs</a:t>
+              <a:t>Outputs are inputs convolved with a weighting kernel</a:t>
             </a:r>
           </a:p>
         </p:txBody>
       </p:sp>
+      <p:pic>
+        <p:nvPicPr>
+          <p:cNvPr id="8" name="Picture 7" descr="A picture containing diagram&#10;&#10;Description automatically generated">
+            <a:extLst>
+              <a:ext uri="{FF2B5EF4-FFF2-40B4-BE49-F238E27FC236}">
+                <a16:creationId xmlns:a16="http://schemas.microsoft.com/office/drawing/2014/main" id="{C32A13B8-4F30-4CA3-8FA4-4C2EC985BE05}"/>
+              </a:ext>
+            </a:extLst>
+          </p:cNvPr>
+          <p:cNvPicPr>
+            <a:picLocks noChangeAspect="1"/>
+          </p:cNvPicPr>
+          <p:nvPr/>
+        </p:nvPicPr>
+        <p:blipFill>
+          <a:blip r:embed="rId2">
+            <a:extLst>
+              <a:ext uri="{28A0092B-C50C-407E-A947-70E740481C1C}">
+                <a14:useLocalDpi xmlns:a14="http://schemas.microsoft.com/office/drawing/2010/main" val="0"/>
+              </a:ext>
+            </a:extLst>
+          </a:blip>
+          <a:stretch>
+            <a:fillRect/>
+          </a:stretch>
+        </p:blipFill>
+        <p:spPr>
+          <a:xfrm>
+            <a:off x="6553200" y="2973243"/>
+            <a:ext cx="3124200" cy="2169584"/>
+          </a:xfrm>
+          <a:prstGeom prst="rect">
+            <a:avLst/>
+          </a:prstGeom>
+        </p:spPr>
+      </p:pic>
+      <p:pic>
+        <p:nvPicPr>
+          <p:cNvPr id="10" name="Picture 9" descr="A picture containing shape&#10;&#10;Description automatically generated">
+            <a:extLst>
+              <a:ext uri="{FF2B5EF4-FFF2-40B4-BE49-F238E27FC236}">
+                <a16:creationId xmlns:a16="http://schemas.microsoft.com/office/drawing/2014/main" id="{D5B6546A-05F5-4D94-9E90-05A557B86E75}"/>
+              </a:ext>
+            </a:extLst>
+          </p:cNvPr>
+          <p:cNvPicPr>
+            <a:picLocks noChangeAspect="1"/>
+          </p:cNvPicPr>
+          <p:nvPr/>
+        </p:nvPicPr>
+        <p:blipFill>
+          <a:blip r:embed="rId3">
+            <a:extLst>
+              <a:ext uri="{28A0092B-C50C-407E-A947-70E740481C1C}">
+                <a14:useLocalDpi xmlns:a14="http://schemas.microsoft.com/office/drawing/2010/main" val="0"/>
+              </a:ext>
+            </a:extLst>
+          </a:blip>
+          <a:stretch>
+            <a:fillRect/>
+          </a:stretch>
+        </p:blipFill>
+        <p:spPr>
+          <a:xfrm>
+            <a:off x="1447800" y="3048000"/>
+            <a:ext cx="3820199" cy="1902638"/>
+          </a:xfrm>
+          <a:prstGeom prst="rect">
+            <a:avLst/>
+          </a:prstGeom>
+          <a:solidFill>
+            <a:srgbClr val="FFFFFF">
+              <a:shade val="85000"/>
+            </a:srgbClr>
+          </a:solidFill>
+          <a:ln w="3175" cap="sq">
+            <a:solidFill>
+              <a:srgbClr val="FFFFFF"/>
+            </a:solidFill>
+            <a:miter lim="800000"/>
+          </a:ln>
+          <a:effectLst>
+            <a:outerShdw blurRad="55000" dist="18000" dir="5400000" algn="tl" rotWithShape="0">
+              <a:srgbClr val="000000">
+                <a:alpha val="40000"/>
+              </a:srgbClr>
+            </a:outerShdw>
+          </a:effectLst>
+          <a:scene3d>
+            <a:camera prst="orthographicFront"/>
+            <a:lightRig rig="twoPt" dir="t">
+              <a:rot lat="0" lon="0" rev="7200000"/>
+            </a:lightRig>
+          </a:scene3d>
+          <a:sp3d>
+            <a:bevelT w="25400" h="19050"/>
+            <a:contourClr>
+              <a:srgbClr val="FFFFFF"/>
+            </a:contourClr>
+          </a:sp3d>
+        </p:spPr>
+      </p:pic>
     </p:spTree>
     <p:extLst>
       <p:ext uri="{BB962C8B-B14F-4D97-AF65-F5344CB8AC3E}">

</xml_diff>